<commit_message>
update ppt and remove displays from slx
</commit_message>
<xml_diff>
--- a/docu_and_plots/thoughts_and_revelations_during_this_project.pptx
+++ b/docu_and_plots/thoughts_and_revelations_during_this_project.pptx
@@ -6357,6 +6357,36 @@
           <a:chExt cx="0" cy="0"/>
         </a:xfrm>
       </p:grpSpPr>
+      <p:pic>
+        <p:nvPicPr>
+          <p:cNvPr id="22" name="Grafik 21">
+            <a:extLst>
+              <a:ext uri="{FF2B5EF4-FFF2-40B4-BE49-F238E27FC236}">
+                <a16:creationId xmlns:a16="http://schemas.microsoft.com/office/drawing/2014/main" id="{E25E2AB9-9DB3-4BD7-9D48-0B482C6B221A}"/>
+              </a:ext>
+            </a:extLst>
+          </p:cNvPr>
+          <p:cNvPicPr>
+            <a:picLocks noChangeAspect="1"/>
+          </p:cNvPicPr>
+          <p:nvPr/>
+        </p:nvPicPr>
+        <p:blipFill>
+          <a:blip r:embed="rId2"/>
+          <a:stretch>
+            <a:fillRect/>
+          </a:stretch>
+        </p:blipFill>
+        <p:spPr>
+          <a:xfrm>
+            <a:off x="5406043" y="3378806"/>
+            <a:ext cx="6616285" cy="3333524"/>
+          </a:xfrm>
+          <a:prstGeom prst="rect">
+            <a:avLst/>
+          </a:prstGeom>
+        </p:spPr>
+      </p:pic>
       <mc:AlternateContent xmlns:mc="http://schemas.openxmlformats.org/markup-compatibility/2006">
         <mc:Choice xmlns:a14="http://schemas.microsoft.com/office/drawing/2010/main" Requires="a14">
           <p:sp>
@@ -6377,7 +6407,7 @@
             </p:nvSpPr>
             <p:spPr>
               <a:xfrm>
-                <a:off x="399660" y="799258"/>
+                <a:off x="240269" y="245585"/>
                 <a:ext cx="10515600" cy="4351338"/>
               </a:xfrm>
             </p:spPr>
@@ -6405,7 +6435,7 @@
                     <a:latin typeface="Calibri" panose="020F0502020204030204" pitchFamily="34" charset="0"/>
                     <a:ea typeface="Times New Roman" panose="02020603050405020304" pitchFamily="18" charset="0"/>
                     <a:cs typeface="Times New Roman" panose="02020603050405020304" pitchFamily="18" charset="0"/>
-                    <a:hlinkClick r:id="rId2"/>
+                    <a:hlinkClick r:id="rId3"/>
                   </a:rPr>
                   <a:t>Simulating </a:t>
                 </a:r>
@@ -6418,7 +6448,7 @@
                     <a:latin typeface="Calibri" panose="020F0502020204030204" pitchFamily="34" charset="0"/>
                     <a:ea typeface="Times New Roman" panose="02020603050405020304" pitchFamily="18" charset="0"/>
                     <a:cs typeface="Times New Roman" panose="02020603050405020304" pitchFamily="18" charset="0"/>
-                    <a:hlinkClick r:id="rId2"/>
+                    <a:hlinkClick r:id="rId3"/>
                   </a:rPr>
                   <a:t>Newtons Law</a:t>
                 </a:r>
@@ -6428,7 +6458,7 @@
                     <a:latin typeface="Calibri" panose="020F0502020204030204" pitchFamily="34" charset="0"/>
                     <a:ea typeface="Times New Roman" panose="02020603050405020304" pitchFamily="18" charset="0"/>
                     <a:cs typeface="Times New Roman" panose="02020603050405020304" pitchFamily="18" charset="0"/>
-                    <a:hlinkClick r:id="rId2"/>
+                    <a:hlinkClick r:id="rId3"/>
                   </a:rPr>
                   <a:t> </a:t>
                 </a:r>
@@ -6830,9 +6860,8 @@
                                     </m:sSup>
                                   </m:den>
                                 </m:f>
-                                <m:acc>
-                                  <m:accPr>
-                                    <m:chr m:val="̂"/>
+                                <m:sSup>
+                                  <m:sSupPr>
                                     <m:ctrlPr>
                                       <a:rPr lang="de-DE" sz="1800" b="0" i="1" dirty="0" smtClean="0">
                                         <a:effectLst/>
@@ -6841,19 +6870,45 @@
                                         <a:cs typeface="Times New Roman" panose="02020603050405020304" pitchFamily="18" charset="0"/>
                                       </a:rPr>
                                     </m:ctrlPr>
-                                  </m:accPr>
+                                  </m:sSupPr>
                                   <m:e>
+                                    <m:acc>
+                                      <m:accPr>
+                                        <m:chr m:val="⃗"/>
+                                        <m:ctrlPr>
+                                          <a:rPr lang="de-DE" sz="1800" b="0" i="1" dirty="0" smtClean="0">
+                                            <a:effectLst/>
+                                            <a:latin typeface="Cambria Math" panose="02040503050406030204" pitchFamily="18" charset="0"/>
+                                            <a:ea typeface="Times New Roman" panose="02020603050405020304" pitchFamily="18" charset="0"/>
+                                            <a:cs typeface="Times New Roman" panose="02020603050405020304" pitchFamily="18" charset="0"/>
+                                          </a:rPr>
+                                        </m:ctrlPr>
+                                      </m:accPr>
+                                      <m:e>
+                                        <m:r>
+                                          <a:rPr lang="de-DE" sz="1800" b="0" i="1" dirty="0" smtClean="0">
+                                            <a:effectLst/>
+                                            <a:latin typeface="Cambria Math" panose="02040503050406030204" pitchFamily="18" charset="0"/>
+                                            <a:ea typeface="Times New Roman" panose="02020603050405020304" pitchFamily="18" charset="0"/>
+                                            <a:cs typeface="Times New Roman" panose="02020603050405020304" pitchFamily="18" charset="0"/>
+                                          </a:rPr>
+                                          <m:t>𝑟</m:t>
+                                        </m:r>
+                                      </m:e>
+                                    </m:acc>
+                                  </m:e>
+                                  <m:sup>
                                     <m:r>
-                                      <a:rPr lang="de-DE" sz="1800" b="1" i="1" dirty="0" smtClean="0">
+                                      <a:rPr lang="de-DE" sz="1800" b="0" i="1" dirty="0" smtClean="0">
                                         <a:effectLst/>
                                         <a:latin typeface="Cambria Math" panose="02040503050406030204" pitchFamily="18" charset="0"/>
                                         <a:ea typeface="Times New Roman" panose="02020603050405020304" pitchFamily="18" charset="0"/>
                                         <a:cs typeface="Times New Roman" panose="02020603050405020304" pitchFamily="18" charset="0"/>
                                       </a:rPr>
-                                      <m:t>𝒓</m:t>
+                                      <m:t>∗</m:t>
                                     </m:r>
-                                  </m:e>
-                                </m:acc>
+                                  </m:sup>
+                                </m:sSup>
                                 <m:r>
                                   <a:rPr lang="de-DE" sz="1800" b="0" i="1" dirty="0" smtClean="0">
                                     <a:effectLst/>
@@ -8018,407 +8073,83 @@
                   </a:rPr>
                   <a:t>coordinates</a:t>
                 </a:r>
-                <a:endParaRPr lang="de-DE" sz="1800" dirty="0">
-                  <a:latin typeface="Calibri" panose="020F0502020204030204" pitchFamily="34" charset="0"/>
-                  <a:ea typeface="Times New Roman" panose="02020603050405020304" pitchFamily="18" charset="0"/>
-                  <a:cs typeface="Times New Roman" panose="02020603050405020304" pitchFamily="18" charset="0"/>
-                </a:endParaRPr>
-              </a:p>
-              <a:p>
-                <a:pPr marL="0" indent="0">
-                  <a:lnSpc>
-                    <a:spcPct val="100000"/>
-                  </a:lnSpc>
-                  <a:spcBef>
-                    <a:spcPts val="0"/>
-                  </a:spcBef>
-                  <a:spcAft>
-                    <a:spcPts val="800"/>
-                  </a:spcAft>
-                  <a:buNone/>
-                </a:pPr>
+                <a:br>
+                  <a:rPr lang="de-DE" sz="1800" dirty="0">
+                    <a:latin typeface="Calibri" panose="020F0502020204030204" pitchFamily="34" charset="0"/>
+                    <a:ea typeface="Times New Roman" panose="02020603050405020304" pitchFamily="18" charset="0"/>
+                    <a:cs typeface="Times New Roman" panose="02020603050405020304" pitchFamily="18" charset="0"/>
+                  </a:rPr>
+                </a:br>
                 <a14:m>
-                  <m:oMathPara xmlns:m="http://schemas.openxmlformats.org/officeDocument/2006/math">
-                    <m:oMathParaPr>
-                      <m:jc m:val="centerGroup"/>
-                    </m:oMathParaPr>
-                    <m:oMath xmlns:m="http://schemas.openxmlformats.org/officeDocument/2006/math">
-                      <m:d>
-                        <m:dPr>
-                          <m:begChr m:val="{"/>
-                          <m:endChr m:val=""/>
-                          <m:ctrlPr>
-                            <a:rPr lang="de-DE" sz="1800" b="0" i="1" smtClean="0">
-                              <a:effectLst/>
-                              <a:latin typeface="Cambria Math" panose="02040503050406030204" pitchFamily="18" charset="0"/>
-                              <a:cs typeface="Times New Roman" panose="02020603050405020304" pitchFamily="18" charset="0"/>
-                            </a:rPr>
-                          </m:ctrlPr>
-                        </m:dPr>
-                        <m:e>
-                          <m:m>
-                            <m:mPr>
-                              <m:mcs>
-                                <m:mc>
-                                  <m:mcPr>
-                                    <m:count m:val="1"/>
-                                    <m:mcJc m:val="center"/>
-                                  </m:mcPr>
-                                </m:mc>
-                              </m:mcs>
-                              <m:ctrlPr>
-                                <a:rPr lang="de-DE" sz="1800" i="1">
-                                  <a:latin typeface="Cambria Math" panose="02040503050406030204" pitchFamily="18" charset="0"/>
-                                  <a:cs typeface="Times New Roman" panose="02020603050405020304" pitchFamily="18" charset="0"/>
-                                </a:rPr>
-                              </m:ctrlPr>
-                            </m:mPr>
-                            <m:mr>
-                              <m:e>
-                                <m:sSub>
-                                  <m:sSubPr>
-                                    <m:ctrlPr>
-                                      <a:rPr lang="de-DE" sz="1800" i="1">
-                                        <a:latin typeface="Cambria Math" panose="02040503050406030204" pitchFamily="18" charset="0"/>
-                                        <a:ea typeface="Times New Roman" panose="02020603050405020304" pitchFamily="18" charset="0"/>
-                                        <a:cs typeface="Times New Roman" panose="02020603050405020304" pitchFamily="18" charset="0"/>
-                                      </a:rPr>
-                                    </m:ctrlPr>
-                                  </m:sSubPr>
-                                  <m:e>
-                                    <m:r>
-                                      <a:rPr lang="de-DE" sz="1800" i="1">
-                                        <a:latin typeface="Cambria Math" panose="02040503050406030204" pitchFamily="18" charset="0"/>
-                                        <a:ea typeface="Times New Roman" panose="02020603050405020304" pitchFamily="18" charset="0"/>
-                                        <a:cs typeface="Times New Roman" panose="02020603050405020304" pitchFamily="18" charset="0"/>
-                                      </a:rPr>
-                                      <m:t>𝑚</m:t>
-                                    </m:r>
-                                  </m:e>
-                                  <m:sub>
-                                    <m:r>
-                                      <a:rPr lang="de-DE" sz="1800" i="1">
-                                        <a:latin typeface="Cambria Math" panose="02040503050406030204" pitchFamily="18" charset="0"/>
-                                        <a:ea typeface="Times New Roman" panose="02020603050405020304" pitchFamily="18" charset="0"/>
-                                        <a:cs typeface="Times New Roman" panose="02020603050405020304" pitchFamily="18" charset="0"/>
-                                      </a:rPr>
-                                      <m:t>1</m:t>
-                                    </m:r>
-                                  </m:sub>
-                                </m:sSub>
-                                <m:r>
-                                  <a:rPr lang="de-DE" sz="1800" b="0" i="1" dirty="0" smtClean="0">
-                                    <a:effectLst/>
-                                    <a:latin typeface="Cambria Math" panose="02040503050406030204" pitchFamily="18" charset="0"/>
-                                    <a:ea typeface="Times New Roman" panose="02020603050405020304" pitchFamily="18" charset="0"/>
-                                    <a:cs typeface="Times New Roman" panose="02020603050405020304" pitchFamily="18" charset="0"/>
-                                  </a:rPr>
-                                  <m:t>=−</m:t>
-                                </m:r>
-                                <m:f>
-                                  <m:fPr>
-                                    <m:ctrlPr>
-                                      <a:rPr lang="de-DE" sz="1800" b="0" i="1" dirty="0" smtClean="0">
-                                        <a:effectLst/>
-                                        <a:latin typeface="Cambria Math" panose="02040503050406030204" pitchFamily="18" charset="0"/>
-                                        <a:ea typeface="Times New Roman" panose="02020603050405020304" pitchFamily="18" charset="0"/>
-                                        <a:cs typeface="Times New Roman" panose="02020603050405020304" pitchFamily="18" charset="0"/>
-                                      </a:rPr>
-                                    </m:ctrlPr>
-                                  </m:fPr>
-                                  <m:num>
-                                    <m:r>
-                                      <a:rPr lang="de-DE" sz="1800" b="0" i="1" dirty="0" smtClean="0">
-                                        <a:effectLst/>
-                                        <a:latin typeface="Cambria Math" panose="02040503050406030204" pitchFamily="18" charset="0"/>
-                                        <a:ea typeface="Times New Roman" panose="02020603050405020304" pitchFamily="18" charset="0"/>
-                                        <a:cs typeface="Times New Roman" panose="02020603050405020304" pitchFamily="18" charset="0"/>
-                                      </a:rPr>
-                                      <m:t>𝐺</m:t>
-                                    </m:r>
-                                    <m:sSub>
-                                      <m:sSubPr>
-                                        <m:ctrlPr>
-                                          <a:rPr lang="de-DE" sz="1800" b="0" i="1" dirty="0" smtClean="0">
-                                            <a:effectLst/>
-                                            <a:latin typeface="Cambria Math" panose="02040503050406030204" pitchFamily="18" charset="0"/>
-                                            <a:ea typeface="Times New Roman" panose="02020603050405020304" pitchFamily="18" charset="0"/>
-                                            <a:cs typeface="Times New Roman" panose="02020603050405020304" pitchFamily="18" charset="0"/>
-                                          </a:rPr>
-                                        </m:ctrlPr>
-                                      </m:sSubPr>
-                                      <m:e>
-                                        <m:r>
-                                          <a:rPr lang="de-DE" sz="1800" b="0" i="1" dirty="0" smtClean="0">
-                                            <a:effectLst/>
-                                            <a:latin typeface="Cambria Math" panose="02040503050406030204" pitchFamily="18" charset="0"/>
-                                            <a:ea typeface="Times New Roman" panose="02020603050405020304" pitchFamily="18" charset="0"/>
-                                            <a:cs typeface="Times New Roman" panose="02020603050405020304" pitchFamily="18" charset="0"/>
-                                          </a:rPr>
-                                          <m:t>𝑚</m:t>
-                                        </m:r>
-                                      </m:e>
-                                      <m:sub>
-                                        <m:r>
-                                          <a:rPr lang="de-DE" sz="1800" b="0" i="1" dirty="0" smtClean="0">
-                                            <a:effectLst/>
-                                            <a:latin typeface="Cambria Math" panose="02040503050406030204" pitchFamily="18" charset="0"/>
-                                            <a:ea typeface="Times New Roman" panose="02020603050405020304" pitchFamily="18" charset="0"/>
-                                            <a:cs typeface="Times New Roman" panose="02020603050405020304" pitchFamily="18" charset="0"/>
-                                          </a:rPr>
-                                          <m:t>1</m:t>
-                                        </m:r>
-                                      </m:sub>
-                                    </m:sSub>
-                                    <m:sSub>
-                                      <m:sSubPr>
-                                        <m:ctrlPr>
-                                          <a:rPr lang="de-DE" sz="1800" b="0" i="1" dirty="0" smtClean="0">
-                                            <a:effectLst/>
-                                            <a:latin typeface="Cambria Math" panose="02040503050406030204" pitchFamily="18" charset="0"/>
-                                            <a:ea typeface="Times New Roman" panose="02020603050405020304" pitchFamily="18" charset="0"/>
-                                            <a:cs typeface="Times New Roman" panose="02020603050405020304" pitchFamily="18" charset="0"/>
-                                          </a:rPr>
-                                        </m:ctrlPr>
-                                      </m:sSubPr>
-                                      <m:e>
-                                        <m:r>
-                                          <a:rPr lang="de-DE" sz="1800" b="0" i="1" dirty="0" smtClean="0">
-                                            <a:effectLst/>
-                                            <a:latin typeface="Cambria Math" panose="02040503050406030204" pitchFamily="18" charset="0"/>
-                                            <a:ea typeface="Times New Roman" panose="02020603050405020304" pitchFamily="18" charset="0"/>
-                                            <a:cs typeface="Times New Roman" panose="02020603050405020304" pitchFamily="18" charset="0"/>
-                                          </a:rPr>
-                                          <m:t>𝑚</m:t>
-                                        </m:r>
-                                      </m:e>
-                                      <m:sub>
-                                        <m:r>
-                                          <a:rPr lang="de-DE" sz="1800" b="0" i="1" dirty="0" smtClean="0">
-                                            <a:effectLst/>
-                                            <a:latin typeface="Cambria Math" panose="02040503050406030204" pitchFamily="18" charset="0"/>
-                                            <a:ea typeface="Times New Roman" panose="02020603050405020304" pitchFamily="18" charset="0"/>
-                                            <a:cs typeface="Times New Roman" panose="02020603050405020304" pitchFamily="18" charset="0"/>
-                                          </a:rPr>
-                                          <m:t>2</m:t>
-                                        </m:r>
-                                      </m:sub>
-                                    </m:sSub>
-                                  </m:num>
-                                  <m:den>
-                                    <m:sSup>
-                                      <m:sSupPr>
-                                        <m:ctrlPr>
-                                          <a:rPr lang="de-DE" sz="1800" b="0" i="1" dirty="0" smtClean="0">
-                                            <a:effectLst/>
-                                            <a:latin typeface="Cambria Math" panose="02040503050406030204" pitchFamily="18" charset="0"/>
-                                            <a:ea typeface="Times New Roman" panose="02020603050405020304" pitchFamily="18" charset="0"/>
-                                            <a:cs typeface="Times New Roman" panose="02020603050405020304" pitchFamily="18" charset="0"/>
-                                          </a:rPr>
-                                        </m:ctrlPr>
-                                      </m:sSupPr>
-                                      <m:e>
-                                        <m:r>
-                                          <a:rPr lang="de-DE" sz="1800" b="0" i="1" dirty="0" smtClean="0">
-                                            <a:effectLst/>
-                                            <a:latin typeface="Cambria Math" panose="02040503050406030204" pitchFamily="18" charset="0"/>
-                                            <a:ea typeface="Times New Roman" panose="02020603050405020304" pitchFamily="18" charset="0"/>
-                                            <a:cs typeface="Times New Roman" panose="02020603050405020304" pitchFamily="18" charset="0"/>
-                                          </a:rPr>
-                                          <m:t>𝑟</m:t>
-                                        </m:r>
-                                      </m:e>
-                                      <m:sup>
-                                        <m:r>
-                                          <a:rPr lang="de-DE" sz="1800" b="0" i="1" dirty="0" smtClean="0">
-                                            <a:effectLst/>
-                                            <a:latin typeface="Cambria Math" panose="02040503050406030204" pitchFamily="18" charset="0"/>
-                                            <a:ea typeface="Times New Roman" panose="02020603050405020304" pitchFamily="18" charset="0"/>
-                                            <a:cs typeface="Times New Roman" panose="02020603050405020304" pitchFamily="18" charset="0"/>
-                                          </a:rPr>
-                                          <m:t>2</m:t>
-                                        </m:r>
-                                      </m:sup>
-                                    </m:sSup>
-                                  </m:den>
-                                </m:f>
-                                <m:acc>
-                                  <m:accPr>
-                                    <m:chr m:val="̂"/>
-                                    <m:ctrlPr>
-                                      <a:rPr lang="de-DE" sz="1800" b="0" i="1" dirty="0" smtClean="0">
-                                        <a:effectLst/>
-                                        <a:latin typeface="Cambria Math" panose="02040503050406030204" pitchFamily="18" charset="0"/>
-                                        <a:ea typeface="Times New Roman" panose="02020603050405020304" pitchFamily="18" charset="0"/>
-                                        <a:cs typeface="Times New Roman" panose="02020603050405020304" pitchFamily="18" charset="0"/>
-                                      </a:rPr>
-                                    </m:ctrlPr>
-                                  </m:accPr>
-                                  <m:e>
-                                    <m:r>
-                                      <a:rPr lang="de-DE" sz="1800" b="1" i="1" dirty="0" smtClean="0">
-                                        <a:effectLst/>
-                                        <a:latin typeface="Cambria Math" panose="02040503050406030204" pitchFamily="18" charset="0"/>
-                                        <a:ea typeface="Times New Roman" panose="02020603050405020304" pitchFamily="18" charset="0"/>
-                                        <a:cs typeface="Times New Roman" panose="02020603050405020304" pitchFamily="18" charset="0"/>
-                                      </a:rPr>
-                                      <m:t>𝒓</m:t>
-                                    </m:r>
-                                  </m:e>
-                                </m:acc>
-                                <m:r>
-                                  <a:rPr lang="de-DE" sz="1800" b="0" i="1" dirty="0" smtClean="0">
-                                    <a:effectLst/>
-                                    <a:latin typeface="Cambria Math" panose="02040503050406030204" pitchFamily="18" charset="0"/>
-                                    <a:ea typeface="Times New Roman" panose="02020603050405020304" pitchFamily="18" charset="0"/>
-                                    <a:cs typeface="Times New Roman" panose="02020603050405020304" pitchFamily="18" charset="0"/>
-                                  </a:rPr>
-                                  <m:t>=−</m:t>
-                                </m:r>
-                                <m:f>
-                                  <m:fPr>
-                                    <m:ctrlPr>
-                                      <a:rPr lang="de-DE" sz="1800" i="1" dirty="0">
-                                        <a:latin typeface="Cambria Math" panose="02040503050406030204" pitchFamily="18" charset="0"/>
-                                        <a:ea typeface="Times New Roman" panose="02020603050405020304" pitchFamily="18" charset="0"/>
-                                        <a:cs typeface="Times New Roman" panose="02020603050405020304" pitchFamily="18" charset="0"/>
-                                      </a:rPr>
-                                    </m:ctrlPr>
-                                  </m:fPr>
-                                  <m:num>
-                                    <m:r>
-                                      <a:rPr lang="de-DE" sz="1800" i="1" dirty="0">
-                                        <a:latin typeface="Cambria Math" panose="02040503050406030204" pitchFamily="18" charset="0"/>
-                                        <a:ea typeface="Times New Roman" panose="02020603050405020304" pitchFamily="18" charset="0"/>
-                                        <a:cs typeface="Times New Roman" panose="02020603050405020304" pitchFamily="18" charset="0"/>
-                                      </a:rPr>
-                                      <m:t>𝐺</m:t>
-                                    </m:r>
-                                    <m:sSub>
-                                      <m:sSubPr>
-                                        <m:ctrlPr>
-                                          <a:rPr lang="de-DE" sz="1800" i="1" dirty="0">
-                                            <a:latin typeface="Cambria Math" panose="02040503050406030204" pitchFamily="18" charset="0"/>
-                                            <a:ea typeface="Times New Roman" panose="02020603050405020304" pitchFamily="18" charset="0"/>
-                                            <a:cs typeface="Times New Roman" panose="02020603050405020304" pitchFamily="18" charset="0"/>
-                                          </a:rPr>
-                                        </m:ctrlPr>
-                                      </m:sSubPr>
-                                      <m:e>
-                                        <m:r>
-                                          <a:rPr lang="de-DE" sz="1800" i="1" dirty="0">
-                                            <a:latin typeface="Cambria Math" panose="02040503050406030204" pitchFamily="18" charset="0"/>
-                                            <a:ea typeface="Times New Roman" panose="02020603050405020304" pitchFamily="18" charset="0"/>
-                                            <a:cs typeface="Times New Roman" panose="02020603050405020304" pitchFamily="18" charset="0"/>
-                                          </a:rPr>
-                                          <m:t>𝑚</m:t>
-                                        </m:r>
-                                      </m:e>
-                                      <m:sub>
-                                        <m:r>
-                                          <a:rPr lang="de-DE" sz="1800" i="1" dirty="0">
-                                            <a:latin typeface="Cambria Math" panose="02040503050406030204" pitchFamily="18" charset="0"/>
-                                            <a:ea typeface="Times New Roman" panose="02020603050405020304" pitchFamily="18" charset="0"/>
-                                            <a:cs typeface="Times New Roman" panose="02020603050405020304" pitchFamily="18" charset="0"/>
-                                          </a:rPr>
-                                          <m:t>1</m:t>
-                                        </m:r>
-                                      </m:sub>
-                                    </m:sSub>
-                                    <m:sSub>
-                                      <m:sSubPr>
-                                        <m:ctrlPr>
-                                          <a:rPr lang="de-DE" sz="1800" i="1" dirty="0">
-                                            <a:latin typeface="Cambria Math" panose="02040503050406030204" pitchFamily="18" charset="0"/>
-                                            <a:ea typeface="Times New Roman" panose="02020603050405020304" pitchFamily="18" charset="0"/>
-                                            <a:cs typeface="Times New Roman" panose="02020603050405020304" pitchFamily="18" charset="0"/>
-                                          </a:rPr>
-                                        </m:ctrlPr>
-                                      </m:sSubPr>
-                                      <m:e>
-                                        <m:r>
-                                          <a:rPr lang="de-DE" sz="1800" i="1" dirty="0">
-                                            <a:latin typeface="Cambria Math" panose="02040503050406030204" pitchFamily="18" charset="0"/>
-                                            <a:ea typeface="Times New Roman" panose="02020603050405020304" pitchFamily="18" charset="0"/>
-                                            <a:cs typeface="Times New Roman" panose="02020603050405020304" pitchFamily="18" charset="0"/>
-                                          </a:rPr>
-                                          <m:t>𝑚</m:t>
-                                        </m:r>
-                                      </m:e>
-                                      <m:sub>
-                                        <m:r>
-                                          <a:rPr lang="de-DE" sz="1800" i="1" dirty="0">
-                                            <a:latin typeface="Cambria Math" panose="02040503050406030204" pitchFamily="18" charset="0"/>
-                                            <a:ea typeface="Times New Roman" panose="02020603050405020304" pitchFamily="18" charset="0"/>
-                                            <a:cs typeface="Times New Roman" panose="02020603050405020304" pitchFamily="18" charset="0"/>
-                                          </a:rPr>
-                                          <m:t>2</m:t>
-                                        </m:r>
-                                      </m:sub>
-                                    </m:sSub>
-                                  </m:num>
-                                  <m:den>
-                                    <m:sSup>
-                                      <m:sSupPr>
-                                        <m:ctrlPr>
-                                          <a:rPr lang="de-DE" sz="1800" i="1" dirty="0">
-                                            <a:latin typeface="Cambria Math" panose="02040503050406030204" pitchFamily="18" charset="0"/>
-                                            <a:ea typeface="Times New Roman" panose="02020603050405020304" pitchFamily="18" charset="0"/>
-                                            <a:cs typeface="Times New Roman" panose="02020603050405020304" pitchFamily="18" charset="0"/>
-                                          </a:rPr>
-                                        </m:ctrlPr>
-                                      </m:sSupPr>
-                                      <m:e>
-                                        <m:r>
-                                          <a:rPr lang="de-DE" sz="1800" i="1" dirty="0">
-                                            <a:latin typeface="Cambria Math" panose="02040503050406030204" pitchFamily="18" charset="0"/>
-                                            <a:ea typeface="Times New Roman" panose="02020603050405020304" pitchFamily="18" charset="0"/>
-                                            <a:cs typeface="Times New Roman" panose="02020603050405020304" pitchFamily="18" charset="0"/>
-                                          </a:rPr>
-                                          <m:t>𝑟</m:t>
-                                        </m:r>
-                                      </m:e>
-                                      <m:sup>
-                                        <m:r>
-                                          <a:rPr lang="de-DE" sz="1800" i="1" dirty="0">
-                                            <a:latin typeface="Cambria Math" panose="02040503050406030204" pitchFamily="18" charset="0"/>
-                                            <a:ea typeface="Times New Roman" panose="02020603050405020304" pitchFamily="18" charset="0"/>
-                                            <a:cs typeface="Times New Roman" panose="02020603050405020304" pitchFamily="18" charset="0"/>
-                                          </a:rPr>
-                                          <m:t>2</m:t>
-                                        </m:r>
-                                      </m:sup>
-                                    </m:sSup>
-                                  </m:den>
-                                </m:f>
-                                <m:f>
-                                  <m:fPr>
-                                    <m:ctrlPr>
-                                      <a:rPr lang="de-DE" sz="1800" b="0" i="1" dirty="0" smtClean="0">
-                                        <a:latin typeface="Cambria Math" panose="02040503050406030204" pitchFamily="18" charset="0"/>
-                                        <a:ea typeface="Times New Roman" panose="02020603050405020304" pitchFamily="18" charset="0"/>
-                                        <a:cs typeface="Times New Roman" panose="02020603050405020304" pitchFamily="18" charset="0"/>
-                                      </a:rPr>
-                                    </m:ctrlPr>
-                                  </m:fPr>
-                                  <m:num>
-                                    <m:d>
-                                      <m:dPr>
-                                        <m:ctrlPr>
-                                          <a:rPr lang="de-DE" sz="1800" b="0" i="1" dirty="0" smtClean="0">
-                                            <a:latin typeface="Cambria Math" panose="02040503050406030204" pitchFamily="18" charset="0"/>
-                                            <a:ea typeface="Times New Roman" panose="02020603050405020304" pitchFamily="18" charset="0"/>
-                                            <a:cs typeface="Times New Roman" panose="02020603050405020304" pitchFamily="18" charset="0"/>
-                                          </a:rPr>
-                                        </m:ctrlPr>
-                                      </m:dPr>
+                  <m:oMath xmlns:m="http://schemas.openxmlformats.org/officeDocument/2006/math">
+                    <m:d>
+                      <m:dPr>
+                        <m:begChr m:val="{"/>
+                        <m:endChr m:val=""/>
+                        <m:ctrlPr>
+                          <a:rPr lang="de-DE" sz="1800" b="0" i="1" smtClean="0">
+                            <a:effectLst/>
+                            <a:latin typeface="Cambria Math" panose="02040503050406030204" pitchFamily="18" charset="0"/>
+                            <a:cs typeface="Times New Roman" panose="02020603050405020304" pitchFamily="18" charset="0"/>
+                          </a:rPr>
+                        </m:ctrlPr>
+                      </m:dPr>
+                      <m:e>
+                        <m:m>
+                          <m:mPr>
+                            <m:mcs>
+                              <m:mc>
+                                <m:mcPr>
+                                  <m:count m:val="1"/>
+                                  <m:mcJc m:val="center"/>
+                                </m:mcPr>
+                              </m:mc>
+                            </m:mcs>
+                            <m:ctrlPr>
+                              <a:rPr lang="de-DE" sz="1800" i="1">
+                                <a:latin typeface="Cambria Math" panose="02040503050406030204" pitchFamily="18" charset="0"/>
+                                <a:cs typeface="Times New Roman" panose="02020603050405020304" pitchFamily="18" charset="0"/>
+                              </a:rPr>
+                            </m:ctrlPr>
+                          </m:mPr>
+                          <m:mr>
+                            <m:e>
+                              <m:d>
+                                <m:dPr>
+                                  <m:begChr m:val="["/>
+                                  <m:endChr m:val="]"/>
+                                  <m:ctrlPr>
+                                    <a:rPr lang="de-DE" sz="1800" b="0" i="1" smtClean="0">
+                                      <a:latin typeface="Cambria Math" panose="02040503050406030204" pitchFamily="18" charset="0"/>
+                                      <a:cs typeface="Times New Roman" panose="02020603050405020304" pitchFamily="18" charset="0"/>
+                                    </a:rPr>
+                                  </m:ctrlPr>
+                                </m:dPr>
+                                <m:e>
+                                  <m:m>
+                                    <m:mPr>
+                                      <m:mcs>
+                                        <m:mc>
+                                          <m:mcPr>
+                                            <m:count m:val="1"/>
+                                            <m:mcJc m:val="center"/>
+                                          </m:mcPr>
+                                        </m:mc>
+                                      </m:mcs>
+                                      <m:ctrlPr>
+                                        <a:rPr lang="de-DE" sz="1800" b="0" i="1" smtClean="0">
+                                          <a:latin typeface="Cambria Math" panose="02040503050406030204" pitchFamily="18" charset="0"/>
+                                          <a:cs typeface="Times New Roman" panose="02020603050405020304" pitchFamily="18" charset="0"/>
+                                        </a:rPr>
+                                      </m:ctrlPr>
+                                    </m:mPr>
+                                    <m:mr>
                                       <m:e>
                                         <m:sSub>
                                           <m:sSubPr>
                                             <m:ctrlPr>
-                                              <a:rPr lang="de-DE" sz="1800" b="0" i="1" dirty="0" smtClean="0">
+                                              <a:rPr lang="de-DE" sz="1800" b="0" i="1" smtClean="0">
                                                 <a:latin typeface="Cambria Math" panose="02040503050406030204" pitchFamily="18" charset="0"/>
-                                                <a:ea typeface="Times New Roman" panose="02020603050405020304" pitchFamily="18" charset="0"/>
                                                 <a:cs typeface="Times New Roman" panose="02020603050405020304" pitchFamily="18" charset="0"/>
                                               </a:rPr>
                                             </m:ctrlPr>
@@ -8426,32 +8157,458 @@
                                           <m:e>
                                             <m:acc>
                                               <m:accPr>
-                                                <m:chr m:val="⃗"/>
+                                                <m:chr m:val="̈"/>
                                                 <m:ctrlPr>
-                                                  <a:rPr lang="de-DE" sz="1800" b="0" i="1" dirty="0" smtClean="0">
+                                                  <a:rPr lang="de-DE" sz="1800" b="0" i="1" smtClean="0">
                                                     <a:latin typeface="Cambria Math" panose="02040503050406030204" pitchFamily="18" charset="0"/>
-                                                    <a:ea typeface="Times New Roman" panose="02020603050405020304" pitchFamily="18" charset="0"/>
                                                     <a:cs typeface="Times New Roman" panose="02020603050405020304" pitchFamily="18" charset="0"/>
                                                   </a:rPr>
                                                 </m:ctrlPr>
                                               </m:accPr>
                                               <m:e>
                                                 <m:r>
-                                                  <a:rPr lang="de-DE" sz="1800" i="1" dirty="0" smtClean="0">
+                                                  <m:rPr>
+                                                    <m:brk m:alnAt="7"/>
+                                                  </m:rPr>
+                                                  <a:rPr lang="de-DE" sz="1800" b="0" i="1" smtClean="0">
                                                     <a:latin typeface="Cambria Math" panose="02040503050406030204" pitchFamily="18" charset="0"/>
-                                                    <a:ea typeface="Times New Roman" panose="02020603050405020304" pitchFamily="18" charset="0"/>
                                                     <a:cs typeface="Times New Roman" panose="02020603050405020304" pitchFamily="18" charset="0"/>
                                                   </a:rPr>
-                                                  <m:t>𝑟</m:t>
+                                                  <m:t>𝑥</m:t>
                                                 </m:r>
                                               </m:e>
                                             </m:acc>
                                           </m:e>
                                           <m:sub>
                                             <m:r>
-                                              <a:rPr lang="de-DE" sz="1800" b="0" i="1" dirty="0" smtClean="0">
+                                              <m:rPr>
+                                                <m:brk m:alnAt="7"/>
+                                              </m:rPr>
+                                              <a:rPr lang="de-DE" sz="1800" b="0" i="1" smtClean="0">
                                                 <a:latin typeface="Cambria Math" panose="02040503050406030204" pitchFamily="18" charset="0"/>
-                                                <a:ea typeface="Times New Roman" panose="02020603050405020304" pitchFamily="18" charset="0"/>
+                                                <a:cs typeface="Times New Roman" panose="02020603050405020304" pitchFamily="18" charset="0"/>
+                                              </a:rPr>
+                                              <m:t>1</m:t>
+                                            </m:r>
+                                          </m:sub>
+                                        </m:sSub>
+                                      </m:e>
+                                    </m:mr>
+                                    <m:mr>
+                                      <m:e>
+                                        <m:sSub>
+                                          <m:sSubPr>
+                                            <m:ctrlPr>
+                                              <a:rPr lang="de-DE" sz="1800" b="0" i="1" smtClean="0">
+                                                <a:latin typeface="Cambria Math" panose="02040503050406030204" pitchFamily="18" charset="0"/>
+                                                <a:cs typeface="Times New Roman" panose="02020603050405020304" pitchFamily="18" charset="0"/>
+                                              </a:rPr>
+                                            </m:ctrlPr>
+                                          </m:sSubPr>
+                                          <m:e>
+                                            <m:acc>
+                                              <m:accPr>
+                                                <m:chr m:val="̈"/>
+                                                <m:ctrlPr>
+                                                  <a:rPr lang="de-DE" sz="1800" b="0" i="1" smtClean="0">
+                                                    <a:latin typeface="Cambria Math" panose="02040503050406030204" pitchFamily="18" charset="0"/>
+                                                    <a:cs typeface="Times New Roman" panose="02020603050405020304" pitchFamily="18" charset="0"/>
+                                                  </a:rPr>
+                                                </m:ctrlPr>
+                                              </m:accPr>
+                                              <m:e>
+                                                <m:r>
+                                                  <a:rPr lang="de-DE" sz="1800" b="0" i="1" smtClean="0">
+                                                    <a:latin typeface="Cambria Math" panose="02040503050406030204" pitchFamily="18" charset="0"/>
+                                                    <a:cs typeface="Times New Roman" panose="02020603050405020304" pitchFamily="18" charset="0"/>
+                                                  </a:rPr>
+                                                  <m:t>𝑦</m:t>
+                                                </m:r>
+                                              </m:e>
+                                            </m:acc>
+                                          </m:e>
+                                          <m:sub>
+                                            <m:r>
+                                              <a:rPr lang="de-DE" sz="1800" b="0" i="1" smtClean="0">
+                                                <a:latin typeface="Cambria Math" panose="02040503050406030204" pitchFamily="18" charset="0"/>
+                                                <a:cs typeface="Times New Roman" panose="02020603050405020304" pitchFamily="18" charset="0"/>
+                                              </a:rPr>
+                                              <m:t>1</m:t>
+                                            </m:r>
+                                          </m:sub>
+                                        </m:sSub>
+                                      </m:e>
+                                    </m:mr>
+                                  </m:m>
+                                </m:e>
+                              </m:d>
+                              <m:r>
+                                <a:rPr lang="de-DE" sz="1800" b="0" i="1" dirty="0" smtClean="0">
+                                  <a:effectLst/>
+                                  <a:latin typeface="Cambria Math" panose="02040503050406030204" pitchFamily="18" charset="0"/>
+                                  <a:ea typeface="Times New Roman" panose="02020603050405020304" pitchFamily="18" charset="0"/>
+                                  <a:cs typeface="Times New Roman" panose="02020603050405020304" pitchFamily="18" charset="0"/>
+                                </a:rPr>
+                                <m:t>=</m:t>
+                              </m:r>
+                              <m:r>
+                                <a:rPr lang="de-DE" sz="1800" b="0" i="1" dirty="0" smtClean="0">
+                                  <a:latin typeface="Cambria Math" panose="02040503050406030204" pitchFamily="18" charset="0"/>
+                                  <a:ea typeface="Times New Roman" panose="02020603050405020304" pitchFamily="18" charset="0"/>
+                                  <a:cs typeface="Times New Roman" panose="02020603050405020304" pitchFamily="18" charset="0"/>
+                                </a:rPr>
+                                <m:t>−</m:t>
+                              </m:r>
+                              <m:f>
+                                <m:fPr>
+                                  <m:ctrlPr>
+                                    <a:rPr lang="de-DE" sz="1800" i="1" dirty="0">
+                                      <a:latin typeface="Cambria Math" panose="02040503050406030204" pitchFamily="18" charset="0"/>
+                                      <a:ea typeface="Times New Roman" panose="02020603050405020304" pitchFamily="18" charset="0"/>
+                                      <a:cs typeface="Times New Roman" panose="02020603050405020304" pitchFamily="18" charset="0"/>
+                                    </a:rPr>
+                                  </m:ctrlPr>
+                                </m:fPr>
+                                <m:num>
+                                  <m:r>
+                                    <a:rPr lang="de-DE" sz="1800" i="1" dirty="0">
+                                      <a:latin typeface="Cambria Math" panose="02040503050406030204" pitchFamily="18" charset="0"/>
+                                      <a:ea typeface="Times New Roman" panose="02020603050405020304" pitchFamily="18" charset="0"/>
+                                      <a:cs typeface="Times New Roman" panose="02020603050405020304" pitchFamily="18" charset="0"/>
+                                    </a:rPr>
+                                    <m:t>𝐺</m:t>
+                                  </m:r>
+                                  <m:sSub>
+                                    <m:sSubPr>
+                                      <m:ctrlPr>
+                                        <a:rPr lang="de-DE" sz="1800" i="1" dirty="0">
+                                          <a:latin typeface="Cambria Math" panose="02040503050406030204" pitchFamily="18" charset="0"/>
+                                          <a:ea typeface="Times New Roman" panose="02020603050405020304" pitchFamily="18" charset="0"/>
+                                          <a:cs typeface="Times New Roman" panose="02020603050405020304" pitchFamily="18" charset="0"/>
+                                        </a:rPr>
+                                      </m:ctrlPr>
+                                    </m:sSubPr>
+                                    <m:e>
+                                      <m:r>
+                                        <a:rPr lang="de-DE" sz="1800" i="1" dirty="0">
+                                          <a:latin typeface="Cambria Math" panose="02040503050406030204" pitchFamily="18" charset="0"/>
+                                          <a:ea typeface="Times New Roman" panose="02020603050405020304" pitchFamily="18" charset="0"/>
+                                          <a:cs typeface="Times New Roman" panose="02020603050405020304" pitchFamily="18" charset="0"/>
+                                        </a:rPr>
+                                        <m:t>𝑚</m:t>
+                                      </m:r>
+                                    </m:e>
+                                    <m:sub>
+                                      <m:r>
+                                        <a:rPr lang="de-DE" sz="1800" i="1" dirty="0">
+                                          <a:latin typeface="Cambria Math" panose="02040503050406030204" pitchFamily="18" charset="0"/>
+                                          <a:ea typeface="Times New Roman" panose="02020603050405020304" pitchFamily="18" charset="0"/>
+                                          <a:cs typeface="Times New Roman" panose="02020603050405020304" pitchFamily="18" charset="0"/>
+                                        </a:rPr>
+                                        <m:t>2</m:t>
+                                      </m:r>
+                                    </m:sub>
+                                  </m:sSub>
+                                </m:num>
+                                <m:den>
+                                  <m:rad>
+                                    <m:radPr>
+                                      <m:degHide m:val="on"/>
+                                      <m:ctrlPr>
+                                        <a:rPr lang="de-DE" sz="1800" b="0" i="1" dirty="0" smtClean="0">
+                                          <a:latin typeface="Cambria Math" panose="02040503050406030204" pitchFamily="18" charset="0"/>
+                                          <a:ea typeface="Times New Roman" panose="02020603050405020304" pitchFamily="18" charset="0"/>
+                                          <a:cs typeface="Times New Roman" panose="02020603050405020304" pitchFamily="18" charset="0"/>
+                                        </a:rPr>
+                                      </m:ctrlPr>
+                                    </m:radPr>
+                                    <m:deg/>
+                                    <m:e>
+                                      <m:sSup>
+                                        <m:sSupPr>
+                                          <m:ctrlPr>
+                                            <a:rPr lang="de-DE" sz="1800" i="1">
+                                              <a:latin typeface="Cambria Math" panose="02040503050406030204" pitchFamily="18" charset="0"/>
+                                              <a:cs typeface="Times New Roman" panose="02020603050405020304" pitchFamily="18" charset="0"/>
+                                            </a:rPr>
+                                          </m:ctrlPr>
+                                        </m:sSupPr>
+                                        <m:e>
+                                          <m:sSub>
+                                            <m:sSubPr>
+                                              <m:ctrlPr>
+                                                <a:rPr lang="de-DE" sz="1800" i="1" dirty="0">
+                                                  <a:latin typeface="Cambria Math" panose="02040503050406030204" pitchFamily="18" charset="0"/>
+                                                  <a:ea typeface="Times New Roman" panose="02020603050405020304" pitchFamily="18" charset="0"/>
+                                                  <a:cs typeface="Times New Roman" panose="02020603050405020304" pitchFamily="18" charset="0"/>
+                                                </a:rPr>
+                                              </m:ctrlPr>
+                                            </m:sSubPr>
+                                            <m:e>
+                                              <m:r>
+                                                <a:rPr lang="de-DE" sz="1800" i="1" dirty="0">
+                                                  <a:latin typeface="Cambria Math" panose="02040503050406030204" pitchFamily="18" charset="0"/>
+                                                  <a:ea typeface="Times New Roman" panose="02020603050405020304" pitchFamily="18" charset="0"/>
+                                                  <a:cs typeface="Times New Roman" panose="02020603050405020304" pitchFamily="18" charset="0"/>
+                                                </a:rPr>
+                                                <m:t>(</m:t>
+                                              </m:r>
+                                              <m:r>
+                                                <a:rPr lang="de-DE" sz="1800" i="1" dirty="0">
+                                                  <a:latin typeface="Cambria Math" panose="02040503050406030204" pitchFamily="18" charset="0"/>
+                                                  <a:ea typeface="Times New Roman" panose="02020603050405020304" pitchFamily="18" charset="0"/>
+                                                  <a:cs typeface="Times New Roman" panose="02020603050405020304" pitchFamily="18" charset="0"/>
+                                                </a:rPr>
+                                                <m:t>𝑥</m:t>
+                                              </m:r>
+                                            </m:e>
+                                            <m:sub>
+                                              <m:r>
+                                                <a:rPr lang="de-DE" sz="1800" i="1" dirty="0">
+                                                  <a:latin typeface="Cambria Math" panose="02040503050406030204" pitchFamily="18" charset="0"/>
+                                                  <a:ea typeface="Times New Roman" panose="02020603050405020304" pitchFamily="18" charset="0"/>
+                                                  <a:cs typeface="Times New Roman" panose="02020603050405020304" pitchFamily="18" charset="0"/>
+                                                </a:rPr>
+                                                <m:t>1</m:t>
+                                              </m:r>
+                                            </m:sub>
+                                          </m:sSub>
+                                          <m:r>
+                                            <a:rPr lang="de-DE" sz="1800" i="1" dirty="0">
+                                              <a:latin typeface="Cambria Math" panose="02040503050406030204" pitchFamily="18" charset="0"/>
+                                              <a:ea typeface="Times New Roman" panose="02020603050405020304" pitchFamily="18" charset="0"/>
+                                              <a:cs typeface="Times New Roman" panose="02020603050405020304" pitchFamily="18" charset="0"/>
+                                            </a:rPr>
+                                            <m:t>−</m:t>
+                                          </m:r>
+                                          <m:sSub>
+                                            <m:sSubPr>
+                                              <m:ctrlPr>
+                                                <a:rPr lang="de-DE" sz="1800" i="1" dirty="0">
+                                                  <a:latin typeface="Cambria Math" panose="02040503050406030204" pitchFamily="18" charset="0"/>
+                                                  <a:ea typeface="Times New Roman" panose="02020603050405020304" pitchFamily="18" charset="0"/>
+                                                  <a:cs typeface="Times New Roman" panose="02020603050405020304" pitchFamily="18" charset="0"/>
+                                                </a:rPr>
+                                              </m:ctrlPr>
+                                            </m:sSubPr>
+                                            <m:e>
+                                              <m:r>
+                                                <a:rPr lang="de-DE" sz="1800" i="1" dirty="0">
+                                                  <a:latin typeface="Cambria Math" panose="02040503050406030204" pitchFamily="18" charset="0"/>
+                                                  <a:ea typeface="Times New Roman" panose="02020603050405020304" pitchFamily="18" charset="0"/>
+                                                  <a:cs typeface="Times New Roman" panose="02020603050405020304" pitchFamily="18" charset="0"/>
+                                                </a:rPr>
+                                                <m:t>𝑥</m:t>
+                                              </m:r>
+                                            </m:e>
+                                            <m:sub>
+                                              <m:r>
+                                                <a:rPr lang="de-DE" sz="1800" i="1" dirty="0">
+                                                  <a:latin typeface="Cambria Math" panose="02040503050406030204" pitchFamily="18" charset="0"/>
+                                                  <a:ea typeface="Times New Roman" panose="02020603050405020304" pitchFamily="18" charset="0"/>
+                                                  <a:cs typeface="Times New Roman" panose="02020603050405020304" pitchFamily="18" charset="0"/>
+                                                </a:rPr>
+                                                <m:t>2</m:t>
+                                              </m:r>
+                                            </m:sub>
+                                          </m:sSub>
+                                          <m:r>
+                                            <a:rPr lang="de-DE" sz="1800" i="1" dirty="0">
+                                              <a:latin typeface="Cambria Math" panose="02040503050406030204" pitchFamily="18" charset="0"/>
+                                              <a:ea typeface="Times New Roman" panose="02020603050405020304" pitchFamily="18" charset="0"/>
+                                              <a:cs typeface="Times New Roman" panose="02020603050405020304" pitchFamily="18" charset="0"/>
+                                            </a:rPr>
+                                            <m:t>)</m:t>
+                                          </m:r>
+                                        </m:e>
+                                        <m:sup>
+                                          <m:r>
+                                            <a:rPr lang="de-DE" sz="1800" i="1">
+                                              <a:latin typeface="Cambria Math" panose="02040503050406030204" pitchFamily="18" charset="0"/>
+                                              <a:cs typeface="Times New Roman" panose="02020603050405020304" pitchFamily="18" charset="0"/>
+                                            </a:rPr>
+                                            <m:t>2</m:t>
+                                          </m:r>
+                                        </m:sup>
+                                      </m:sSup>
+                                      <m:r>
+                                        <a:rPr lang="de-DE" sz="1800" b="0" i="1" dirty="0" smtClean="0">
+                                          <a:latin typeface="Cambria Math" panose="02040503050406030204" pitchFamily="18" charset="0"/>
+                                          <a:ea typeface="Times New Roman" panose="02020603050405020304" pitchFamily="18" charset="0"/>
+                                          <a:cs typeface="Times New Roman" panose="02020603050405020304" pitchFamily="18" charset="0"/>
+                                        </a:rPr>
+                                        <m:t>+</m:t>
+                                      </m:r>
+                                      <m:sSup>
+                                        <m:sSupPr>
+                                          <m:ctrlPr>
+                                            <a:rPr lang="de-DE" sz="1800" b="0" i="1" dirty="0" smtClean="0">
+                                              <a:latin typeface="Cambria Math" panose="02040503050406030204" pitchFamily="18" charset="0"/>
+                                              <a:ea typeface="Times New Roman" panose="02020603050405020304" pitchFamily="18" charset="0"/>
+                                              <a:cs typeface="Times New Roman" panose="02020603050405020304" pitchFamily="18" charset="0"/>
+                                            </a:rPr>
+                                          </m:ctrlPr>
+                                        </m:sSupPr>
+                                        <m:e>
+                                          <m:d>
+                                            <m:dPr>
+                                              <m:ctrlPr>
+                                                <a:rPr lang="de-DE" sz="1800" b="0" i="1" dirty="0" smtClean="0">
+                                                  <a:latin typeface="Cambria Math" panose="02040503050406030204" pitchFamily="18" charset="0"/>
+                                                  <a:ea typeface="Times New Roman" panose="02020603050405020304" pitchFamily="18" charset="0"/>
+                                                  <a:cs typeface="Times New Roman" panose="02020603050405020304" pitchFamily="18" charset="0"/>
+                                                </a:rPr>
+                                              </m:ctrlPr>
+                                            </m:dPr>
+                                            <m:e>
+                                              <m:sSub>
+                                                <m:sSubPr>
+                                                  <m:ctrlPr>
+                                                    <a:rPr lang="de-DE" sz="1800" b="0" i="1" dirty="0" smtClean="0">
+                                                      <a:latin typeface="Cambria Math" panose="02040503050406030204" pitchFamily="18" charset="0"/>
+                                                      <a:ea typeface="Times New Roman" panose="02020603050405020304" pitchFamily="18" charset="0"/>
+                                                      <a:cs typeface="Times New Roman" panose="02020603050405020304" pitchFamily="18" charset="0"/>
+                                                    </a:rPr>
+                                                  </m:ctrlPr>
+                                                </m:sSubPr>
+                                                <m:e>
+                                                  <m:r>
+                                                    <a:rPr lang="de-DE" sz="1800" b="0" i="1" dirty="0" smtClean="0">
+                                                      <a:latin typeface="Cambria Math" panose="02040503050406030204" pitchFamily="18" charset="0"/>
+                                                      <a:ea typeface="Times New Roman" panose="02020603050405020304" pitchFamily="18" charset="0"/>
+                                                      <a:cs typeface="Times New Roman" panose="02020603050405020304" pitchFamily="18" charset="0"/>
+                                                    </a:rPr>
+                                                    <m:t>𝑦</m:t>
+                                                  </m:r>
+                                                </m:e>
+                                                <m:sub>
+                                                  <m:r>
+                                                    <a:rPr lang="de-DE" sz="1800" b="0" i="1" dirty="0" smtClean="0">
+                                                      <a:latin typeface="Cambria Math" panose="02040503050406030204" pitchFamily="18" charset="0"/>
+                                                      <a:ea typeface="Times New Roman" panose="02020603050405020304" pitchFamily="18" charset="0"/>
+                                                      <a:cs typeface="Times New Roman" panose="02020603050405020304" pitchFamily="18" charset="0"/>
+                                                    </a:rPr>
+                                                    <m:t>1</m:t>
+                                                  </m:r>
+                                                </m:sub>
+                                              </m:sSub>
+                                              <m:r>
+                                                <a:rPr lang="de-DE" sz="1800" b="0" i="1" dirty="0" smtClean="0">
+                                                  <a:latin typeface="Cambria Math" panose="02040503050406030204" pitchFamily="18" charset="0"/>
+                                                  <a:ea typeface="Times New Roman" panose="02020603050405020304" pitchFamily="18" charset="0"/>
+                                                  <a:cs typeface="Times New Roman" panose="02020603050405020304" pitchFamily="18" charset="0"/>
+                                                </a:rPr>
+                                                <m:t>−</m:t>
+                                              </m:r>
+                                              <m:sSub>
+                                                <m:sSubPr>
+                                                  <m:ctrlPr>
+                                                    <a:rPr lang="de-DE" sz="1800" b="0" i="1" dirty="0" smtClean="0">
+                                                      <a:latin typeface="Cambria Math" panose="02040503050406030204" pitchFamily="18" charset="0"/>
+                                                      <a:ea typeface="Times New Roman" panose="02020603050405020304" pitchFamily="18" charset="0"/>
+                                                      <a:cs typeface="Times New Roman" panose="02020603050405020304" pitchFamily="18" charset="0"/>
+                                                    </a:rPr>
+                                                  </m:ctrlPr>
+                                                </m:sSubPr>
+                                                <m:e>
+                                                  <m:r>
+                                                    <a:rPr lang="de-DE" sz="1800" b="0" i="1" dirty="0" smtClean="0">
+                                                      <a:latin typeface="Cambria Math" panose="02040503050406030204" pitchFamily="18" charset="0"/>
+                                                      <a:ea typeface="Times New Roman" panose="02020603050405020304" pitchFamily="18" charset="0"/>
+                                                      <a:cs typeface="Times New Roman" panose="02020603050405020304" pitchFamily="18" charset="0"/>
+                                                    </a:rPr>
+                                                    <m:t>𝑦</m:t>
+                                                  </m:r>
+                                                </m:e>
+                                                <m:sub>
+                                                  <m:r>
+                                                    <a:rPr lang="de-DE" sz="1800" b="0" i="1" dirty="0" smtClean="0">
+                                                      <a:latin typeface="Cambria Math" panose="02040503050406030204" pitchFamily="18" charset="0"/>
+                                                      <a:ea typeface="Times New Roman" panose="02020603050405020304" pitchFamily="18" charset="0"/>
+                                                      <a:cs typeface="Times New Roman" panose="02020603050405020304" pitchFamily="18" charset="0"/>
+                                                    </a:rPr>
+                                                    <m:t>2</m:t>
+                                                  </m:r>
+                                                </m:sub>
+                                              </m:sSub>
+                                            </m:e>
+                                          </m:d>
+                                        </m:e>
+                                        <m:sup>
+                                          <m:r>
+                                            <a:rPr lang="de-DE" sz="1800" b="0" i="1" dirty="0" smtClean="0">
+                                              <a:latin typeface="Cambria Math" panose="02040503050406030204" pitchFamily="18" charset="0"/>
+                                              <a:ea typeface="Times New Roman" panose="02020603050405020304" pitchFamily="18" charset="0"/>
+                                              <a:cs typeface="Times New Roman" panose="02020603050405020304" pitchFamily="18" charset="0"/>
+                                            </a:rPr>
+                                            <m:t>2</m:t>
+                                          </m:r>
+                                        </m:sup>
+                                      </m:sSup>
+                                    </m:e>
+                                  </m:rad>
+                                </m:den>
+                              </m:f>
+                              <m:d>
+                                <m:dPr>
+                                  <m:begChr m:val="["/>
+                                  <m:endChr m:val="]"/>
+                                  <m:ctrlPr>
+                                    <a:rPr lang="de-DE" sz="1800" b="0" i="1" dirty="0" smtClean="0">
+                                      <a:latin typeface="Cambria Math" panose="02040503050406030204" pitchFamily="18" charset="0"/>
+                                      <a:ea typeface="Times New Roman" panose="02020603050405020304" pitchFamily="18" charset="0"/>
+                                      <a:cs typeface="Times New Roman" panose="02020603050405020304" pitchFamily="18" charset="0"/>
+                                    </a:rPr>
+                                  </m:ctrlPr>
+                                </m:dPr>
+                                <m:e>
+                                  <m:m>
+                                    <m:mPr>
+                                      <m:mcs>
+                                        <m:mc>
+                                          <m:mcPr>
+                                            <m:count m:val="1"/>
+                                            <m:mcJc m:val="center"/>
+                                          </m:mcPr>
+                                        </m:mc>
+                                      </m:mcs>
+                                      <m:ctrlPr>
+                                        <a:rPr lang="de-DE" sz="1800" i="1">
+                                          <a:latin typeface="Cambria Math" panose="02040503050406030204" pitchFamily="18" charset="0"/>
+                                          <a:cs typeface="Times New Roman" panose="02020603050405020304" pitchFamily="18" charset="0"/>
+                                        </a:rPr>
+                                      </m:ctrlPr>
+                                    </m:mPr>
+                                    <m:mr>
+                                      <m:e>
+                                        <m:sSub>
+                                          <m:sSubPr>
+                                            <m:ctrlPr>
+                                              <a:rPr lang="de-DE" sz="1800" i="1">
+                                                <a:latin typeface="Cambria Math" panose="02040503050406030204" pitchFamily="18" charset="0"/>
+                                                <a:cs typeface="Times New Roman" panose="02020603050405020304" pitchFamily="18" charset="0"/>
+                                              </a:rPr>
+                                            </m:ctrlPr>
+                                          </m:sSubPr>
+                                          <m:e>
+                                            <m:r>
+                                              <m:rPr>
+                                                <m:brk m:alnAt="7"/>
+                                              </m:rPr>
+                                              <a:rPr lang="de-DE" sz="1800" i="1">
+                                                <a:latin typeface="Cambria Math" panose="02040503050406030204" pitchFamily="18" charset="0"/>
+                                                <a:cs typeface="Times New Roman" panose="02020603050405020304" pitchFamily="18" charset="0"/>
+                                              </a:rPr>
+                                              <m:t>𝑥</m:t>
+                                            </m:r>
+                                          </m:e>
+                                          <m:sub>
+                                            <m:r>
+                                              <m:rPr>
+                                                <m:brk m:alnAt="7"/>
+                                              </m:rPr>
+                                              <a:rPr lang="de-DE" sz="1800" i="1">
+                                                <a:latin typeface="Cambria Math" panose="02040503050406030204" pitchFamily="18" charset="0"/>
                                                 <a:cs typeface="Times New Roman" panose="02020603050405020304" pitchFamily="18" charset="0"/>
                                               </a:rPr>
                                               <m:t>1</m:t>
@@ -8459,9 +8616,8 @@
                                           </m:sub>
                                         </m:sSub>
                                         <m:r>
-                                          <a:rPr lang="de-DE" sz="1800" b="0" i="1" dirty="0" smtClean="0">
+                                          <a:rPr lang="de-DE" sz="1800" b="0" i="1" smtClean="0">
                                             <a:latin typeface="Cambria Math" panose="02040503050406030204" pitchFamily="18" charset="0"/>
-                                            <a:ea typeface="Times New Roman" panose="02020603050405020304" pitchFamily="18" charset="0"/>
                                             <a:cs typeface="Times New Roman" panose="02020603050405020304" pitchFamily="18" charset="0"/>
                                           </a:rPr>
                                           <m:t>−</m:t>
@@ -8469,9 +8625,143 @@
                                         <m:sSub>
                                           <m:sSubPr>
                                             <m:ctrlPr>
-                                              <a:rPr lang="de-DE" sz="1800" b="0" i="1" dirty="0" smtClean="0">
+                                              <a:rPr lang="de-DE" sz="1800" b="0" i="1" smtClean="0">
                                                 <a:latin typeface="Cambria Math" panose="02040503050406030204" pitchFamily="18" charset="0"/>
-                                                <a:ea typeface="Times New Roman" panose="02020603050405020304" pitchFamily="18" charset="0"/>
+                                                <a:cs typeface="Times New Roman" panose="02020603050405020304" pitchFamily="18" charset="0"/>
+                                              </a:rPr>
+                                            </m:ctrlPr>
+                                          </m:sSubPr>
+                                          <m:e>
+                                            <m:r>
+                                              <a:rPr lang="de-DE" sz="1800" b="0" i="1" smtClean="0">
+                                                <a:latin typeface="Cambria Math" panose="02040503050406030204" pitchFamily="18" charset="0"/>
+                                                <a:cs typeface="Times New Roman" panose="02020603050405020304" pitchFamily="18" charset="0"/>
+                                              </a:rPr>
+                                              <m:t>𝑥</m:t>
+                                            </m:r>
+                                          </m:e>
+                                          <m:sub>
+                                            <m:r>
+                                              <a:rPr lang="de-DE" sz="1800" b="0" i="1" smtClean="0">
+                                                <a:latin typeface="Cambria Math" panose="02040503050406030204" pitchFamily="18" charset="0"/>
+                                                <a:cs typeface="Times New Roman" panose="02020603050405020304" pitchFamily="18" charset="0"/>
+                                              </a:rPr>
+                                              <m:t>2</m:t>
+                                            </m:r>
+                                          </m:sub>
+                                        </m:sSub>
+                                      </m:e>
+                                    </m:mr>
+                                    <m:mr>
+                                      <m:e>
+                                        <m:sSub>
+                                          <m:sSubPr>
+                                            <m:ctrlPr>
+                                              <a:rPr lang="de-DE" sz="1800" i="1">
+                                                <a:latin typeface="Cambria Math" panose="02040503050406030204" pitchFamily="18" charset="0"/>
+                                                <a:cs typeface="Times New Roman" panose="02020603050405020304" pitchFamily="18" charset="0"/>
+                                              </a:rPr>
+                                            </m:ctrlPr>
+                                          </m:sSubPr>
+                                          <m:e>
+                                            <m:r>
+                                              <a:rPr lang="de-DE" sz="1800" i="1">
+                                                <a:latin typeface="Cambria Math" panose="02040503050406030204" pitchFamily="18" charset="0"/>
+                                                <a:cs typeface="Times New Roman" panose="02020603050405020304" pitchFamily="18" charset="0"/>
+                                              </a:rPr>
+                                              <m:t>𝑦</m:t>
+                                            </m:r>
+                                          </m:e>
+                                          <m:sub>
+                                            <m:r>
+                                              <a:rPr lang="de-DE" sz="1800" i="1">
+                                                <a:latin typeface="Cambria Math" panose="02040503050406030204" pitchFamily="18" charset="0"/>
+                                                <a:cs typeface="Times New Roman" panose="02020603050405020304" pitchFamily="18" charset="0"/>
+                                              </a:rPr>
+                                              <m:t>1</m:t>
+                                            </m:r>
+                                          </m:sub>
+                                        </m:sSub>
+                                        <m:r>
+                                          <a:rPr lang="de-DE" sz="1800" b="0" i="1" smtClean="0">
+                                            <a:latin typeface="Cambria Math" panose="02040503050406030204" pitchFamily="18" charset="0"/>
+                                            <a:cs typeface="Times New Roman" panose="02020603050405020304" pitchFamily="18" charset="0"/>
+                                          </a:rPr>
+                                          <m:t>−</m:t>
+                                        </m:r>
+                                        <m:sSub>
+                                          <m:sSubPr>
+                                            <m:ctrlPr>
+                                              <a:rPr lang="de-DE" sz="1800" b="0" i="1" smtClean="0">
+                                                <a:latin typeface="Cambria Math" panose="02040503050406030204" pitchFamily="18" charset="0"/>
+                                                <a:cs typeface="Times New Roman" panose="02020603050405020304" pitchFamily="18" charset="0"/>
+                                              </a:rPr>
+                                            </m:ctrlPr>
+                                          </m:sSubPr>
+                                          <m:e>
+                                            <m:r>
+                                              <a:rPr lang="de-DE" sz="1800" b="0" i="1" smtClean="0">
+                                                <a:latin typeface="Cambria Math" panose="02040503050406030204" pitchFamily="18" charset="0"/>
+                                                <a:cs typeface="Times New Roman" panose="02020603050405020304" pitchFamily="18" charset="0"/>
+                                              </a:rPr>
+                                              <m:t>𝑦</m:t>
+                                            </m:r>
+                                          </m:e>
+                                          <m:sub>
+                                            <m:r>
+                                              <a:rPr lang="de-DE" sz="1800" b="0" i="1" smtClean="0">
+                                                <a:latin typeface="Cambria Math" panose="02040503050406030204" pitchFamily="18" charset="0"/>
+                                                <a:cs typeface="Times New Roman" panose="02020603050405020304" pitchFamily="18" charset="0"/>
+                                              </a:rPr>
+                                              <m:t>2</m:t>
+                                            </m:r>
+                                          </m:sub>
+                                        </m:sSub>
+                                      </m:e>
+                                    </m:mr>
+                                  </m:m>
+                                </m:e>
+                              </m:d>
+                            </m:e>
+                          </m:mr>
+                          <m:mr>
+                            <m:e>
+                              <m:d>
+                                <m:dPr>
+                                  <m:begChr m:val="["/>
+                                  <m:endChr m:val="]"/>
+                                  <m:ctrlPr>
+                                    <a:rPr lang="de-DE" sz="1800" i="1">
+                                      <a:latin typeface="Cambria Math" panose="02040503050406030204" pitchFamily="18" charset="0"/>
+                                      <a:cs typeface="Times New Roman" panose="02020603050405020304" pitchFamily="18" charset="0"/>
+                                    </a:rPr>
+                                  </m:ctrlPr>
+                                </m:dPr>
+                                <m:e>
+                                  <m:m>
+                                    <m:mPr>
+                                      <m:mcs>
+                                        <m:mc>
+                                          <m:mcPr>
+                                            <m:count m:val="1"/>
+                                            <m:mcJc m:val="center"/>
+                                          </m:mcPr>
+                                        </m:mc>
+                                      </m:mcs>
+                                      <m:ctrlPr>
+                                        <a:rPr lang="de-DE" sz="1800" i="1">
+                                          <a:latin typeface="Cambria Math" panose="02040503050406030204" pitchFamily="18" charset="0"/>
+                                          <a:cs typeface="Times New Roman" panose="02020603050405020304" pitchFamily="18" charset="0"/>
+                                        </a:rPr>
+                                      </m:ctrlPr>
+                                    </m:mPr>
+                                    <m:mr>
+                                      <m:e>
+                                        <m:sSub>
+                                          <m:sSubPr>
+                                            <m:ctrlPr>
+                                              <a:rPr lang="de-DE" sz="1800" i="1">
+                                                <a:latin typeface="Cambria Math" panose="02040503050406030204" pitchFamily="18" charset="0"/>
                                                 <a:cs typeface="Times New Roman" panose="02020603050405020304" pitchFamily="18" charset="0"/>
                                               </a:rPr>
                                             </m:ctrlPr>
@@ -8479,32 +8769,32 @@
                                           <m:e>
                                             <m:acc>
                                               <m:accPr>
-                                                <m:chr m:val="⃗"/>
+                                                <m:chr m:val="̈"/>
                                                 <m:ctrlPr>
-                                                  <a:rPr lang="de-DE" sz="1800" b="0" i="1" dirty="0" smtClean="0">
+                                                  <a:rPr lang="de-DE" sz="1800" b="0" i="1" smtClean="0">
                                                     <a:latin typeface="Cambria Math" panose="02040503050406030204" pitchFamily="18" charset="0"/>
-                                                    <a:ea typeface="Times New Roman" panose="02020603050405020304" pitchFamily="18" charset="0"/>
                                                     <a:cs typeface="Times New Roman" panose="02020603050405020304" pitchFamily="18" charset="0"/>
                                                   </a:rPr>
                                                 </m:ctrlPr>
                                               </m:accPr>
                                               <m:e>
                                                 <m:r>
-                                                  <a:rPr lang="de-DE" sz="1800" b="0" i="1" dirty="0" smtClean="0">
+                                                  <m:rPr>
+                                                    <m:brk m:alnAt="7"/>
+                                                  </m:rPr>
+                                                  <a:rPr lang="de-DE" sz="1800" i="1">
                                                     <a:latin typeface="Cambria Math" panose="02040503050406030204" pitchFamily="18" charset="0"/>
-                                                    <a:ea typeface="Times New Roman" panose="02020603050405020304" pitchFamily="18" charset="0"/>
                                                     <a:cs typeface="Times New Roman" panose="02020603050405020304" pitchFamily="18" charset="0"/>
                                                   </a:rPr>
-                                                  <m:t>𝑟</m:t>
+                                                  <m:t>𝑥</m:t>
                                                 </m:r>
                                               </m:e>
                                             </m:acc>
                                           </m:e>
                                           <m:sub>
                                             <m:r>
-                                              <a:rPr lang="de-DE" sz="1800" b="0" i="1" dirty="0" smtClean="0">
+                                              <a:rPr lang="de-DE" sz="1800" b="0" i="1" smtClean="0">
                                                 <a:latin typeface="Cambria Math" panose="02040503050406030204" pitchFamily="18" charset="0"/>
-                                                <a:ea typeface="Times New Roman" panose="02020603050405020304" pitchFamily="18" charset="0"/>
                                                 <a:cs typeface="Times New Roman" panose="02020603050405020304" pitchFamily="18" charset="0"/>
                                               </a:rPr>
                                               <m:t>2</m:t>
@@ -8512,597 +8802,550 @@
                                           </m:sub>
                                         </m:sSub>
                                       </m:e>
-                                    </m:d>
-                                  </m:num>
-                                  <m:den>
-                                    <m:r>
-                                      <a:rPr lang="de-DE" sz="1800" b="0" i="1" dirty="0" smtClean="0">
-                                        <a:latin typeface="Cambria Math" panose="02040503050406030204" pitchFamily="18" charset="0"/>
-                                        <a:ea typeface="Times New Roman" panose="02020603050405020304" pitchFamily="18" charset="0"/>
-                                        <a:cs typeface="Times New Roman" panose="02020603050405020304" pitchFamily="18" charset="0"/>
-                                      </a:rPr>
-                                      <m:t>𝑟</m:t>
-                                    </m:r>
-                                  </m:den>
-                                </m:f>
-                                <m:r>
-                                  <a:rPr lang="de-DE" sz="1800" b="0" i="1" dirty="0" smtClean="0">
-                                    <a:latin typeface="Cambria Math" panose="02040503050406030204" pitchFamily="18" charset="0"/>
-                                    <a:ea typeface="Times New Roman" panose="02020603050405020304" pitchFamily="18" charset="0"/>
-                                    <a:cs typeface="Times New Roman" panose="02020603050405020304" pitchFamily="18" charset="0"/>
-                                  </a:rPr>
-                                  <m:t>=−</m:t>
-                                </m:r>
-                                <m:f>
-                                  <m:fPr>
-                                    <m:ctrlPr>
-                                      <a:rPr lang="de-DE" sz="1800" i="1" dirty="0">
-                                        <a:latin typeface="Cambria Math" panose="02040503050406030204" pitchFamily="18" charset="0"/>
-                                        <a:ea typeface="Times New Roman" panose="02020603050405020304" pitchFamily="18" charset="0"/>
-                                        <a:cs typeface="Times New Roman" panose="02020603050405020304" pitchFamily="18" charset="0"/>
-                                      </a:rPr>
-                                    </m:ctrlPr>
-                                  </m:fPr>
-                                  <m:num>
-                                    <m:r>
-                                      <a:rPr lang="de-DE" sz="1800" i="1" dirty="0">
-                                        <a:latin typeface="Cambria Math" panose="02040503050406030204" pitchFamily="18" charset="0"/>
-                                        <a:ea typeface="Times New Roman" panose="02020603050405020304" pitchFamily="18" charset="0"/>
-                                        <a:cs typeface="Times New Roman" panose="02020603050405020304" pitchFamily="18" charset="0"/>
-                                      </a:rPr>
-                                      <m:t>𝐺</m:t>
-                                    </m:r>
-                                    <m:sSub>
-                                      <m:sSubPr>
-                                        <m:ctrlPr>
-                                          <a:rPr lang="de-DE" sz="1800" i="1" dirty="0">
-                                            <a:latin typeface="Cambria Math" panose="02040503050406030204" pitchFamily="18" charset="0"/>
-                                            <a:ea typeface="Times New Roman" panose="02020603050405020304" pitchFamily="18" charset="0"/>
-                                            <a:cs typeface="Times New Roman" panose="02020603050405020304" pitchFamily="18" charset="0"/>
-                                          </a:rPr>
-                                        </m:ctrlPr>
-                                      </m:sSubPr>
+                                    </m:mr>
+                                    <m:mr>
                                       <m:e>
-                                        <m:r>
-                                          <a:rPr lang="de-DE" sz="1800" i="1" dirty="0">
-                                            <a:latin typeface="Cambria Math" panose="02040503050406030204" pitchFamily="18" charset="0"/>
-                                            <a:ea typeface="Times New Roman" panose="02020603050405020304" pitchFamily="18" charset="0"/>
-                                            <a:cs typeface="Times New Roman" panose="02020603050405020304" pitchFamily="18" charset="0"/>
-                                          </a:rPr>
-                                          <m:t>𝑚</m:t>
-                                        </m:r>
-                                      </m:e>
-                                      <m:sub>
-                                        <m:r>
-                                          <a:rPr lang="de-DE" sz="1800" i="1" dirty="0">
-                                            <a:latin typeface="Cambria Math" panose="02040503050406030204" pitchFamily="18" charset="0"/>
-                                            <a:ea typeface="Times New Roman" panose="02020603050405020304" pitchFamily="18" charset="0"/>
-                                            <a:cs typeface="Times New Roman" panose="02020603050405020304" pitchFamily="18" charset="0"/>
-                                          </a:rPr>
-                                          <m:t>1</m:t>
-                                        </m:r>
-                                      </m:sub>
-                                    </m:sSub>
-                                    <m:sSub>
-                                      <m:sSubPr>
-                                        <m:ctrlPr>
-                                          <a:rPr lang="de-DE" sz="1800" i="1" dirty="0">
-                                            <a:latin typeface="Cambria Math" panose="02040503050406030204" pitchFamily="18" charset="0"/>
-                                            <a:ea typeface="Times New Roman" panose="02020603050405020304" pitchFamily="18" charset="0"/>
-                                            <a:cs typeface="Times New Roman" panose="02020603050405020304" pitchFamily="18" charset="0"/>
-                                          </a:rPr>
-                                        </m:ctrlPr>
-                                      </m:sSubPr>
-                                      <m:e>
-                                        <m:r>
-                                          <a:rPr lang="de-DE" sz="1800" i="1" dirty="0">
-                                            <a:latin typeface="Cambria Math" panose="02040503050406030204" pitchFamily="18" charset="0"/>
-                                            <a:ea typeface="Times New Roman" panose="02020603050405020304" pitchFamily="18" charset="0"/>
-                                            <a:cs typeface="Times New Roman" panose="02020603050405020304" pitchFamily="18" charset="0"/>
-                                          </a:rPr>
-                                          <m:t>𝑚</m:t>
-                                        </m:r>
-                                      </m:e>
-                                      <m:sub>
-                                        <m:r>
-                                          <a:rPr lang="de-DE" sz="1800" i="1" dirty="0">
-                                            <a:latin typeface="Cambria Math" panose="02040503050406030204" pitchFamily="18" charset="0"/>
-                                            <a:ea typeface="Times New Roman" panose="02020603050405020304" pitchFamily="18" charset="0"/>
-                                            <a:cs typeface="Times New Roman" panose="02020603050405020304" pitchFamily="18" charset="0"/>
-                                          </a:rPr>
-                                          <m:t>2</m:t>
-                                        </m:r>
-                                      </m:sub>
-                                    </m:sSub>
-                                  </m:num>
-                                  <m:den>
-                                    <m:sSup>
-                                      <m:sSupPr>
-                                        <m:ctrlPr>
-                                          <a:rPr lang="de-DE" sz="1800" i="1" dirty="0">
-                                            <a:latin typeface="Cambria Math" panose="02040503050406030204" pitchFamily="18" charset="0"/>
-                                            <a:ea typeface="Times New Roman" panose="02020603050405020304" pitchFamily="18" charset="0"/>
-                                            <a:cs typeface="Times New Roman" panose="02020603050405020304" pitchFamily="18" charset="0"/>
-                                          </a:rPr>
-                                        </m:ctrlPr>
-                                      </m:sSupPr>
-                                      <m:e>
-                                        <m:r>
-                                          <a:rPr lang="de-DE" sz="1800" i="1" dirty="0">
-                                            <a:latin typeface="Cambria Math" panose="02040503050406030204" pitchFamily="18" charset="0"/>
-                                            <a:ea typeface="Times New Roman" panose="02020603050405020304" pitchFamily="18" charset="0"/>
-                                            <a:cs typeface="Times New Roman" panose="02020603050405020304" pitchFamily="18" charset="0"/>
-                                          </a:rPr>
-                                          <m:t>𝑟</m:t>
-                                        </m:r>
-                                      </m:e>
-                                      <m:sup>
-                                        <m:r>
-                                          <a:rPr lang="de-DE" sz="1800" b="0" i="1" dirty="0" smtClean="0">
-                                            <a:latin typeface="Cambria Math" panose="02040503050406030204" pitchFamily="18" charset="0"/>
-                                            <a:ea typeface="Times New Roman" panose="02020603050405020304" pitchFamily="18" charset="0"/>
-                                            <a:cs typeface="Times New Roman" panose="02020603050405020304" pitchFamily="18" charset="0"/>
-                                          </a:rPr>
-                                          <m:t>3</m:t>
-                                        </m:r>
-                                      </m:sup>
-                                    </m:sSup>
-                                  </m:den>
-                                </m:f>
-                                <m:d>
-                                  <m:dPr>
-                                    <m:ctrlPr>
-                                      <a:rPr lang="de-DE" sz="1800" i="1" dirty="0">
-                                        <a:latin typeface="Cambria Math" panose="02040503050406030204" pitchFamily="18" charset="0"/>
-                                        <a:ea typeface="Times New Roman" panose="02020603050405020304" pitchFamily="18" charset="0"/>
-                                        <a:cs typeface="Times New Roman" panose="02020603050405020304" pitchFamily="18" charset="0"/>
-                                      </a:rPr>
-                                    </m:ctrlPr>
-                                  </m:dPr>
-                                  <m:e>
-                                    <m:sSub>
-                                      <m:sSubPr>
-                                        <m:ctrlPr>
-                                          <a:rPr lang="de-DE" sz="1800" i="1" dirty="0">
-                                            <a:latin typeface="Cambria Math" panose="02040503050406030204" pitchFamily="18" charset="0"/>
-                                            <a:ea typeface="Times New Roman" panose="02020603050405020304" pitchFamily="18" charset="0"/>
-                                            <a:cs typeface="Times New Roman" panose="02020603050405020304" pitchFamily="18" charset="0"/>
-                                          </a:rPr>
-                                        </m:ctrlPr>
-                                      </m:sSubPr>
-                                      <m:e>
-                                        <m:acc>
-                                          <m:accPr>
-                                            <m:chr m:val="⃗"/>
+                                        <m:sSub>
+                                          <m:sSubPr>
                                             <m:ctrlPr>
-                                              <a:rPr lang="de-DE" sz="1800" i="1" dirty="0">
+                                              <a:rPr lang="de-DE" sz="1800" i="1">
                                                 <a:latin typeface="Cambria Math" panose="02040503050406030204" pitchFamily="18" charset="0"/>
-                                                <a:ea typeface="Times New Roman" panose="02020603050405020304" pitchFamily="18" charset="0"/>
                                                 <a:cs typeface="Times New Roman" panose="02020603050405020304" pitchFamily="18" charset="0"/>
                                               </a:rPr>
                                             </m:ctrlPr>
-                                          </m:accPr>
+                                          </m:sSubPr>
                                           <m:e>
+                                            <m:acc>
+                                              <m:accPr>
+                                                <m:chr m:val="̈"/>
+                                                <m:ctrlPr>
+                                                  <a:rPr lang="de-DE" sz="1800" b="0" i="1" smtClean="0">
+                                                    <a:latin typeface="Cambria Math" panose="02040503050406030204" pitchFamily="18" charset="0"/>
+                                                    <a:cs typeface="Times New Roman" panose="02020603050405020304" pitchFamily="18" charset="0"/>
+                                                  </a:rPr>
+                                                </m:ctrlPr>
+                                              </m:accPr>
+                                              <m:e>
+                                                <m:r>
+                                                  <a:rPr lang="de-DE" sz="1800" i="1">
+                                                    <a:latin typeface="Cambria Math" panose="02040503050406030204" pitchFamily="18" charset="0"/>
+                                                    <a:cs typeface="Times New Roman" panose="02020603050405020304" pitchFamily="18" charset="0"/>
+                                                  </a:rPr>
+                                                  <m:t>𝑦</m:t>
+                                                </m:r>
+                                              </m:e>
+                                            </m:acc>
+                                          </m:e>
+                                          <m:sub>
                                             <m:r>
-                                              <a:rPr lang="de-DE" sz="1800" i="1" dirty="0">
+                                              <a:rPr lang="de-DE" sz="1800" b="0" i="1" smtClean="0">
                                                 <a:latin typeface="Cambria Math" panose="02040503050406030204" pitchFamily="18" charset="0"/>
-                                                <a:ea typeface="Times New Roman" panose="02020603050405020304" pitchFamily="18" charset="0"/>
                                                 <a:cs typeface="Times New Roman" panose="02020603050405020304" pitchFamily="18" charset="0"/>
                                               </a:rPr>
-                                              <m:t>𝑟</m:t>
+                                              <m:t>2</m:t>
                                             </m:r>
-                                          </m:e>
-                                        </m:acc>
+                                          </m:sub>
+                                        </m:sSub>
                                       </m:e>
-                                      <m:sub>
-                                        <m:r>
-                                          <a:rPr lang="de-DE" sz="1800" i="1" dirty="0">
-                                            <a:latin typeface="Cambria Math" panose="02040503050406030204" pitchFamily="18" charset="0"/>
-                                            <a:ea typeface="Times New Roman" panose="02020603050405020304" pitchFamily="18" charset="0"/>
-                                            <a:cs typeface="Times New Roman" panose="02020603050405020304" pitchFamily="18" charset="0"/>
-                                          </a:rPr>
-                                          <m:t>1</m:t>
-                                        </m:r>
-                                      </m:sub>
-                                    </m:sSub>
-                                    <m:r>
-                                      <a:rPr lang="de-DE" sz="1800" i="1" dirty="0">
-                                        <a:latin typeface="Cambria Math" panose="02040503050406030204" pitchFamily="18" charset="0"/>
-                                        <a:ea typeface="Times New Roman" panose="02020603050405020304" pitchFamily="18" charset="0"/>
-                                        <a:cs typeface="Times New Roman" panose="02020603050405020304" pitchFamily="18" charset="0"/>
-                                      </a:rPr>
-                                      <m:t>−</m:t>
-                                    </m:r>
-                                    <m:sSub>
-                                      <m:sSubPr>
-                                        <m:ctrlPr>
-                                          <a:rPr lang="de-DE" sz="1800" i="1" dirty="0">
-                                            <a:latin typeface="Cambria Math" panose="02040503050406030204" pitchFamily="18" charset="0"/>
-                                            <a:ea typeface="Times New Roman" panose="02020603050405020304" pitchFamily="18" charset="0"/>
-                                            <a:cs typeface="Times New Roman" panose="02020603050405020304" pitchFamily="18" charset="0"/>
-                                          </a:rPr>
-                                        </m:ctrlPr>
-                                      </m:sSubPr>
+                                    </m:mr>
+                                  </m:m>
+                                </m:e>
+                              </m:d>
+                              <m:r>
+                                <a:rPr lang="de-DE" sz="1800" i="1" dirty="0">
+                                  <a:latin typeface="Cambria Math" panose="02040503050406030204" pitchFamily="18" charset="0"/>
+                                  <a:ea typeface="Times New Roman" panose="02020603050405020304" pitchFamily="18" charset="0"/>
+                                  <a:cs typeface="Times New Roman" panose="02020603050405020304" pitchFamily="18" charset="0"/>
+                                </a:rPr>
+                                <m:t>=</m:t>
+                              </m:r>
+                              <m:r>
+                                <a:rPr lang="de-DE" sz="1800" b="0" i="1" dirty="0" smtClean="0">
+                                  <a:latin typeface="Cambria Math" panose="02040503050406030204" pitchFamily="18" charset="0"/>
+                                  <a:ea typeface="Times New Roman" panose="02020603050405020304" pitchFamily="18" charset="0"/>
+                                  <a:cs typeface="Times New Roman" panose="02020603050405020304" pitchFamily="18" charset="0"/>
+                                </a:rPr>
+                                <m:t>+</m:t>
+                              </m:r>
+                              <m:f>
+                                <m:fPr>
+                                  <m:ctrlPr>
+                                    <a:rPr lang="de-DE" sz="1800" i="1" dirty="0">
+                                      <a:latin typeface="Cambria Math" panose="02040503050406030204" pitchFamily="18" charset="0"/>
+                                      <a:ea typeface="Times New Roman" panose="02020603050405020304" pitchFamily="18" charset="0"/>
+                                      <a:cs typeface="Times New Roman" panose="02020603050405020304" pitchFamily="18" charset="0"/>
+                                    </a:rPr>
+                                  </m:ctrlPr>
+                                </m:fPr>
+                                <m:num>
+                                  <m:r>
+                                    <a:rPr lang="de-DE" sz="1800" i="1" dirty="0">
+                                      <a:latin typeface="Cambria Math" panose="02040503050406030204" pitchFamily="18" charset="0"/>
+                                      <a:ea typeface="Times New Roman" panose="02020603050405020304" pitchFamily="18" charset="0"/>
+                                      <a:cs typeface="Times New Roman" panose="02020603050405020304" pitchFamily="18" charset="0"/>
+                                    </a:rPr>
+                                    <m:t>𝐺</m:t>
+                                  </m:r>
+                                  <m:sSub>
+                                    <m:sSubPr>
+                                      <m:ctrlPr>
+                                        <a:rPr lang="de-DE" sz="1800" i="1" dirty="0">
+                                          <a:latin typeface="Cambria Math" panose="02040503050406030204" pitchFamily="18" charset="0"/>
+                                          <a:ea typeface="Times New Roman" panose="02020603050405020304" pitchFamily="18" charset="0"/>
+                                          <a:cs typeface="Times New Roman" panose="02020603050405020304" pitchFamily="18" charset="0"/>
+                                        </a:rPr>
+                                      </m:ctrlPr>
+                                    </m:sSubPr>
+                                    <m:e>
+                                      <m:r>
+                                        <a:rPr lang="de-DE" sz="1800" i="1" dirty="0">
+                                          <a:latin typeface="Cambria Math" panose="02040503050406030204" pitchFamily="18" charset="0"/>
+                                          <a:ea typeface="Times New Roman" panose="02020603050405020304" pitchFamily="18" charset="0"/>
+                                          <a:cs typeface="Times New Roman" panose="02020603050405020304" pitchFamily="18" charset="0"/>
+                                        </a:rPr>
+                                        <m:t>𝑚</m:t>
+                                      </m:r>
+                                    </m:e>
+                                    <m:sub>
+                                      <m:r>
+                                        <a:rPr lang="de-DE" sz="1800" i="1" dirty="0">
+                                          <a:latin typeface="Cambria Math" panose="02040503050406030204" pitchFamily="18" charset="0"/>
+                                          <a:ea typeface="Times New Roman" panose="02020603050405020304" pitchFamily="18" charset="0"/>
+                                          <a:cs typeface="Times New Roman" panose="02020603050405020304" pitchFamily="18" charset="0"/>
+                                        </a:rPr>
+                                        <m:t>1</m:t>
+                                      </m:r>
+                                    </m:sub>
+                                  </m:sSub>
+                                </m:num>
+                                <m:den>
+                                  <m:rad>
+                                    <m:radPr>
+                                      <m:degHide m:val="on"/>
+                                      <m:ctrlPr>
+                                        <a:rPr lang="de-DE" sz="1800" i="1" dirty="0">
+                                          <a:latin typeface="Cambria Math" panose="02040503050406030204" pitchFamily="18" charset="0"/>
+                                          <a:ea typeface="Times New Roman" panose="02020603050405020304" pitchFamily="18" charset="0"/>
+                                          <a:cs typeface="Times New Roman" panose="02020603050405020304" pitchFamily="18" charset="0"/>
+                                        </a:rPr>
+                                      </m:ctrlPr>
+                                    </m:radPr>
+                                    <m:deg/>
+                                    <m:e>
+                                      <m:sSup>
+                                        <m:sSupPr>
+                                          <m:ctrlPr>
+                                            <a:rPr lang="de-DE" sz="1800" i="1">
+                                              <a:latin typeface="Cambria Math" panose="02040503050406030204" pitchFamily="18" charset="0"/>
+                                              <a:cs typeface="Times New Roman" panose="02020603050405020304" pitchFamily="18" charset="0"/>
+                                            </a:rPr>
+                                          </m:ctrlPr>
+                                        </m:sSupPr>
+                                        <m:e>
+                                          <m:sSub>
+                                            <m:sSubPr>
+                                              <m:ctrlPr>
+                                                <a:rPr lang="de-DE" sz="1800" i="1" dirty="0">
+                                                  <a:latin typeface="Cambria Math" panose="02040503050406030204" pitchFamily="18" charset="0"/>
+                                                  <a:ea typeface="Times New Roman" panose="02020603050405020304" pitchFamily="18" charset="0"/>
+                                                  <a:cs typeface="Times New Roman" panose="02020603050405020304" pitchFamily="18" charset="0"/>
+                                                </a:rPr>
+                                              </m:ctrlPr>
+                                            </m:sSubPr>
+                                            <m:e>
+                                              <m:r>
+                                                <a:rPr lang="de-DE" sz="1800" i="1" dirty="0">
+                                                  <a:latin typeface="Cambria Math" panose="02040503050406030204" pitchFamily="18" charset="0"/>
+                                                  <a:ea typeface="Times New Roman" panose="02020603050405020304" pitchFamily="18" charset="0"/>
+                                                  <a:cs typeface="Times New Roman" panose="02020603050405020304" pitchFamily="18" charset="0"/>
+                                                </a:rPr>
+                                                <m:t>(</m:t>
+                                              </m:r>
+                                              <m:r>
+                                                <a:rPr lang="de-DE" sz="1800" i="1" dirty="0">
+                                                  <a:latin typeface="Cambria Math" panose="02040503050406030204" pitchFamily="18" charset="0"/>
+                                                  <a:ea typeface="Times New Roman" panose="02020603050405020304" pitchFamily="18" charset="0"/>
+                                                  <a:cs typeface="Times New Roman" panose="02020603050405020304" pitchFamily="18" charset="0"/>
+                                                </a:rPr>
+                                                <m:t>𝑥</m:t>
+                                              </m:r>
+                                            </m:e>
+                                            <m:sub>
+                                              <m:r>
+                                                <a:rPr lang="de-DE" sz="1800" i="1" dirty="0">
+                                                  <a:latin typeface="Cambria Math" panose="02040503050406030204" pitchFamily="18" charset="0"/>
+                                                  <a:ea typeface="Times New Roman" panose="02020603050405020304" pitchFamily="18" charset="0"/>
+                                                  <a:cs typeface="Times New Roman" panose="02020603050405020304" pitchFamily="18" charset="0"/>
+                                                </a:rPr>
+                                                <m:t>1</m:t>
+                                              </m:r>
+                                            </m:sub>
+                                          </m:sSub>
+                                          <m:r>
+                                            <a:rPr lang="de-DE" sz="1800" i="1" dirty="0">
+                                              <a:latin typeface="Cambria Math" panose="02040503050406030204" pitchFamily="18" charset="0"/>
+                                              <a:ea typeface="Times New Roman" panose="02020603050405020304" pitchFamily="18" charset="0"/>
+                                              <a:cs typeface="Times New Roman" panose="02020603050405020304" pitchFamily="18" charset="0"/>
+                                            </a:rPr>
+                                            <m:t>−</m:t>
+                                          </m:r>
+                                          <m:sSub>
+                                            <m:sSubPr>
+                                              <m:ctrlPr>
+                                                <a:rPr lang="de-DE" sz="1800" i="1" dirty="0">
+                                                  <a:latin typeface="Cambria Math" panose="02040503050406030204" pitchFamily="18" charset="0"/>
+                                                  <a:ea typeface="Times New Roman" panose="02020603050405020304" pitchFamily="18" charset="0"/>
+                                                  <a:cs typeface="Times New Roman" panose="02020603050405020304" pitchFamily="18" charset="0"/>
+                                                </a:rPr>
+                                              </m:ctrlPr>
+                                            </m:sSubPr>
+                                            <m:e>
+                                              <m:r>
+                                                <a:rPr lang="de-DE" sz="1800" i="1" dirty="0">
+                                                  <a:latin typeface="Cambria Math" panose="02040503050406030204" pitchFamily="18" charset="0"/>
+                                                  <a:ea typeface="Times New Roman" panose="02020603050405020304" pitchFamily="18" charset="0"/>
+                                                  <a:cs typeface="Times New Roman" panose="02020603050405020304" pitchFamily="18" charset="0"/>
+                                                </a:rPr>
+                                                <m:t>𝑥</m:t>
+                                              </m:r>
+                                            </m:e>
+                                            <m:sub>
+                                              <m:r>
+                                                <a:rPr lang="de-DE" sz="1800" i="1" dirty="0">
+                                                  <a:latin typeface="Cambria Math" panose="02040503050406030204" pitchFamily="18" charset="0"/>
+                                                  <a:ea typeface="Times New Roman" panose="02020603050405020304" pitchFamily="18" charset="0"/>
+                                                  <a:cs typeface="Times New Roman" panose="02020603050405020304" pitchFamily="18" charset="0"/>
+                                                </a:rPr>
+                                                <m:t>2</m:t>
+                                              </m:r>
+                                            </m:sub>
+                                          </m:sSub>
+                                          <m:r>
+                                            <a:rPr lang="de-DE" sz="1800" i="1" dirty="0">
+                                              <a:latin typeface="Cambria Math" panose="02040503050406030204" pitchFamily="18" charset="0"/>
+                                              <a:ea typeface="Times New Roman" panose="02020603050405020304" pitchFamily="18" charset="0"/>
+                                              <a:cs typeface="Times New Roman" panose="02020603050405020304" pitchFamily="18" charset="0"/>
+                                            </a:rPr>
+                                            <m:t>)</m:t>
+                                          </m:r>
+                                        </m:e>
+                                        <m:sup>
+                                          <m:r>
+                                            <a:rPr lang="de-DE" sz="1800" i="1">
+                                              <a:latin typeface="Cambria Math" panose="02040503050406030204" pitchFamily="18" charset="0"/>
+                                              <a:cs typeface="Times New Roman" panose="02020603050405020304" pitchFamily="18" charset="0"/>
+                                            </a:rPr>
+                                            <m:t>2</m:t>
+                                          </m:r>
+                                        </m:sup>
+                                      </m:sSup>
+                                      <m:r>
+                                        <a:rPr lang="de-DE" sz="1800" i="1" dirty="0">
+                                          <a:latin typeface="Cambria Math" panose="02040503050406030204" pitchFamily="18" charset="0"/>
+                                          <a:ea typeface="Times New Roman" panose="02020603050405020304" pitchFamily="18" charset="0"/>
+                                          <a:cs typeface="Times New Roman" panose="02020603050405020304" pitchFamily="18" charset="0"/>
+                                        </a:rPr>
+                                        <m:t>+</m:t>
+                                      </m:r>
+                                      <m:sSup>
+                                        <m:sSupPr>
+                                          <m:ctrlPr>
+                                            <a:rPr lang="de-DE" sz="1800" i="1" dirty="0">
+                                              <a:latin typeface="Cambria Math" panose="02040503050406030204" pitchFamily="18" charset="0"/>
+                                              <a:ea typeface="Times New Roman" panose="02020603050405020304" pitchFamily="18" charset="0"/>
+                                              <a:cs typeface="Times New Roman" panose="02020603050405020304" pitchFamily="18" charset="0"/>
+                                            </a:rPr>
+                                          </m:ctrlPr>
+                                        </m:sSupPr>
+                                        <m:e>
+                                          <m:d>
+                                            <m:dPr>
+                                              <m:ctrlPr>
+                                                <a:rPr lang="de-DE" sz="1800" i="1" dirty="0">
+                                                  <a:latin typeface="Cambria Math" panose="02040503050406030204" pitchFamily="18" charset="0"/>
+                                                  <a:ea typeface="Times New Roman" panose="02020603050405020304" pitchFamily="18" charset="0"/>
+                                                  <a:cs typeface="Times New Roman" panose="02020603050405020304" pitchFamily="18" charset="0"/>
+                                                </a:rPr>
+                                              </m:ctrlPr>
+                                            </m:dPr>
+                                            <m:e>
+                                              <m:sSub>
+                                                <m:sSubPr>
+                                                  <m:ctrlPr>
+                                                    <a:rPr lang="de-DE" sz="1800" i="1" dirty="0">
+                                                      <a:latin typeface="Cambria Math" panose="02040503050406030204" pitchFamily="18" charset="0"/>
+                                                      <a:ea typeface="Times New Roman" panose="02020603050405020304" pitchFamily="18" charset="0"/>
+                                                      <a:cs typeface="Times New Roman" panose="02020603050405020304" pitchFamily="18" charset="0"/>
+                                                    </a:rPr>
+                                                  </m:ctrlPr>
+                                                </m:sSubPr>
+                                                <m:e>
+                                                  <m:r>
+                                                    <a:rPr lang="de-DE" sz="1800" i="1" dirty="0">
+                                                      <a:latin typeface="Cambria Math" panose="02040503050406030204" pitchFamily="18" charset="0"/>
+                                                      <a:ea typeface="Times New Roman" panose="02020603050405020304" pitchFamily="18" charset="0"/>
+                                                      <a:cs typeface="Times New Roman" panose="02020603050405020304" pitchFamily="18" charset="0"/>
+                                                    </a:rPr>
+                                                    <m:t>𝑦</m:t>
+                                                  </m:r>
+                                                </m:e>
+                                                <m:sub>
+                                                  <m:r>
+                                                    <a:rPr lang="de-DE" sz="1800" i="1" dirty="0">
+                                                      <a:latin typeface="Cambria Math" panose="02040503050406030204" pitchFamily="18" charset="0"/>
+                                                      <a:ea typeface="Times New Roman" panose="02020603050405020304" pitchFamily="18" charset="0"/>
+                                                      <a:cs typeface="Times New Roman" panose="02020603050405020304" pitchFamily="18" charset="0"/>
+                                                    </a:rPr>
+                                                    <m:t>1</m:t>
+                                                  </m:r>
+                                                </m:sub>
+                                              </m:sSub>
+                                              <m:r>
+                                                <a:rPr lang="de-DE" sz="1800" i="1" dirty="0">
+                                                  <a:latin typeface="Cambria Math" panose="02040503050406030204" pitchFamily="18" charset="0"/>
+                                                  <a:ea typeface="Times New Roman" panose="02020603050405020304" pitchFamily="18" charset="0"/>
+                                                  <a:cs typeface="Times New Roman" panose="02020603050405020304" pitchFamily="18" charset="0"/>
+                                                </a:rPr>
+                                                <m:t>−</m:t>
+                                              </m:r>
+                                              <m:sSub>
+                                                <m:sSubPr>
+                                                  <m:ctrlPr>
+                                                    <a:rPr lang="de-DE" sz="1800" i="1" dirty="0">
+                                                      <a:latin typeface="Cambria Math" panose="02040503050406030204" pitchFamily="18" charset="0"/>
+                                                      <a:ea typeface="Times New Roman" panose="02020603050405020304" pitchFamily="18" charset="0"/>
+                                                      <a:cs typeface="Times New Roman" panose="02020603050405020304" pitchFamily="18" charset="0"/>
+                                                    </a:rPr>
+                                                  </m:ctrlPr>
+                                                </m:sSubPr>
+                                                <m:e>
+                                                  <m:r>
+                                                    <a:rPr lang="de-DE" sz="1800" i="1" dirty="0">
+                                                      <a:latin typeface="Cambria Math" panose="02040503050406030204" pitchFamily="18" charset="0"/>
+                                                      <a:ea typeface="Times New Roman" panose="02020603050405020304" pitchFamily="18" charset="0"/>
+                                                      <a:cs typeface="Times New Roman" panose="02020603050405020304" pitchFamily="18" charset="0"/>
+                                                    </a:rPr>
+                                                    <m:t>𝑦</m:t>
+                                                  </m:r>
+                                                </m:e>
+                                                <m:sub>
+                                                  <m:r>
+                                                    <a:rPr lang="de-DE" sz="1800" i="1" dirty="0">
+                                                      <a:latin typeface="Cambria Math" panose="02040503050406030204" pitchFamily="18" charset="0"/>
+                                                      <a:ea typeface="Times New Roman" panose="02020603050405020304" pitchFamily="18" charset="0"/>
+                                                      <a:cs typeface="Times New Roman" panose="02020603050405020304" pitchFamily="18" charset="0"/>
+                                                    </a:rPr>
+                                                    <m:t>2</m:t>
+                                                  </m:r>
+                                                </m:sub>
+                                              </m:sSub>
+                                            </m:e>
+                                          </m:d>
+                                        </m:e>
+                                        <m:sup>
+                                          <m:r>
+                                            <a:rPr lang="de-DE" sz="1800" i="1" dirty="0">
+                                              <a:latin typeface="Cambria Math" panose="02040503050406030204" pitchFamily="18" charset="0"/>
+                                              <a:ea typeface="Times New Roman" panose="02020603050405020304" pitchFamily="18" charset="0"/>
+                                              <a:cs typeface="Times New Roman" panose="02020603050405020304" pitchFamily="18" charset="0"/>
+                                            </a:rPr>
+                                            <m:t>2</m:t>
+                                          </m:r>
+                                        </m:sup>
+                                      </m:sSup>
+                                    </m:e>
+                                  </m:rad>
+                                </m:den>
+                              </m:f>
+                              <m:d>
+                                <m:dPr>
+                                  <m:begChr m:val="["/>
+                                  <m:endChr m:val="]"/>
+                                  <m:ctrlPr>
+                                    <a:rPr lang="de-DE" sz="1800" i="1" dirty="0">
+                                      <a:latin typeface="Cambria Math" panose="02040503050406030204" pitchFamily="18" charset="0"/>
+                                      <a:ea typeface="Times New Roman" panose="02020603050405020304" pitchFamily="18" charset="0"/>
+                                      <a:cs typeface="Times New Roman" panose="02020603050405020304" pitchFamily="18" charset="0"/>
+                                    </a:rPr>
+                                  </m:ctrlPr>
+                                </m:dPr>
+                                <m:e>
+                                  <m:m>
+                                    <m:mPr>
+                                      <m:mcs>
+                                        <m:mc>
+                                          <m:mcPr>
+                                            <m:count m:val="1"/>
+                                            <m:mcJc m:val="center"/>
+                                          </m:mcPr>
+                                        </m:mc>
+                                      </m:mcs>
+                                      <m:ctrlPr>
+                                        <a:rPr lang="de-DE" sz="1800" i="1">
+                                          <a:latin typeface="Cambria Math" panose="02040503050406030204" pitchFamily="18" charset="0"/>
+                                          <a:cs typeface="Times New Roman" panose="02020603050405020304" pitchFamily="18" charset="0"/>
+                                        </a:rPr>
+                                      </m:ctrlPr>
+                                    </m:mPr>
+                                    <m:mr>
                                       <m:e>
-                                        <m:acc>
-                                          <m:accPr>
-                                            <m:chr m:val="⃗"/>
+                                        <m:sSub>
+                                          <m:sSubPr>
                                             <m:ctrlPr>
-                                              <a:rPr lang="de-DE" sz="1800" i="1" dirty="0">
+                                              <a:rPr lang="de-DE" sz="1800" i="1">
                                                 <a:latin typeface="Cambria Math" panose="02040503050406030204" pitchFamily="18" charset="0"/>
-                                                <a:ea typeface="Times New Roman" panose="02020603050405020304" pitchFamily="18" charset="0"/>
                                                 <a:cs typeface="Times New Roman" panose="02020603050405020304" pitchFamily="18" charset="0"/>
                                               </a:rPr>
                                             </m:ctrlPr>
-                                          </m:accPr>
+                                          </m:sSubPr>
                                           <m:e>
                                             <m:r>
-                                              <a:rPr lang="de-DE" sz="1800" i="1" dirty="0">
+                                              <m:rPr>
+                                                <m:brk m:alnAt="7"/>
+                                              </m:rPr>
+                                              <a:rPr lang="de-DE" sz="1800" i="1">
                                                 <a:latin typeface="Cambria Math" panose="02040503050406030204" pitchFamily="18" charset="0"/>
-                                                <a:ea typeface="Times New Roman" panose="02020603050405020304" pitchFamily="18" charset="0"/>
                                                 <a:cs typeface="Times New Roman" panose="02020603050405020304" pitchFamily="18" charset="0"/>
                                               </a:rPr>
-                                              <m:t>𝑟</m:t>
+                                              <m:t>𝑥</m:t>
                                             </m:r>
                                           </m:e>
-                                        </m:acc>
-                                      </m:e>
-                                      <m:sub>
+                                          <m:sub>
+                                            <m:r>
+                                              <m:rPr>
+                                                <m:brk m:alnAt="7"/>
+                                              </m:rPr>
+                                              <a:rPr lang="de-DE" sz="1800" i="1">
+                                                <a:latin typeface="Cambria Math" panose="02040503050406030204" pitchFamily="18" charset="0"/>
+                                                <a:cs typeface="Times New Roman" panose="02020603050405020304" pitchFamily="18" charset="0"/>
+                                              </a:rPr>
+                                              <m:t>1</m:t>
+                                            </m:r>
+                                          </m:sub>
+                                        </m:sSub>
                                         <m:r>
-                                          <a:rPr lang="de-DE" sz="1800" i="1" dirty="0">
+                                          <a:rPr lang="de-DE" sz="1800" i="1">
                                             <a:latin typeface="Cambria Math" panose="02040503050406030204" pitchFamily="18" charset="0"/>
-                                            <a:ea typeface="Times New Roman" panose="02020603050405020304" pitchFamily="18" charset="0"/>
                                             <a:cs typeface="Times New Roman" panose="02020603050405020304" pitchFamily="18" charset="0"/>
                                           </a:rPr>
-                                          <m:t>2</m:t>
+                                          <m:t>−</m:t>
                                         </m:r>
-                                      </m:sub>
-                                    </m:sSub>
-                                  </m:e>
-                                </m:d>
-                              </m:e>
-                            </m:mr>
-                            <m:mr>
-                              <m:e>
-                                <m:sSub>
-                                  <m:sSubPr>
-                                    <m:ctrlPr>
-                                      <a:rPr lang="de-DE" sz="1800" i="1">
-                                        <a:latin typeface="Cambria Math" panose="02040503050406030204" pitchFamily="18" charset="0"/>
-                                        <a:ea typeface="Times New Roman" panose="02020603050405020304" pitchFamily="18" charset="0"/>
-                                        <a:cs typeface="Times New Roman" panose="02020603050405020304" pitchFamily="18" charset="0"/>
-                                      </a:rPr>
-                                    </m:ctrlPr>
-                                  </m:sSubPr>
-                                  <m:e>
-                                    <m:r>
-                                      <a:rPr lang="de-DE" sz="1800" i="1">
-                                        <a:latin typeface="Cambria Math" panose="02040503050406030204" pitchFamily="18" charset="0"/>
-                                        <a:ea typeface="Times New Roman" panose="02020603050405020304" pitchFamily="18" charset="0"/>
-                                        <a:cs typeface="Times New Roman" panose="02020603050405020304" pitchFamily="18" charset="0"/>
-                                      </a:rPr>
-                                      <m:t>𝑚</m:t>
-                                    </m:r>
-                                  </m:e>
-                                  <m:sub>
-                                    <m:r>
-                                      <a:rPr lang="de-DE" sz="1800" b="0" i="1" smtClean="0">
-                                        <a:latin typeface="Cambria Math" panose="02040503050406030204" pitchFamily="18" charset="0"/>
-                                        <a:ea typeface="Times New Roman" panose="02020603050405020304" pitchFamily="18" charset="0"/>
-                                        <a:cs typeface="Times New Roman" panose="02020603050405020304" pitchFamily="18" charset="0"/>
-                                      </a:rPr>
-                                      <m:t>2</m:t>
-                                    </m:r>
-                                  </m:sub>
-                                </m:sSub>
-                                <m:sSub>
-                                  <m:sSubPr>
-                                    <m:ctrlPr>
-                                      <a:rPr lang="de-DE" sz="1800" i="1" dirty="0">
-                                        <a:latin typeface="Cambria Math" panose="02040503050406030204" pitchFamily="18" charset="0"/>
-                                        <a:ea typeface="Times New Roman" panose="02020603050405020304" pitchFamily="18" charset="0"/>
-                                        <a:cs typeface="Times New Roman" panose="02020603050405020304" pitchFamily="18" charset="0"/>
-                                      </a:rPr>
-                                    </m:ctrlPr>
-                                  </m:sSubPr>
-                                  <m:e>
-                                    <m:acc>
-                                      <m:accPr>
-                                        <m:chr m:val="̈"/>
-                                        <m:ctrlPr>
-                                          <a:rPr lang="de-DE" sz="1800" i="1" dirty="0">
-                                            <a:latin typeface="Cambria Math" panose="02040503050406030204" pitchFamily="18" charset="0"/>
-                                            <a:ea typeface="Times New Roman" panose="02020603050405020304" pitchFamily="18" charset="0"/>
-                                            <a:cs typeface="Times New Roman" panose="02020603050405020304" pitchFamily="18" charset="0"/>
-                                          </a:rPr>
-                                        </m:ctrlPr>
-                                      </m:accPr>
-                                      <m:e>
-                                        <m:acc>
-                                          <m:accPr>
-                                            <m:chr m:val="⃗"/>
+                                        <m:sSub>
+                                          <m:sSubPr>
                                             <m:ctrlPr>
                                               <a:rPr lang="de-DE" sz="1800" i="1">
                                                 <a:latin typeface="Cambria Math" panose="02040503050406030204" pitchFamily="18" charset="0"/>
-                                                <a:ea typeface="Times New Roman" panose="02020603050405020304" pitchFamily="18" charset="0"/>
                                                 <a:cs typeface="Times New Roman" panose="02020603050405020304" pitchFamily="18" charset="0"/>
                                               </a:rPr>
                                             </m:ctrlPr>
-                                          </m:accPr>
+                                          </m:sSubPr>
                                           <m:e>
                                             <m:r>
                                               <a:rPr lang="de-DE" sz="1800" i="1">
                                                 <a:latin typeface="Cambria Math" panose="02040503050406030204" pitchFamily="18" charset="0"/>
-                                                <a:ea typeface="Times New Roman" panose="02020603050405020304" pitchFamily="18" charset="0"/>
                                                 <a:cs typeface="Times New Roman" panose="02020603050405020304" pitchFamily="18" charset="0"/>
                                               </a:rPr>
-                                              <m:t>𝑟</m:t>
+                                              <m:t>𝑥</m:t>
                                             </m:r>
                                           </m:e>
-                                        </m:acc>
+                                          <m:sub>
+                                            <m:r>
+                                              <a:rPr lang="de-DE" sz="1800" i="1">
+                                                <a:latin typeface="Cambria Math" panose="02040503050406030204" pitchFamily="18" charset="0"/>
+                                                <a:cs typeface="Times New Roman" panose="02020603050405020304" pitchFamily="18" charset="0"/>
+                                              </a:rPr>
+                                              <m:t>2</m:t>
+                                            </m:r>
+                                          </m:sub>
+                                        </m:sSub>
                                       </m:e>
-                                    </m:acc>
-                                  </m:e>
-                                  <m:sub>
-                                    <m:r>
-                                      <a:rPr lang="de-DE" sz="1800" b="0" i="1" dirty="0" smtClean="0">
-                                        <a:latin typeface="Cambria Math" panose="02040503050406030204" pitchFamily="18" charset="0"/>
-                                        <a:ea typeface="Times New Roman" panose="02020603050405020304" pitchFamily="18" charset="0"/>
-                                        <a:cs typeface="Times New Roman" panose="02020603050405020304" pitchFamily="18" charset="0"/>
-                                      </a:rPr>
-                                      <m:t>2</m:t>
-                                    </m:r>
-                                  </m:sub>
-                                </m:sSub>
-                                <m:r>
-                                  <a:rPr lang="de-DE" sz="1800" b="0" i="1" dirty="0" smtClean="0">
-                                    <a:latin typeface="Cambria Math" panose="02040503050406030204" pitchFamily="18" charset="0"/>
-                                    <a:ea typeface="Times New Roman" panose="02020603050405020304" pitchFamily="18" charset="0"/>
-                                    <a:cs typeface="Times New Roman" panose="02020603050405020304" pitchFamily="18" charset="0"/>
-                                  </a:rPr>
-                                  <m:t>=+</m:t>
-                                </m:r>
-                                <m:f>
-                                  <m:fPr>
-                                    <m:ctrlPr>
-                                      <a:rPr lang="de-DE" sz="1800" i="1" dirty="0">
-                                        <a:latin typeface="Cambria Math" panose="02040503050406030204" pitchFamily="18" charset="0"/>
-                                        <a:ea typeface="Times New Roman" panose="02020603050405020304" pitchFamily="18" charset="0"/>
-                                        <a:cs typeface="Times New Roman" panose="02020603050405020304" pitchFamily="18" charset="0"/>
-                                      </a:rPr>
-                                    </m:ctrlPr>
-                                  </m:fPr>
-                                  <m:num>
-                                    <m:r>
-                                      <a:rPr lang="de-DE" sz="1800" i="1" dirty="0">
-                                        <a:latin typeface="Cambria Math" panose="02040503050406030204" pitchFamily="18" charset="0"/>
-                                        <a:ea typeface="Times New Roman" panose="02020603050405020304" pitchFamily="18" charset="0"/>
-                                        <a:cs typeface="Times New Roman" panose="02020603050405020304" pitchFamily="18" charset="0"/>
-                                      </a:rPr>
-                                      <m:t>𝐺</m:t>
-                                    </m:r>
-                                    <m:sSub>
-                                      <m:sSubPr>
-                                        <m:ctrlPr>
-                                          <a:rPr lang="de-DE" sz="1800" i="1" dirty="0">
-                                            <a:latin typeface="Cambria Math" panose="02040503050406030204" pitchFamily="18" charset="0"/>
-                                            <a:ea typeface="Times New Roman" panose="02020603050405020304" pitchFamily="18" charset="0"/>
-                                            <a:cs typeface="Times New Roman" panose="02020603050405020304" pitchFamily="18" charset="0"/>
-                                          </a:rPr>
-                                        </m:ctrlPr>
-                                      </m:sSubPr>
+                                    </m:mr>
+                                    <m:mr>
                                       <m:e>
-                                        <m:r>
-                                          <a:rPr lang="de-DE" sz="1800" i="1" dirty="0">
-                                            <a:latin typeface="Cambria Math" panose="02040503050406030204" pitchFamily="18" charset="0"/>
-                                            <a:ea typeface="Times New Roman" panose="02020603050405020304" pitchFamily="18" charset="0"/>
-                                            <a:cs typeface="Times New Roman" panose="02020603050405020304" pitchFamily="18" charset="0"/>
-                                          </a:rPr>
-                                          <m:t>𝑚</m:t>
-                                        </m:r>
-                                      </m:e>
-                                      <m:sub>
-                                        <m:r>
-                                          <a:rPr lang="de-DE" sz="1800" i="1" dirty="0">
-                                            <a:latin typeface="Cambria Math" panose="02040503050406030204" pitchFamily="18" charset="0"/>
-                                            <a:ea typeface="Times New Roman" panose="02020603050405020304" pitchFamily="18" charset="0"/>
-                                            <a:cs typeface="Times New Roman" panose="02020603050405020304" pitchFamily="18" charset="0"/>
-                                          </a:rPr>
-                                          <m:t>1</m:t>
-                                        </m:r>
-                                      </m:sub>
-                                    </m:sSub>
-                                    <m:sSub>
-                                      <m:sSubPr>
-                                        <m:ctrlPr>
-                                          <a:rPr lang="de-DE" sz="1800" i="1" dirty="0">
-                                            <a:latin typeface="Cambria Math" panose="02040503050406030204" pitchFamily="18" charset="0"/>
-                                            <a:ea typeface="Times New Roman" panose="02020603050405020304" pitchFamily="18" charset="0"/>
-                                            <a:cs typeface="Times New Roman" panose="02020603050405020304" pitchFamily="18" charset="0"/>
-                                          </a:rPr>
-                                        </m:ctrlPr>
-                                      </m:sSubPr>
-                                      <m:e>
-                                        <m:r>
-                                          <a:rPr lang="de-DE" sz="1800" i="1" dirty="0">
-                                            <a:latin typeface="Cambria Math" panose="02040503050406030204" pitchFamily="18" charset="0"/>
-                                            <a:ea typeface="Times New Roman" panose="02020603050405020304" pitchFamily="18" charset="0"/>
-                                            <a:cs typeface="Times New Roman" panose="02020603050405020304" pitchFamily="18" charset="0"/>
-                                          </a:rPr>
-                                          <m:t>𝑚</m:t>
-                                        </m:r>
-                                      </m:e>
-                                      <m:sub>
-                                        <m:r>
-                                          <a:rPr lang="de-DE" sz="1800" i="1" dirty="0">
-                                            <a:latin typeface="Cambria Math" panose="02040503050406030204" pitchFamily="18" charset="0"/>
-                                            <a:ea typeface="Times New Roman" panose="02020603050405020304" pitchFamily="18" charset="0"/>
-                                            <a:cs typeface="Times New Roman" panose="02020603050405020304" pitchFamily="18" charset="0"/>
-                                          </a:rPr>
-                                          <m:t>2</m:t>
-                                        </m:r>
-                                      </m:sub>
-                                    </m:sSub>
-                                  </m:num>
-                                  <m:den>
-                                    <m:sSup>
-                                      <m:sSupPr>
-                                        <m:ctrlPr>
-                                          <a:rPr lang="de-DE" sz="1800" i="1" dirty="0">
-                                            <a:latin typeface="Cambria Math" panose="02040503050406030204" pitchFamily="18" charset="0"/>
-                                            <a:ea typeface="Times New Roman" panose="02020603050405020304" pitchFamily="18" charset="0"/>
-                                            <a:cs typeface="Times New Roman" panose="02020603050405020304" pitchFamily="18" charset="0"/>
-                                          </a:rPr>
-                                        </m:ctrlPr>
-                                      </m:sSupPr>
-                                      <m:e>
-                                        <m:r>
-                                          <a:rPr lang="de-DE" sz="1800" i="1" dirty="0">
-                                            <a:latin typeface="Cambria Math" panose="02040503050406030204" pitchFamily="18" charset="0"/>
-                                            <a:ea typeface="Times New Roman" panose="02020603050405020304" pitchFamily="18" charset="0"/>
-                                            <a:cs typeface="Times New Roman" panose="02020603050405020304" pitchFamily="18" charset="0"/>
-                                          </a:rPr>
-                                          <m:t>𝑟</m:t>
-                                        </m:r>
-                                      </m:e>
-                                      <m:sup>
-                                        <m:r>
-                                          <a:rPr lang="de-DE" sz="1800" i="1" dirty="0">
-                                            <a:latin typeface="Cambria Math" panose="02040503050406030204" pitchFamily="18" charset="0"/>
-                                            <a:ea typeface="Times New Roman" panose="02020603050405020304" pitchFamily="18" charset="0"/>
-                                            <a:cs typeface="Times New Roman" panose="02020603050405020304" pitchFamily="18" charset="0"/>
-                                          </a:rPr>
-                                          <m:t>3</m:t>
-                                        </m:r>
-                                      </m:sup>
-                                    </m:sSup>
-                                  </m:den>
-                                </m:f>
-                                <m:d>
-                                  <m:dPr>
-                                    <m:ctrlPr>
-                                      <a:rPr lang="de-DE" sz="1800" i="1" dirty="0">
-                                        <a:latin typeface="Cambria Math" panose="02040503050406030204" pitchFamily="18" charset="0"/>
-                                        <a:ea typeface="Times New Roman" panose="02020603050405020304" pitchFamily="18" charset="0"/>
-                                        <a:cs typeface="Times New Roman" panose="02020603050405020304" pitchFamily="18" charset="0"/>
-                                      </a:rPr>
-                                    </m:ctrlPr>
-                                  </m:dPr>
-                                  <m:e>
-                                    <m:sSub>
-                                      <m:sSubPr>
-                                        <m:ctrlPr>
-                                          <a:rPr lang="de-DE" sz="1800" i="1" dirty="0">
-                                            <a:latin typeface="Cambria Math" panose="02040503050406030204" pitchFamily="18" charset="0"/>
-                                            <a:ea typeface="Times New Roman" panose="02020603050405020304" pitchFamily="18" charset="0"/>
-                                            <a:cs typeface="Times New Roman" panose="02020603050405020304" pitchFamily="18" charset="0"/>
-                                          </a:rPr>
-                                        </m:ctrlPr>
-                                      </m:sSubPr>
-                                      <m:e>
-                                        <m:acc>
-                                          <m:accPr>
-                                            <m:chr m:val="⃗"/>
+                                        <m:sSub>
+                                          <m:sSubPr>
                                             <m:ctrlPr>
-                                              <a:rPr lang="de-DE" sz="1800" i="1" dirty="0">
+                                              <a:rPr lang="de-DE" sz="1800" i="1">
                                                 <a:latin typeface="Cambria Math" panose="02040503050406030204" pitchFamily="18" charset="0"/>
-                                                <a:ea typeface="Times New Roman" panose="02020603050405020304" pitchFamily="18" charset="0"/>
                                                 <a:cs typeface="Times New Roman" panose="02020603050405020304" pitchFamily="18" charset="0"/>
                                               </a:rPr>
                                             </m:ctrlPr>
-                                          </m:accPr>
+                                          </m:sSubPr>
                                           <m:e>
                                             <m:r>
-                                              <a:rPr lang="de-DE" sz="1800" i="1" dirty="0">
+                                              <a:rPr lang="de-DE" sz="1800" i="1">
                                                 <a:latin typeface="Cambria Math" panose="02040503050406030204" pitchFamily="18" charset="0"/>
-                                                <a:ea typeface="Times New Roman" panose="02020603050405020304" pitchFamily="18" charset="0"/>
                                                 <a:cs typeface="Times New Roman" panose="02020603050405020304" pitchFamily="18" charset="0"/>
                                               </a:rPr>
-                                              <m:t>𝑟</m:t>
+                                              <m:t>𝑦</m:t>
                                             </m:r>
                                           </m:e>
-                                        </m:acc>
-                                      </m:e>
-                                      <m:sub>
+                                          <m:sub>
+                                            <m:r>
+                                              <a:rPr lang="de-DE" sz="1800" i="1">
+                                                <a:latin typeface="Cambria Math" panose="02040503050406030204" pitchFamily="18" charset="0"/>
+                                                <a:cs typeface="Times New Roman" panose="02020603050405020304" pitchFamily="18" charset="0"/>
+                                              </a:rPr>
+                                              <m:t>1</m:t>
+                                            </m:r>
+                                          </m:sub>
+                                        </m:sSub>
                                         <m:r>
-                                          <a:rPr lang="de-DE" sz="1800" i="1" dirty="0">
+                                          <a:rPr lang="de-DE" sz="1800" i="1">
                                             <a:latin typeface="Cambria Math" panose="02040503050406030204" pitchFamily="18" charset="0"/>
-                                            <a:ea typeface="Times New Roman" panose="02020603050405020304" pitchFamily="18" charset="0"/>
                                             <a:cs typeface="Times New Roman" panose="02020603050405020304" pitchFamily="18" charset="0"/>
                                           </a:rPr>
-                                          <m:t>1</m:t>
+                                          <m:t>−</m:t>
                                         </m:r>
-                                      </m:sub>
-                                    </m:sSub>
-                                    <m:r>
-                                      <a:rPr lang="de-DE" sz="1800" i="1" dirty="0">
-                                        <a:latin typeface="Cambria Math" panose="02040503050406030204" pitchFamily="18" charset="0"/>
-                                        <a:ea typeface="Times New Roman" panose="02020603050405020304" pitchFamily="18" charset="0"/>
-                                        <a:cs typeface="Times New Roman" panose="02020603050405020304" pitchFamily="18" charset="0"/>
-                                      </a:rPr>
-                                      <m:t>−</m:t>
-                                    </m:r>
-                                    <m:sSub>
-                                      <m:sSubPr>
-                                        <m:ctrlPr>
-                                          <a:rPr lang="de-DE" sz="1800" i="1" dirty="0">
-                                            <a:latin typeface="Cambria Math" panose="02040503050406030204" pitchFamily="18" charset="0"/>
-                                            <a:ea typeface="Times New Roman" panose="02020603050405020304" pitchFamily="18" charset="0"/>
-                                            <a:cs typeface="Times New Roman" panose="02020603050405020304" pitchFamily="18" charset="0"/>
-                                          </a:rPr>
-                                        </m:ctrlPr>
-                                      </m:sSubPr>
-                                      <m:e>
-                                        <m:acc>
-                                          <m:accPr>
-                                            <m:chr m:val="⃗"/>
+                                        <m:sSub>
+                                          <m:sSubPr>
                                             <m:ctrlPr>
-                                              <a:rPr lang="de-DE" sz="1800" i="1" dirty="0">
+                                              <a:rPr lang="de-DE" sz="1800" i="1">
                                                 <a:latin typeface="Cambria Math" panose="02040503050406030204" pitchFamily="18" charset="0"/>
-                                                <a:ea typeface="Times New Roman" panose="02020603050405020304" pitchFamily="18" charset="0"/>
                                                 <a:cs typeface="Times New Roman" panose="02020603050405020304" pitchFamily="18" charset="0"/>
                                               </a:rPr>
                                             </m:ctrlPr>
-                                          </m:accPr>
+                                          </m:sSubPr>
                                           <m:e>
                                             <m:r>
-                                              <a:rPr lang="de-DE" sz="1800" i="1" dirty="0">
+                                              <a:rPr lang="de-DE" sz="1800" i="1">
                                                 <a:latin typeface="Cambria Math" panose="02040503050406030204" pitchFamily="18" charset="0"/>
-                                                <a:ea typeface="Times New Roman" panose="02020603050405020304" pitchFamily="18" charset="0"/>
                                                 <a:cs typeface="Times New Roman" panose="02020603050405020304" pitchFamily="18" charset="0"/>
                                               </a:rPr>
-                                              <m:t>𝑟</m:t>
+                                              <m:t>𝑦</m:t>
                                             </m:r>
                                           </m:e>
-                                        </m:acc>
+                                          <m:sub>
+                                            <m:r>
+                                              <a:rPr lang="de-DE" sz="1800" i="1">
+                                                <a:latin typeface="Cambria Math" panose="02040503050406030204" pitchFamily="18" charset="0"/>
+                                                <a:cs typeface="Times New Roman" panose="02020603050405020304" pitchFamily="18" charset="0"/>
+                                              </a:rPr>
+                                              <m:t>2</m:t>
+                                            </m:r>
+                                          </m:sub>
+                                        </m:sSub>
                                       </m:e>
-                                      <m:sub>
-                                        <m:r>
-                                          <a:rPr lang="de-DE" sz="1800" i="1" dirty="0">
-                                            <a:latin typeface="Cambria Math" panose="02040503050406030204" pitchFamily="18" charset="0"/>
-                                            <a:ea typeface="Times New Roman" panose="02020603050405020304" pitchFamily="18" charset="0"/>
-                                            <a:cs typeface="Times New Roman" panose="02020603050405020304" pitchFamily="18" charset="0"/>
-                                          </a:rPr>
-                                          <m:t>2</m:t>
-                                        </m:r>
-                                      </m:sub>
-                                    </m:sSub>
-                                  </m:e>
-                                </m:d>
-                              </m:e>
-                            </m:mr>
-                          </m:m>
-                        </m:e>
-                      </m:d>
-                    </m:oMath>
-                  </m:oMathPara>
+                                    </m:mr>
+                                  </m:m>
+                                </m:e>
+                              </m:d>
+                            </m:e>
+                          </m:mr>
+                        </m:m>
+                      </m:e>
+                    </m:d>
+                  </m:oMath>
                 </a14:m>
-                <a:endParaRPr lang="de-DE" sz="1800" dirty="0">
-                  <a:effectLst/>
-                  <a:latin typeface="Calibri" panose="020F0502020204030204" pitchFamily="34" charset="0"/>
-                  <a:ea typeface="Times New Roman" panose="02020603050405020304" pitchFamily="18" charset="0"/>
-                  <a:cs typeface="Times New Roman" panose="02020603050405020304" pitchFamily="18" charset="0"/>
-                </a:endParaRPr>
+                <a:r>
+                  <a:rPr lang="de-DE" sz="1800" dirty="0">
+                    <a:effectLst/>
+                    <a:latin typeface="Calibri" panose="020F0502020204030204" pitchFamily="34" charset="0"/>
+                    <a:ea typeface="Times New Roman" panose="02020603050405020304" pitchFamily="18" charset="0"/>
+                    <a:cs typeface="Times New Roman" panose="02020603050405020304" pitchFamily="18" charset="0"/>
+                  </a:rPr>
+                  <a:t> </a:t>
+                </a:r>
               </a:p>
               <a:p>
                 <a:pPr marL="0" indent="0">
@@ -9146,13 +9389,1779 @@
             </p:nvSpPr>
             <p:spPr>
               <a:xfrm>
-                <a:off x="399660" y="799258"/>
+                <a:off x="240269" y="245585"/>
                 <a:ext cx="10515600" cy="4351338"/>
               </a:xfrm>
               <a:blipFill>
-                <a:blip r:embed="rId3"/>
+                <a:blip r:embed="rId4"/>
                 <a:stretch>
-                  <a:fillRect l="-522" t="-700"/>
+                  <a:fillRect l="-464" t="-700"/>
+                </a:stretch>
+              </a:blipFill>
+            </p:spPr>
+            <p:txBody>
+              <a:bodyPr/>
+              <a:lstStyle/>
+              <a:p>
+                <a:r>
+                  <a:rPr lang="de-DE">
+                    <a:noFill/>
+                  </a:rPr>
+                  <a:t> </a:t>
+                </a:r>
+              </a:p>
+            </p:txBody>
+          </p:sp>
+        </mc:Fallback>
+      </mc:AlternateContent>
+      <mc:AlternateContent xmlns:mc="http://schemas.openxmlformats.org/markup-compatibility/2006">
+        <mc:Choice xmlns:a14="http://schemas.microsoft.com/office/drawing/2010/main" Requires="a14">
+          <p:sp>
+            <p:nvSpPr>
+              <p:cNvPr id="2" name="Textfeld 1">
+                <a:extLst>
+                  <a:ext uri="{FF2B5EF4-FFF2-40B4-BE49-F238E27FC236}">
+                    <a16:creationId xmlns:a16="http://schemas.microsoft.com/office/drawing/2014/main" id="{0CB11AF6-C425-4371-AFA7-8BA9A52CA9BC}"/>
+                  </a:ext>
+                </a:extLst>
+              </p:cNvPr>
+              <p:cNvSpPr txBox="1"/>
+              <p:nvPr/>
+            </p:nvSpPr>
+            <p:spPr>
+              <a:xfrm>
+                <a:off x="6959473" y="4837819"/>
+                <a:ext cx="880212" cy="415498"/>
+              </a:xfrm>
+              <a:prstGeom prst="rect">
+                <a:avLst/>
+              </a:prstGeom>
+              <a:noFill/>
+            </p:spPr>
+            <p:txBody>
+              <a:bodyPr wrap="square" rtlCol="0">
+                <a:spAutoFit/>
+              </a:bodyPr>
+              <a:lstStyle/>
+              <a:p>
+                <a14:m>
+                  <m:oMathPara xmlns:m="http://schemas.openxmlformats.org/officeDocument/2006/math">
+                    <m:oMathParaPr>
+                      <m:jc m:val="centerGroup"/>
+                    </m:oMathParaPr>
+                    <m:oMath xmlns:m="http://schemas.openxmlformats.org/officeDocument/2006/math">
+                      <m:sSup>
+                        <m:sSupPr>
+                          <m:ctrlPr>
+                            <a:rPr lang="de-DE" sz="1000" i="1" smtClean="0">
+                              <a:solidFill>
+                                <a:srgbClr val="FF0000"/>
+                              </a:solidFill>
+                              <a:latin typeface="Cambria Math" panose="02040503050406030204" pitchFamily="18" charset="0"/>
+                              <a:cs typeface="Times New Roman" panose="02020603050405020304" pitchFamily="18" charset="0"/>
+                            </a:rPr>
+                          </m:ctrlPr>
+                        </m:sSupPr>
+                        <m:e>
+                          <m:sSub>
+                            <m:sSubPr>
+                              <m:ctrlPr>
+                                <a:rPr lang="de-DE" sz="1000" i="1" dirty="0">
+                                  <a:solidFill>
+                                    <a:srgbClr val="FF0000"/>
+                                  </a:solidFill>
+                                  <a:latin typeface="Cambria Math" panose="02040503050406030204" pitchFamily="18" charset="0"/>
+                                  <a:ea typeface="Times New Roman" panose="02020603050405020304" pitchFamily="18" charset="0"/>
+                                  <a:cs typeface="Times New Roman" panose="02020603050405020304" pitchFamily="18" charset="0"/>
+                                </a:rPr>
+                              </m:ctrlPr>
+                            </m:sSubPr>
+                            <m:e>
+                              <m:r>
+                                <a:rPr lang="de-DE" sz="1000" i="1" dirty="0">
+                                  <a:solidFill>
+                                    <a:srgbClr val="FF0000"/>
+                                  </a:solidFill>
+                                  <a:latin typeface="Cambria Math" panose="02040503050406030204" pitchFamily="18" charset="0"/>
+                                  <a:ea typeface="Times New Roman" panose="02020603050405020304" pitchFamily="18" charset="0"/>
+                                  <a:cs typeface="Times New Roman" panose="02020603050405020304" pitchFamily="18" charset="0"/>
+                                </a:rPr>
+                                <m:t>(</m:t>
+                              </m:r>
+                              <m:r>
+                                <a:rPr lang="de-DE" sz="1000" i="1" dirty="0">
+                                  <a:solidFill>
+                                    <a:srgbClr val="FF0000"/>
+                                  </a:solidFill>
+                                  <a:latin typeface="Cambria Math" panose="02040503050406030204" pitchFamily="18" charset="0"/>
+                                  <a:ea typeface="Times New Roman" panose="02020603050405020304" pitchFamily="18" charset="0"/>
+                                  <a:cs typeface="Times New Roman" panose="02020603050405020304" pitchFamily="18" charset="0"/>
+                                </a:rPr>
+                                <m:t>𝑥</m:t>
+                              </m:r>
+                            </m:e>
+                            <m:sub>
+                              <m:r>
+                                <a:rPr lang="de-DE" sz="1000" i="1" dirty="0">
+                                  <a:solidFill>
+                                    <a:srgbClr val="FF0000"/>
+                                  </a:solidFill>
+                                  <a:latin typeface="Cambria Math" panose="02040503050406030204" pitchFamily="18" charset="0"/>
+                                  <a:ea typeface="Times New Roman" panose="02020603050405020304" pitchFamily="18" charset="0"/>
+                                  <a:cs typeface="Times New Roman" panose="02020603050405020304" pitchFamily="18" charset="0"/>
+                                </a:rPr>
+                                <m:t>1</m:t>
+                              </m:r>
+                            </m:sub>
+                          </m:sSub>
+                          <m:r>
+                            <a:rPr lang="de-DE" sz="1000" i="1" dirty="0">
+                              <a:solidFill>
+                                <a:srgbClr val="FF0000"/>
+                              </a:solidFill>
+                              <a:latin typeface="Cambria Math" panose="02040503050406030204" pitchFamily="18" charset="0"/>
+                              <a:ea typeface="Times New Roman" panose="02020603050405020304" pitchFamily="18" charset="0"/>
+                              <a:cs typeface="Times New Roman" panose="02020603050405020304" pitchFamily="18" charset="0"/>
+                            </a:rPr>
+                            <m:t>−</m:t>
+                          </m:r>
+                          <m:sSub>
+                            <m:sSubPr>
+                              <m:ctrlPr>
+                                <a:rPr lang="de-DE" sz="1000" i="1" dirty="0">
+                                  <a:solidFill>
+                                    <a:srgbClr val="FF0000"/>
+                                  </a:solidFill>
+                                  <a:latin typeface="Cambria Math" panose="02040503050406030204" pitchFamily="18" charset="0"/>
+                                  <a:ea typeface="Times New Roman" panose="02020603050405020304" pitchFamily="18" charset="0"/>
+                                  <a:cs typeface="Times New Roman" panose="02020603050405020304" pitchFamily="18" charset="0"/>
+                                </a:rPr>
+                              </m:ctrlPr>
+                            </m:sSubPr>
+                            <m:e>
+                              <m:r>
+                                <a:rPr lang="de-DE" sz="1000" i="1" dirty="0">
+                                  <a:solidFill>
+                                    <a:srgbClr val="FF0000"/>
+                                  </a:solidFill>
+                                  <a:latin typeface="Cambria Math" panose="02040503050406030204" pitchFamily="18" charset="0"/>
+                                  <a:ea typeface="Times New Roman" panose="02020603050405020304" pitchFamily="18" charset="0"/>
+                                  <a:cs typeface="Times New Roman" panose="02020603050405020304" pitchFamily="18" charset="0"/>
+                                </a:rPr>
+                                <m:t>𝑥</m:t>
+                              </m:r>
+                            </m:e>
+                            <m:sub>
+                              <m:r>
+                                <a:rPr lang="de-DE" sz="1000" i="1" dirty="0">
+                                  <a:solidFill>
+                                    <a:srgbClr val="FF0000"/>
+                                  </a:solidFill>
+                                  <a:latin typeface="Cambria Math" panose="02040503050406030204" pitchFamily="18" charset="0"/>
+                                  <a:ea typeface="Times New Roman" panose="02020603050405020304" pitchFamily="18" charset="0"/>
+                                  <a:cs typeface="Times New Roman" panose="02020603050405020304" pitchFamily="18" charset="0"/>
+                                </a:rPr>
+                                <m:t>2</m:t>
+                              </m:r>
+                            </m:sub>
+                          </m:sSub>
+                          <m:r>
+                            <a:rPr lang="de-DE" sz="1000" i="1" dirty="0">
+                              <a:solidFill>
+                                <a:srgbClr val="FF0000"/>
+                              </a:solidFill>
+                              <a:latin typeface="Cambria Math" panose="02040503050406030204" pitchFamily="18" charset="0"/>
+                              <a:ea typeface="Times New Roman" panose="02020603050405020304" pitchFamily="18" charset="0"/>
+                              <a:cs typeface="Times New Roman" panose="02020603050405020304" pitchFamily="18" charset="0"/>
+                            </a:rPr>
+                            <m:t>)</m:t>
+                          </m:r>
+                        </m:e>
+                        <m:sup>
+                          <m:r>
+                            <a:rPr lang="de-DE" sz="1000" i="1">
+                              <a:solidFill>
+                                <a:srgbClr val="FF0000"/>
+                              </a:solidFill>
+                              <a:latin typeface="Cambria Math" panose="02040503050406030204" pitchFamily="18" charset="0"/>
+                              <a:cs typeface="Times New Roman" panose="02020603050405020304" pitchFamily="18" charset="0"/>
+                            </a:rPr>
+                            <m:t>2</m:t>
+                          </m:r>
+                        </m:sup>
+                      </m:sSup>
+                    </m:oMath>
+                    <m:oMath xmlns:m="http://schemas.openxmlformats.org/officeDocument/2006/math">
+                      <m:r>
+                        <a:rPr lang="de-DE" sz="1000" i="1" dirty="0">
+                          <a:solidFill>
+                            <a:srgbClr val="FF0000"/>
+                          </a:solidFill>
+                          <a:latin typeface="Cambria Math" panose="02040503050406030204" pitchFamily="18" charset="0"/>
+                          <a:ea typeface="Times New Roman" panose="02020603050405020304" pitchFamily="18" charset="0"/>
+                          <a:cs typeface="Times New Roman" panose="02020603050405020304" pitchFamily="18" charset="0"/>
+                        </a:rPr>
+                        <m:t>+</m:t>
+                      </m:r>
+                      <m:sSup>
+                        <m:sSupPr>
+                          <m:ctrlPr>
+                            <a:rPr lang="de-DE" sz="1000" i="1" dirty="0">
+                              <a:solidFill>
+                                <a:srgbClr val="FF0000"/>
+                              </a:solidFill>
+                              <a:latin typeface="Cambria Math" panose="02040503050406030204" pitchFamily="18" charset="0"/>
+                              <a:ea typeface="Times New Roman" panose="02020603050405020304" pitchFamily="18" charset="0"/>
+                              <a:cs typeface="Times New Roman" panose="02020603050405020304" pitchFamily="18" charset="0"/>
+                            </a:rPr>
+                          </m:ctrlPr>
+                        </m:sSupPr>
+                        <m:e>
+                          <m:d>
+                            <m:dPr>
+                              <m:ctrlPr>
+                                <a:rPr lang="de-DE" sz="1000" i="1" dirty="0">
+                                  <a:solidFill>
+                                    <a:srgbClr val="FF0000"/>
+                                  </a:solidFill>
+                                  <a:latin typeface="Cambria Math" panose="02040503050406030204" pitchFamily="18" charset="0"/>
+                                  <a:ea typeface="Times New Roman" panose="02020603050405020304" pitchFamily="18" charset="0"/>
+                                  <a:cs typeface="Times New Roman" panose="02020603050405020304" pitchFamily="18" charset="0"/>
+                                </a:rPr>
+                              </m:ctrlPr>
+                            </m:dPr>
+                            <m:e>
+                              <m:sSub>
+                                <m:sSubPr>
+                                  <m:ctrlPr>
+                                    <a:rPr lang="de-DE" sz="1000" i="1" dirty="0">
+                                      <a:solidFill>
+                                        <a:srgbClr val="FF0000"/>
+                                      </a:solidFill>
+                                      <a:latin typeface="Cambria Math" panose="02040503050406030204" pitchFamily="18" charset="0"/>
+                                      <a:ea typeface="Times New Roman" panose="02020603050405020304" pitchFamily="18" charset="0"/>
+                                      <a:cs typeface="Times New Roman" panose="02020603050405020304" pitchFamily="18" charset="0"/>
+                                    </a:rPr>
+                                  </m:ctrlPr>
+                                </m:sSubPr>
+                                <m:e>
+                                  <m:r>
+                                    <a:rPr lang="de-DE" sz="1000" i="1" dirty="0">
+                                      <a:solidFill>
+                                        <a:srgbClr val="FF0000"/>
+                                      </a:solidFill>
+                                      <a:latin typeface="Cambria Math" panose="02040503050406030204" pitchFamily="18" charset="0"/>
+                                      <a:ea typeface="Times New Roman" panose="02020603050405020304" pitchFamily="18" charset="0"/>
+                                      <a:cs typeface="Times New Roman" panose="02020603050405020304" pitchFamily="18" charset="0"/>
+                                    </a:rPr>
+                                    <m:t>𝑦</m:t>
+                                  </m:r>
+                                </m:e>
+                                <m:sub>
+                                  <m:r>
+                                    <a:rPr lang="de-DE" sz="1000" i="1" dirty="0">
+                                      <a:solidFill>
+                                        <a:srgbClr val="FF0000"/>
+                                      </a:solidFill>
+                                      <a:latin typeface="Cambria Math" panose="02040503050406030204" pitchFamily="18" charset="0"/>
+                                      <a:ea typeface="Times New Roman" panose="02020603050405020304" pitchFamily="18" charset="0"/>
+                                      <a:cs typeface="Times New Roman" panose="02020603050405020304" pitchFamily="18" charset="0"/>
+                                    </a:rPr>
+                                    <m:t>1</m:t>
+                                  </m:r>
+                                </m:sub>
+                              </m:sSub>
+                              <m:r>
+                                <a:rPr lang="de-DE" sz="1000" i="1" dirty="0">
+                                  <a:solidFill>
+                                    <a:srgbClr val="FF0000"/>
+                                  </a:solidFill>
+                                  <a:latin typeface="Cambria Math" panose="02040503050406030204" pitchFamily="18" charset="0"/>
+                                  <a:ea typeface="Times New Roman" panose="02020603050405020304" pitchFamily="18" charset="0"/>
+                                  <a:cs typeface="Times New Roman" panose="02020603050405020304" pitchFamily="18" charset="0"/>
+                                </a:rPr>
+                                <m:t>−</m:t>
+                              </m:r>
+                              <m:sSub>
+                                <m:sSubPr>
+                                  <m:ctrlPr>
+                                    <a:rPr lang="de-DE" sz="1000" i="1" dirty="0">
+                                      <a:solidFill>
+                                        <a:srgbClr val="FF0000"/>
+                                      </a:solidFill>
+                                      <a:latin typeface="Cambria Math" panose="02040503050406030204" pitchFamily="18" charset="0"/>
+                                      <a:ea typeface="Times New Roman" panose="02020603050405020304" pitchFamily="18" charset="0"/>
+                                      <a:cs typeface="Times New Roman" panose="02020603050405020304" pitchFamily="18" charset="0"/>
+                                    </a:rPr>
+                                  </m:ctrlPr>
+                                </m:sSubPr>
+                                <m:e>
+                                  <m:r>
+                                    <a:rPr lang="de-DE" sz="1000" i="1" dirty="0">
+                                      <a:solidFill>
+                                        <a:srgbClr val="FF0000"/>
+                                      </a:solidFill>
+                                      <a:latin typeface="Cambria Math" panose="02040503050406030204" pitchFamily="18" charset="0"/>
+                                      <a:ea typeface="Times New Roman" panose="02020603050405020304" pitchFamily="18" charset="0"/>
+                                      <a:cs typeface="Times New Roman" panose="02020603050405020304" pitchFamily="18" charset="0"/>
+                                    </a:rPr>
+                                    <m:t>𝑦</m:t>
+                                  </m:r>
+                                </m:e>
+                                <m:sub>
+                                  <m:r>
+                                    <a:rPr lang="de-DE" sz="1000" i="1" dirty="0">
+                                      <a:solidFill>
+                                        <a:srgbClr val="FF0000"/>
+                                      </a:solidFill>
+                                      <a:latin typeface="Cambria Math" panose="02040503050406030204" pitchFamily="18" charset="0"/>
+                                      <a:ea typeface="Times New Roman" panose="02020603050405020304" pitchFamily="18" charset="0"/>
+                                      <a:cs typeface="Times New Roman" panose="02020603050405020304" pitchFamily="18" charset="0"/>
+                                    </a:rPr>
+                                    <m:t>2</m:t>
+                                  </m:r>
+                                </m:sub>
+                              </m:sSub>
+                            </m:e>
+                          </m:d>
+                        </m:e>
+                        <m:sup>
+                          <m:r>
+                            <a:rPr lang="de-DE" sz="1000" i="1" dirty="0">
+                              <a:solidFill>
+                                <a:srgbClr val="FF0000"/>
+                              </a:solidFill>
+                              <a:latin typeface="Cambria Math" panose="02040503050406030204" pitchFamily="18" charset="0"/>
+                              <a:ea typeface="Times New Roman" panose="02020603050405020304" pitchFamily="18" charset="0"/>
+                              <a:cs typeface="Times New Roman" panose="02020603050405020304" pitchFamily="18" charset="0"/>
+                            </a:rPr>
+                            <m:t>2</m:t>
+                          </m:r>
+                        </m:sup>
+                      </m:sSup>
+                    </m:oMath>
+                  </m:oMathPara>
+                </a14:m>
+                <a:endParaRPr lang="de-DE" sz="1000" dirty="0">
+                  <a:solidFill>
+                    <a:srgbClr val="FF0000"/>
+                  </a:solidFill>
+                </a:endParaRPr>
+              </a:p>
+            </p:txBody>
+          </p:sp>
+        </mc:Choice>
+        <mc:Fallback>
+          <p:sp>
+            <p:nvSpPr>
+              <p:cNvPr id="2" name="Textfeld 1">
+                <a:extLst>
+                  <a:ext uri="{FF2B5EF4-FFF2-40B4-BE49-F238E27FC236}">
+                    <a16:creationId xmlns:a16="http://schemas.microsoft.com/office/drawing/2014/main" id="{0CB11AF6-C425-4371-AFA7-8BA9A52CA9BC}"/>
+                  </a:ext>
+                </a:extLst>
+              </p:cNvPr>
+              <p:cNvSpPr txBox="1">
+                <a:spLocks noRot="1" noChangeAspect="1" noMove="1" noResize="1" noEditPoints="1" noAdjustHandles="1" noChangeArrowheads="1" noChangeShapeType="1" noTextEdit="1"/>
+              </p:cNvSpPr>
+              <p:nvPr/>
+            </p:nvSpPr>
+            <p:spPr>
+              <a:xfrm>
+                <a:off x="6959473" y="4837819"/>
+                <a:ext cx="880212" cy="415498"/>
+              </a:xfrm>
+              <a:prstGeom prst="rect">
+                <a:avLst/>
+              </a:prstGeom>
+              <a:blipFill>
+                <a:blip r:embed="rId5"/>
+                <a:stretch>
+                  <a:fillRect/>
+                </a:stretch>
+              </a:blipFill>
+            </p:spPr>
+            <p:txBody>
+              <a:bodyPr/>
+              <a:lstStyle/>
+              <a:p>
+                <a:r>
+                  <a:rPr lang="de-DE">
+                    <a:noFill/>
+                  </a:rPr>
+                  <a:t> </a:t>
+                </a:r>
+              </a:p>
+            </p:txBody>
+          </p:sp>
+        </mc:Fallback>
+      </mc:AlternateContent>
+      <mc:AlternateContent xmlns:mc="http://schemas.openxmlformats.org/markup-compatibility/2006">
+        <mc:Choice xmlns:a14="http://schemas.microsoft.com/office/drawing/2010/main" Requires="a14">
+          <p:sp>
+            <p:nvSpPr>
+              <p:cNvPr id="7" name="Textfeld 6">
+                <a:extLst>
+                  <a:ext uri="{FF2B5EF4-FFF2-40B4-BE49-F238E27FC236}">
+                    <a16:creationId xmlns:a16="http://schemas.microsoft.com/office/drawing/2014/main" id="{8CF6A230-4417-49FB-8A68-A919694BD065}"/>
+                  </a:ext>
+                </a:extLst>
+              </p:cNvPr>
+              <p:cNvSpPr txBox="1"/>
+              <p:nvPr/>
+            </p:nvSpPr>
+            <p:spPr>
+              <a:xfrm>
+                <a:off x="8295744" y="4956821"/>
+                <a:ext cx="981512" cy="349711"/>
+              </a:xfrm>
+              <a:prstGeom prst="rect">
+                <a:avLst/>
+              </a:prstGeom>
+              <a:noFill/>
+            </p:spPr>
+            <p:txBody>
+              <a:bodyPr wrap="square">
+                <a:spAutoFit/>
+              </a:bodyPr>
+              <a:lstStyle/>
+              <a:p>
+                <a:pPr/>
+                <a14:m>
+                  <m:oMathPara xmlns:m="http://schemas.openxmlformats.org/officeDocument/2006/math">
+                    <m:oMathParaPr>
+                      <m:jc m:val="centerGroup"/>
+                    </m:oMathParaPr>
+                    <m:oMath xmlns:m="http://schemas.openxmlformats.org/officeDocument/2006/math">
+                      <m:d>
+                        <m:dPr>
+                          <m:begChr m:val="["/>
+                          <m:endChr m:val="]"/>
+                          <m:ctrlPr>
+                            <a:rPr lang="de-DE" sz="1000" b="0" i="1" dirty="0" smtClean="0">
+                              <a:solidFill>
+                                <a:srgbClr val="FF0000"/>
+                              </a:solidFill>
+                              <a:latin typeface="Cambria Math" panose="02040503050406030204" pitchFamily="18" charset="0"/>
+                              <a:ea typeface="Times New Roman" panose="02020603050405020304" pitchFamily="18" charset="0"/>
+                              <a:cs typeface="Times New Roman" panose="02020603050405020304" pitchFamily="18" charset="0"/>
+                            </a:rPr>
+                          </m:ctrlPr>
+                        </m:dPr>
+                        <m:e>
+                          <m:m>
+                            <m:mPr>
+                              <m:mcs>
+                                <m:mc>
+                                  <m:mcPr>
+                                    <m:count m:val="1"/>
+                                    <m:mcJc m:val="center"/>
+                                  </m:mcPr>
+                                </m:mc>
+                              </m:mcs>
+                              <m:ctrlPr>
+                                <a:rPr lang="de-DE" sz="1000" i="1">
+                                  <a:solidFill>
+                                    <a:srgbClr val="FF0000"/>
+                                  </a:solidFill>
+                                  <a:latin typeface="Cambria Math" panose="02040503050406030204" pitchFamily="18" charset="0"/>
+                                  <a:cs typeface="Times New Roman" panose="02020603050405020304" pitchFamily="18" charset="0"/>
+                                </a:rPr>
+                              </m:ctrlPr>
+                            </m:mPr>
+                            <m:mr>
+                              <m:e>
+                                <m:sSub>
+                                  <m:sSubPr>
+                                    <m:ctrlPr>
+                                      <a:rPr lang="de-DE" sz="1000" i="1">
+                                        <a:solidFill>
+                                          <a:srgbClr val="FF0000"/>
+                                        </a:solidFill>
+                                        <a:latin typeface="Cambria Math" panose="02040503050406030204" pitchFamily="18" charset="0"/>
+                                        <a:cs typeface="Times New Roman" panose="02020603050405020304" pitchFamily="18" charset="0"/>
+                                      </a:rPr>
+                                    </m:ctrlPr>
+                                  </m:sSubPr>
+                                  <m:e>
+                                    <m:r>
+                                      <m:rPr>
+                                        <m:brk m:alnAt="7"/>
+                                      </m:rPr>
+                                      <a:rPr lang="de-DE" sz="1000" i="1">
+                                        <a:solidFill>
+                                          <a:srgbClr val="FF0000"/>
+                                        </a:solidFill>
+                                        <a:latin typeface="Cambria Math" panose="02040503050406030204" pitchFamily="18" charset="0"/>
+                                        <a:cs typeface="Times New Roman" panose="02020603050405020304" pitchFamily="18" charset="0"/>
+                                      </a:rPr>
+                                      <m:t>𝑥</m:t>
+                                    </m:r>
+                                  </m:e>
+                                  <m:sub>
+                                    <m:r>
+                                      <m:rPr>
+                                        <m:brk m:alnAt="7"/>
+                                      </m:rPr>
+                                      <a:rPr lang="de-DE" sz="1000" i="1">
+                                        <a:solidFill>
+                                          <a:srgbClr val="FF0000"/>
+                                        </a:solidFill>
+                                        <a:latin typeface="Cambria Math" panose="02040503050406030204" pitchFamily="18" charset="0"/>
+                                        <a:cs typeface="Times New Roman" panose="02020603050405020304" pitchFamily="18" charset="0"/>
+                                      </a:rPr>
+                                      <m:t>1</m:t>
+                                    </m:r>
+                                  </m:sub>
+                                </m:sSub>
+                                <m:r>
+                                  <a:rPr lang="de-DE" sz="1000" b="0" i="1" smtClean="0">
+                                    <a:solidFill>
+                                      <a:srgbClr val="FF0000"/>
+                                    </a:solidFill>
+                                    <a:latin typeface="Cambria Math" panose="02040503050406030204" pitchFamily="18" charset="0"/>
+                                    <a:cs typeface="Times New Roman" panose="02020603050405020304" pitchFamily="18" charset="0"/>
+                                  </a:rPr>
+                                  <m:t>−</m:t>
+                                </m:r>
+                                <m:sSub>
+                                  <m:sSubPr>
+                                    <m:ctrlPr>
+                                      <a:rPr lang="de-DE" sz="1000" b="0" i="1" smtClean="0">
+                                        <a:solidFill>
+                                          <a:srgbClr val="FF0000"/>
+                                        </a:solidFill>
+                                        <a:latin typeface="Cambria Math" panose="02040503050406030204" pitchFamily="18" charset="0"/>
+                                        <a:cs typeface="Times New Roman" panose="02020603050405020304" pitchFamily="18" charset="0"/>
+                                      </a:rPr>
+                                    </m:ctrlPr>
+                                  </m:sSubPr>
+                                  <m:e>
+                                    <m:r>
+                                      <a:rPr lang="de-DE" sz="1000" b="0" i="1" smtClean="0">
+                                        <a:solidFill>
+                                          <a:srgbClr val="FF0000"/>
+                                        </a:solidFill>
+                                        <a:latin typeface="Cambria Math" panose="02040503050406030204" pitchFamily="18" charset="0"/>
+                                        <a:cs typeface="Times New Roman" panose="02020603050405020304" pitchFamily="18" charset="0"/>
+                                      </a:rPr>
+                                      <m:t>𝑥</m:t>
+                                    </m:r>
+                                  </m:e>
+                                  <m:sub>
+                                    <m:r>
+                                      <a:rPr lang="de-DE" sz="1000" b="0" i="1" smtClean="0">
+                                        <a:solidFill>
+                                          <a:srgbClr val="FF0000"/>
+                                        </a:solidFill>
+                                        <a:latin typeface="Cambria Math" panose="02040503050406030204" pitchFamily="18" charset="0"/>
+                                        <a:cs typeface="Times New Roman" panose="02020603050405020304" pitchFamily="18" charset="0"/>
+                                      </a:rPr>
+                                      <m:t>2</m:t>
+                                    </m:r>
+                                  </m:sub>
+                                </m:sSub>
+                              </m:e>
+                            </m:mr>
+                            <m:mr>
+                              <m:e>
+                                <m:sSub>
+                                  <m:sSubPr>
+                                    <m:ctrlPr>
+                                      <a:rPr lang="de-DE" sz="1000" i="1">
+                                        <a:solidFill>
+                                          <a:srgbClr val="FF0000"/>
+                                        </a:solidFill>
+                                        <a:latin typeface="Cambria Math" panose="02040503050406030204" pitchFamily="18" charset="0"/>
+                                        <a:cs typeface="Times New Roman" panose="02020603050405020304" pitchFamily="18" charset="0"/>
+                                      </a:rPr>
+                                    </m:ctrlPr>
+                                  </m:sSubPr>
+                                  <m:e>
+                                    <m:r>
+                                      <a:rPr lang="de-DE" sz="1000" i="1">
+                                        <a:solidFill>
+                                          <a:srgbClr val="FF0000"/>
+                                        </a:solidFill>
+                                        <a:latin typeface="Cambria Math" panose="02040503050406030204" pitchFamily="18" charset="0"/>
+                                        <a:cs typeface="Times New Roman" panose="02020603050405020304" pitchFamily="18" charset="0"/>
+                                      </a:rPr>
+                                      <m:t>𝑦</m:t>
+                                    </m:r>
+                                  </m:e>
+                                  <m:sub>
+                                    <m:r>
+                                      <a:rPr lang="de-DE" sz="1000" i="1">
+                                        <a:solidFill>
+                                          <a:srgbClr val="FF0000"/>
+                                        </a:solidFill>
+                                        <a:latin typeface="Cambria Math" panose="02040503050406030204" pitchFamily="18" charset="0"/>
+                                        <a:cs typeface="Times New Roman" panose="02020603050405020304" pitchFamily="18" charset="0"/>
+                                      </a:rPr>
+                                      <m:t>1</m:t>
+                                    </m:r>
+                                  </m:sub>
+                                </m:sSub>
+                                <m:r>
+                                  <a:rPr lang="de-DE" sz="1000" b="0" i="1" smtClean="0">
+                                    <a:solidFill>
+                                      <a:srgbClr val="FF0000"/>
+                                    </a:solidFill>
+                                    <a:latin typeface="Cambria Math" panose="02040503050406030204" pitchFamily="18" charset="0"/>
+                                    <a:cs typeface="Times New Roman" panose="02020603050405020304" pitchFamily="18" charset="0"/>
+                                  </a:rPr>
+                                  <m:t>−</m:t>
+                                </m:r>
+                                <m:sSub>
+                                  <m:sSubPr>
+                                    <m:ctrlPr>
+                                      <a:rPr lang="de-DE" sz="1000" b="0" i="1" smtClean="0">
+                                        <a:solidFill>
+                                          <a:srgbClr val="FF0000"/>
+                                        </a:solidFill>
+                                        <a:latin typeface="Cambria Math" panose="02040503050406030204" pitchFamily="18" charset="0"/>
+                                        <a:cs typeface="Times New Roman" panose="02020603050405020304" pitchFamily="18" charset="0"/>
+                                      </a:rPr>
+                                    </m:ctrlPr>
+                                  </m:sSubPr>
+                                  <m:e>
+                                    <m:r>
+                                      <a:rPr lang="de-DE" sz="1000" b="0" i="1" smtClean="0">
+                                        <a:solidFill>
+                                          <a:srgbClr val="FF0000"/>
+                                        </a:solidFill>
+                                        <a:latin typeface="Cambria Math" panose="02040503050406030204" pitchFamily="18" charset="0"/>
+                                        <a:cs typeface="Times New Roman" panose="02020603050405020304" pitchFamily="18" charset="0"/>
+                                      </a:rPr>
+                                      <m:t>𝑦</m:t>
+                                    </m:r>
+                                  </m:e>
+                                  <m:sub>
+                                    <m:r>
+                                      <a:rPr lang="de-DE" sz="1000" b="0" i="1" smtClean="0">
+                                        <a:solidFill>
+                                          <a:srgbClr val="FF0000"/>
+                                        </a:solidFill>
+                                        <a:latin typeface="Cambria Math" panose="02040503050406030204" pitchFamily="18" charset="0"/>
+                                        <a:cs typeface="Times New Roman" panose="02020603050405020304" pitchFamily="18" charset="0"/>
+                                      </a:rPr>
+                                      <m:t>2</m:t>
+                                    </m:r>
+                                  </m:sub>
+                                </m:sSub>
+                              </m:e>
+                            </m:mr>
+                          </m:m>
+                        </m:e>
+                      </m:d>
+                    </m:oMath>
+                  </m:oMathPara>
+                </a14:m>
+                <a:endParaRPr lang="de-DE" sz="1000" dirty="0">
+                  <a:solidFill>
+                    <a:srgbClr val="FF0000"/>
+                  </a:solidFill>
+                </a:endParaRPr>
+              </a:p>
+            </p:txBody>
+          </p:sp>
+        </mc:Choice>
+        <mc:Fallback>
+          <p:sp>
+            <p:nvSpPr>
+              <p:cNvPr id="7" name="Textfeld 6">
+                <a:extLst>
+                  <a:ext uri="{FF2B5EF4-FFF2-40B4-BE49-F238E27FC236}">
+                    <a16:creationId xmlns:a16="http://schemas.microsoft.com/office/drawing/2014/main" id="{8CF6A230-4417-49FB-8A68-A919694BD065}"/>
+                  </a:ext>
+                </a:extLst>
+              </p:cNvPr>
+              <p:cNvSpPr txBox="1">
+                <a:spLocks noRot="1" noChangeAspect="1" noMove="1" noResize="1" noEditPoints="1" noAdjustHandles="1" noChangeArrowheads="1" noChangeShapeType="1" noTextEdit="1"/>
+              </p:cNvSpPr>
+              <p:nvPr/>
+            </p:nvSpPr>
+            <p:spPr>
+              <a:xfrm>
+                <a:off x="8295744" y="4956821"/>
+                <a:ext cx="981512" cy="349711"/>
+              </a:xfrm>
+              <a:prstGeom prst="rect">
+                <a:avLst/>
+              </a:prstGeom>
+              <a:blipFill>
+                <a:blip r:embed="rId6"/>
+                <a:stretch>
+                  <a:fillRect/>
+                </a:stretch>
+              </a:blipFill>
+            </p:spPr>
+            <p:txBody>
+              <a:bodyPr/>
+              <a:lstStyle/>
+              <a:p>
+                <a:r>
+                  <a:rPr lang="de-DE">
+                    <a:noFill/>
+                  </a:rPr>
+                  <a:t> </a:t>
+                </a:r>
+              </a:p>
+            </p:txBody>
+          </p:sp>
+        </mc:Fallback>
+      </mc:AlternateContent>
+      <mc:AlternateContent xmlns:mc="http://schemas.openxmlformats.org/markup-compatibility/2006">
+        <mc:Choice xmlns:a14="http://schemas.microsoft.com/office/drawing/2010/main" Requires="a14">
+          <p:sp>
+            <p:nvSpPr>
+              <p:cNvPr id="8" name="Ellipse 7">
+                <a:extLst>
+                  <a:ext uri="{FF2B5EF4-FFF2-40B4-BE49-F238E27FC236}">
+                    <a16:creationId xmlns:a16="http://schemas.microsoft.com/office/drawing/2014/main" id="{76FCD334-E70B-443A-B2F3-836134366201}"/>
+                  </a:ext>
+                </a:extLst>
+              </p:cNvPr>
+              <p:cNvSpPr/>
+              <p:nvPr/>
+            </p:nvSpPr>
+            <p:spPr>
+              <a:xfrm>
+                <a:off x="9492142" y="2353218"/>
+                <a:ext cx="285225" cy="285225"/>
+              </a:xfrm>
+              <a:prstGeom prst="ellipse">
+                <a:avLst/>
+              </a:prstGeom>
+            </p:spPr>
+            <p:style>
+              <a:lnRef idx="2">
+                <a:schemeClr val="accent1">
+                  <a:shade val="50000"/>
+                </a:schemeClr>
+              </a:lnRef>
+              <a:fillRef idx="1">
+                <a:schemeClr val="accent1"/>
+              </a:fillRef>
+              <a:effectRef idx="0">
+                <a:schemeClr val="accent1"/>
+              </a:effectRef>
+              <a:fontRef idx="minor">
+                <a:schemeClr val="lt1"/>
+              </a:fontRef>
+            </p:style>
+            <p:txBody>
+              <a:bodyPr rtlCol="0" anchor="ctr"/>
+              <a:lstStyle/>
+              <a:p>
+                <a:pPr algn="ctr"/>
+                <a14:m>
+                  <m:oMathPara xmlns:m="http://schemas.openxmlformats.org/officeDocument/2006/math">
+                    <m:oMathParaPr>
+                      <m:jc m:val="centerGroup"/>
+                    </m:oMathParaPr>
+                    <m:oMath xmlns:m="http://schemas.openxmlformats.org/officeDocument/2006/math">
+                      <m:sSub>
+                        <m:sSubPr>
+                          <m:ctrlPr>
+                            <a:rPr lang="de-DE" sz="1200" i="1" smtClean="0">
+                              <a:latin typeface="Cambria Math" panose="02040503050406030204" pitchFamily="18" charset="0"/>
+                              <a:ea typeface="Times New Roman" panose="02020603050405020304" pitchFamily="18" charset="0"/>
+                              <a:cs typeface="Times New Roman" panose="02020603050405020304" pitchFamily="18" charset="0"/>
+                            </a:rPr>
+                          </m:ctrlPr>
+                        </m:sSubPr>
+                        <m:e>
+                          <m:r>
+                            <a:rPr lang="de-DE" sz="1200" i="1">
+                              <a:latin typeface="Cambria Math" panose="02040503050406030204" pitchFamily="18" charset="0"/>
+                              <a:ea typeface="Times New Roman" panose="02020603050405020304" pitchFamily="18" charset="0"/>
+                              <a:cs typeface="Times New Roman" panose="02020603050405020304" pitchFamily="18" charset="0"/>
+                            </a:rPr>
+                            <m:t>𝑚</m:t>
+                          </m:r>
+                        </m:e>
+                        <m:sub>
+                          <m:r>
+                            <a:rPr lang="de-DE" sz="1200" b="0" i="1" smtClean="0">
+                              <a:latin typeface="Cambria Math" panose="02040503050406030204" pitchFamily="18" charset="0"/>
+                              <a:ea typeface="Times New Roman" panose="02020603050405020304" pitchFamily="18" charset="0"/>
+                              <a:cs typeface="Times New Roman" panose="02020603050405020304" pitchFamily="18" charset="0"/>
+                            </a:rPr>
+                            <m:t>1</m:t>
+                          </m:r>
+                        </m:sub>
+                      </m:sSub>
+                    </m:oMath>
+                  </m:oMathPara>
+                </a14:m>
+                <a:endParaRPr lang="de-DE" sz="1200" dirty="0"/>
+              </a:p>
+            </p:txBody>
+          </p:sp>
+        </mc:Choice>
+        <mc:Fallback>
+          <p:sp>
+            <p:nvSpPr>
+              <p:cNvPr id="8" name="Ellipse 7">
+                <a:extLst>
+                  <a:ext uri="{FF2B5EF4-FFF2-40B4-BE49-F238E27FC236}">
+                    <a16:creationId xmlns:a16="http://schemas.microsoft.com/office/drawing/2014/main" id="{76FCD334-E70B-443A-B2F3-836134366201}"/>
+                  </a:ext>
+                </a:extLst>
+              </p:cNvPr>
+              <p:cNvSpPr>
+                <a:spLocks noRot="1" noChangeAspect="1" noMove="1" noResize="1" noEditPoints="1" noAdjustHandles="1" noChangeArrowheads="1" noChangeShapeType="1" noTextEdit="1"/>
+              </p:cNvSpPr>
+              <p:nvPr/>
+            </p:nvSpPr>
+            <p:spPr>
+              <a:xfrm>
+                <a:off x="9492142" y="2353218"/>
+                <a:ext cx="285225" cy="285225"/>
+              </a:xfrm>
+              <a:prstGeom prst="ellipse">
+                <a:avLst/>
+              </a:prstGeom>
+              <a:blipFill>
+                <a:blip r:embed="rId7"/>
+                <a:stretch>
+                  <a:fillRect l="-2041"/>
+                </a:stretch>
+              </a:blipFill>
+            </p:spPr>
+            <p:txBody>
+              <a:bodyPr/>
+              <a:lstStyle/>
+              <a:p>
+                <a:r>
+                  <a:rPr lang="de-DE">
+                    <a:noFill/>
+                  </a:rPr>
+                  <a:t> </a:t>
+                </a:r>
+              </a:p>
+            </p:txBody>
+          </p:sp>
+        </mc:Fallback>
+      </mc:AlternateContent>
+      <mc:AlternateContent xmlns:mc="http://schemas.openxmlformats.org/markup-compatibility/2006">
+        <mc:Choice xmlns:a14="http://schemas.microsoft.com/office/drawing/2010/main" Requires="a14">
+          <p:sp>
+            <p:nvSpPr>
+              <p:cNvPr id="9" name="Ellipse 8">
+                <a:extLst>
+                  <a:ext uri="{FF2B5EF4-FFF2-40B4-BE49-F238E27FC236}">
+                    <a16:creationId xmlns:a16="http://schemas.microsoft.com/office/drawing/2014/main" id="{0824C644-01F1-4B4B-BD8E-5EACE1225055}"/>
+                  </a:ext>
+                </a:extLst>
+              </p:cNvPr>
+              <p:cNvSpPr/>
+              <p:nvPr/>
+            </p:nvSpPr>
+            <p:spPr>
+              <a:xfrm>
+                <a:off x="10335236" y="1426128"/>
+                <a:ext cx="285225" cy="285225"/>
+              </a:xfrm>
+              <a:prstGeom prst="ellipse">
+                <a:avLst/>
+              </a:prstGeom>
+            </p:spPr>
+            <p:style>
+              <a:lnRef idx="2">
+                <a:schemeClr val="accent1">
+                  <a:shade val="50000"/>
+                </a:schemeClr>
+              </a:lnRef>
+              <a:fillRef idx="1">
+                <a:schemeClr val="accent1"/>
+              </a:fillRef>
+              <a:effectRef idx="0">
+                <a:schemeClr val="accent1"/>
+              </a:effectRef>
+              <a:fontRef idx="minor">
+                <a:schemeClr val="lt1"/>
+              </a:fontRef>
+            </p:style>
+            <p:txBody>
+              <a:bodyPr rtlCol="0" anchor="ctr"/>
+              <a:lstStyle/>
+              <a:p>
+                <a:pPr algn="ctr"/>
+                <a14:m>
+                  <m:oMathPara xmlns:m="http://schemas.openxmlformats.org/officeDocument/2006/math">
+                    <m:oMathParaPr>
+                      <m:jc m:val="centerGroup"/>
+                    </m:oMathParaPr>
+                    <m:oMath xmlns:m="http://schemas.openxmlformats.org/officeDocument/2006/math">
+                      <m:sSub>
+                        <m:sSubPr>
+                          <m:ctrlPr>
+                            <a:rPr lang="de-DE" sz="1200" i="1" smtClean="0">
+                              <a:latin typeface="Cambria Math" panose="02040503050406030204" pitchFamily="18" charset="0"/>
+                              <a:ea typeface="Times New Roman" panose="02020603050405020304" pitchFamily="18" charset="0"/>
+                              <a:cs typeface="Times New Roman" panose="02020603050405020304" pitchFamily="18" charset="0"/>
+                            </a:rPr>
+                          </m:ctrlPr>
+                        </m:sSubPr>
+                        <m:e>
+                          <m:r>
+                            <a:rPr lang="de-DE" sz="1200" i="1">
+                              <a:latin typeface="Cambria Math" panose="02040503050406030204" pitchFamily="18" charset="0"/>
+                              <a:ea typeface="Times New Roman" panose="02020603050405020304" pitchFamily="18" charset="0"/>
+                              <a:cs typeface="Times New Roman" panose="02020603050405020304" pitchFamily="18" charset="0"/>
+                            </a:rPr>
+                            <m:t>𝑚</m:t>
+                          </m:r>
+                        </m:e>
+                        <m:sub>
+                          <m:r>
+                            <a:rPr lang="de-DE" sz="1200" b="0" i="1" smtClean="0">
+                              <a:latin typeface="Cambria Math" panose="02040503050406030204" pitchFamily="18" charset="0"/>
+                              <a:ea typeface="Times New Roman" panose="02020603050405020304" pitchFamily="18" charset="0"/>
+                              <a:cs typeface="Times New Roman" panose="02020603050405020304" pitchFamily="18" charset="0"/>
+                            </a:rPr>
+                            <m:t>2</m:t>
+                          </m:r>
+                        </m:sub>
+                      </m:sSub>
+                    </m:oMath>
+                  </m:oMathPara>
+                </a14:m>
+                <a:endParaRPr lang="de-DE" sz="1200" dirty="0"/>
+              </a:p>
+            </p:txBody>
+          </p:sp>
+        </mc:Choice>
+        <mc:Fallback>
+          <p:sp>
+            <p:nvSpPr>
+              <p:cNvPr id="9" name="Ellipse 8">
+                <a:extLst>
+                  <a:ext uri="{FF2B5EF4-FFF2-40B4-BE49-F238E27FC236}">
+                    <a16:creationId xmlns:a16="http://schemas.microsoft.com/office/drawing/2014/main" id="{0824C644-01F1-4B4B-BD8E-5EACE1225055}"/>
+                  </a:ext>
+                </a:extLst>
+              </p:cNvPr>
+              <p:cNvSpPr>
+                <a:spLocks noRot="1" noChangeAspect="1" noMove="1" noResize="1" noEditPoints="1" noAdjustHandles="1" noChangeArrowheads="1" noChangeShapeType="1" noTextEdit="1"/>
+              </p:cNvSpPr>
+              <p:nvPr/>
+            </p:nvSpPr>
+            <p:spPr>
+              <a:xfrm>
+                <a:off x="10335236" y="1426128"/>
+                <a:ext cx="285225" cy="285225"/>
+              </a:xfrm>
+              <a:prstGeom prst="ellipse">
+                <a:avLst/>
+              </a:prstGeom>
+              <a:blipFill>
+                <a:blip r:embed="rId8"/>
+                <a:stretch>
+                  <a:fillRect l="-2041"/>
+                </a:stretch>
+              </a:blipFill>
+            </p:spPr>
+            <p:txBody>
+              <a:bodyPr/>
+              <a:lstStyle/>
+              <a:p>
+                <a:r>
+                  <a:rPr lang="de-DE">
+                    <a:noFill/>
+                  </a:rPr>
+                  <a:t> </a:t>
+                </a:r>
+              </a:p>
+            </p:txBody>
+          </p:sp>
+        </mc:Fallback>
+      </mc:AlternateContent>
+      <p:cxnSp>
+        <p:nvCxnSpPr>
+          <p:cNvPr id="11" name="Gerade Verbindung mit Pfeil 10">
+            <a:extLst>
+              <a:ext uri="{FF2B5EF4-FFF2-40B4-BE49-F238E27FC236}">
+                <a16:creationId xmlns:a16="http://schemas.microsoft.com/office/drawing/2014/main" id="{57557BF5-61E3-4CE2-A498-9923F6E6FA88}"/>
+              </a:ext>
+            </a:extLst>
+          </p:cNvPr>
+          <p:cNvCxnSpPr>
+            <a:cxnSpLocks/>
+            <a:stCxn id="9" idx="3"/>
+            <a:endCxn id="8" idx="7"/>
+          </p:cNvCxnSpPr>
+          <p:nvPr/>
+        </p:nvCxnSpPr>
+        <p:spPr>
+          <a:xfrm flipH="1">
+            <a:off x="9735597" y="1669583"/>
+            <a:ext cx="641409" cy="725405"/>
+          </a:xfrm>
+          <a:prstGeom prst="straightConnector1">
+            <a:avLst/>
+          </a:prstGeom>
+          <a:ln>
+            <a:tailEnd type="triangle"/>
+          </a:ln>
+        </p:spPr>
+        <p:style>
+          <a:lnRef idx="1">
+            <a:schemeClr val="accent1"/>
+          </a:lnRef>
+          <a:fillRef idx="0">
+            <a:schemeClr val="accent1"/>
+          </a:fillRef>
+          <a:effectRef idx="0">
+            <a:schemeClr val="accent1"/>
+          </a:effectRef>
+          <a:fontRef idx="minor">
+            <a:schemeClr val="tx1"/>
+          </a:fontRef>
+        </p:style>
+      </p:cxnSp>
+      <mc:AlternateContent xmlns:mc="http://schemas.openxmlformats.org/markup-compatibility/2006">
+        <mc:Choice xmlns:a14="http://schemas.microsoft.com/office/drawing/2010/main" Requires="a14">
+          <p:sp>
+            <p:nvSpPr>
+              <p:cNvPr id="13" name="Textfeld 12">
+                <a:extLst>
+                  <a:ext uri="{FF2B5EF4-FFF2-40B4-BE49-F238E27FC236}">
+                    <a16:creationId xmlns:a16="http://schemas.microsoft.com/office/drawing/2014/main" id="{FC1FBFA2-61F6-4BDB-8658-09A875C7BA6F}"/>
+                  </a:ext>
+                </a:extLst>
+              </p:cNvPr>
+              <p:cNvSpPr txBox="1"/>
+              <p:nvPr/>
+            </p:nvSpPr>
+            <p:spPr>
+              <a:xfrm>
+                <a:off x="9058185" y="1803979"/>
+                <a:ext cx="943587" cy="369332"/>
+              </a:xfrm>
+              <a:prstGeom prst="rect">
+                <a:avLst/>
+              </a:prstGeom>
+              <a:noFill/>
+            </p:spPr>
+            <p:txBody>
+              <a:bodyPr wrap="square" rtlCol="0">
+                <a:spAutoFit/>
+              </a:bodyPr>
+              <a:lstStyle/>
+              <a:p>
+                <a14:m>
+                  <m:oMathPara xmlns:m="http://schemas.openxmlformats.org/officeDocument/2006/math">
+                    <m:oMathParaPr>
+                      <m:jc m:val="centerGroup"/>
+                    </m:oMathParaPr>
+                    <m:oMath xmlns:m="http://schemas.openxmlformats.org/officeDocument/2006/math">
+                      <m:sSub>
+                        <m:sSubPr>
+                          <m:ctrlPr>
+                            <a:rPr lang="de-DE" sz="1800" i="1" dirty="0" smtClean="0">
+                              <a:solidFill>
+                                <a:schemeClr val="accent1"/>
+                              </a:solidFill>
+                              <a:latin typeface="Cambria Math" panose="02040503050406030204" pitchFamily="18" charset="0"/>
+                              <a:ea typeface="Times New Roman" panose="02020603050405020304" pitchFamily="18" charset="0"/>
+                              <a:cs typeface="Times New Roman" panose="02020603050405020304" pitchFamily="18" charset="0"/>
+                            </a:rPr>
+                          </m:ctrlPr>
+                        </m:sSubPr>
+                        <m:e>
+                          <m:acc>
+                            <m:accPr>
+                              <m:chr m:val="⃗"/>
+                              <m:ctrlPr>
+                                <a:rPr lang="de-DE" sz="1800" i="1" dirty="0">
+                                  <a:solidFill>
+                                    <a:schemeClr val="accent1"/>
+                                  </a:solidFill>
+                                  <a:latin typeface="Cambria Math" panose="02040503050406030204" pitchFamily="18" charset="0"/>
+                                  <a:ea typeface="Times New Roman" panose="02020603050405020304" pitchFamily="18" charset="0"/>
+                                  <a:cs typeface="Times New Roman" panose="02020603050405020304" pitchFamily="18" charset="0"/>
+                                </a:rPr>
+                              </m:ctrlPr>
+                            </m:accPr>
+                            <m:e>
+                              <m:r>
+                                <a:rPr lang="de-DE" sz="1800" i="1" dirty="0">
+                                  <a:solidFill>
+                                    <a:schemeClr val="accent1"/>
+                                  </a:solidFill>
+                                  <a:latin typeface="Cambria Math" panose="02040503050406030204" pitchFamily="18" charset="0"/>
+                                  <a:ea typeface="Times New Roman" panose="02020603050405020304" pitchFamily="18" charset="0"/>
+                                  <a:cs typeface="Times New Roman" panose="02020603050405020304" pitchFamily="18" charset="0"/>
+                                </a:rPr>
+                                <m:t>𝑟</m:t>
+                              </m:r>
+                            </m:e>
+                          </m:acc>
+                        </m:e>
+                        <m:sub>
+                          <m:r>
+                            <a:rPr lang="de-DE" sz="1800" i="1" dirty="0">
+                              <a:solidFill>
+                                <a:schemeClr val="accent1"/>
+                              </a:solidFill>
+                              <a:latin typeface="Cambria Math" panose="02040503050406030204" pitchFamily="18" charset="0"/>
+                              <a:ea typeface="Times New Roman" panose="02020603050405020304" pitchFamily="18" charset="0"/>
+                              <a:cs typeface="Times New Roman" panose="02020603050405020304" pitchFamily="18" charset="0"/>
+                            </a:rPr>
+                            <m:t>1</m:t>
+                          </m:r>
+                        </m:sub>
+                      </m:sSub>
+                      <m:r>
+                        <a:rPr lang="de-DE" sz="1800" i="1" dirty="0">
+                          <a:solidFill>
+                            <a:schemeClr val="accent1"/>
+                          </a:solidFill>
+                          <a:latin typeface="Cambria Math" panose="02040503050406030204" pitchFamily="18" charset="0"/>
+                          <a:ea typeface="Times New Roman" panose="02020603050405020304" pitchFamily="18" charset="0"/>
+                          <a:cs typeface="Times New Roman" panose="02020603050405020304" pitchFamily="18" charset="0"/>
+                        </a:rPr>
+                        <m:t>−</m:t>
+                      </m:r>
+                      <m:sSub>
+                        <m:sSubPr>
+                          <m:ctrlPr>
+                            <a:rPr lang="de-DE" sz="1800" i="1" dirty="0">
+                              <a:solidFill>
+                                <a:schemeClr val="accent1"/>
+                              </a:solidFill>
+                              <a:latin typeface="Cambria Math" panose="02040503050406030204" pitchFamily="18" charset="0"/>
+                              <a:ea typeface="Times New Roman" panose="02020603050405020304" pitchFamily="18" charset="0"/>
+                              <a:cs typeface="Times New Roman" panose="02020603050405020304" pitchFamily="18" charset="0"/>
+                            </a:rPr>
+                          </m:ctrlPr>
+                        </m:sSubPr>
+                        <m:e>
+                          <m:acc>
+                            <m:accPr>
+                              <m:chr m:val="⃗"/>
+                              <m:ctrlPr>
+                                <a:rPr lang="de-DE" sz="1800" i="1" dirty="0">
+                                  <a:solidFill>
+                                    <a:schemeClr val="accent1"/>
+                                  </a:solidFill>
+                                  <a:latin typeface="Cambria Math" panose="02040503050406030204" pitchFamily="18" charset="0"/>
+                                  <a:ea typeface="Times New Roman" panose="02020603050405020304" pitchFamily="18" charset="0"/>
+                                  <a:cs typeface="Times New Roman" panose="02020603050405020304" pitchFamily="18" charset="0"/>
+                                </a:rPr>
+                              </m:ctrlPr>
+                            </m:accPr>
+                            <m:e>
+                              <m:r>
+                                <a:rPr lang="de-DE" sz="1800" i="1" dirty="0">
+                                  <a:solidFill>
+                                    <a:schemeClr val="accent1"/>
+                                  </a:solidFill>
+                                  <a:latin typeface="Cambria Math" panose="02040503050406030204" pitchFamily="18" charset="0"/>
+                                  <a:ea typeface="Times New Roman" panose="02020603050405020304" pitchFamily="18" charset="0"/>
+                                  <a:cs typeface="Times New Roman" panose="02020603050405020304" pitchFamily="18" charset="0"/>
+                                </a:rPr>
+                                <m:t>𝑟</m:t>
+                              </m:r>
+                            </m:e>
+                          </m:acc>
+                        </m:e>
+                        <m:sub>
+                          <m:r>
+                            <a:rPr lang="de-DE" sz="1800" i="1" dirty="0">
+                              <a:solidFill>
+                                <a:schemeClr val="accent1"/>
+                              </a:solidFill>
+                              <a:latin typeface="Cambria Math" panose="02040503050406030204" pitchFamily="18" charset="0"/>
+                              <a:ea typeface="Times New Roman" panose="02020603050405020304" pitchFamily="18" charset="0"/>
+                              <a:cs typeface="Times New Roman" panose="02020603050405020304" pitchFamily="18" charset="0"/>
+                            </a:rPr>
+                            <m:t>2</m:t>
+                          </m:r>
+                        </m:sub>
+                      </m:sSub>
+                    </m:oMath>
+                  </m:oMathPara>
+                </a14:m>
+                <a:endParaRPr lang="de-DE" dirty="0">
+                  <a:solidFill>
+                    <a:schemeClr val="accent1"/>
+                  </a:solidFill>
+                </a:endParaRPr>
+              </a:p>
+            </p:txBody>
+          </p:sp>
+        </mc:Choice>
+        <mc:Fallback>
+          <p:sp>
+            <p:nvSpPr>
+              <p:cNvPr id="13" name="Textfeld 12">
+                <a:extLst>
+                  <a:ext uri="{FF2B5EF4-FFF2-40B4-BE49-F238E27FC236}">
+                    <a16:creationId xmlns:a16="http://schemas.microsoft.com/office/drawing/2014/main" id="{FC1FBFA2-61F6-4BDB-8658-09A875C7BA6F}"/>
+                  </a:ext>
+                </a:extLst>
+              </p:cNvPr>
+              <p:cNvSpPr txBox="1">
+                <a:spLocks noRot="1" noChangeAspect="1" noMove="1" noResize="1" noEditPoints="1" noAdjustHandles="1" noChangeArrowheads="1" noChangeShapeType="1" noTextEdit="1"/>
+              </p:cNvSpPr>
+              <p:nvPr/>
+            </p:nvSpPr>
+            <p:spPr>
+              <a:xfrm>
+                <a:off x="9058185" y="1803979"/>
+                <a:ext cx="943587" cy="369332"/>
+              </a:xfrm>
+              <a:prstGeom prst="rect">
+                <a:avLst/>
+              </a:prstGeom>
+              <a:blipFill>
+                <a:blip r:embed="rId9"/>
+                <a:stretch>
+                  <a:fillRect t="-22951" r="-16129"/>
+                </a:stretch>
+              </a:blipFill>
+            </p:spPr>
+            <p:txBody>
+              <a:bodyPr/>
+              <a:lstStyle/>
+              <a:p>
+                <a:r>
+                  <a:rPr lang="de-DE">
+                    <a:noFill/>
+                  </a:rPr>
+                  <a:t> </a:t>
+                </a:r>
+              </a:p>
+            </p:txBody>
+          </p:sp>
+        </mc:Fallback>
+      </mc:AlternateContent>
+      <p:cxnSp>
+        <p:nvCxnSpPr>
+          <p:cNvPr id="19" name="Gerade Verbindung mit Pfeil 18">
+            <a:extLst>
+              <a:ext uri="{FF2B5EF4-FFF2-40B4-BE49-F238E27FC236}">
+                <a16:creationId xmlns:a16="http://schemas.microsoft.com/office/drawing/2014/main" id="{3021DD59-1083-470C-B50B-919C15F94F20}"/>
+              </a:ext>
+            </a:extLst>
+          </p:cNvPr>
+          <p:cNvCxnSpPr>
+            <a:stCxn id="9" idx="3"/>
+          </p:cNvCxnSpPr>
+          <p:nvPr/>
+        </p:nvCxnSpPr>
+        <p:spPr>
+          <a:xfrm flipH="1">
+            <a:off x="10133901" y="1669583"/>
+            <a:ext cx="243105" cy="285225"/>
+          </a:xfrm>
+          <a:prstGeom prst="straightConnector1">
+            <a:avLst/>
+          </a:prstGeom>
+          <a:ln>
+            <a:solidFill>
+              <a:srgbClr val="FF0000"/>
+            </a:solidFill>
+            <a:tailEnd type="triangle"/>
+          </a:ln>
+        </p:spPr>
+        <p:style>
+          <a:lnRef idx="1">
+            <a:schemeClr val="accent1"/>
+          </a:lnRef>
+          <a:fillRef idx="0">
+            <a:schemeClr val="accent1"/>
+          </a:fillRef>
+          <a:effectRef idx="0">
+            <a:schemeClr val="accent1"/>
+          </a:effectRef>
+          <a:fontRef idx="minor">
+            <a:schemeClr val="tx1"/>
+          </a:fontRef>
+        </p:style>
+      </p:cxnSp>
+      <mc:AlternateContent xmlns:mc="http://schemas.openxmlformats.org/markup-compatibility/2006">
+        <mc:Choice xmlns:a14="http://schemas.microsoft.com/office/drawing/2010/main" Requires="a14">
+          <p:sp>
+            <p:nvSpPr>
+              <p:cNvPr id="20" name="Textfeld 19">
+                <a:extLst>
+                  <a:ext uri="{FF2B5EF4-FFF2-40B4-BE49-F238E27FC236}">
+                    <a16:creationId xmlns:a16="http://schemas.microsoft.com/office/drawing/2014/main" id="{44E6CDBE-203F-43DB-88BF-00592E388E14}"/>
+                  </a:ext>
+                </a:extLst>
+              </p:cNvPr>
+              <p:cNvSpPr txBox="1"/>
+              <p:nvPr/>
+            </p:nvSpPr>
+            <p:spPr>
+              <a:xfrm>
+                <a:off x="10257227" y="1711353"/>
+                <a:ext cx="309210" cy="369332"/>
+              </a:xfrm>
+              <a:prstGeom prst="rect">
+                <a:avLst/>
+              </a:prstGeom>
+              <a:noFill/>
+            </p:spPr>
+            <p:txBody>
+              <a:bodyPr wrap="square" rtlCol="0">
+                <a:spAutoFit/>
+              </a:bodyPr>
+              <a:lstStyle/>
+              <a:p>
+                <a14:m>
+                  <m:oMathPara xmlns:m="http://schemas.openxmlformats.org/officeDocument/2006/math">
+                    <m:oMathParaPr>
+                      <m:jc m:val="centerGroup"/>
+                    </m:oMathParaPr>
+                    <m:oMath xmlns:m="http://schemas.openxmlformats.org/officeDocument/2006/math">
+                      <m:sSup>
+                        <m:sSupPr>
+                          <m:ctrlPr>
+                            <a:rPr lang="de-DE" i="1" dirty="0" smtClean="0">
+                              <a:solidFill>
+                                <a:srgbClr val="FF0000"/>
+                              </a:solidFill>
+                              <a:latin typeface="Cambria Math" panose="02040503050406030204" pitchFamily="18" charset="0"/>
+                              <a:ea typeface="Times New Roman" panose="02020603050405020304" pitchFamily="18" charset="0"/>
+                              <a:cs typeface="Times New Roman" panose="02020603050405020304" pitchFamily="18" charset="0"/>
+                            </a:rPr>
+                          </m:ctrlPr>
+                        </m:sSupPr>
+                        <m:e>
+                          <m:acc>
+                            <m:accPr>
+                              <m:chr m:val="⃗"/>
+                              <m:ctrlPr>
+                                <a:rPr lang="de-DE" i="1" dirty="0">
+                                  <a:solidFill>
+                                    <a:srgbClr val="FF0000"/>
+                                  </a:solidFill>
+                                  <a:latin typeface="Cambria Math" panose="02040503050406030204" pitchFamily="18" charset="0"/>
+                                  <a:ea typeface="Times New Roman" panose="02020603050405020304" pitchFamily="18" charset="0"/>
+                                  <a:cs typeface="Times New Roman" panose="02020603050405020304" pitchFamily="18" charset="0"/>
+                                </a:rPr>
+                              </m:ctrlPr>
+                            </m:accPr>
+                            <m:e>
+                              <m:r>
+                                <a:rPr lang="de-DE" i="1" dirty="0">
+                                  <a:solidFill>
+                                    <a:srgbClr val="FF0000"/>
+                                  </a:solidFill>
+                                  <a:latin typeface="Cambria Math" panose="02040503050406030204" pitchFamily="18" charset="0"/>
+                                  <a:ea typeface="Times New Roman" panose="02020603050405020304" pitchFamily="18" charset="0"/>
+                                  <a:cs typeface="Times New Roman" panose="02020603050405020304" pitchFamily="18" charset="0"/>
+                                </a:rPr>
+                                <m:t>𝑟</m:t>
+                              </m:r>
+                            </m:e>
+                          </m:acc>
+                        </m:e>
+                        <m:sup>
+                          <m:r>
+                            <a:rPr lang="de-DE" i="1" dirty="0">
+                              <a:solidFill>
+                                <a:srgbClr val="FF0000"/>
+                              </a:solidFill>
+                              <a:latin typeface="Cambria Math" panose="02040503050406030204" pitchFamily="18" charset="0"/>
+                              <a:ea typeface="Times New Roman" panose="02020603050405020304" pitchFamily="18" charset="0"/>
+                              <a:cs typeface="Times New Roman" panose="02020603050405020304" pitchFamily="18" charset="0"/>
+                            </a:rPr>
+                            <m:t>∗</m:t>
+                          </m:r>
+                        </m:sup>
+                      </m:sSup>
+                    </m:oMath>
+                  </m:oMathPara>
+                </a14:m>
+                <a:endParaRPr lang="de-DE" dirty="0">
+                  <a:solidFill>
+                    <a:srgbClr val="FF0000"/>
+                  </a:solidFill>
+                </a:endParaRPr>
+              </a:p>
+            </p:txBody>
+          </p:sp>
+        </mc:Choice>
+        <mc:Fallback>
+          <p:sp>
+            <p:nvSpPr>
+              <p:cNvPr id="20" name="Textfeld 19">
+                <a:extLst>
+                  <a:ext uri="{FF2B5EF4-FFF2-40B4-BE49-F238E27FC236}">
+                    <a16:creationId xmlns:a16="http://schemas.microsoft.com/office/drawing/2014/main" id="{44E6CDBE-203F-43DB-88BF-00592E388E14}"/>
+                  </a:ext>
+                </a:extLst>
+              </p:cNvPr>
+              <p:cNvSpPr txBox="1">
+                <a:spLocks noRot="1" noChangeAspect="1" noMove="1" noResize="1" noEditPoints="1" noAdjustHandles="1" noChangeArrowheads="1" noChangeShapeType="1" noTextEdit="1"/>
+              </p:cNvSpPr>
+              <p:nvPr/>
+            </p:nvSpPr>
+            <p:spPr>
+              <a:xfrm>
+                <a:off x="10257227" y="1711353"/>
+                <a:ext cx="309210" cy="369332"/>
+              </a:xfrm>
+              <a:prstGeom prst="rect">
+                <a:avLst/>
+              </a:prstGeom>
+              <a:blipFill>
+                <a:blip r:embed="rId10"/>
+                <a:stretch>
+                  <a:fillRect l="-2000" t="-23333" r="-22000"/>
+                </a:stretch>
+              </a:blipFill>
+            </p:spPr>
+            <p:txBody>
+              <a:bodyPr/>
+              <a:lstStyle/>
+              <a:p>
+                <a:r>
+                  <a:rPr lang="de-DE">
+                    <a:noFill/>
+                  </a:rPr>
+                  <a:t> </a:t>
+                </a:r>
+              </a:p>
+            </p:txBody>
+          </p:sp>
+        </mc:Fallback>
+      </mc:AlternateContent>
+      <mc:AlternateContent xmlns:mc="http://schemas.openxmlformats.org/markup-compatibility/2006">
+        <mc:Choice xmlns:a14="http://schemas.microsoft.com/office/drawing/2010/main" Requires="a14">
+          <p:sp>
+            <p:nvSpPr>
+              <p:cNvPr id="24" name="Textfeld 23">
+                <a:extLst>
+                  <a:ext uri="{FF2B5EF4-FFF2-40B4-BE49-F238E27FC236}">
+                    <a16:creationId xmlns:a16="http://schemas.microsoft.com/office/drawing/2014/main" id="{6F65D4BE-92BE-437F-86C1-84547584A383}"/>
+                  </a:ext>
+                </a:extLst>
+              </p:cNvPr>
+              <p:cNvSpPr txBox="1"/>
+              <p:nvPr/>
+            </p:nvSpPr>
+            <p:spPr>
+              <a:xfrm>
+                <a:off x="10001772" y="578088"/>
+                <a:ext cx="2020556" cy="646331"/>
+              </a:xfrm>
+              <a:prstGeom prst="rect">
+                <a:avLst/>
+              </a:prstGeom>
+              <a:noFill/>
+            </p:spPr>
+            <p:txBody>
+              <a:bodyPr wrap="square">
+                <a:spAutoFit/>
+              </a:bodyPr>
+              <a:lstStyle/>
+              <a:p>
+                <a14:m>
+                  <m:oMathPara xmlns:m="http://schemas.openxmlformats.org/officeDocument/2006/math">
+                    <m:oMathParaPr>
+                      <m:jc m:val="centerGroup"/>
+                    </m:oMathParaPr>
+                    <m:oMath xmlns:m="http://schemas.openxmlformats.org/officeDocument/2006/math">
+                      <m:d>
+                        <m:dPr>
+                          <m:begChr m:val="|"/>
+                          <m:endChr m:val="|"/>
+                          <m:ctrlPr>
+                            <a:rPr lang="de-DE" b="0" i="1" dirty="0" smtClean="0">
+                              <a:solidFill>
+                                <a:srgbClr val="FF0000"/>
+                              </a:solidFill>
+                              <a:latin typeface="Cambria Math" panose="02040503050406030204" pitchFamily="18" charset="0"/>
+                              <a:ea typeface="Times New Roman" panose="02020603050405020304" pitchFamily="18" charset="0"/>
+                              <a:cs typeface="Times New Roman" panose="02020603050405020304" pitchFamily="18" charset="0"/>
+                            </a:rPr>
+                          </m:ctrlPr>
+                        </m:dPr>
+                        <m:e>
+                          <m:sSup>
+                            <m:sSupPr>
+                              <m:ctrlPr>
+                                <a:rPr lang="de-DE" i="1" dirty="0" smtClean="0">
+                                  <a:solidFill>
+                                    <a:srgbClr val="FF0000"/>
+                                  </a:solidFill>
+                                  <a:latin typeface="Cambria Math" panose="02040503050406030204" pitchFamily="18" charset="0"/>
+                                  <a:ea typeface="Times New Roman" panose="02020603050405020304" pitchFamily="18" charset="0"/>
+                                  <a:cs typeface="Times New Roman" panose="02020603050405020304" pitchFamily="18" charset="0"/>
+                                </a:rPr>
+                              </m:ctrlPr>
+                            </m:sSupPr>
+                            <m:e>
+                              <m:acc>
+                                <m:accPr>
+                                  <m:chr m:val="⃗"/>
+                                  <m:ctrlPr>
+                                    <a:rPr lang="de-DE" i="1" dirty="0">
+                                      <a:solidFill>
+                                        <a:srgbClr val="FF0000"/>
+                                      </a:solidFill>
+                                      <a:latin typeface="Cambria Math" panose="02040503050406030204" pitchFamily="18" charset="0"/>
+                                      <a:ea typeface="Times New Roman" panose="02020603050405020304" pitchFamily="18" charset="0"/>
+                                      <a:cs typeface="Times New Roman" panose="02020603050405020304" pitchFamily="18" charset="0"/>
+                                    </a:rPr>
+                                  </m:ctrlPr>
+                                </m:accPr>
+                                <m:e>
+                                  <m:r>
+                                    <a:rPr lang="de-DE" i="1" dirty="0">
+                                      <a:solidFill>
+                                        <a:srgbClr val="FF0000"/>
+                                      </a:solidFill>
+                                      <a:latin typeface="Cambria Math" panose="02040503050406030204" pitchFamily="18" charset="0"/>
+                                      <a:ea typeface="Times New Roman" panose="02020603050405020304" pitchFamily="18" charset="0"/>
+                                      <a:cs typeface="Times New Roman" panose="02020603050405020304" pitchFamily="18" charset="0"/>
+                                    </a:rPr>
+                                    <m:t>𝑟</m:t>
+                                  </m:r>
+                                </m:e>
+                              </m:acc>
+                            </m:e>
+                            <m:sup>
+                              <m:r>
+                                <a:rPr lang="de-DE" i="1" dirty="0">
+                                  <a:solidFill>
+                                    <a:srgbClr val="FF0000"/>
+                                  </a:solidFill>
+                                  <a:latin typeface="Cambria Math" panose="02040503050406030204" pitchFamily="18" charset="0"/>
+                                  <a:ea typeface="Times New Roman" panose="02020603050405020304" pitchFamily="18" charset="0"/>
+                                  <a:cs typeface="Times New Roman" panose="02020603050405020304" pitchFamily="18" charset="0"/>
+                                </a:rPr>
+                                <m:t>∗</m:t>
+                              </m:r>
+                            </m:sup>
+                          </m:sSup>
+                        </m:e>
+                      </m:d>
+                      <m:r>
+                        <a:rPr lang="de-DE" b="0" i="1" dirty="0" smtClean="0">
+                          <a:solidFill>
+                            <a:srgbClr val="FF0000"/>
+                          </a:solidFill>
+                          <a:latin typeface="Cambria Math" panose="02040503050406030204" pitchFamily="18" charset="0"/>
+                          <a:ea typeface="Times New Roman" panose="02020603050405020304" pitchFamily="18" charset="0"/>
+                          <a:cs typeface="Times New Roman" panose="02020603050405020304" pitchFamily="18" charset="0"/>
+                        </a:rPr>
+                        <m:t>=1</m:t>
+                      </m:r>
+                    </m:oMath>
+                    <m:oMath xmlns:m="http://schemas.openxmlformats.org/officeDocument/2006/math">
+                      <m:d>
+                        <m:dPr>
+                          <m:begChr m:val="|"/>
+                          <m:endChr m:val="|"/>
+                          <m:ctrlPr>
+                            <a:rPr lang="de-DE" b="0" i="0" dirty="0" smtClean="0">
+                              <a:solidFill>
+                                <a:schemeClr val="accent1"/>
+                              </a:solidFill>
+                              <a:latin typeface="Cambria Math" panose="02040503050406030204" pitchFamily="18" charset="0"/>
+                              <a:ea typeface="Times New Roman" panose="02020603050405020304" pitchFamily="18" charset="0"/>
+                              <a:cs typeface="Times New Roman" panose="02020603050405020304" pitchFamily="18" charset="0"/>
+                            </a:rPr>
+                          </m:ctrlPr>
+                        </m:dPr>
+                        <m:e>
+                          <m:sSub>
+                            <m:sSubPr>
+                              <m:ctrlPr>
+                                <a:rPr lang="de-DE" i="1" dirty="0">
+                                  <a:solidFill>
+                                    <a:schemeClr val="accent1"/>
+                                  </a:solidFill>
+                                  <a:latin typeface="Cambria Math" panose="02040503050406030204" pitchFamily="18" charset="0"/>
+                                  <a:ea typeface="Times New Roman" panose="02020603050405020304" pitchFamily="18" charset="0"/>
+                                  <a:cs typeface="Times New Roman" panose="02020603050405020304" pitchFamily="18" charset="0"/>
+                                </a:rPr>
+                              </m:ctrlPr>
+                            </m:sSubPr>
+                            <m:e>
+                              <m:acc>
+                                <m:accPr>
+                                  <m:chr m:val="⃗"/>
+                                  <m:ctrlPr>
+                                    <a:rPr lang="de-DE" i="1" dirty="0">
+                                      <a:solidFill>
+                                        <a:schemeClr val="accent1"/>
+                                      </a:solidFill>
+                                      <a:latin typeface="Cambria Math" panose="02040503050406030204" pitchFamily="18" charset="0"/>
+                                      <a:ea typeface="Times New Roman" panose="02020603050405020304" pitchFamily="18" charset="0"/>
+                                      <a:cs typeface="Times New Roman" panose="02020603050405020304" pitchFamily="18" charset="0"/>
+                                    </a:rPr>
+                                  </m:ctrlPr>
+                                </m:accPr>
+                                <m:e>
+                                  <m:r>
+                                    <a:rPr lang="de-DE" i="1" dirty="0">
+                                      <a:solidFill>
+                                        <a:schemeClr val="accent1"/>
+                                      </a:solidFill>
+                                      <a:latin typeface="Cambria Math" panose="02040503050406030204" pitchFamily="18" charset="0"/>
+                                      <a:ea typeface="Times New Roman" panose="02020603050405020304" pitchFamily="18" charset="0"/>
+                                      <a:cs typeface="Times New Roman" panose="02020603050405020304" pitchFamily="18" charset="0"/>
+                                    </a:rPr>
+                                    <m:t>𝑟</m:t>
+                                  </m:r>
+                                </m:e>
+                              </m:acc>
+                            </m:e>
+                            <m:sub>
+                              <m:r>
+                                <a:rPr lang="de-DE" i="1" dirty="0">
+                                  <a:solidFill>
+                                    <a:schemeClr val="accent1"/>
+                                  </a:solidFill>
+                                  <a:latin typeface="Cambria Math" panose="02040503050406030204" pitchFamily="18" charset="0"/>
+                                  <a:ea typeface="Times New Roman" panose="02020603050405020304" pitchFamily="18" charset="0"/>
+                                  <a:cs typeface="Times New Roman" panose="02020603050405020304" pitchFamily="18" charset="0"/>
+                                </a:rPr>
+                                <m:t>1</m:t>
+                              </m:r>
+                            </m:sub>
+                          </m:sSub>
+                          <m:r>
+                            <a:rPr lang="de-DE" i="1" dirty="0">
+                              <a:solidFill>
+                                <a:schemeClr val="accent1"/>
+                              </a:solidFill>
+                              <a:latin typeface="Cambria Math" panose="02040503050406030204" pitchFamily="18" charset="0"/>
+                              <a:ea typeface="Times New Roman" panose="02020603050405020304" pitchFamily="18" charset="0"/>
+                              <a:cs typeface="Times New Roman" panose="02020603050405020304" pitchFamily="18" charset="0"/>
+                            </a:rPr>
+                            <m:t>−</m:t>
+                          </m:r>
+                          <m:sSub>
+                            <m:sSubPr>
+                              <m:ctrlPr>
+                                <a:rPr lang="de-DE" i="1" dirty="0">
+                                  <a:solidFill>
+                                    <a:schemeClr val="accent1"/>
+                                  </a:solidFill>
+                                  <a:latin typeface="Cambria Math" panose="02040503050406030204" pitchFamily="18" charset="0"/>
+                                  <a:ea typeface="Times New Roman" panose="02020603050405020304" pitchFamily="18" charset="0"/>
+                                  <a:cs typeface="Times New Roman" panose="02020603050405020304" pitchFamily="18" charset="0"/>
+                                </a:rPr>
+                              </m:ctrlPr>
+                            </m:sSubPr>
+                            <m:e>
+                              <m:acc>
+                                <m:accPr>
+                                  <m:chr m:val="⃗"/>
+                                  <m:ctrlPr>
+                                    <a:rPr lang="de-DE" i="1" dirty="0">
+                                      <a:solidFill>
+                                        <a:schemeClr val="accent1"/>
+                                      </a:solidFill>
+                                      <a:latin typeface="Cambria Math" panose="02040503050406030204" pitchFamily="18" charset="0"/>
+                                      <a:ea typeface="Times New Roman" panose="02020603050405020304" pitchFamily="18" charset="0"/>
+                                      <a:cs typeface="Times New Roman" panose="02020603050405020304" pitchFamily="18" charset="0"/>
+                                    </a:rPr>
+                                  </m:ctrlPr>
+                                </m:accPr>
+                                <m:e>
+                                  <m:r>
+                                    <a:rPr lang="de-DE" i="1" dirty="0">
+                                      <a:solidFill>
+                                        <a:schemeClr val="accent1"/>
+                                      </a:solidFill>
+                                      <a:latin typeface="Cambria Math" panose="02040503050406030204" pitchFamily="18" charset="0"/>
+                                      <a:ea typeface="Times New Roman" panose="02020603050405020304" pitchFamily="18" charset="0"/>
+                                      <a:cs typeface="Times New Roman" panose="02020603050405020304" pitchFamily="18" charset="0"/>
+                                    </a:rPr>
+                                    <m:t>𝑟</m:t>
+                                  </m:r>
+                                </m:e>
+                              </m:acc>
+                            </m:e>
+                            <m:sub>
+                              <m:r>
+                                <a:rPr lang="de-DE" i="1" dirty="0">
+                                  <a:solidFill>
+                                    <a:schemeClr val="accent1"/>
+                                  </a:solidFill>
+                                  <a:latin typeface="Cambria Math" panose="02040503050406030204" pitchFamily="18" charset="0"/>
+                                  <a:ea typeface="Times New Roman" panose="02020603050405020304" pitchFamily="18" charset="0"/>
+                                  <a:cs typeface="Times New Roman" panose="02020603050405020304" pitchFamily="18" charset="0"/>
+                                </a:rPr>
+                                <m:t>2</m:t>
+                              </m:r>
+                            </m:sub>
+                          </m:sSub>
+                        </m:e>
+                      </m:d>
+                      <m:r>
+                        <a:rPr lang="de-DE" b="0" i="1" dirty="0" smtClean="0">
+                          <a:solidFill>
+                            <a:schemeClr val="accent1"/>
+                          </a:solidFill>
+                          <a:latin typeface="Cambria Math" panose="02040503050406030204" pitchFamily="18" charset="0"/>
+                          <a:ea typeface="Times New Roman" panose="02020603050405020304" pitchFamily="18" charset="0"/>
+                          <a:cs typeface="Times New Roman" panose="02020603050405020304" pitchFamily="18" charset="0"/>
+                        </a:rPr>
+                        <m:t>=</m:t>
+                      </m:r>
+                      <m:r>
+                        <a:rPr lang="de-DE" b="0" i="1" dirty="0" smtClean="0">
+                          <a:solidFill>
+                            <a:schemeClr val="accent1"/>
+                          </a:solidFill>
+                          <a:latin typeface="Cambria Math" panose="02040503050406030204" pitchFamily="18" charset="0"/>
+                          <a:ea typeface="Times New Roman" panose="02020603050405020304" pitchFamily="18" charset="0"/>
+                          <a:cs typeface="Times New Roman" panose="02020603050405020304" pitchFamily="18" charset="0"/>
+                        </a:rPr>
+                        <m:t>𝑟</m:t>
+                      </m:r>
+                    </m:oMath>
+                  </m:oMathPara>
+                </a14:m>
+                <a:endParaRPr lang="de-DE" dirty="0">
+                  <a:solidFill>
+                    <a:schemeClr val="accent1"/>
+                  </a:solidFill>
+                </a:endParaRPr>
+              </a:p>
+            </p:txBody>
+          </p:sp>
+        </mc:Choice>
+        <mc:Fallback>
+          <p:sp>
+            <p:nvSpPr>
+              <p:cNvPr id="24" name="Textfeld 23">
+                <a:extLst>
+                  <a:ext uri="{FF2B5EF4-FFF2-40B4-BE49-F238E27FC236}">
+                    <a16:creationId xmlns:a16="http://schemas.microsoft.com/office/drawing/2014/main" id="{6F65D4BE-92BE-437F-86C1-84547584A383}"/>
+                  </a:ext>
+                </a:extLst>
+              </p:cNvPr>
+              <p:cNvSpPr txBox="1">
+                <a:spLocks noRot="1" noChangeAspect="1" noMove="1" noResize="1" noEditPoints="1" noAdjustHandles="1" noChangeArrowheads="1" noChangeShapeType="1" noTextEdit="1"/>
+              </p:cNvSpPr>
+              <p:nvPr/>
+            </p:nvSpPr>
+            <p:spPr>
+              <a:xfrm>
+                <a:off x="10001772" y="578088"/>
+                <a:ext cx="2020556" cy="646331"/>
+              </a:xfrm>
+              <a:prstGeom prst="rect">
+                <a:avLst/>
+              </a:prstGeom>
+              <a:blipFill>
+                <a:blip r:embed="rId11"/>
+                <a:stretch>
+                  <a:fillRect t="-13208"/>
                 </a:stretch>
               </a:blipFill>
             </p:spPr>

</xml_diff>

<commit_message>
adapt script and update ppt
</commit_message>
<xml_diff>
--- a/docu_and_plots/thoughts_and_revelations_during_this_project.pptx
+++ b/docu_and_plots/thoughts_and_revelations_during_this_project.pptx
@@ -11,6 +11,7 @@
     <p:sldId id="259" r:id="rId5"/>
     <p:sldId id="260" r:id="rId6"/>
     <p:sldId id="261" r:id="rId7"/>
+    <p:sldId id="262" r:id="rId8"/>
   </p:sldIdLst>
   <p:sldSz cx="12192000" cy="6858000"/>
   <p:notesSz cx="6858000" cy="9144000"/>
@@ -276,7 +277,7 @@
           <a:p>
             <a:fld id="{911E94B8-BB3E-4AB9-8BD5-5E2112388417}" type="datetimeFigureOut">
               <a:rPr lang="de-DE" smtClean="0"/>
-              <a:t>22.12.2020</a:t>
+              <a:t>23.12.2020</a:t>
             </a:fld>
             <a:endParaRPr lang="de-DE"/>
           </a:p>
@@ -474,7 +475,7 @@
           <a:p>
             <a:fld id="{911E94B8-BB3E-4AB9-8BD5-5E2112388417}" type="datetimeFigureOut">
               <a:rPr lang="de-DE" smtClean="0"/>
-              <a:t>22.12.2020</a:t>
+              <a:t>23.12.2020</a:t>
             </a:fld>
             <a:endParaRPr lang="de-DE"/>
           </a:p>
@@ -682,7 +683,7 @@
           <a:p>
             <a:fld id="{911E94B8-BB3E-4AB9-8BD5-5E2112388417}" type="datetimeFigureOut">
               <a:rPr lang="de-DE" smtClean="0"/>
-              <a:t>22.12.2020</a:t>
+              <a:t>23.12.2020</a:t>
             </a:fld>
             <a:endParaRPr lang="de-DE"/>
           </a:p>
@@ -880,7 +881,7 @@
           <a:p>
             <a:fld id="{911E94B8-BB3E-4AB9-8BD5-5E2112388417}" type="datetimeFigureOut">
               <a:rPr lang="de-DE" smtClean="0"/>
-              <a:t>22.12.2020</a:t>
+              <a:t>23.12.2020</a:t>
             </a:fld>
             <a:endParaRPr lang="de-DE"/>
           </a:p>
@@ -1155,7 +1156,7 @@
           <a:p>
             <a:fld id="{911E94B8-BB3E-4AB9-8BD5-5E2112388417}" type="datetimeFigureOut">
               <a:rPr lang="de-DE" smtClean="0"/>
-              <a:t>22.12.2020</a:t>
+              <a:t>23.12.2020</a:t>
             </a:fld>
             <a:endParaRPr lang="de-DE"/>
           </a:p>
@@ -1420,7 +1421,7 @@
           <a:p>
             <a:fld id="{911E94B8-BB3E-4AB9-8BD5-5E2112388417}" type="datetimeFigureOut">
               <a:rPr lang="de-DE" smtClean="0"/>
-              <a:t>22.12.2020</a:t>
+              <a:t>23.12.2020</a:t>
             </a:fld>
             <a:endParaRPr lang="de-DE"/>
           </a:p>
@@ -1832,7 +1833,7 @@
           <a:p>
             <a:fld id="{911E94B8-BB3E-4AB9-8BD5-5E2112388417}" type="datetimeFigureOut">
               <a:rPr lang="de-DE" smtClean="0"/>
-              <a:t>22.12.2020</a:t>
+              <a:t>23.12.2020</a:t>
             </a:fld>
             <a:endParaRPr lang="de-DE"/>
           </a:p>
@@ -1973,7 +1974,7 @@
           <a:p>
             <a:fld id="{911E94B8-BB3E-4AB9-8BD5-5E2112388417}" type="datetimeFigureOut">
               <a:rPr lang="de-DE" smtClean="0"/>
-              <a:t>22.12.2020</a:t>
+              <a:t>23.12.2020</a:t>
             </a:fld>
             <a:endParaRPr lang="de-DE"/>
           </a:p>
@@ -2086,7 +2087,7 @@
           <a:p>
             <a:fld id="{911E94B8-BB3E-4AB9-8BD5-5E2112388417}" type="datetimeFigureOut">
               <a:rPr lang="de-DE" smtClean="0"/>
-              <a:t>22.12.2020</a:t>
+              <a:t>23.12.2020</a:t>
             </a:fld>
             <a:endParaRPr lang="de-DE"/>
           </a:p>
@@ -2397,7 +2398,7 @@
           <a:p>
             <a:fld id="{911E94B8-BB3E-4AB9-8BD5-5E2112388417}" type="datetimeFigureOut">
               <a:rPr lang="de-DE" smtClean="0"/>
-              <a:t>22.12.2020</a:t>
+              <a:t>23.12.2020</a:t>
             </a:fld>
             <a:endParaRPr lang="de-DE"/>
           </a:p>
@@ -2685,7 +2686,7 @@
           <a:p>
             <a:fld id="{911E94B8-BB3E-4AB9-8BD5-5E2112388417}" type="datetimeFigureOut">
               <a:rPr lang="de-DE" smtClean="0"/>
-              <a:t>22.12.2020</a:t>
+              <a:t>23.12.2020</a:t>
             </a:fld>
             <a:endParaRPr lang="de-DE"/>
           </a:p>
@@ -2926,7 +2927,7 @@
           <a:p>
             <a:fld id="{911E94B8-BB3E-4AB9-8BD5-5E2112388417}" type="datetimeFigureOut">
               <a:rPr lang="de-DE" smtClean="0"/>
-              <a:t>22.12.2020</a:t>
+              <a:t>23.12.2020</a:t>
             </a:fld>
             <a:endParaRPr lang="de-DE"/>
           </a:p>
@@ -6389,8 +6390,8 @@
           </a:prstGeom>
         </p:spPr>
       </p:pic>
-      <mc:AlternateContent xmlns:mc="http://schemas.openxmlformats.org/markup-compatibility/2006">
-        <mc:Choice xmlns:a14="http://schemas.microsoft.com/office/drawing/2010/main" Requires="a14">
+      <mc:AlternateContent xmlns:mc="http://schemas.openxmlformats.org/markup-compatibility/2006" xmlns:a14="http://schemas.microsoft.com/office/drawing/2010/main">
+        <mc:Choice Requires="a14">
           <p:sp>
             <p:nvSpPr>
               <p:cNvPr id="4" name="Inhaltsplatzhalter 2">
@@ -9649,7 +9650,7 @@
             </p:txBody>
           </p:sp>
         </mc:Choice>
-        <mc:Fallback>
+        <mc:Fallback xmlns="">
           <p:sp>
             <p:nvSpPr>
               <p:cNvPr id="4" name="Inhaltsplatzhalter 2">
@@ -9693,8 +9694,8 @@
           </p:sp>
         </mc:Fallback>
       </mc:AlternateContent>
-      <mc:AlternateContent xmlns:mc="http://schemas.openxmlformats.org/markup-compatibility/2006">
-        <mc:Choice xmlns:a14="http://schemas.microsoft.com/office/drawing/2010/main" Requires="a14">
+      <mc:AlternateContent xmlns:mc="http://schemas.openxmlformats.org/markup-compatibility/2006" xmlns:a14="http://schemas.microsoft.com/office/drawing/2010/main">
+        <mc:Choice Requires="a14">
           <p:sp>
             <p:nvSpPr>
               <p:cNvPr id="2" name="Textfeld 1">
@@ -9723,6 +9724,7 @@
               </a:bodyPr>
               <a:lstStyle/>
               <a:p>
+                <a:pPr/>
                 <a14:m>
                   <m:oMathPara xmlns:m="http://schemas.openxmlformats.org/officeDocument/2006/math">
                     <m:oMathParaPr>
@@ -10030,7 +10032,7 @@
             </p:txBody>
           </p:sp>
         </mc:Choice>
-        <mc:Fallback>
+        <mc:Fallback xmlns="">
           <p:sp>
             <p:nvSpPr>
               <p:cNvPr id="2" name="Textfeld 1">
@@ -10075,8 +10077,8 @@
           </p:sp>
         </mc:Fallback>
       </mc:AlternateContent>
-      <mc:AlternateContent xmlns:mc="http://schemas.openxmlformats.org/markup-compatibility/2006">
-        <mc:Choice xmlns:a14="http://schemas.microsoft.com/office/drawing/2010/main" Requires="a14">
+      <mc:AlternateContent xmlns:mc="http://schemas.openxmlformats.org/markup-compatibility/2006" xmlns:a14="http://schemas.microsoft.com/office/drawing/2010/main">
+        <mc:Choice Requires="a14">
           <p:sp>
             <p:nvSpPr>
               <p:cNvPr id="7" name="Textfeld 6">
@@ -10345,7 +10347,7 @@
             </p:txBody>
           </p:sp>
         </mc:Choice>
-        <mc:Fallback>
+        <mc:Fallback xmlns="">
           <p:sp>
             <p:nvSpPr>
               <p:cNvPr id="7" name="Textfeld 6">
@@ -10390,8 +10392,8 @@
           </p:sp>
         </mc:Fallback>
       </mc:AlternateContent>
-      <mc:AlternateContent xmlns:mc="http://schemas.openxmlformats.org/markup-compatibility/2006">
-        <mc:Choice xmlns:a14="http://schemas.microsoft.com/office/drawing/2010/main" Requires="a14">
+      <mc:AlternateContent xmlns:mc="http://schemas.openxmlformats.org/markup-compatibility/2006" xmlns:a14="http://schemas.microsoft.com/office/drawing/2010/main">
+        <mc:Choice Requires="a14">
           <p:sp>
             <p:nvSpPr>
               <p:cNvPr id="8" name="Ellipse 7">
@@ -10479,7 +10481,7 @@
             </p:txBody>
           </p:sp>
         </mc:Choice>
-        <mc:Fallback>
+        <mc:Fallback xmlns="">
           <p:sp>
             <p:nvSpPr>
               <p:cNvPr id="8" name="Ellipse 7">
@@ -10524,8 +10526,8 @@
           </p:sp>
         </mc:Fallback>
       </mc:AlternateContent>
-      <mc:AlternateContent xmlns:mc="http://schemas.openxmlformats.org/markup-compatibility/2006">
-        <mc:Choice xmlns:a14="http://schemas.microsoft.com/office/drawing/2010/main" Requires="a14">
+      <mc:AlternateContent xmlns:mc="http://schemas.openxmlformats.org/markup-compatibility/2006" xmlns:a14="http://schemas.microsoft.com/office/drawing/2010/main">
+        <mc:Choice Requires="a14">
           <p:sp>
             <p:nvSpPr>
               <p:cNvPr id="9" name="Ellipse 8">
@@ -10613,7 +10615,7 @@
             </p:txBody>
           </p:sp>
         </mc:Choice>
-        <mc:Fallback>
+        <mc:Fallback xmlns="">
           <p:sp>
             <p:nvSpPr>
               <p:cNvPr id="9" name="Ellipse 8">
@@ -10701,8 +10703,8 @@
           </a:fontRef>
         </p:style>
       </p:cxnSp>
-      <mc:AlternateContent xmlns:mc="http://schemas.openxmlformats.org/markup-compatibility/2006">
-        <mc:Choice xmlns:a14="http://schemas.microsoft.com/office/drawing/2010/main" Requires="a14">
+      <mc:AlternateContent xmlns:mc="http://schemas.openxmlformats.org/markup-compatibility/2006" xmlns:a14="http://schemas.microsoft.com/office/drawing/2010/main">
+        <mc:Choice Requires="a14">
           <p:sp>
             <p:nvSpPr>
               <p:cNvPr id="13" name="Textfeld 12">
@@ -10731,6 +10733,7 @@
               </a:bodyPr>
               <a:lstStyle/>
               <a:p>
+                <a:pPr/>
                 <a14:m>
                   <m:oMathPara xmlns:m="http://schemas.openxmlformats.org/officeDocument/2006/math">
                     <m:oMathParaPr>
@@ -10874,7 +10877,7 @@
             </p:txBody>
           </p:sp>
         </mc:Choice>
-        <mc:Fallback>
+        <mc:Fallback xmlns="">
           <p:sp>
             <p:nvSpPr>
               <p:cNvPr id="13" name="Textfeld 12">
@@ -10963,8 +10966,8 @@
           </a:fontRef>
         </p:style>
       </p:cxnSp>
-      <mc:AlternateContent xmlns:mc="http://schemas.openxmlformats.org/markup-compatibility/2006">
-        <mc:Choice xmlns:a14="http://schemas.microsoft.com/office/drawing/2010/main" Requires="a14">
+      <mc:AlternateContent xmlns:mc="http://schemas.openxmlformats.org/markup-compatibility/2006" xmlns:a14="http://schemas.microsoft.com/office/drawing/2010/main">
+        <mc:Choice Requires="a14">
           <p:sp>
             <p:nvSpPr>
               <p:cNvPr id="20" name="Textfeld 19">
@@ -10993,6 +10996,7 @@
               </a:bodyPr>
               <a:lstStyle/>
               <a:p>
+                <a:pPr/>
                 <a14:m>
                   <m:oMathPara xmlns:m="http://schemas.openxmlformats.org/officeDocument/2006/math">
                     <m:oMathParaPr>
@@ -11068,7 +11072,7 @@
             </p:txBody>
           </p:sp>
         </mc:Choice>
-        <mc:Fallback>
+        <mc:Fallback xmlns="">
           <p:sp>
             <p:nvSpPr>
               <p:cNvPr id="20" name="Textfeld 19">
@@ -11113,8 +11117,8 @@
           </p:sp>
         </mc:Fallback>
       </mc:AlternateContent>
-      <mc:AlternateContent xmlns:mc="http://schemas.openxmlformats.org/markup-compatibility/2006">
-        <mc:Choice xmlns:a14="http://schemas.microsoft.com/office/drawing/2010/main" Requires="a14">
+      <mc:AlternateContent xmlns:mc="http://schemas.openxmlformats.org/markup-compatibility/2006" xmlns:a14="http://schemas.microsoft.com/office/drawing/2010/main">
+        <mc:Choice Requires="a14">
           <p:sp>
             <p:nvSpPr>
               <p:cNvPr id="24" name="Textfeld 23">
@@ -11143,6 +11147,7 @@
               </a:bodyPr>
               <a:lstStyle/>
               <a:p>
+                <a:pPr/>
                 <a14:m>
                   <m:oMathPara xmlns:m="http://schemas.openxmlformats.org/officeDocument/2006/math">
                     <m:oMathParaPr>
@@ -11242,7 +11247,7 @@
                           <m:begChr m:val="|"/>
                           <m:endChr m:val="|"/>
                           <m:ctrlPr>
-                            <a:rPr lang="de-DE" b="0" i="0" dirty="0" smtClean="0">
+                            <a:rPr lang="de-DE" b="0" i="1" dirty="0" smtClean="0">
                               <a:solidFill>
                                 <a:schemeClr val="accent1"/>
                               </a:solidFill>
@@ -11414,7 +11419,7 @@
             </p:txBody>
           </p:sp>
         </mc:Choice>
-        <mc:Fallback>
+        <mc:Fallback xmlns="">
           <p:sp>
             <p:nvSpPr>
               <p:cNvPr id="24" name="Textfeld 23">
@@ -11489,8 +11494,8 @@
           <a:chExt cx="0" cy="0"/>
         </a:xfrm>
       </p:grpSpPr>
-      <mc:AlternateContent xmlns:mc="http://schemas.openxmlformats.org/markup-compatibility/2006">
-        <mc:Choice xmlns:a14="http://schemas.microsoft.com/office/drawing/2010/main" Requires="a14">
+      <mc:AlternateContent xmlns:mc="http://schemas.openxmlformats.org/markup-compatibility/2006" xmlns:a14="http://schemas.microsoft.com/office/drawing/2010/main">
+        <mc:Choice Requires="a14">
           <p:sp>
             <p:nvSpPr>
               <p:cNvPr id="3" name="Inhaltsplatzhalter 2">
@@ -11999,13 +12004,7 @@
                       <a:rPr lang="de-DE" b="0" i="1" smtClean="0">
                         <a:latin typeface="Cambria Math" panose="02040503050406030204" pitchFamily="18" charset="0"/>
                       </a:rPr>
-                      <m:t>↔</m:t>
-                    </m:r>
-                    <m:r>
-                      <a:rPr lang="de-DE" b="0" i="1" smtClean="0">
-                        <a:latin typeface="Cambria Math" panose="02040503050406030204" pitchFamily="18" charset="0"/>
-                      </a:rPr>
-                      <m:t> </m:t>
+                      <m:t>↔ </m:t>
                     </m:r>
                     <m:sSub>
                       <m:sSubPr>
@@ -12505,7 +12504,7 @@
             </p:txBody>
           </p:sp>
         </mc:Choice>
-        <mc:Fallback>
+        <mc:Fallback xmlns="">
           <p:sp>
             <p:nvSpPr>
               <p:cNvPr id="3" name="Inhaltsplatzhalter 2">
@@ -12599,13 +12598,13 @@
             </p:nvSpPr>
             <p:spPr>
               <a:xfrm>
-                <a:off x="938867" y="575410"/>
-                <a:ext cx="6313805" cy="5238161"/>
+                <a:off x="92278" y="159391"/>
+                <a:ext cx="8119279" cy="6560191"/>
               </a:xfrm>
             </p:spPr>
             <p:txBody>
               <a:bodyPr>
-                <a:normAutofit/>
+                <a:normAutofit fontScale="70000" lnSpcReduction="20000"/>
               </a:bodyPr>
               <a:lstStyle/>
               <a:p>
@@ -12703,6 +12702,575 @@
                   <a:rPr lang="de-DE" dirty="0" err="1"/>
                   <a:t>orbit</a:t>
                 </a:r>
+                <a:br>
+                  <a:rPr lang="de-DE" dirty="0"/>
+                </a:br>
+                <a14:m>
+                  <m:oMath xmlns:m="http://schemas.openxmlformats.org/officeDocument/2006/math">
+                    <m:sSub>
+                      <m:sSubPr>
+                        <m:ctrlPr>
+                          <a:rPr lang="de-DE" b="0" i="1" smtClean="0">
+                            <a:latin typeface="Cambria Math" panose="02040503050406030204" pitchFamily="18" charset="0"/>
+                          </a:rPr>
+                        </m:ctrlPr>
+                      </m:sSubPr>
+                      <m:e>
+                        <m:r>
+                          <a:rPr lang="de-DE" b="0" i="1" smtClean="0">
+                            <a:latin typeface="Cambria Math" panose="02040503050406030204" pitchFamily="18" charset="0"/>
+                          </a:rPr>
+                          <m:t>𝐹</m:t>
+                        </m:r>
+                      </m:e>
+                      <m:sub>
+                        <m:r>
+                          <a:rPr lang="de-DE" b="0" i="1" smtClean="0">
+                            <a:latin typeface="Cambria Math" panose="02040503050406030204" pitchFamily="18" charset="0"/>
+                          </a:rPr>
+                          <m:t>𝑍</m:t>
+                        </m:r>
+                      </m:sub>
+                    </m:sSub>
+                    <m:r>
+                      <a:rPr lang="de-DE" b="0" i="1" smtClean="0">
+                        <a:latin typeface="Cambria Math" panose="02040503050406030204" pitchFamily="18" charset="0"/>
+                      </a:rPr>
+                      <m:t>=</m:t>
+                    </m:r>
+                    <m:f>
+                      <m:fPr>
+                        <m:ctrlPr>
+                          <a:rPr lang="de-DE" i="1">
+                            <a:latin typeface="Cambria Math" panose="02040503050406030204" pitchFamily="18" charset="0"/>
+                          </a:rPr>
+                        </m:ctrlPr>
+                      </m:fPr>
+                      <m:num>
+                        <m:sSub>
+                          <m:sSubPr>
+                            <m:ctrlPr>
+                              <a:rPr lang="de-DE" i="1">
+                                <a:latin typeface="Cambria Math" panose="02040503050406030204" pitchFamily="18" charset="0"/>
+                              </a:rPr>
+                            </m:ctrlPr>
+                          </m:sSubPr>
+                          <m:e>
+                            <m:r>
+                              <a:rPr lang="de-DE" i="1">
+                                <a:latin typeface="Cambria Math" panose="02040503050406030204" pitchFamily="18" charset="0"/>
+                              </a:rPr>
+                              <m:t>𝑚</m:t>
+                            </m:r>
+                          </m:e>
+                          <m:sub>
+                            <m:r>
+                              <a:rPr lang="de-DE" i="1">
+                                <a:latin typeface="Cambria Math" panose="02040503050406030204" pitchFamily="18" charset="0"/>
+                              </a:rPr>
+                              <m:t>2</m:t>
+                            </m:r>
+                          </m:sub>
+                        </m:sSub>
+                        <m:sSubSup>
+                          <m:sSubSupPr>
+                            <m:ctrlPr>
+                              <a:rPr lang="de-DE" i="1">
+                                <a:latin typeface="Cambria Math" panose="02040503050406030204" pitchFamily="18" charset="0"/>
+                              </a:rPr>
+                            </m:ctrlPr>
+                          </m:sSubSupPr>
+                          <m:e>
+                            <m:r>
+                              <a:rPr lang="de-DE" i="1">
+                                <a:latin typeface="Cambria Math" panose="02040503050406030204" pitchFamily="18" charset="0"/>
+                              </a:rPr>
+                              <m:t>𝑣</m:t>
+                            </m:r>
+                          </m:e>
+                          <m:sub>
+                            <m:r>
+                              <a:rPr lang="de-DE" i="1">
+                                <a:latin typeface="Cambria Math" panose="02040503050406030204" pitchFamily="18" charset="0"/>
+                              </a:rPr>
+                              <m:t>2</m:t>
+                            </m:r>
+                          </m:sub>
+                          <m:sup>
+                            <m:r>
+                              <a:rPr lang="de-DE" i="1">
+                                <a:latin typeface="Cambria Math" panose="02040503050406030204" pitchFamily="18" charset="0"/>
+                              </a:rPr>
+                              <m:t>2</m:t>
+                            </m:r>
+                          </m:sup>
+                        </m:sSubSup>
+                      </m:num>
+                      <m:den>
+                        <m:r>
+                          <a:rPr lang="de-DE" i="1">
+                            <a:latin typeface="Cambria Math" panose="02040503050406030204" pitchFamily="18" charset="0"/>
+                          </a:rPr>
+                          <m:t>𝑟</m:t>
+                        </m:r>
+                      </m:den>
+                    </m:f>
+                    <m:r>
+                      <a:rPr lang="de-DE" i="1">
+                        <a:latin typeface="Cambria Math" panose="02040503050406030204" pitchFamily="18" charset="0"/>
+                      </a:rPr>
+                      <m:t>=</m:t>
+                    </m:r>
+                    <m:f>
+                      <m:fPr>
+                        <m:ctrlPr>
+                          <a:rPr lang="de-DE" i="1">
+                            <a:latin typeface="Cambria Math" panose="02040503050406030204" pitchFamily="18" charset="0"/>
+                          </a:rPr>
+                        </m:ctrlPr>
+                      </m:fPr>
+                      <m:num>
+                        <m:sSub>
+                          <m:sSubPr>
+                            <m:ctrlPr>
+                              <a:rPr lang="de-DE" i="1">
+                                <a:latin typeface="Cambria Math" panose="02040503050406030204" pitchFamily="18" charset="0"/>
+                              </a:rPr>
+                            </m:ctrlPr>
+                          </m:sSubPr>
+                          <m:e>
+                            <m:r>
+                              <a:rPr lang="de-DE" i="1">
+                                <a:latin typeface="Cambria Math" panose="02040503050406030204" pitchFamily="18" charset="0"/>
+                              </a:rPr>
+                              <m:t>𝑚</m:t>
+                            </m:r>
+                          </m:e>
+                          <m:sub>
+                            <m:r>
+                              <a:rPr lang="de-DE" i="1">
+                                <a:latin typeface="Cambria Math" panose="02040503050406030204" pitchFamily="18" charset="0"/>
+                              </a:rPr>
+                              <m:t>1</m:t>
+                            </m:r>
+                          </m:sub>
+                        </m:sSub>
+                        <m:sSubSup>
+                          <m:sSubSupPr>
+                            <m:ctrlPr>
+                              <a:rPr lang="de-DE" i="1">
+                                <a:latin typeface="Cambria Math" panose="02040503050406030204" pitchFamily="18" charset="0"/>
+                              </a:rPr>
+                            </m:ctrlPr>
+                          </m:sSubSupPr>
+                          <m:e>
+                            <m:r>
+                              <a:rPr lang="de-DE" i="1">
+                                <a:latin typeface="Cambria Math" panose="02040503050406030204" pitchFamily="18" charset="0"/>
+                              </a:rPr>
+                              <m:t>𝑣</m:t>
+                            </m:r>
+                          </m:e>
+                          <m:sub>
+                            <m:r>
+                              <a:rPr lang="de-DE" i="1">
+                                <a:latin typeface="Cambria Math" panose="02040503050406030204" pitchFamily="18" charset="0"/>
+                              </a:rPr>
+                              <m:t>1</m:t>
+                            </m:r>
+                          </m:sub>
+                          <m:sup>
+                            <m:r>
+                              <a:rPr lang="de-DE" i="1">
+                                <a:latin typeface="Cambria Math" panose="02040503050406030204" pitchFamily="18" charset="0"/>
+                              </a:rPr>
+                              <m:t>2</m:t>
+                            </m:r>
+                          </m:sup>
+                        </m:sSubSup>
+                      </m:num>
+                      <m:den>
+                        <m:r>
+                          <a:rPr lang="de-DE" i="1">
+                            <a:latin typeface="Cambria Math" panose="02040503050406030204" pitchFamily="18" charset="0"/>
+                          </a:rPr>
+                          <m:t>𝑟</m:t>
+                        </m:r>
+                      </m:den>
+                    </m:f>
+                    <m:r>
+                      <a:rPr lang="de-DE" i="1">
+                        <a:latin typeface="Cambria Math" panose="02040503050406030204" pitchFamily="18" charset="0"/>
+                      </a:rPr>
+                      <m:t>=</m:t>
+                    </m:r>
+                    <m:sSub>
+                      <m:sSubPr>
+                        <m:ctrlPr>
+                          <a:rPr lang="de-DE" b="0" i="1" smtClean="0">
+                            <a:latin typeface="Cambria Math" panose="02040503050406030204" pitchFamily="18" charset="0"/>
+                          </a:rPr>
+                        </m:ctrlPr>
+                      </m:sSubPr>
+                      <m:e>
+                        <m:r>
+                          <a:rPr lang="de-DE" b="0" i="1" smtClean="0">
+                            <a:latin typeface="Cambria Math" panose="02040503050406030204" pitchFamily="18" charset="0"/>
+                          </a:rPr>
+                          <m:t>𝐹</m:t>
+                        </m:r>
+                      </m:e>
+                      <m:sub>
+                        <m:r>
+                          <a:rPr lang="de-DE" b="0" i="1" smtClean="0">
+                            <a:latin typeface="Cambria Math" panose="02040503050406030204" pitchFamily="18" charset="0"/>
+                          </a:rPr>
+                          <m:t>𝐺</m:t>
+                        </m:r>
+                      </m:sub>
+                    </m:sSub>
+                    <m:r>
+                      <a:rPr lang="de-DE" b="0" i="1" smtClean="0">
+                        <a:latin typeface="Cambria Math" panose="02040503050406030204" pitchFamily="18" charset="0"/>
+                      </a:rPr>
+                      <m:t>=</m:t>
+                    </m:r>
+                    <m:f>
+                      <m:fPr>
+                        <m:ctrlPr>
+                          <a:rPr lang="de-DE" i="1">
+                            <a:latin typeface="Cambria Math" panose="02040503050406030204" pitchFamily="18" charset="0"/>
+                          </a:rPr>
+                        </m:ctrlPr>
+                      </m:fPr>
+                      <m:num>
+                        <m:r>
+                          <a:rPr lang="de-DE" i="1">
+                            <a:latin typeface="Cambria Math" panose="02040503050406030204" pitchFamily="18" charset="0"/>
+                          </a:rPr>
+                          <m:t>𝐺</m:t>
+                        </m:r>
+                        <m:sSub>
+                          <m:sSubPr>
+                            <m:ctrlPr>
+                              <a:rPr lang="de-DE" i="1">
+                                <a:latin typeface="Cambria Math" panose="02040503050406030204" pitchFamily="18" charset="0"/>
+                              </a:rPr>
+                            </m:ctrlPr>
+                          </m:sSubPr>
+                          <m:e>
+                            <m:r>
+                              <a:rPr lang="de-DE" i="1">
+                                <a:latin typeface="Cambria Math" panose="02040503050406030204" pitchFamily="18" charset="0"/>
+                              </a:rPr>
+                              <m:t>𝑚</m:t>
+                            </m:r>
+                          </m:e>
+                          <m:sub>
+                            <m:r>
+                              <a:rPr lang="de-DE" i="1">
+                                <a:latin typeface="Cambria Math" panose="02040503050406030204" pitchFamily="18" charset="0"/>
+                              </a:rPr>
+                              <m:t>1</m:t>
+                            </m:r>
+                          </m:sub>
+                        </m:sSub>
+                        <m:sSub>
+                          <m:sSubPr>
+                            <m:ctrlPr>
+                              <a:rPr lang="de-DE" i="1">
+                                <a:latin typeface="Cambria Math" panose="02040503050406030204" pitchFamily="18" charset="0"/>
+                              </a:rPr>
+                            </m:ctrlPr>
+                          </m:sSubPr>
+                          <m:e>
+                            <m:r>
+                              <a:rPr lang="de-DE" i="1">
+                                <a:latin typeface="Cambria Math" panose="02040503050406030204" pitchFamily="18" charset="0"/>
+                              </a:rPr>
+                              <m:t>𝑚</m:t>
+                            </m:r>
+                          </m:e>
+                          <m:sub>
+                            <m:r>
+                              <a:rPr lang="de-DE" i="1">
+                                <a:latin typeface="Cambria Math" panose="02040503050406030204" pitchFamily="18" charset="0"/>
+                              </a:rPr>
+                              <m:t>2</m:t>
+                            </m:r>
+                          </m:sub>
+                        </m:sSub>
+                      </m:num>
+                      <m:den>
+                        <m:sSup>
+                          <m:sSupPr>
+                            <m:ctrlPr>
+                              <a:rPr lang="de-DE" i="1">
+                                <a:latin typeface="Cambria Math" panose="02040503050406030204" pitchFamily="18" charset="0"/>
+                              </a:rPr>
+                            </m:ctrlPr>
+                          </m:sSupPr>
+                          <m:e>
+                            <m:d>
+                              <m:dPr>
+                                <m:ctrlPr>
+                                  <a:rPr lang="de-DE" i="1">
+                                    <a:latin typeface="Cambria Math" panose="02040503050406030204" pitchFamily="18" charset="0"/>
+                                  </a:rPr>
+                                </m:ctrlPr>
+                              </m:dPr>
+                              <m:e>
+                                <m:r>
+                                  <a:rPr lang="de-DE" i="1">
+                                    <a:latin typeface="Cambria Math" panose="02040503050406030204" pitchFamily="18" charset="0"/>
+                                  </a:rPr>
+                                  <m:t>2</m:t>
+                                </m:r>
+                                <m:r>
+                                  <a:rPr lang="de-DE" i="1">
+                                    <a:latin typeface="Cambria Math" panose="02040503050406030204" pitchFamily="18" charset="0"/>
+                                  </a:rPr>
+                                  <m:t>𝑟</m:t>
+                                </m:r>
+                              </m:e>
+                            </m:d>
+                          </m:e>
+                          <m:sup>
+                            <m:r>
+                              <a:rPr lang="de-DE" i="1">
+                                <a:latin typeface="Cambria Math" panose="02040503050406030204" pitchFamily="18" charset="0"/>
+                              </a:rPr>
+                              <m:t>2</m:t>
+                            </m:r>
+                          </m:sup>
+                        </m:sSup>
+                      </m:den>
+                    </m:f>
+                    <m:r>
+                      <a:rPr lang="de-DE" b="0" i="1" smtClean="0">
+                        <a:latin typeface="Cambria Math" panose="02040503050406030204" pitchFamily="18" charset="0"/>
+                      </a:rPr>
+                      <m:t> </m:t>
+                    </m:r>
+                  </m:oMath>
+                </a14:m>
+                <a:br>
+                  <a:rPr lang="de-DE" b="0" i="1" dirty="0">
+                    <a:latin typeface="Cambria Math" panose="02040503050406030204" pitchFamily="18" charset="0"/>
+                  </a:rPr>
+                </a:br>
+                <a14:m>
+                  <m:oMath xmlns:m="http://schemas.openxmlformats.org/officeDocument/2006/math">
+                    <m:r>
+                      <a:rPr lang="de-DE" b="0" i="1" smtClean="0">
+                        <a:latin typeface="Cambria Math" panose="02040503050406030204" pitchFamily="18" charset="0"/>
+                      </a:rPr>
+                      <m:t>↔</m:t>
+                    </m:r>
+                    <m:r>
+                      <a:rPr lang="de-DE" b="0" i="1" smtClean="0">
+                        <a:latin typeface="Cambria Math" panose="02040503050406030204" pitchFamily="18" charset="0"/>
+                      </a:rPr>
+                      <m:t>  </m:t>
+                    </m:r>
+                    <m:sSubSup>
+                      <m:sSubSupPr>
+                        <m:ctrlPr>
+                          <a:rPr lang="de-DE" b="0" i="1" smtClean="0">
+                            <a:latin typeface="Cambria Math" panose="02040503050406030204" pitchFamily="18" charset="0"/>
+                          </a:rPr>
+                        </m:ctrlPr>
+                      </m:sSubSupPr>
+                      <m:e>
+                        <m:r>
+                          <a:rPr lang="de-DE" b="0" i="1" smtClean="0">
+                            <a:latin typeface="Cambria Math" panose="02040503050406030204" pitchFamily="18" charset="0"/>
+                          </a:rPr>
+                          <m:t>𝑣</m:t>
+                        </m:r>
+                      </m:e>
+                      <m:sub>
+                        <m:r>
+                          <a:rPr lang="de-DE" b="0" i="1" smtClean="0">
+                            <a:latin typeface="Cambria Math" panose="02040503050406030204" pitchFamily="18" charset="0"/>
+                          </a:rPr>
+                          <m:t>1</m:t>
+                        </m:r>
+                      </m:sub>
+                      <m:sup>
+                        <m:r>
+                          <a:rPr lang="de-DE" b="0" i="1" smtClean="0">
+                            <a:latin typeface="Cambria Math" panose="02040503050406030204" pitchFamily="18" charset="0"/>
+                          </a:rPr>
+                          <m:t>2</m:t>
+                        </m:r>
+                      </m:sup>
+                    </m:sSubSup>
+                    <m:r>
+                      <a:rPr lang="de-DE" b="0" i="1" smtClean="0">
+                        <a:latin typeface="Cambria Math" panose="02040503050406030204" pitchFamily="18" charset="0"/>
+                      </a:rPr>
+                      <m:t>=</m:t>
+                    </m:r>
+                    <m:f>
+                      <m:fPr>
+                        <m:ctrlPr>
+                          <a:rPr lang="de-DE" b="0" i="1" smtClean="0">
+                            <a:latin typeface="Cambria Math" panose="02040503050406030204" pitchFamily="18" charset="0"/>
+                          </a:rPr>
+                        </m:ctrlPr>
+                      </m:fPr>
+                      <m:num>
+                        <m:r>
+                          <a:rPr lang="de-DE" b="0" i="1" smtClean="0">
+                            <a:latin typeface="Cambria Math" panose="02040503050406030204" pitchFamily="18" charset="0"/>
+                          </a:rPr>
+                          <m:t>𝐺</m:t>
+                        </m:r>
+                        <m:sSub>
+                          <m:sSubPr>
+                            <m:ctrlPr>
+                              <a:rPr lang="de-DE" b="0" i="1" smtClean="0">
+                                <a:latin typeface="Cambria Math" panose="02040503050406030204" pitchFamily="18" charset="0"/>
+                              </a:rPr>
+                            </m:ctrlPr>
+                          </m:sSubPr>
+                          <m:e>
+                            <m:r>
+                              <a:rPr lang="de-DE" b="0" i="1" smtClean="0">
+                                <a:latin typeface="Cambria Math" panose="02040503050406030204" pitchFamily="18" charset="0"/>
+                              </a:rPr>
+                              <m:t>𝑚</m:t>
+                            </m:r>
+                          </m:e>
+                          <m:sub>
+                            <m:r>
+                              <a:rPr lang="de-DE" b="0" i="1" smtClean="0">
+                                <a:latin typeface="Cambria Math" panose="02040503050406030204" pitchFamily="18" charset="0"/>
+                              </a:rPr>
+                              <m:t>2</m:t>
+                            </m:r>
+                          </m:sub>
+                        </m:sSub>
+                      </m:num>
+                      <m:den>
+                        <m:r>
+                          <a:rPr lang="de-DE" b="0" i="1" smtClean="0">
+                            <a:latin typeface="Cambria Math" panose="02040503050406030204" pitchFamily="18" charset="0"/>
+                          </a:rPr>
+                          <m:t>4</m:t>
+                        </m:r>
+                        <m:r>
+                          <a:rPr lang="de-DE" b="0" i="1" smtClean="0">
+                            <a:latin typeface="Cambria Math" panose="02040503050406030204" pitchFamily="18" charset="0"/>
+                          </a:rPr>
+                          <m:t>𝑟</m:t>
+                        </m:r>
+                      </m:den>
+                    </m:f>
+                    <m:r>
+                      <a:rPr lang="de-DE" b="0" i="1" smtClean="0">
+                        <a:latin typeface="Cambria Math" panose="02040503050406030204" pitchFamily="18" charset="0"/>
+                      </a:rPr>
+                      <m:t>=−</m:t>
+                    </m:r>
+                    <m:sSubSup>
+                      <m:sSubSupPr>
+                        <m:ctrlPr>
+                          <a:rPr lang="de-DE" b="0" i="1" smtClean="0">
+                            <a:latin typeface="Cambria Math" panose="02040503050406030204" pitchFamily="18" charset="0"/>
+                          </a:rPr>
+                        </m:ctrlPr>
+                      </m:sSubSupPr>
+                      <m:e>
+                        <m:r>
+                          <a:rPr lang="de-DE" b="0" i="1" smtClean="0">
+                            <a:latin typeface="Cambria Math" panose="02040503050406030204" pitchFamily="18" charset="0"/>
+                          </a:rPr>
+                          <m:t>𝑣</m:t>
+                        </m:r>
+                      </m:e>
+                      <m:sub>
+                        <m:r>
+                          <a:rPr lang="de-DE" b="0" i="1" smtClean="0">
+                            <a:latin typeface="Cambria Math" panose="02040503050406030204" pitchFamily="18" charset="0"/>
+                          </a:rPr>
+                          <m:t>2</m:t>
+                        </m:r>
+                      </m:sub>
+                      <m:sup>
+                        <m:r>
+                          <a:rPr lang="de-DE" b="0" i="1" smtClean="0">
+                            <a:latin typeface="Cambria Math" panose="02040503050406030204" pitchFamily="18" charset="0"/>
+                          </a:rPr>
+                          <m:t>2</m:t>
+                        </m:r>
+                      </m:sup>
+                    </m:sSubSup>
+                    <m:r>
+                      <a:rPr lang="de-DE" b="0" i="1" smtClean="0">
+                        <a:latin typeface="Cambria Math" panose="02040503050406030204" pitchFamily="18" charset="0"/>
+                      </a:rPr>
+                      <m:t>=−</m:t>
+                    </m:r>
+                    <m:f>
+                      <m:fPr>
+                        <m:ctrlPr>
+                          <a:rPr lang="de-DE" b="0" i="1" smtClean="0">
+                            <a:latin typeface="Cambria Math" panose="02040503050406030204" pitchFamily="18" charset="0"/>
+                          </a:rPr>
+                        </m:ctrlPr>
+                      </m:fPr>
+                      <m:num>
+                        <m:r>
+                          <a:rPr lang="de-DE" b="0" i="1" smtClean="0">
+                            <a:latin typeface="Cambria Math" panose="02040503050406030204" pitchFamily="18" charset="0"/>
+                          </a:rPr>
+                          <m:t>𝐺</m:t>
+                        </m:r>
+                        <m:sSub>
+                          <m:sSubPr>
+                            <m:ctrlPr>
+                              <a:rPr lang="de-DE" b="0" i="1" smtClean="0">
+                                <a:latin typeface="Cambria Math" panose="02040503050406030204" pitchFamily="18" charset="0"/>
+                              </a:rPr>
+                            </m:ctrlPr>
+                          </m:sSubPr>
+                          <m:e>
+                            <m:r>
+                              <a:rPr lang="de-DE" b="0" i="1" smtClean="0">
+                                <a:latin typeface="Cambria Math" panose="02040503050406030204" pitchFamily="18" charset="0"/>
+                              </a:rPr>
+                              <m:t>𝑚</m:t>
+                            </m:r>
+                          </m:e>
+                          <m:sub>
+                            <m:r>
+                              <a:rPr lang="de-DE" b="0" i="1" smtClean="0">
+                                <a:latin typeface="Cambria Math" panose="02040503050406030204" pitchFamily="18" charset="0"/>
+                              </a:rPr>
+                              <m:t>1</m:t>
+                            </m:r>
+                          </m:sub>
+                        </m:sSub>
+                      </m:num>
+                      <m:den>
+                        <m:r>
+                          <a:rPr lang="de-DE" b="0" i="1" smtClean="0">
+                            <a:latin typeface="Cambria Math" panose="02040503050406030204" pitchFamily="18" charset="0"/>
+                          </a:rPr>
+                          <m:t>4</m:t>
+                        </m:r>
+                        <m:r>
+                          <a:rPr lang="de-DE" b="0" i="1" smtClean="0">
+                            <a:latin typeface="Cambria Math" panose="02040503050406030204" pitchFamily="18" charset="0"/>
+                          </a:rPr>
+                          <m:t>𝑟</m:t>
+                        </m:r>
+                      </m:den>
+                    </m:f>
+                  </m:oMath>
+                </a14:m>
                 <a:br>
                   <a:rPr lang="de-DE" dirty="0"/>
                 </a:br>
@@ -12864,6 +13432,108 @@
                   <a:rPr lang="de-DE" dirty="0" err="1"/>
                   <a:t>velocities</a:t>
                 </a:r>
+                <a:br>
+                  <a:rPr lang="de-DE" dirty="0"/>
+                </a:br>
+                <a14:m>
+                  <m:oMath xmlns:m="http://schemas.openxmlformats.org/officeDocument/2006/math">
+                    <m:r>
+                      <a:rPr lang="de-DE" b="0" i="1" smtClean="0">
+                        <a:latin typeface="Cambria Math" panose="02040503050406030204" pitchFamily="18" charset="0"/>
+                      </a:rPr>
+                      <m:t>𝑟</m:t>
+                    </m:r>
+                    <m:r>
+                      <a:rPr lang="de-DE" b="0" i="1" smtClean="0">
+                        <a:latin typeface="Cambria Math" panose="02040503050406030204" pitchFamily="18" charset="0"/>
+                      </a:rPr>
+                      <m:t>=</m:t>
+                    </m:r>
+                    <m:f>
+                      <m:fPr>
+                        <m:ctrlPr>
+                          <a:rPr lang="de-DE" b="0" i="1" smtClean="0">
+                            <a:latin typeface="Cambria Math" panose="02040503050406030204" pitchFamily="18" charset="0"/>
+                          </a:rPr>
+                        </m:ctrlPr>
+                      </m:fPr>
+                      <m:num>
+                        <m:r>
+                          <a:rPr lang="de-DE" b="0" i="1" smtClean="0">
+                            <a:latin typeface="Cambria Math" panose="02040503050406030204" pitchFamily="18" charset="0"/>
+                          </a:rPr>
+                          <m:t>𝐺</m:t>
+                        </m:r>
+                        <m:sSub>
+                          <m:sSubPr>
+                            <m:ctrlPr>
+                              <a:rPr lang="de-DE" b="0" i="1" smtClean="0">
+                                <a:latin typeface="Cambria Math" panose="02040503050406030204" pitchFamily="18" charset="0"/>
+                              </a:rPr>
+                            </m:ctrlPr>
+                          </m:sSubPr>
+                          <m:e>
+                            <m:r>
+                              <a:rPr lang="de-DE" b="0" i="1" smtClean="0">
+                                <a:latin typeface="Cambria Math" panose="02040503050406030204" pitchFamily="18" charset="0"/>
+                              </a:rPr>
+                              <m:t>𝑚</m:t>
+                            </m:r>
+                          </m:e>
+                          <m:sub>
+                            <m:r>
+                              <a:rPr lang="de-DE" b="0" i="1" smtClean="0">
+                                <a:latin typeface="Cambria Math" panose="02040503050406030204" pitchFamily="18" charset="0"/>
+                              </a:rPr>
+                              <m:t>2</m:t>
+                            </m:r>
+                          </m:sub>
+                        </m:sSub>
+                      </m:num>
+                      <m:den>
+                        <m:sSubSup>
+                          <m:sSubSupPr>
+                            <m:ctrlPr>
+                              <a:rPr lang="de-DE" b="0" i="1" smtClean="0">
+                                <a:latin typeface="Cambria Math" panose="02040503050406030204" pitchFamily="18" charset="0"/>
+                              </a:rPr>
+                            </m:ctrlPr>
+                          </m:sSubSupPr>
+                          <m:e>
+                            <m:r>
+                              <a:rPr lang="de-DE" b="0" i="1" smtClean="0">
+                                <a:latin typeface="Cambria Math" panose="02040503050406030204" pitchFamily="18" charset="0"/>
+                              </a:rPr>
+                              <m:t>4</m:t>
+                            </m:r>
+                            <m:r>
+                              <a:rPr lang="de-DE" b="0" i="1" smtClean="0">
+                                <a:latin typeface="Cambria Math" panose="02040503050406030204" pitchFamily="18" charset="0"/>
+                              </a:rPr>
+                              <m:t>𝑣</m:t>
+                            </m:r>
+                          </m:e>
+                          <m:sub>
+                            <m:r>
+                              <a:rPr lang="de-DE" b="0" i="1" smtClean="0">
+                                <a:latin typeface="Cambria Math" panose="02040503050406030204" pitchFamily="18" charset="0"/>
+                              </a:rPr>
+                              <m:t>1</m:t>
+                            </m:r>
+                          </m:sub>
+                          <m:sup>
+                            <m:r>
+                              <a:rPr lang="de-DE" b="0" i="1" smtClean="0">
+                                <a:latin typeface="Cambria Math" panose="02040503050406030204" pitchFamily="18" charset="0"/>
+                              </a:rPr>
+                              <m:t>2</m:t>
+                            </m:r>
+                          </m:sup>
+                        </m:sSubSup>
+                      </m:den>
+                    </m:f>
+                  </m:oMath>
+                </a14:m>
                 <a:endParaRPr lang="de-DE" dirty="0"/>
               </a:p>
               <a:p>
@@ -12901,7 +13571,7 @@
                 </a:r>
                 <a:r>
                   <a:rPr lang="de-DE" dirty="0" err="1"/>
-                  <a:t>volcity</a:t>
+                  <a:t>velocity</a:t>
                 </a:r>
                 <a:r>
                   <a:rPr lang="de-DE" dirty="0"/>
@@ -12943,6 +13613,113 @@
                   <a:rPr lang="de-DE" dirty="0" err="1"/>
                   <a:t>distance</a:t>
                 </a:r>
+                <a:br>
+                  <a:rPr lang="de-DE" dirty="0"/>
+                </a:br>
+                <a14:m>
+                  <m:oMath xmlns:m="http://schemas.openxmlformats.org/officeDocument/2006/math">
+                    <m:sSub>
+                      <m:sSubPr>
+                        <m:ctrlPr>
+                          <a:rPr lang="de-DE" b="0" i="1" smtClean="0">
+                            <a:latin typeface="Cambria Math" panose="02040503050406030204" pitchFamily="18" charset="0"/>
+                          </a:rPr>
+                        </m:ctrlPr>
+                      </m:sSubPr>
+                      <m:e>
+                        <m:r>
+                          <a:rPr lang="de-DE" b="0" i="1" smtClean="0">
+                            <a:latin typeface="Cambria Math" panose="02040503050406030204" pitchFamily="18" charset="0"/>
+                          </a:rPr>
+                          <m:t>𝑣</m:t>
+                        </m:r>
+                      </m:e>
+                      <m:sub>
+                        <m:r>
+                          <a:rPr lang="de-DE" b="0" i="1" smtClean="0">
+                            <a:latin typeface="Cambria Math" panose="02040503050406030204" pitchFamily="18" charset="0"/>
+                          </a:rPr>
+                          <m:t>1</m:t>
+                        </m:r>
+                      </m:sub>
+                    </m:sSub>
+                    <m:r>
+                      <a:rPr lang="de-DE" i="1">
+                        <a:latin typeface="Cambria Math" panose="02040503050406030204" pitchFamily="18" charset="0"/>
+                      </a:rPr>
+                      <m:t>=</m:t>
+                    </m:r>
+                    <m:rad>
+                      <m:radPr>
+                        <m:degHide m:val="on"/>
+                        <m:ctrlPr>
+                          <a:rPr lang="de-DE" b="0" i="1" smtClean="0">
+                            <a:latin typeface="Cambria Math" panose="02040503050406030204" pitchFamily="18" charset="0"/>
+                          </a:rPr>
+                        </m:ctrlPr>
+                      </m:radPr>
+                      <m:deg/>
+                      <m:e>
+                        <m:f>
+                          <m:fPr>
+                            <m:ctrlPr>
+                              <a:rPr lang="de-DE" i="1">
+                                <a:latin typeface="Cambria Math" panose="02040503050406030204" pitchFamily="18" charset="0"/>
+                              </a:rPr>
+                            </m:ctrlPr>
+                          </m:fPr>
+                          <m:num>
+                            <m:r>
+                              <a:rPr lang="de-DE" i="1">
+                                <a:latin typeface="Cambria Math" panose="02040503050406030204" pitchFamily="18" charset="0"/>
+                              </a:rPr>
+                              <m:t>𝐺</m:t>
+                            </m:r>
+                            <m:sSub>
+                              <m:sSubPr>
+                                <m:ctrlPr>
+                                  <a:rPr lang="de-DE" i="1">
+                                    <a:latin typeface="Cambria Math" panose="02040503050406030204" pitchFamily="18" charset="0"/>
+                                  </a:rPr>
+                                </m:ctrlPr>
+                              </m:sSubPr>
+                              <m:e>
+                                <m:r>
+                                  <a:rPr lang="de-DE" i="1">
+                                    <a:latin typeface="Cambria Math" panose="02040503050406030204" pitchFamily="18" charset="0"/>
+                                  </a:rPr>
+                                  <m:t>𝑚</m:t>
+                                </m:r>
+                              </m:e>
+                              <m:sub>
+                                <m:r>
+                                  <a:rPr lang="de-DE" i="1">
+                                    <a:latin typeface="Cambria Math" panose="02040503050406030204" pitchFamily="18" charset="0"/>
+                                  </a:rPr>
+                                  <m:t>2</m:t>
+                                </m:r>
+                              </m:sub>
+                            </m:sSub>
+                          </m:num>
+                          <m:den>
+                            <m:r>
+                              <a:rPr lang="de-DE" i="1">
+                                <a:latin typeface="Cambria Math" panose="02040503050406030204" pitchFamily="18" charset="0"/>
+                              </a:rPr>
+                              <m:t>4</m:t>
+                            </m:r>
+                            <m:r>
+                              <a:rPr lang="de-DE" i="1">
+                                <a:latin typeface="Cambria Math" panose="02040503050406030204" pitchFamily="18" charset="0"/>
+                              </a:rPr>
+                              <m:t>𝑟</m:t>
+                            </m:r>
+                          </m:den>
+                        </m:f>
+                      </m:e>
+                    </m:rad>
+                  </m:oMath>
+                </a14:m>
                 <a:endParaRPr lang="de-DE" dirty="0"/>
               </a:p>
               <a:p>
@@ -12996,7 +13773,7 @@
                 </a:r>
                 <a:r>
                   <a:rPr lang="de-DE" dirty="0" err="1"/>
-                  <a:t>vodies</a:t>
+                  <a:t>bodies</a:t>
                 </a:r>
                 <a:r>
                   <a:rPr lang="de-DE" dirty="0"/>
@@ -13038,7 +13815,250 @@
                   <a:rPr lang="de-DE" dirty="0" err="1"/>
                   <a:t>velocities</a:t>
                 </a:r>
+                <a:br>
+                  <a:rPr lang="de-DE" dirty="0"/>
+                </a:br>
+                <a14:m>
+                  <m:oMath xmlns:m="http://schemas.openxmlformats.org/officeDocument/2006/math">
+                    <m:sSub>
+                      <m:sSubPr>
+                        <m:ctrlPr>
+                          <a:rPr lang="de-DE" b="0" i="1" smtClean="0">
+                            <a:latin typeface="Cambria Math" panose="02040503050406030204" pitchFamily="18" charset="0"/>
+                          </a:rPr>
+                        </m:ctrlPr>
+                      </m:sSubPr>
+                      <m:e>
+                        <m:r>
+                          <a:rPr lang="de-DE" b="0" i="1" smtClean="0">
+                            <a:latin typeface="Cambria Math" panose="02040503050406030204" pitchFamily="18" charset="0"/>
+                          </a:rPr>
+                          <m:t>𝑚</m:t>
+                        </m:r>
+                      </m:e>
+                      <m:sub>
+                        <m:r>
+                          <a:rPr lang="de-DE" b="0" i="1" smtClean="0">
+                            <a:latin typeface="Cambria Math" panose="02040503050406030204" pitchFamily="18" charset="0"/>
+                          </a:rPr>
+                          <m:t>2</m:t>
+                        </m:r>
+                      </m:sub>
+                    </m:sSub>
+                    <m:r>
+                      <a:rPr lang="de-DE" b="0" i="1" smtClean="0">
+                        <a:latin typeface="Cambria Math" panose="02040503050406030204" pitchFamily="18" charset="0"/>
+                      </a:rPr>
+                      <m:t>=</m:t>
+                    </m:r>
+                    <m:f>
+                      <m:fPr>
+                        <m:ctrlPr>
+                          <a:rPr lang="de-DE" b="0" i="1" smtClean="0">
+                            <a:latin typeface="Cambria Math" panose="02040503050406030204" pitchFamily="18" charset="0"/>
+                          </a:rPr>
+                        </m:ctrlPr>
+                      </m:fPr>
+                      <m:num>
+                        <m:r>
+                          <a:rPr lang="de-DE" b="0" i="1" smtClean="0">
+                            <a:latin typeface="Cambria Math" panose="02040503050406030204" pitchFamily="18" charset="0"/>
+                          </a:rPr>
+                          <m:t>4</m:t>
+                        </m:r>
+                        <m:r>
+                          <a:rPr lang="de-DE" b="0" i="1" smtClean="0">
+                            <a:latin typeface="Cambria Math" panose="02040503050406030204" pitchFamily="18" charset="0"/>
+                          </a:rPr>
+                          <m:t>𝑟</m:t>
+                        </m:r>
+                        <m:sSubSup>
+                          <m:sSubSupPr>
+                            <m:ctrlPr>
+                              <a:rPr lang="de-DE" b="0" i="1" smtClean="0">
+                                <a:latin typeface="Cambria Math" panose="02040503050406030204" pitchFamily="18" charset="0"/>
+                              </a:rPr>
+                            </m:ctrlPr>
+                          </m:sSubSupPr>
+                          <m:e>
+                            <m:r>
+                              <a:rPr lang="de-DE" b="0" i="1" smtClean="0">
+                                <a:latin typeface="Cambria Math" panose="02040503050406030204" pitchFamily="18" charset="0"/>
+                              </a:rPr>
+                              <m:t>𝑣</m:t>
+                            </m:r>
+                          </m:e>
+                          <m:sub>
+                            <m:r>
+                              <a:rPr lang="de-DE" b="0" i="1" smtClean="0">
+                                <a:latin typeface="Cambria Math" panose="02040503050406030204" pitchFamily="18" charset="0"/>
+                              </a:rPr>
+                              <m:t>1</m:t>
+                            </m:r>
+                          </m:sub>
+                          <m:sup>
+                            <m:r>
+                              <a:rPr lang="de-DE" b="0" i="1" smtClean="0">
+                                <a:latin typeface="Cambria Math" panose="02040503050406030204" pitchFamily="18" charset="0"/>
+                              </a:rPr>
+                              <m:t>2</m:t>
+                            </m:r>
+                          </m:sup>
+                        </m:sSubSup>
+                      </m:num>
+                      <m:den>
+                        <m:r>
+                          <a:rPr lang="de-DE" b="0" i="1" smtClean="0">
+                            <a:latin typeface="Cambria Math" panose="02040503050406030204" pitchFamily="18" charset="0"/>
+                          </a:rPr>
+                          <m:t>𝐺</m:t>
+                        </m:r>
+                      </m:den>
+                    </m:f>
+                    <m:r>
+                      <a:rPr lang="de-DE" b="0" i="1" smtClean="0">
+                        <a:latin typeface="Cambria Math" panose="02040503050406030204" pitchFamily="18" charset="0"/>
+                      </a:rPr>
+                      <m:t>=</m:t>
+                    </m:r>
+                    <m:sSub>
+                      <m:sSubPr>
+                        <m:ctrlPr>
+                          <a:rPr lang="de-DE" b="0" i="1" smtClean="0">
+                            <a:latin typeface="Cambria Math" panose="02040503050406030204" pitchFamily="18" charset="0"/>
+                          </a:rPr>
+                        </m:ctrlPr>
+                      </m:sSubPr>
+                      <m:e>
+                        <m:r>
+                          <a:rPr lang="de-DE" b="0" i="1" smtClean="0">
+                            <a:latin typeface="Cambria Math" panose="02040503050406030204" pitchFamily="18" charset="0"/>
+                          </a:rPr>
+                          <m:t>𝑚</m:t>
+                        </m:r>
+                      </m:e>
+                      <m:sub>
+                        <m:r>
+                          <a:rPr lang="de-DE" b="0" i="1" smtClean="0">
+                            <a:latin typeface="Cambria Math" panose="02040503050406030204" pitchFamily="18" charset="0"/>
+                          </a:rPr>
+                          <m:t>1</m:t>
+                        </m:r>
+                      </m:sub>
+                    </m:sSub>
+                  </m:oMath>
+                </a14:m>
                 <a:endParaRPr lang="de-DE" dirty="0"/>
+              </a:p>
+              <a:p>
+                <a:pPr>
+                  <a:lnSpc>
+                    <a:spcPct val="107000"/>
+                  </a:lnSpc>
+                  <a:spcAft>
+                    <a:spcPts val="800"/>
+                  </a:spcAft>
+                </a:pPr>
+                <a:r>
+                  <a:rPr lang="de-DE" dirty="0" err="1"/>
+                  <a:t>For</a:t>
+                </a:r>
+                <a:r>
+                  <a:rPr lang="de-DE" dirty="0"/>
+                  <a:t> </a:t>
+                </a:r>
+                <a:r>
+                  <a:rPr lang="de-DE" dirty="0" err="1"/>
+                  <a:t>elliptical</a:t>
+                </a:r>
+                <a:r>
+                  <a:rPr lang="de-DE" dirty="0"/>
+                  <a:t> </a:t>
+                </a:r>
+                <a:r>
+                  <a:rPr lang="de-DE" dirty="0" err="1"/>
+                  <a:t>orbits</a:t>
+                </a:r>
+                <a:r>
+                  <a:rPr lang="de-DE" dirty="0"/>
+                  <a:t> </a:t>
+                </a:r>
+                <a:r>
+                  <a:rPr lang="de-DE" dirty="0" err="1"/>
+                  <a:t>obviously</a:t>
+                </a:r>
+                <a:r>
+                  <a:rPr lang="de-DE" dirty="0"/>
+                  <a:t> </a:t>
+                </a:r>
+                <a:r>
+                  <a:rPr lang="de-DE" dirty="0" err="1"/>
+                  <a:t>choose</a:t>
+                </a:r>
+                <a:r>
+                  <a:rPr lang="de-DE" dirty="0"/>
+                  <a:t> </a:t>
+                </a:r>
+              </a:p>
+              <a:p>
+                <a:pPr lvl="1">
+                  <a:lnSpc>
+                    <a:spcPct val="107000"/>
+                  </a:lnSpc>
+                  <a:spcAft>
+                    <a:spcPts val="800"/>
+                  </a:spcAft>
+                </a:pPr>
+                <a:r>
+                  <a:rPr lang="de-DE" dirty="0" err="1"/>
+                  <a:t>smaller</a:t>
+                </a:r>
+                <a:r>
+                  <a:rPr lang="de-DE" dirty="0"/>
+                  <a:t> </a:t>
+                </a:r>
+                <a:r>
+                  <a:rPr lang="de-DE" dirty="0" err="1"/>
+                  <a:t>velocities</a:t>
+                </a:r>
+                <a:endParaRPr lang="de-DE" dirty="0"/>
+              </a:p>
+              <a:p>
+                <a:pPr lvl="1">
+                  <a:lnSpc>
+                    <a:spcPct val="107000"/>
+                  </a:lnSpc>
+                  <a:spcAft>
+                    <a:spcPts val="800"/>
+                  </a:spcAft>
+                </a:pPr>
+                <a:r>
+                  <a:rPr lang="de-DE" dirty="0" err="1"/>
+                  <a:t>bigger</a:t>
+                </a:r>
+                <a:r>
+                  <a:rPr lang="de-DE" dirty="0"/>
+                  <a:t> </a:t>
+                </a:r>
+                <a:r>
+                  <a:rPr lang="de-DE" dirty="0" err="1"/>
+                  <a:t>masses</a:t>
+                </a:r>
+                <a:endParaRPr lang="de-DE" dirty="0"/>
+              </a:p>
+              <a:p>
+                <a:pPr lvl="1">
+                  <a:lnSpc>
+                    <a:spcPct val="107000"/>
+                  </a:lnSpc>
+                  <a:spcAft>
+                    <a:spcPts val="800"/>
+                  </a:spcAft>
+                </a:pPr>
+                <a:r>
+                  <a:rPr lang="de-DE" dirty="0"/>
+                  <a:t>larger radii</a:t>
+                </a:r>
               </a:p>
             </p:txBody>
           </p:sp>
@@ -13062,13 +14082,13 @@
             </p:nvSpPr>
             <p:spPr>
               <a:xfrm>
-                <a:off x="938867" y="575410"/>
-                <a:ext cx="6313805" cy="5238161"/>
+                <a:off x="92278" y="159391"/>
+                <a:ext cx="8119279" cy="6560191"/>
               </a:xfrm>
               <a:blipFill>
                 <a:blip r:embed="rId2"/>
                 <a:stretch>
-                  <a:fillRect l="-1931" t="-1860" r="-1448"/>
+                  <a:fillRect l="-751" t="-1673"/>
                 </a:stretch>
               </a:blipFill>
             </p:spPr>
@@ -13101,7 +14121,7 @@
         </p:nvGrpSpPr>
         <p:grpSpPr>
           <a:xfrm>
-            <a:off x="7377344" y="2251600"/>
+            <a:off x="8325300" y="456356"/>
             <a:ext cx="3603844" cy="2736154"/>
             <a:chOff x="45656" y="210236"/>
             <a:chExt cx="1544260" cy="1172452"/>
@@ -13380,8 +14400,8 @@
             </a:fontRef>
           </p:style>
         </p:cxnSp>
-        <mc:AlternateContent xmlns:mc="http://schemas.openxmlformats.org/markup-compatibility/2006">
-          <mc:Choice xmlns:a14="http://schemas.microsoft.com/office/drawing/2010/main" Requires="a14">
+        <mc:AlternateContent xmlns:mc="http://schemas.openxmlformats.org/markup-compatibility/2006" xmlns:a14="http://schemas.microsoft.com/office/drawing/2010/main">
+          <mc:Choice Requires="a14">
             <p:sp>
               <p:nvSpPr>
                 <p:cNvPr id="12" name="Textfeld 30">
@@ -13452,7 +14472,7 @@
               </p:txBody>
             </p:sp>
           </mc:Choice>
-          <mc:Fallback>
+          <mc:Fallback xmlns="">
             <p:sp>
               <p:nvSpPr>
                 <p:cNvPr id="12" name="Textfeld 30">
@@ -13500,8 +14520,8 @@
             </p:sp>
           </mc:Fallback>
         </mc:AlternateContent>
-        <mc:AlternateContent xmlns:mc="http://schemas.openxmlformats.org/markup-compatibility/2006">
-          <mc:Choice xmlns:a14="http://schemas.microsoft.com/office/drawing/2010/main" Requires="a14">
+        <mc:AlternateContent xmlns:mc="http://schemas.openxmlformats.org/markup-compatibility/2006" xmlns:a14="http://schemas.microsoft.com/office/drawing/2010/main">
+          <mc:Choice Requires="a14">
             <p:sp>
               <p:nvSpPr>
                 <p:cNvPr id="13" name="Textfeld 31">
@@ -13597,7 +14617,7 @@
               </p:txBody>
             </p:sp>
           </mc:Choice>
-          <mc:Fallback>
+          <mc:Fallback xmlns="">
             <p:sp>
               <p:nvSpPr>
                 <p:cNvPr id="13" name="Textfeld 31">
@@ -13645,8 +14665,8 @@
             </p:sp>
           </mc:Fallback>
         </mc:AlternateContent>
-        <mc:AlternateContent xmlns:mc="http://schemas.openxmlformats.org/markup-compatibility/2006">
-          <mc:Choice xmlns:a14="http://schemas.microsoft.com/office/drawing/2010/main" Requires="a14">
+        <mc:AlternateContent xmlns:mc="http://schemas.openxmlformats.org/markup-compatibility/2006" xmlns:a14="http://schemas.microsoft.com/office/drawing/2010/main">
+          <mc:Choice Requires="a14">
             <p:sp>
               <p:nvSpPr>
                 <p:cNvPr id="14" name="Textfeld 31">
@@ -13742,7 +14762,7 @@
               </p:txBody>
             </p:sp>
           </mc:Choice>
-          <mc:Fallback>
+          <mc:Fallback xmlns="">
             <p:sp>
               <p:nvSpPr>
                 <p:cNvPr id="14" name="Textfeld 31">
@@ -13790,8 +14810,8 @@
             </p:sp>
           </mc:Fallback>
         </mc:AlternateContent>
-        <mc:AlternateContent xmlns:mc="http://schemas.openxmlformats.org/markup-compatibility/2006">
-          <mc:Choice xmlns:a14="http://schemas.microsoft.com/office/drawing/2010/main" Requires="a14">
+        <mc:AlternateContent xmlns:mc="http://schemas.openxmlformats.org/markup-compatibility/2006" xmlns:a14="http://schemas.microsoft.com/office/drawing/2010/main">
+          <mc:Choice Requires="a14">
             <p:sp>
               <p:nvSpPr>
                 <p:cNvPr id="15" name="Textfeld 31">
@@ -13887,7 +14907,7 @@
               </p:txBody>
             </p:sp>
           </mc:Choice>
-          <mc:Fallback>
+          <mc:Fallback xmlns="">
             <p:sp>
               <p:nvSpPr>
                 <p:cNvPr id="15" name="Textfeld 31">
@@ -13935,8 +14955,8 @@
             </p:sp>
           </mc:Fallback>
         </mc:AlternateContent>
-        <mc:AlternateContent xmlns:mc="http://schemas.openxmlformats.org/markup-compatibility/2006">
-          <mc:Choice xmlns:a14="http://schemas.microsoft.com/office/drawing/2010/main" Requires="a14">
+        <mc:AlternateContent xmlns:mc="http://schemas.openxmlformats.org/markup-compatibility/2006" xmlns:a14="http://schemas.microsoft.com/office/drawing/2010/main">
+          <mc:Choice Requires="a14">
             <p:sp>
               <p:nvSpPr>
                 <p:cNvPr id="16" name="Textfeld 31">
@@ -14032,7 +15052,7 @@
               </p:txBody>
             </p:sp>
           </mc:Choice>
-          <mc:Fallback>
+          <mc:Fallback xmlns="">
             <p:sp>
               <p:nvSpPr>
                 <p:cNvPr id="16" name="Textfeld 31">
@@ -14085,6 +15105,733 @@
     <p:extLst>
       <p:ext uri="{BB962C8B-B14F-4D97-AF65-F5344CB8AC3E}">
         <p14:creationId xmlns:p14="http://schemas.microsoft.com/office/powerpoint/2010/main" val="4189462151"/>
+      </p:ext>
+    </p:extLst>
+  </p:cSld>
+  <p:clrMapOvr>
+    <a:masterClrMapping/>
+  </p:clrMapOvr>
+</p:sld>
+</file>
+
+<file path=ppt/slides/slide7.xml><?xml version="1.0" encoding="utf-8"?>
+<p:sld xmlns:a="http://schemas.openxmlformats.org/drawingml/2006/main" xmlns:r="http://schemas.openxmlformats.org/officeDocument/2006/relationships" xmlns:p="http://schemas.openxmlformats.org/presentationml/2006/main">
+  <p:cSld>
+    <p:spTree>
+      <p:nvGrpSpPr>
+        <p:cNvPr id="1" name=""/>
+        <p:cNvGrpSpPr/>
+        <p:nvPr/>
+      </p:nvGrpSpPr>
+      <p:grpSpPr>
+        <a:xfrm>
+          <a:off x="0" y="0"/>
+          <a:ext cx="0" cy="0"/>
+          <a:chOff x="0" y="0"/>
+          <a:chExt cx="0" cy="0"/>
+        </a:xfrm>
+      </p:grpSpPr>
+      <mc:AlternateContent xmlns:mc="http://schemas.openxmlformats.org/markup-compatibility/2006">
+        <mc:Choice xmlns:a14="http://schemas.microsoft.com/office/drawing/2010/main" Requires="a14">
+          <p:sp>
+            <p:nvSpPr>
+              <p:cNvPr id="3" name="Inhaltsplatzhalter 2">
+                <a:extLst>
+                  <a:ext uri="{FF2B5EF4-FFF2-40B4-BE49-F238E27FC236}">
+                    <a16:creationId xmlns:a16="http://schemas.microsoft.com/office/drawing/2014/main" id="{3B1A83BB-2485-4102-8DD6-1897273AC4F1}"/>
+                  </a:ext>
+                </a:extLst>
+              </p:cNvPr>
+              <p:cNvSpPr>
+                <a:spLocks noGrp="1"/>
+              </p:cNvSpPr>
+              <p:nvPr>
+                <p:ph idx="1"/>
+              </p:nvPr>
+            </p:nvSpPr>
+            <p:spPr>
+              <a:xfrm>
+                <a:off x="838200" y="352338"/>
+                <a:ext cx="10515600" cy="5824625"/>
+              </a:xfrm>
+            </p:spPr>
+            <p:txBody>
+              <a:bodyPr/>
+              <a:lstStyle/>
+              <a:p>
+                <a:pPr marL="0" indent="0">
+                  <a:buNone/>
+                </a:pPr>
+                <a:r>
+                  <a:rPr lang="de-DE" b="1" dirty="0"/>
+                  <a:t>Decreasing </a:t>
+                </a:r>
+                <a:r>
+                  <a:rPr lang="de-DE" b="1" dirty="0" err="1"/>
+                  <a:t>calculation</a:t>
+                </a:r>
+                <a:r>
+                  <a:rPr lang="de-DE" b="1" dirty="0"/>
+                  <a:t> time </a:t>
+                </a:r>
+                <a:r>
+                  <a:rPr lang="de-DE" b="1" dirty="0" err="1"/>
+                  <a:t>by</a:t>
+                </a:r>
+                <a:r>
+                  <a:rPr lang="de-DE" b="1" dirty="0"/>
+                  <a:t> </a:t>
+                </a:r>
+                <a:r>
+                  <a:rPr lang="de-DE" b="1" dirty="0" err="1"/>
+                  <a:t>improving</a:t>
+                </a:r>
+                <a:r>
+                  <a:rPr lang="de-DE" b="1" dirty="0"/>
+                  <a:t> </a:t>
+                </a:r>
+                <a:r>
+                  <a:rPr lang="de-DE" b="1" dirty="0" err="1"/>
+                  <a:t>numerics</a:t>
+                </a:r>
+                <a:endParaRPr lang="de-DE" b="1" dirty="0"/>
+              </a:p>
+              <a:p>
+                <a:r>
+                  <a:rPr lang="de-DE" dirty="0"/>
+                  <a:t>Simulink </a:t>
+                </a:r>
+                <a:r>
+                  <a:rPr lang="de-DE" dirty="0" err="1"/>
+                  <a:t>integrators</a:t>
+                </a:r>
+                <a:r>
+                  <a:rPr lang="de-DE" dirty="0"/>
+                  <a:t> </a:t>
+                </a:r>
+                <a:r>
+                  <a:rPr lang="de-DE" dirty="0" err="1"/>
+                  <a:t>work</a:t>
+                </a:r>
+                <a:r>
+                  <a:rPr lang="de-DE" dirty="0"/>
+                  <a:t> </a:t>
+                </a:r>
+                <a:r>
+                  <a:rPr lang="de-DE" dirty="0" err="1"/>
+                  <a:t>with</a:t>
+                </a:r>
+                <a:r>
+                  <a:rPr lang="de-DE" dirty="0"/>
+                  <a:t> 64bit </a:t>
+                </a:r>
+                <a:r>
+                  <a:rPr lang="de-DE" dirty="0" err="1"/>
+                  <a:t>floating</a:t>
+                </a:r>
+                <a:r>
+                  <a:rPr lang="de-DE" dirty="0"/>
+                  <a:t> </a:t>
+                </a:r>
+                <a:r>
+                  <a:rPr lang="de-DE" dirty="0" err="1"/>
+                  <a:t>point</a:t>
+                </a:r>
+                <a:r>
+                  <a:rPr lang="de-DE" dirty="0"/>
+                  <a:t> </a:t>
+                </a:r>
+                <a:r>
+                  <a:rPr lang="de-DE" dirty="0" err="1"/>
+                  <a:t>numbers</a:t>
+                </a:r>
+                <a:r>
+                  <a:rPr lang="de-DE" dirty="0"/>
+                  <a:t> </a:t>
+                </a:r>
+                <a:r>
+                  <a:rPr lang="de-DE" dirty="0" err="1"/>
+                  <a:t>that</a:t>
+                </a:r>
+                <a:r>
+                  <a:rPr lang="de-DE" dirty="0"/>
+                  <a:t> </a:t>
+                </a:r>
+                <a:r>
+                  <a:rPr lang="de-DE" dirty="0" err="1"/>
+                  <a:t>have</a:t>
+                </a:r>
+                <a:r>
+                  <a:rPr lang="de-DE" dirty="0"/>
+                  <a:t> </a:t>
+                </a:r>
+                <a:r>
+                  <a:rPr lang="de-DE" dirty="0" err="1"/>
+                  <a:t>the</a:t>
+                </a:r>
+                <a:r>
+                  <a:rPr lang="de-DE" dirty="0"/>
+                  <a:t> </a:t>
+                </a:r>
+                <a:r>
+                  <a:rPr lang="de-DE" dirty="0" err="1"/>
+                  <a:t>best</a:t>
+                </a:r>
+                <a:r>
+                  <a:rPr lang="de-DE" dirty="0"/>
+                  <a:t> </a:t>
+                </a:r>
+                <a:r>
+                  <a:rPr lang="de-DE" dirty="0" err="1"/>
+                  <a:t>accuracy</a:t>
+                </a:r>
+                <a:r>
+                  <a:rPr lang="de-DE" dirty="0"/>
+                  <a:t> </a:t>
+                </a:r>
+                <a:r>
+                  <a:rPr lang="de-DE" dirty="0" err="1"/>
+                  <a:t>around</a:t>
+                </a:r>
+                <a:r>
+                  <a:rPr lang="de-DE" dirty="0"/>
+                  <a:t> 1.0</a:t>
+                </a:r>
+              </a:p>
+              <a:p>
+                <a:r>
+                  <a:rPr lang="de-DE" dirty="0" err="1"/>
+                  <a:t>For</a:t>
+                </a:r>
+                <a:r>
+                  <a:rPr lang="de-DE" dirty="0"/>
+                  <a:t> large </a:t>
+                </a:r>
+                <a:r>
+                  <a:rPr lang="de-DE" dirty="0" err="1"/>
+                  <a:t>numbers</a:t>
+                </a:r>
+                <a:r>
+                  <a:rPr lang="de-DE" dirty="0"/>
+                  <a:t> </a:t>
+                </a:r>
+                <a:r>
+                  <a:rPr lang="de-DE" dirty="0" err="1"/>
+                  <a:t>the</a:t>
+                </a:r>
+                <a:r>
+                  <a:rPr lang="de-DE" dirty="0"/>
+                  <a:t> </a:t>
+                </a:r>
+                <a:r>
+                  <a:rPr lang="de-DE" dirty="0" err="1"/>
+                  <a:t>accuracy</a:t>
+                </a:r>
+                <a:r>
+                  <a:rPr lang="de-DE" dirty="0"/>
+                  <a:t> </a:t>
+                </a:r>
+                <a:r>
+                  <a:rPr lang="de-DE" dirty="0" err="1"/>
+                  <a:t>of</a:t>
+                </a:r>
+                <a:r>
+                  <a:rPr lang="de-DE" dirty="0"/>
+                  <a:t> </a:t>
+                </a:r>
+                <a:r>
+                  <a:rPr lang="de-DE" dirty="0" err="1"/>
+                  <a:t>the</a:t>
+                </a:r>
+                <a:r>
+                  <a:rPr lang="de-DE" dirty="0"/>
+                  <a:t> </a:t>
+                </a:r>
+                <a:r>
+                  <a:rPr lang="de-DE" dirty="0" err="1"/>
+                  <a:t>integrators</a:t>
+                </a:r>
+                <a:r>
+                  <a:rPr lang="de-DE" dirty="0"/>
+                  <a:t> </a:t>
+                </a:r>
+                <a:r>
+                  <a:rPr lang="de-DE" dirty="0" err="1"/>
+                  <a:t>decrease</a:t>
+                </a:r>
+                <a:endParaRPr lang="de-DE" dirty="0"/>
+              </a:p>
+              <a:p>
+                <a:r>
+                  <a:rPr lang="de-DE" dirty="0" err="1"/>
+                  <a:t>Therefore</a:t>
+                </a:r>
+                <a:r>
+                  <a:rPr lang="de-DE" dirty="0"/>
+                  <a:t>: </a:t>
+                </a:r>
+                <a:r>
+                  <a:rPr lang="de-DE" dirty="0" err="1"/>
+                  <a:t>Scaling</a:t>
+                </a:r>
+                <a:r>
+                  <a:rPr lang="de-DE" dirty="0"/>
+                  <a:t> </a:t>
+                </a:r>
+                <a:r>
+                  <a:rPr lang="de-DE" dirty="0" err="1"/>
+                  <a:t>the</a:t>
+                </a:r>
+                <a:r>
+                  <a:rPr lang="de-DE" dirty="0"/>
+                  <a:t> </a:t>
+                </a:r>
+                <a:r>
+                  <a:rPr lang="de-DE" dirty="0" err="1"/>
+                  <a:t>input</a:t>
+                </a:r>
+                <a:r>
+                  <a:rPr lang="de-DE" dirty="0"/>
+                  <a:t> </a:t>
+                </a:r>
+                <a:r>
+                  <a:rPr lang="de-DE" dirty="0" err="1"/>
+                  <a:t>to</a:t>
+                </a:r>
+                <a:r>
+                  <a:rPr lang="de-DE" dirty="0"/>
+                  <a:t> (</a:t>
+                </a:r>
+                <a:r>
+                  <a:rPr lang="de-DE" dirty="0" err="1"/>
+                  <a:t>especially</a:t>
+                </a:r>
+                <a:r>
+                  <a:rPr lang="de-DE" dirty="0"/>
+                  <a:t>) </a:t>
+                </a:r>
+                <a:r>
+                  <a:rPr lang="de-DE" dirty="0" err="1"/>
+                  <a:t>the</a:t>
+                </a:r>
+                <a:r>
+                  <a:rPr lang="de-DE" dirty="0"/>
+                  <a:t> </a:t>
+                </a:r>
+                <a:r>
+                  <a:rPr lang="de-DE" dirty="0" err="1"/>
+                  <a:t>position</a:t>
+                </a:r>
+                <a:r>
+                  <a:rPr lang="de-DE" dirty="0"/>
+                  <a:t> </a:t>
+                </a:r>
+                <a:r>
+                  <a:rPr lang="de-DE" dirty="0" err="1"/>
+                  <a:t>integrator</a:t>
+                </a:r>
+                <a:r>
+                  <a:rPr lang="de-DE" dirty="0"/>
+                  <a:t> and </a:t>
+                </a:r>
+                <a:r>
+                  <a:rPr lang="de-DE" dirty="0" err="1"/>
+                  <a:t>rescaling</a:t>
+                </a:r>
+                <a:r>
+                  <a:rPr lang="de-DE" dirty="0"/>
+                  <a:t> at ist </a:t>
+                </a:r>
+                <a:r>
+                  <a:rPr lang="de-DE" dirty="0" err="1"/>
+                  <a:t>output</a:t>
+                </a:r>
+                <a:r>
+                  <a:rPr lang="de-DE" dirty="0"/>
+                  <a:t> </a:t>
+                </a:r>
+                <a:r>
+                  <a:rPr lang="de-DE" dirty="0" err="1"/>
+                  <a:t>makes</a:t>
+                </a:r>
+                <a:r>
+                  <a:rPr lang="de-DE" dirty="0"/>
+                  <a:t> sense:</a:t>
+                </a:r>
+              </a:p>
+              <a:p>
+                <a:r>
+                  <a:rPr lang="de-DE" dirty="0"/>
+                  <a:t>The </a:t>
+                </a:r>
+                <a:r>
+                  <a:rPr lang="de-DE" dirty="0" err="1"/>
+                  <a:t>dynamic</a:t>
+                </a:r>
+                <a:r>
+                  <a:rPr lang="de-DE" dirty="0"/>
+                  <a:t> </a:t>
+                </a:r>
+                <a:r>
+                  <a:rPr lang="de-DE" dirty="0" err="1"/>
+                  <a:t>equations</a:t>
+                </a:r>
+                <a:r>
+                  <a:rPr lang="de-DE" dirty="0"/>
+                  <a:t> </a:t>
+                </a:r>
+                <a:r>
+                  <a:rPr lang="de-DE" dirty="0" err="1"/>
+                  <a:t>are</a:t>
+                </a:r>
+                <a:r>
+                  <a:rPr lang="de-DE" dirty="0"/>
+                  <a:t>:</a:t>
+                </a:r>
+                <a:br>
+                  <a:rPr lang="de-DE" dirty="0"/>
+                </a:br>
+                <a14:m>
+                  <m:oMath xmlns:m="http://schemas.openxmlformats.org/officeDocument/2006/math">
+                    <m:sSub>
+                      <m:sSubPr>
+                        <m:ctrlPr>
+                          <a:rPr lang="de-DE" b="0" i="1" smtClean="0">
+                            <a:latin typeface="Cambria Math" panose="02040503050406030204" pitchFamily="18" charset="0"/>
+                          </a:rPr>
+                        </m:ctrlPr>
+                      </m:sSubPr>
+                      <m:e>
+                        <m:r>
+                          <a:rPr lang="de-DE" b="0" i="1" smtClean="0">
+                            <a:latin typeface="Cambria Math" panose="02040503050406030204" pitchFamily="18" charset="0"/>
+                          </a:rPr>
+                          <m:t>𝑚</m:t>
+                        </m:r>
+                      </m:e>
+                      <m:sub>
+                        <m:r>
+                          <a:rPr lang="de-DE" b="0" i="1" smtClean="0">
+                            <a:latin typeface="Cambria Math" panose="02040503050406030204" pitchFamily="18" charset="0"/>
+                          </a:rPr>
+                          <m:t>1</m:t>
+                        </m:r>
+                      </m:sub>
+                    </m:sSub>
+                    <m:sSub>
+                      <m:sSubPr>
+                        <m:ctrlPr>
+                          <a:rPr lang="de-DE" b="0" i="1" smtClean="0">
+                            <a:latin typeface="Cambria Math" panose="02040503050406030204" pitchFamily="18" charset="0"/>
+                          </a:rPr>
+                        </m:ctrlPr>
+                      </m:sSubPr>
+                      <m:e>
+                        <m:acc>
+                          <m:accPr>
+                            <m:chr m:val="̈"/>
+                            <m:ctrlPr>
+                              <a:rPr lang="de-DE" b="1" i="1" smtClean="0">
+                                <a:latin typeface="Cambria Math" panose="02040503050406030204" pitchFamily="18" charset="0"/>
+                              </a:rPr>
+                            </m:ctrlPr>
+                          </m:accPr>
+                          <m:e>
+                            <m:r>
+                              <a:rPr lang="de-DE" b="1" i="1" smtClean="0">
+                                <a:latin typeface="Cambria Math" panose="02040503050406030204" pitchFamily="18" charset="0"/>
+                              </a:rPr>
+                              <m:t>𝒓</m:t>
+                            </m:r>
+                          </m:e>
+                        </m:acc>
+                      </m:e>
+                      <m:sub>
+                        <m:r>
+                          <a:rPr lang="de-DE" b="0" i="1" smtClean="0">
+                            <a:latin typeface="Cambria Math" panose="02040503050406030204" pitchFamily="18" charset="0"/>
+                          </a:rPr>
+                          <m:t>1</m:t>
+                        </m:r>
+                      </m:sub>
+                    </m:sSub>
+                    <m:r>
+                      <a:rPr lang="de-DE" b="0" i="1" smtClean="0">
+                        <a:latin typeface="Cambria Math" panose="02040503050406030204" pitchFamily="18" charset="0"/>
+                      </a:rPr>
+                      <m:t>=−</m:t>
+                    </m:r>
+                    <m:f>
+                      <m:fPr>
+                        <m:ctrlPr>
+                          <a:rPr lang="de-DE" b="0" i="1" smtClean="0">
+                            <a:latin typeface="Cambria Math" panose="02040503050406030204" pitchFamily="18" charset="0"/>
+                          </a:rPr>
+                        </m:ctrlPr>
+                      </m:fPr>
+                      <m:num>
+                        <m:r>
+                          <a:rPr lang="de-DE" b="0" i="1" smtClean="0">
+                            <a:latin typeface="Cambria Math" panose="02040503050406030204" pitchFamily="18" charset="0"/>
+                          </a:rPr>
+                          <m:t>𝐺</m:t>
+                        </m:r>
+                        <m:sSub>
+                          <m:sSubPr>
+                            <m:ctrlPr>
+                              <a:rPr lang="de-DE" b="0" i="1" smtClean="0">
+                                <a:latin typeface="Cambria Math" panose="02040503050406030204" pitchFamily="18" charset="0"/>
+                              </a:rPr>
+                            </m:ctrlPr>
+                          </m:sSubPr>
+                          <m:e>
+                            <m:r>
+                              <a:rPr lang="de-DE" b="0" i="1" smtClean="0">
+                                <a:latin typeface="Cambria Math" panose="02040503050406030204" pitchFamily="18" charset="0"/>
+                              </a:rPr>
+                              <m:t>𝑚</m:t>
+                            </m:r>
+                          </m:e>
+                          <m:sub>
+                            <m:r>
+                              <a:rPr lang="de-DE" b="0" i="1" smtClean="0">
+                                <a:latin typeface="Cambria Math" panose="02040503050406030204" pitchFamily="18" charset="0"/>
+                              </a:rPr>
+                              <m:t>1</m:t>
+                            </m:r>
+                          </m:sub>
+                        </m:sSub>
+                        <m:sSub>
+                          <m:sSubPr>
+                            <m:ctrlPr>
+                              <a:rPr lang="de-DE" b="0" i="1" smtClean="0">
+                                <a:latin typeface="Cambria Math" panose="02040503050406030204" pitchFamily="18" charset="0"/>
+                              </a:rPr>
+                            </m:ctrlPr>
+                          </m:sSubPr>
+                          <m:e>
+                            <m:r>
+                              <a:rPr lang="de-DE" b="0" i="1" smtClean="0">
+                                <a:latin typeface="Cambria Math" panose="02040503050406030204" pitchFamily="18" charset="0"/>
+                              </a:rPr>
+                              <m:t>𝑚</m:t>
+                            </m:r>
+                          </m:e>
+                          <m:sub>
+                            <m:r>
+                              <a:rPr lang="de-DE" b="0" i="1" smtClean="0">
+                                <a:latin typeface="Cambria Math" panose="02040503050406030204" pitchFamily="18" charset="0"/>
+                              </a:rPr>
+                              <m:t>2</m:t>
+                            </m:r>
+                          </m:sub>
+                        </m:sSub>
+                      </m:num>
+                      <m:den>
+                        <m:sSup>
+                          <m:sSupPr>
+                            <m:ctrlPr>
+                              <a:rPr lang="de-DE" b="0" i="1" smtClean="0">
+                                <a:latin typeface="Cambria Math" panose="02040503050406030204" pitchFamily="18" charset="0"/>
+                              </a:rPr>
+                            </m:ctrlPr>
+                          </m:sSupPr>
+                          <m:e>
+                            <m:r>
+                              <a:rPr lang="de-DE" b="0" i="1" smtClean="0">
+                                <a:latin typeface="Cambria Math" panose="02040503050406030204" pitchFamily="18" charset="0"/>
+                              </a:rPr>
+                              <m:t>𝑟</m:t>
+                            </m:r>
+                          </m:e>
+                          <m:sup>
+                            <m:r>
+                              <a:rPr lang="de-DE" b="0" i="1" smtClean="0">
+                                <a:latin typeface="Cambria Math" panose="02040503050406030204" pitchFamily="18" charset="0"/>
+                              </a:rPr>
+                              <m:t>2</m:t>
+                            </m:r>
+                          </m:sup>
+                        </m:sSup>
+                      </m:den>
+                    </m:f>
+                    <m:acc>
+                      <m:accPr>
+                        <m:chr m:val="̂"/>
+                        <m:ctrlPr>
+                          <a:rPr lang="de-DE" b="0" i="1" smtClean="0">
+                            <a:latin typeface="Cambria Math" panose="02040503050406030204" pitchFamily="18" charset="0"/>
+                          </a:rPr>
+                        </m:ctrlPr>
+                      </m:accPr>
+                      <m:e>
+                        <m:r>
+                          <a:rPr lang="de-DE" b="1" i="1" smtClean="0">
+                            <a:latin typeface="Cambria Math" panose="02040503050406030204" pitchFamily="18" charset="0"/>
+                          </a:rPr>
+                          <m:t>𝒓</m:t>
+                        </m:r>
+                      </m:e>
+                    </m:acc>
+                  </m:oMath>
+                </a14:m>
+                <a:br>
+                  <a:rPr lang="de-DE" b="0" dirty="0"/>
+                </a:br>
+                <a:r>
+                  <a:rPr lang="de-DE" b="0" dirty="0" err="1"/>
+                  <a:t>where</a:t>
+                </a:r>
+                <a:r>
+                  <a:rPr lang="de-DE" b="0" dirty="0"/>
+                  <a:t>  </a:t>
+                </a:r>
+                <a14:m>
+                  <m:oMath xmlns:m="http://schemas.openxmlformats.org/officeDocument/2006/math">
+                    <m:r>
+                      <a:rPr lang="de-DE" b="0" i="1" smtClean="0">
+                        <a:latin typeface="Cambria Math" panose="02040503050406030204" pitchFamily="18" charset="0"/>
+                      </a:rPr>
+                      <m:t>𝑟</m:t>
+                    </m:r>
+                    <m:r>
+                      <a:rPr lang="de-DE" b="0" i="1" smtClean="0">
+                        <a:latin typeface="Cambria Math" panose="02040503050406030204" pitchFamily="18" charset="0"/>
+                      </a:rPr>
+                      <m:t>=</m:t>
+                    </m:r>
+                    <m:d>
+                      <m:dPr>
+                        <m:begChr m:val="|"/>
+                        <m:endChr m:val="|"/>
+                        <m:ctrlPr>
+                          <a:rPr lang="de-DE" b="0" i="1" smtClean="0">
+                            <a:latin typeface="Cambria Math" panose="02040503050406030204" pitchFamily="18" charset="0"/>
+                          </a:rPr>
+                        </m:ctrlPr>
+                      </m:dPr>
+                      <m:e>
+                        <m:acc>
+                          <m:accPr>
+                            <m:chr m:val="̂"/>
+                            <m:ctrlPr>
+                              <a:rPr lang="de-DE" b="0" i="1" smtClean="0">
+                                <a:latin typeface="Cambria Math" panose="02040503050406030204" pitchFamily="18" charset="0"/>
+                              </a:rPr>
+                            </m:ctrlPr>
+                          </m:accPr>
+                          <m:e>
+                            <m:r>
+                              <a:rPr lang="de-DE" b="1" i="1" smtClean="0">
+                                <a:latin typeface="Cambria Math" panose="02040503050406030204" pitchFamily="18" charset="0"/>
+                              </a:rPr>
+                              <m:t>𝒓</m:t>
+                            </m:r>
+                          </m:e>
+                        </m:acc>
+                      </m:e>
+                    </m:d>
+                    <m:r>
+                      <a:rPr lang="de-DE" b="0" i="1" smtClean="0">
+                        <a:latin typeface="Cambria Math" panose="02040503050406030204" pitchFamily="18" charset="0"/>
+                      </a:rPr>
+                      <m:t>≈1⋅</m:t>
+                    </m:r>
+                    <m:sSup>
+                      <m:sSupPr>
+                        <m:ctrlPr>
+                          <a:rPr lang="de-DE" b="0" i="1" smtClean="0">
+                            <a:latin typeface="Cambria Math" panose="02040503050406030204" pitchFamily="18" charset="0"/>
+                          </a:rPr>
+                        </m:ctrlPr>
+                      </m:sSupPr>
+                      <m:e>
+                        <m:r>
+                          <a:rPr lang="de-DE" b="0" i="1" smtClean="0">
+                            <a:latin typeface="Cambria Math" panose="02040503050406030204" pitchFamily="18" charset="0"/>
+                          </a:rPr>
+                          <m:t>10</m:t>
+                        </m:r>
+                      </m:e>
+                      <m:sup>
+                        <m:r>
+                          <a:rPr lang="de-DE" b="0" i="1" smtClean="0">
+                            <a:latin typeface="Cambria Math" panose="02040503050406030204" pitchFamily="18" charset="0"/>
+                          </a:rPr>
+                          <m:t>9</m:t>
+                        </m:r>
+                      </m:sup>
+                    </m:sSup>
+                    <m:r>
+                      <m:rPr>
+                        <m:sty m:val="p"/>
+                      </m:rPr>
+                      <a:rPr lang="de-DE" b="0" i="0" smtClean="0">
+                        <a:latin typeface="Cambria Math" panose="02040503050406030204" pitchFamily="18" charset="0"/>
+                      </a:rPr>
+                      <m:t>m</m:t>
+                    </m:r>
+                  </m:oMath>
+                </a14:m>
+                <a:endParaRPr lang="de-DE" dirty="0"/>
+              </a:p>
+              <a:p>
+                <a:r>
+                  <a:rPr lang="de-DE" dirty="0"/>
+                  <a:t>The </a:t>
+                </a:r>
+              </a:p>
+            </p:txBody>
+          </p:sp>
+        </mc:Choice>
+        <mc:Fallback>
+          <p:sp>
+            <p:nvSpPr>
+              <p:cNvPr id="3" name="Inhaltsplatzhalter 2">
+                <a:extLst>
+                  <a:ext uri="{FF2B5EF4-FFF2-40B4-BE49-F238E27FC236}">
+                    <a16:creationId xmlns:a16="http://schemas.microsoft.com/office/drawing/2014/main" id="{3B1A83BB-2485-4102-8DD6-1897273AC4F1}"/>
+                  </a:ext>
+                </a:extLst>
+              </p:cNvPr>
+              <p:cNvSpPr>
+                <a:spLocks noGrp="1" noRot="1" noChangeAspect="1" noMove="1" noResize="1" noEditPoints="1" noAdjustHandles="1" noChangeArrowheads="1" noChangeShapeType="1" noTextEdit="1"/>
+              </p:cNvSpPr>
+              <p:nvPr>
+                <p:ph idx="1"/>
+              </p:nvPr>
+            </p:nvSpPr>
+            <p:spPr>
+              <a:xfrm>
+                <a:off x="838200" y="352338"/>
+                <a:ext cx="10515600" cy="5824625"/>
+              </a:xfrm>
+              <a:blipFill>
+                <a:blip r:embed="rId2"/>
+                <a:stretch>
+                  <a:fillRect l="-1217" t="-1780" r="-1681"/>
+                </a:stretch>
+              </a:blipFill>
+            </p:spPr>
+            <p:txBody>
+              <a:bodyPr/>
+              <a:lstStyle/>
+              <a:p>
+                <a:r>
+                  <a:rPr lang="de-DE">
+                    <a:noFill/>
+                  </a:rPr>
+                  <a:t> </a:t>
+                </a:r>
+              </a:p>
+            </p:txBody>
+          </p:sp>
+        </mc:Fallback>
+      </mc:AlternateContent>
+    </p:spTree>
+    <p:extLst>
+      <p:ext uri="{BB962C8B-B14F-4D97-AF65-F5344CB8AC3E}">
+        <p14:creationId xmlns:p14="http://schemas.microsoft.com/office/powerpoint/2010/main" val="3051711305"/>
       </p:ext>
     </p:extLst>
   </p:cSld>

</xml_diff>

<commit_message>
update docu and try to improve plutCharon
remove word docu and keep ppt
try to improve plutCharon simulation
</commit_message>
<xml_diff>
--- a/docu_and_plots/thoughts_and_revelations_during_this_project.pptx
+++ b/docu_and_plots/thoughts_and_revelations_during_this_project.pptx
@@ -7,11 +7,12 @@
   <p:sldIdLst>
     <p:sldId id="256" r:id="rId2"/>
     <p:sldId id="257" r:id="rId3"/>
-    <p:sldId id="258" r:id="rId4"/>
-    <p:sldId id="259" r:id="rId5"/>
-    <p:sldId id="260" r:id="rId6"/>
-    <p:sldId id="261" r:id="rId7"/>
-    <p:sldId id="262" r:id="rId8"/>
+    <p:sldId id="263" r:id="rId4"/>
+    <p:sldId id="258" r:id="rId5"/>
+    <p:sldId id="259" r:id="rId6"/>
+    <p:sldId id="260" r:id="rId7"/>
+    <p:sldId id="261" r:id="rId8"/>
+    <p:sldId id="262" r:id="rId9"/>
   </p:sldIdLst>
   <p:sldSz cx="12192000" cy="6858000"/>
   <p:notesSz cx="6858000" cy="9144000"/>
@@ -4985,6 +4986,760 @@
           <a:chExt cx="0" cy="0"/>
         </a:xfrm>
       </p:grpSpPr>
+      <p:sp>
+        <p:nvSpPr>
+          <p:cNvPr id="3" name="Inhaltsplatzhalter 2">
+            <a:extLst>
+              <a:ext uri="{FF2B5EF4-FFF2-40B4-BE49-F238E27FC236}">
+                <a16:creationId xmlns:a16="http://schemas.microsoft.com/office/drawing/2014/main" id="{9BF0CDF2-6249-44C3-BC35-9F28EA9AF07B}"/>
+              </a:ext>
+            </a:extLst>
+          </p:cNvPr>
+          <p:cNvSpPr>
+            <a:spLocks noGrp="1"/>
+          </p:cNvSpPr>
+          <p:nvPr>
+            <p:ph idx="1"/>
+          </p:nvPr>
+        </p:nvSpPr>
+        <p:spPr>
+          <a:xfrm>
+            <a:off x="838200" y="327171"/>
+            <a:ext cx="10515600" cy="5849792"/>
+          </a:xfrm>
+        </p:spPr>
+        <p:txBody>
+          <a:bodyPr/>
+          <a:lstStyle/>
+          <a:p>
+            <a:pPr marL="0" indent="0">
+              <a:buNone/>
+            </a:pPr>
+            <a:r>
+              <a:rPr lang="de-DE" b="1" dirty="0"/>
+              <a:t>Problem </a:t>
+            </a:r>
+            <a:r>
+              <a:rPr lang="de-DE" b="1" dirty="0" err="1"/>
+              <a:t>with</a:t>
+            </a:r>
+            <a:r>
+              <a:rPr lang="de-DE" b="1" dirty="0"/>
+              <a:t> </a:t>
+            </a:r>
+            <a:r>
+              <a:rPr lang="de-DE" b="1" dirty="0" err="1"/>
+              <a:t>orbit</a:t>
+            </a:r>
+            <a:r>
+              <a:rPr lang="de-DE" b="1" dirty="0"/>
+              <a:t> </a:t>
+            </a:r>
+            <a:r>
+              <a:rPr lang="de-DE" b="1" dirty="0" err="1"/>
+              <a:t>animation</a:t>
+            </a:r>
+            <a:r>
+              <a:rPr lang="de-DE" b="1" dirty="0"/>
+              <a:t> so </a:t>
+            </a:r>
+            <a:r>
+              <a:rPr lang="de-DE" b="1" dirty="0" err="1"/>
+              <a:t>far</a:t>
+            </a:r>
+            <a:endParaRPr lang="de-DE" b="1" dirty="0"/>
+          </a:p>
+          <a:p>
+            <a:r>
+              <a:rPr lang="de-DE" dirty="0"/>
+              <a:t>I </a:t>
+            </a:r>
+            <a:r>
+              <a:rPr lang="de-DE" dirty="0" err="1"/>
+              <a:t>use</a:t>
+            </a:r>
+            <a:r>
+              <a:rPr lang="de-DE" dirty="0"/>
+              <a:t> same-</a:t>
+            </a:r>
+            <a:r>
+              <a:rPr lang="de-DE" dirty="0" err="1"/>
+              <a:t>sized</a:t>
+            </a:r>
+            <a:r>
+              <a:rPr lang="de-DE" dirty="0"/>
+              <a:t> angle </a:t>
+            </a:r>
+            <a:r>
+              <a:rPr lang="de-DE" dirty="0" err="1"/>
+              <a:t>steps</a:t>
+            </a:r>
+            <a:endParaRPr lang="de-DE" dirty="0"/>
+          </a:p>
+          <a:p>
+            <a:endParaRPr lang="de-DE" dirty="0"/>
+          </a:p>
+          <a:p>
+            <a:endParaRPr lang="de-DE" dirty="0"/>
+          </a:p>
+          <a:p>
+            <a:endParaRPr lang="de-DE" dirty="0"/>
+          </a:p>
+          <a:p>
+            <a:endParaRPr lang="de-DE" dirty="0"/>
+          </a:p>
+          <a:p>
+            <a:endParaRPr lang="de-DE" dirty="0"/>
+          </a:p>
+          <a:p>
+            <a:r>
+              <a:rPr lang="de-DE" dirty="0"/>
+              <a:t>Same </a:t>
+            </a:r>
+            <a:r>
+              <a:rPr lang="de-DE" dirty="0" err="1"/>
+              <a:t>size</a:t>
+            </a:r>
+            <a:r>
+              <a:rPr lang="de-DE" dirty="0"/>
+              <a:t> </a:t>
+            </a:r>
+            <a:r>
+              <a:rPr lang="de-DE" dirty="0" err="1"/>
+              <a:t>angles</a:t>
+            </a:r>
+            <a:r>
+              <a:rPr lang="de-DE" dirty="0"/>
+              <a:t> </a:t>
+            </a:r>
+            <a:r>
+              <a:rPr lang="de-DE" dirty="0" err="1"/>
+              <a:t>lead</a:t>
+            </a:r>
+            <a:r>
+              <a:rPr lang="de-DE" dirty="0"/>
+              <a:t> </a:t>
+            </a:r>
+            <a:r>
+              <a:rPr lang="de-DE" dirty="0" err="1"/>
+              <a:t>to</a:t>
+            </a:r>
+            <a:r>
+              <a:rPr lang="de-DE" dirty="0"/>
+              <a:t> a fast </a:t>
+            </a:r>
+            <a:r>
+              <a:rPr lang="de-DE" dirty="0" err="1"/>
+              <a:t>speed</a:t>
+            </a:r>
+            <a:r>
+              <a:rPr lang="de-DE" dirty="0"/>
+              <a:t> </a:t>
+            </a:r>
+            <a:r>
+              <a:rPr lang="de-DE" dirty="0" err="1"/>
+              <a:t>far</a:t>
+            </a:r>
+            <a:r>
+              <a:rPr lang="de-DE" dirty="0"/>
+              <a:t> </a:t>
+            </a:r>
+            <a:r>
+              <a:rPr lang="de-DE" dirty="0" err="1"/>
+              <a:t>away</a:t>
+            </a:r>
+            <a:r>
+              <a:rPr lang="de-DE" dirty="0"/>
+              <a:t> </a:t>
+            </a:r>
+            <a:r>
+              <a:rPr lang="de-DE" dirty="0" err="1"/>
+              <a:t>from</a:t>
+            </a:r>
+            <a:r>
+              <a:rPr lang="de-DE" dirty="0"/>
+              <a:t> </a:t>
+            </a:r>
+            <a:r>
+              <a:rPr lang="de-DE" dirty="0" err="1"/>
+              <a:t>the</a:t>
+            </a:r>
+            <a:r>
+              <a:rPr lang="de-DE" dirty="0"/>
+              <a:t> </a:t>
+            </a:r>
+            <a:r>
+              <a:rPr lang="de-DE" dirty="0" err="1"/>
+              <a:t>focal</a:t>
+            </a:r>
+            <a:r>
+              <a:rPr lang="de-DE" dirty="0"/>
+              <a:t> </a:t>
+            </a:r>
+            <a:r>
+              <a:rPr lang="de-DE" dirty="0" err="1"/>
+              <a:t>point</a:t>
+            </a:r>
+            <a:r>
+              <a:rPr lang="de-DE" dirty="0"/>
+              <a:t> (</a:t>
+            </a:r>
+            <a:r>
+              <a:rPr lang="de-DE" dirty="0" err="1"/>
+              <a:t>sun</a:t>
+            </a:r>
+            <a:r>
+              <a:rPr lang="de-DE" dirty="0"/>
+              <a:t>) and slow </a:t>
+            </a:r>
+            <a:r>
+              <a:rPr lang="de-DE" dirty="0" err="1"/>
+              <a:t>speeds</a:t>
+            </a:r>
+            <a:r>
+              <a:rPr lang="de-DE" dirty="0"/>
+              <a:t> </a:t>
+            </a:r>
+            <a:r>
+              <a:rPr lang="de-DE" dirty="0" err="1"/>
+              <a:t>close</a:t>
+            </a:r>
+            <a:r>
+              <a:rPr lang="de-DE" dirty="0"/>
+              <a:t> </a:t>
+            </a:r>
+            <a:r>
+              <a:rPr lang="de-DE" dirty="0" err="1"/>
+              <a:t>to</a:t>
+            </a:r>
+            <a:r>
+              <a:rPr lang="de-DE" dirty="0"/>
+              <a:t> </a:t>
+            </a:r>
+            <a:r>
+              <a:rPr lang="de-DE" dirty="0" err="1"/>
+              <a:t>the</a:t>
+            </a:r>
+            <a:r>
+              <a:rPr lang="de-DE" dirty="0"/>
+              <a:t> </a:t>
+            </a:r>
+            <a:r>
+              <a:rPr lang="de-DE" dirty="0" err="1"/>
+              <a:t>focal</a:t>
+            </a:r>
+            <a:r>
+              <a:rPr lang="de-DE" dirty="0"/>
+              <a:t> </a:t>
+            </a:r>
+            <a:r>
+              <a:rPr lang="de-DE" dirty="0" err="1"/>
+              <a:t>point</a:t>
+            </a:r>
+            <a:br>
+              <a:rPr lang="de-DE" dirty="0"/>
+            </a:br>
+            <a:r>
+              <a:rPr lang="de-DE" dirty="0">
+                <a:sym typeface="Wingdings" panose="05000000000000000000" pitchFamily="2" charset="2"/>
+              </a:rPr>
+              <a:t> </a:t>
+            </a:r>
+            <a:r>
+              <a:rPr lang="de-DE" dirty="0" err="1">
+                <a:sym typeface="Wingdings" panose="05000000000000000000" pitchFamily="2" charset="2"/>
+              </a:rPr>
+              <a:t>the</a:t>
+            </a:r>
+            <a:r>
+              <a:rPr lang="de-DE" dirty="0">
+                <a:sym typeface="Wingdings" panose="05000000000000000000" pitchFamily="2" charset="2"/>
+              </a:rPr>
+              <a:t> </a:t>
+            </a:r>
+            <a:r>
+              <a:rPr lang="de-DE" dirty="0" err="1">
+                <a:sym typeface="Wingdings" panose="05000000000000000000" pitchFamily="2" charset="2"/>
+              </a:rPr>
+              <a:t>exact</a:t>
+            </a:r>
+            <a:r>
+              <a:rPr lang="de-DE" dirty="0">
+                <a:sym typeface="Wingdings" panose="05000000000000000000" pitchFamily="2" charset="2"/>
+              </a:rPr>
+              <a:t> </a:t>
+            </a:r>
+            <a:r>
+              <a:rPr lang="de-DE" dirty="0" err="1">
+                <a:sym typeface="Wingdings" panose="05000000000000000000" pitchFamily="2" charset="2"/>
+              </a:rPr>
+              <a:t>opposite</a:t>
+            </a:r>
+            <a:r>
+              <a:rPr lang="de-DE" dirty="0">
+                <a:sym typeface="Wingdings" panose="05000000000000000000" pitchFamily="2" charset="2"/>
+              </a:rPr>
+              <a:t> </a:t>
+            </a:r>
+            <a:r>
+              <a:rPr lang="de-DE" dirty="0" err="1">
+                <a:sym typeface="Wingdings" panose="05000000000000000000" pitchFamily="2" charset="2"/>
+              </a:rPr>
+              <a:t>is</a:t>
+            </a:r>
+            <a:r>
+              <a:rPr lang="de-DE" dirty="0">
+                <a:sym typeface="Wingdings" panose="05000000000000000000" pitchFamily="2" charset="2"/>
+              </a:rPr>
+              <a:t> </a:t>
+            </a:r>
+            <a:r>
+              <a:rPr lang="de-DE" dirty="0" err="1">
+                <a:sym typeface="Wingdings" panose="05000000000000000000" pitchFamily="2" charset="2"/>
+              </a:rPr>
+              <a:t>the</a:t>
+            </a:r>
+            <a:r>
+              <a:rPr lang="de-DE" dirty="0">
+                <a:sym typeface="Wingdings" panose="05000000000000000000" pitchFamily="2" charset="2"/>
+              </a:rPr>
+              <a:t> </a:t>
+            </a:r>
+            <a:r>
+              <a:rPr lang="de-DE" dirty="0" err="1">
+                <a:sym typeface="Wingdings" panose="05000000000000000000" pitchFamily="2" charset="2"/>
+              </a:rPr>
+              <a:t>case</a:t>
+            </a:r>
+            <a:r>
+              <a:rPr lang="de-DE" dirty="0">
+                <a:sym typeface="Wingdings" panose="05000000000000000000" pitchFamily="2" charset="2"/>
+              </a:rPr>
+              <a:t> in </a:t>
+            </a:r>
+            <a:r>
+              <a:rPr lang="de-DE" dirty="0" err="1">
+                <a:sym typeface="Wingdings" panose="05000000000000000000" pitchFamily="2" charset="2"/>
+              </a:rPr>
+              <a:t>reality</a:t>
+            </a:r>
+            <a:r>
+              <a:rPr lang="de-DE" dirty="0">
+                <a:sym typeface="Wingdings" panose="05000000000000000000" pitchFamily="2" charset="2"/>
+              </a:rPr>
+              <a:t> </a:t>
+            </a:r>
+            <a:r>
+              <a:rPr lang="de-DE" dirty="0" err="1">
+                <a:sym typeface="Wingdings" panose="05000000000000000000" pitchFamily="2" charset="2"/>
+              </a:rPr>
+              <a:t>because</a:t>
+            </a:r>
+            <a:r>
+              <a:rPr lang="de-DE" dirty="0">
+                <a:sym typeface="Wingdings" panose="05000000000000000000" pitchFamily="2" charset="2"/>
+              </a:rPr>
+              <a:t>:</a:t>
+            </a:r>
+            <a:br>
+              <a:rPr lang="de-DE" dirty="0">
+                <a:sym typeface="Wingdings" panose="05000000000000000000" pitchFamily="2" charset="2"/>
+              </a:rPr>
+            </a:br>
+            <a:r>
+              <a:rPr lang="de-DE" dirty="0">
+                <a:sym typeface="Wingdings" panose="05000000000000000000" pitchFamily="2" charset="2"/>
+              </a:rPr>
+              <a:t>same </a:t>
+            </a:r>
+            <a:r>
+              <a:rPr lang="de-DE" dirty="0" err="1">
+                <a:sym typeface="Wingdings" panose="05000000000000000000" pitchFamily="2" charset="2"/>
+              </a:rPr>
+              <a:t>sized</a:t>
+            </a:r>
+            <a:r>
+              <a:rPr lang="de-DE" dirty="0">
+                <a:sym typeface="Wingdings" panose="05000000000000000000" pitchFamily="2" charset="2"/>
+              </a:rPr>
+              <a:t> </a:t>
+            </a:r>
+            <a:r>
+              <a:rPr lang="de-DE" dirty="0" err="1">
+                <a:sym typeface="Wingdings" panose="05000000000000000000" pitchFamily="2" charset="2"/>
+              </a:rPr>
+              <a:t>angles</a:t>
+            </a:r>
+            <a:r>
+              <a:rPr lang="de-DE" dirty="0">
+                <a:sym typeface="Wingdings" panose="05000000000000000000" pitchFamily="2" charset="2"/>
+              </a:rPr>
+              <a:t> </a:t>
+            </a:r>
+            <a:r>
+              <a:rPr lang="de-DE" dirty="0" err="1">
+                <a:sym typeface="Wingdings" panose="05000000000000000000" pitchFamily="2" charset="2"/>
+              </a:rPr>
+              <a:t>with</a:t>
+            </a:r>
+            <a:r>
+              <a:rPr lang="de-DE" dirty="0">
+                <a:sym typeface="Wingdings" panose="05000000000000000000" pitchFamily="2" charset="2"/>
+              </a:rPr>
+              <a:t> </a:t>
+            </a:r>
+            <a:r>
+              <a:rPr lang="de-DE" dirty="0" err="1">
+                <a:sym typeface="Wingdings" panose="05000000000000000000" pitchFamily="2" charset="2"/>
+              </a:rPr>
+              <a:t>every</a:t>
+            </a:r>
+            <a:r>
+              <a:rPr lang="de-DE" dirty="0">
+                <a:sym typeface="Wingdings" panose="05000000000000000000" pitchFamily="2" charset="2"/>
+              </a:rPr>
+              <a:t> angle </a:t>
+            </a:r>
+            <a:r>
+              <a:rPr lang="de-DE" dirty="0" err="1">
+                <a:sym typeface="Wingdings" panose="05000000000000000000" pitchFamily="2" charset="2"/>
+              </a:rPr>
+              <a:t>section</a:t>
+            </a:r>
+            <a:r>
+              <a:rPr lang="de-DE" dirty="0">
+                <a:sym typeface="Wingdings" panose="05000000000000000000" pitchFamily="2" charset="2"/>
+              </a:rPr>
+              <a:t> </a:t>
+            </a:r>
+            <a:r>
+              <a:rPr lang="de-DE" dirty="0" err="1">
+                <a:sym typeface="Wingdings" panose="05000000000000000000" pitchFamily="2" charset="2"/>
+              </a:rPr>
+              <a:t>being</a:t>
+            </a:r>
+            <a:r>
+              <a:rPr lang="de-DE" dirty="0">
+                <a:sym typeface="Wingdings" panose="05000000000000000000" pitchFamily="2" charset="2"/>
+              </a:rPr>
+              <a:t> </a:t>
+            </a:r>
+            <a:r>
+              <a:rPr lang="de-DE" dirty="0" err="1">
+                <a:sym typeface="Wingdings" panose="05000000000000000000" pitchFamily="2" charset="2"/>
+              </a:rPr>
+              <a:t>shown</a:t>
+            </a:r>
+            <a:r>
+              <a:rPr lang="de-DE" dirty="0">
+                <a:sym typeface="Wingdings" panose="05000000000000000000" pitchFamily="2" charset="2"/>
+              </a:rPr>
+              <a:t> </a:t>
+            </a:r>
+            <a:r>
+              <a:rPr lang="de-DE" dirty="0" err="1">
+                <a:sym typeface="Wingdings" panose="05000000000000000000" pitchFamily="2" charset="2"/>
+              </a:rPr>
+              <a:t>with</a:t>
+            </a:r>
+            <a:r>
+              <a:rPr lang="de-DE" dirty="0">
+                <a:sym typeface="Wingdings" panose="05000000000000000000" pitchFamily="2" charset="2"/>
+              </a:rPr>
+              <a:t> </a:t>
+            </a:r>
+            <a:r>
+              <a:rPr lang="de-DE" dirty="0" err="1">
+                <a:sym typeface="Wingdings" panose="05000000000000000000" pitchFamily="2" charset="2"/>
+              </a:rPr>
+              <a:t>the</a:t>
+            </a:r>
+            <a:r>
+              <a:rPr lang="de-DE" dirty="0">
+                <a:sym typeface="Wingdings" panose="05000000000000000000" pitchFamily="2" charset="2"/>
+              </a:rPr>
+              <a:t> same </a:t>
+            </a:r>
+            <a:r>
+              <a:rPr lang="de-DE" dirty="0" err="1">
+                <a:sym typeface="Wingdings" panose="05000000000000000000" pitchFamily="2" charset="2"/>
+              </a:rPr>
+              <a:t>amount</a:t>
+            </a:r>
+            <a:r>
+              <a:rPr lang="de-DE" dirty="0">
+                <a:sym typeface="Wingdings" panose="05000000000000000000" pitchFamily="2" charset="2"/>
+              </a:rPr>
+              <a:t> </a:t>
+            </a:r>
+            <a:r>
+              <a:rPr lang="de-DE" dirty="0" err="1">
+                <a:sym typeface="Wingdings" panose="05000000000000000000" pitchFamily="2" charset="2"/>
+              </a:rPr>
+              <a:t>of</a:t>
+            </a:r>
+            <a:r>
+              <a:rPr lang="de-DE" dirty="0">
+                <a:sym typeface="Wingdings" panose="05000000000000000000" pitchFamily="2" charset="2"/>
+              </a:rPr>
+              <a:t> time </a:t>
+            </a:r>
+            <a:r>
+              <a:rPr lang="de-DE" dirty="0" err="1">
+                <a:sym typeface="Wingdings" panose="05000000000000000000" pitchFamily="2" charset="2"/>
+              </a:rPr>
+              <a:t>violates</a:t>
+            </a:r>
+            <a:r>
+              <a:rPr lang="de-DE" dirty="0">
+                <a:sym typeface="Wingdings" panose="05000000000000000000" pitchFamily="2" charset="2"/>
+              </a:rPr>
+              <a:t> Keplers </a:t>
+            </a:r>
+            <a:r>
+              <a:rPr lang="de-DE">
+                <a:sym typeface="Wingdings" panose="05000000000000000000" pitchFamily="2" charset="2"/>
+              </a:rPr>
+              <a:t>second </a:t>
+            </a:r>
+            <a:r>
+              <a:rPr lang="de-DE" dirty="0" err="1">
+                <a:sym typeface="Wingdings" panose="05000000000000000000" pitchFamily="2" charset="2"/>
+              </a:rPr>
+              <a:t>law</a:t>
+            </a:r>
+            <a:endParaRPr lang="de-DE" dirty="0"/>
+          </a:p>
+        </p:txBody>
+      </p:sp>
+      <p:pic>
+        <p:nvPicPr>
+          <p:cNvPr id="5" name="Grafik 4">
+            <a:extLst>
+              <a:ext uri="{FF2B5EF4-FFF2-40B4-BE49-F238E27FC236}">
+                <a16:creationId xmlns:a16="http://schemas.microsoft.com/office/drawing/2014/main" id="{AF7EDCC3-2DEB-49AA-9C49-D33B1A712C89}"/>
+              </a:ext>
+            </a:extLst>
+          </p:cNvPr>
+          <p:cNvPicPr>
+            <a:picLocks noChangeAspect="1"/>
+          </p:cNvPicPr>
+          <p:nvPr/>
+        </p:nvPicPr>
+        <p:blipFill>
+          <a:blip r:embed="rId2"/>
+          <a:stretch>
+            <a:fillRect/>
+          </a:stretch>
+        </p:blipFill>
+        <p:spPr>
+          <a:xfrm>
+            <a:off x="3007546" y="1308681"/>
+            <a:ext cx="2715433" cy="2697061"/>
+          </a:xfrm>
+          <a:prstGeom prst="rect">
+            <a:avLst/>
+          </a:prstGeom>
+        </p:spPr>
+      </p:pic>
+      <p:pic>
+        <p:nvPicPr>
+          <p:cNvPr id="7" name="Grafik 6">
+            <a:extLst>
+              <a:ext uri="{FF2B5EF4-FFF2-40B4-BE49-F238E27FC236}">
+                <a16:creationId xmlns:a16="http://schemas.microsoft.com/office/drawing/2014/main" id="{3A376B0C-15AB-4DAC-994D-4D26F60FDE9D}"/>
+              </a:ext>
+            </a:extLst>
+          </p:cNvPr>
+          <p:cNvPicPr>
+            <a:picLocks noChangeAspect="1"/>
+          </p:cNvPicPr>
+          <p:nvPr/>
+        </p:nvPicPr>
+        <p:blipFill>
+          <a:blip r:embed="rId3"/>
+          <a:stretch>
+            <a:fillRect/>
+          </a:stretch>
+        </p:blipFill>
+        <p:spPr>
+          <a:xfrm>
+            <a:off x="6596414" y="1216403"/>
+            <a:ext cx="1643062" cy="1602659"/>
+          </a:xfrm>
+          <a:prstGeom prst="rect">
+            <a:avLst/>
+          </a:prstGeom>
+        </p:spPr>
+      </p:pic>
+      <p:cxnSp>
+        <p:nvCxnSpPr>
+          <p:cNvPr id="10" name="Gerader Verbinder 9">
+            <a:extLst>
+              <a:ext uri="{FF2B5EF4-FFF2-40B4-BE49-F238E27FC236}">
+                <a16:creationId xmlns:a16="http://schemas.microsoft.com/office/drawing/2014/main" id="{276B0A53-0B07-47D8-A5EF-B0DDD2AD950A}"/>
+              </a:ext>
+            </a:extLst>
+          </p:cNvPr>
+          <p:cNvCxnSpPr>
+            <a:cxnSpLocks/>
+          </p:cNvCxnSpPr>
+          <p:nvPr/>
+        </p:nvCxnSpPr>
+        <p:spPr>
+          <a:xfrm flipH="1">
+            <a:off x="4924337" y="1216403"/>
+            <a:ext cx="1672077" cy="1300294"/>
+          </a:xfrm>
+          <a:prstGeom prst="line">
+            <a:avLst/>
+          </a:prstGeom>
+          <a:ln>
+            <a:solidFill>
+              <a:srgbClr val="FF0000"/>
+            </a:solidFill>
+          </a:ln>
+        </p:spPr>
+        <p:style>
+          <a:lnRef idx="1">
+            <a:schemeClr val="accent1"/>
+          </a:lnRef>
+          <a:fillRef idx="0">
+            <a:schemeClr val="accent1"/>
+          </a:fillRef>
+          <a:effectRef idx="0">
+            <a:schemeClr val="accent1"/>
+          </a:effectRef>
+          <a:fontRef idx="minor">
+            <a:schemeClr val="tx1"/>
+          </a:fontRef>
+        </p:style>
+      </p:cxnSp>
+      <p:sp>
+        <p:nvSpPr>
+          <p:cNvPr id="11" name="Rechteck 10">
+            <a:extLst>
+              <a:ext uri="{FF2B5EF4-FFF2-40B4-BE49-F238E27FC236}">
+                <a16:creationId xmlns:a16="http://schemas.microsoft.com/office/drawing/2014/main" id="{DE7EF536-39FB-47F6-AB00-BC5828B0017C}"/>
+              </a:ext>
+            </a:extLst>
+          </p:cNvPr>
+          <p:cNvSpPr/>
+          <p:nvPr/>
+        </p:nvSpPr>
+        <p:spPr>
+          <a:xfrm>
+            <a:off x="4924337" y="2516697"/>
+            <a:ext cx="411061" cy="411061"/>
+          </a:xfrm>
+          <a:prstGeom prst="rect">
+            <a:avLst/>
+          </a:prstGeom>
+          <a:noFill/>
+          <a:ln>
+            <a:solidFill>
+              <a:srgbClr val="FF0000"/>
+            </a:solidFill>
+          </a:ln>
+        </p:spPr>
+        <p:style>
+          <a:lnRef idx="2">
+            <a:schemeClr val="accent1">
+              <a:shade val="50000"/>
+            </a:schemeClr>
+          </a:lnRef>
+          <a:fillRef idx="1">
+            <a:schemeClr val="accent1"/>
+          </a:fillRef>
+          <a:effectRef idx="0">
+            <a:schemeClr val="accent1"/>
+          </a:effectRef>
+          <a:fontRef idx="minor">
+            <a:schemeClr val="lt1"/>
+          </a:fontRef>
+        </p:style>
+        <p:txBody>
+          <a:bodyPr rtlCol="0" anchor="ctr"/>
+          <a:lstStyle/>
+          <a:p>
+            <a:pPr algn="ctr"/>
+            <a:endParaRPr lang="de-DE"/>
+          </a:p>
+        </p:txBody>
+      </p:sp>
+      <p:cxnSp>
+        <p:nvCxnSpPr>
+          <p:cNvPr id="13" name="Gerader Verbinder 12">
+            <a:extLst>
+              <a:ext uri="{FF2B5EF4-FFF2-40B4-BE49-F238E27FC236}">
+                <a16:creationId xmlns:a16="http://schemas.microsoft.com/office/drawing/2014/main" id="{6EF4B5F8-9C1A-4CFA-8741-5E040C787CAC}"/>
+              </a:ext>
+            </a:extLst>
+          </p:cNvPr>
+          <p:cNvCxnSpPr>
+            <a:cxnSpLocks/>
+          </p:cNvCxnSpPr>
+          <p:nvPr/>
+        </p:nvCxnSpPr>
+        <p:spPr>
+          <a:xfrm flipH="1">
+            <a:off x="4923506" y="2819062"/>
+            <a:ext cx="1611518" cy="108696"/>
+          </a:xfrm>
+          <a:prstGeom prst="line">
+            <a:avLst/>
+          </a:prstGeom>
+          <a:ln>
+            <a:solidFill>
+              <a:srgbClr val="FF0000"/>
+            </a:solidFill>
+          </a:ln>
+        </p:spPr>
+        <p:style>
+          <a:lnRef idx="1">
+            <a:schemeClr val="accent1"/>
+          </a:lnRef>
+          <a:fillRef idx="0">
+            <a:schemeClr val="accent1"/>
+          </a:fillRef>
+          <a:effectRef idx="0">
+            <a:schemeClr val="accent1"/>
+          </a:effectRef>
+          <a:fontRef idx="minor">
+            <a:schemeClr val="tx1"/>
+          </a:fontRef>
+        </p:style>
+      </p:cxnSp>
+    </p:spTree>
+    <p:extLst>
+      <p:ext uri="{BB962C8B-B14F-4D97-AF65-F5344CB8AC3E}">
+        <p14:creationId xmlns:p14="http://schemas.microsoft.com/office/powerpoint/2010/main" val="3847533781"/>
+      </p:ext>
+    </p:extLst>
+  </p:cSld>
+  <p:clrMapOvr>
+    <a:masterClrMapping/>
+  </p:clrMapOvr>
+</p:sld>
+</file>
+
+<file path=ppt/slides/slide4.xml><?xml version="1.0" encoding="utf-8"?>
+<p:sld xmlns:a="http://schemas.openxmlformats.org/drawingml/2006/main" xmlns:r="http://schemas.openxmlformats.org/officeDocument/2006/relationships" xmlns:p="http://schemas.openxmlformats.org/presentationml/2006/main">
+  <p:cSld>
+    <p:spTree>
+      <p:nvGrpSpPr>
+        <p:cNvPr id="1" name=""/>
+        <p:cNvGrpSpPr/>
+        <p:nvPr/>
+      </p:nvGrpSpPr>
+      <p:grpSpPr>
+        <a:xfrm>
+          <a:off x="0" y="0"/>
+          <a:ext cx="0" cy="0"/>
+          <a:chOff x="0" y="0"/>
+          <a:chExt cx="0" cy="0"/>
+        </a:xfrm>
+      </p:grpSpPr>
       <mc:AlternateContent xmlns:mc="http://schemas.openxmlformats.org/markup-compatibility/2006" xmlns:a14="http://schemas.microsoft.com/office/drawing/2010/main">
         <mc:Choice Requires="a14">
           <p:sp>
@@ -6343,7 +7098,7 @@
 </p:sld>
 </file>
 
-<file path=ppt/slides/slide4.xml><?xml version="1.0" encoding="utf-8"?>
+<file path=ppt/slides/slide5.xml><?xml version="1.0" encoding="utf-8"?>
 <p:sld xmlns:a="http://schemas.openxmlformats.org/drawingml/2006/main" xmlns:r="http://schemas.openxmlformats.org/officeDocument/2006/relationships" xmlns:p="http://schemas.openxmlformats.org/presentationml/2006/main">
   <p:cSld>
     <p:spTree>
@@ -11477,7 +12232,7 @@
 </p:sld>
 </file>
 
-<file path=ppt/slides/slide5.xml><?xml version="1.0" encoding="utf-8"?>
+<file path=ppt/slides/slide6.xml><?xml version="1.0" encoding="utf-8"?>
 <p:sld xmlns:a="http://schemas.openxmlformats.org/drawingml/2006/main" xmlns:r="http://schemas.openxmlformats.org/officeDocument/2006/relationships" xmlns:p="http://schemas.openxmlformats.org/presentationml/2006/main">
   <p:cSld>
     <p:spTree>
@@ -12004,7 +12759,13 @@
                       <a:rPr lang="de-DE" b="0" i="1" smtClean="0">
                         <a:latin typeface="Cambria Math" panose="02040503050406030204" pitchFamily="18" charset="0"/>
                       </a:rPr>
-                      <m:t>↔ </m:t>
+                      <m:t>↔</m:t>
+                    </m:r>
+                    <m:r>
+                      <a:rPr lang="de-DE" b="0" i="1" smtClean="0">
+                        <a:latin typeface="Cambria Math" panose="02040503050406030204" pitchFamily="18" charset="0"/>
+                      </a:rPr>
+                      <m:t> </m:t>
                     </m:r>
                     <m:sSub>
                       <m:sSubPr>
@@ -12561,7 +13322,7 @@
 </p:sld>
 </file>
 
-<file path=ppt/slides/slide6.xml><?xml version="1.0" encoding="utf-8"?>
+<file path=ppt/slides/slide7.xml><?xml version="1.0" encoding="utf-8"?>
 <p:sld xmlns:a="http://schemas.openxmlformats.org/drawingml/2006/main" xmlns:r="http://schemas.openxmlformats.org/officeDocument/2006/relationships" xmlns:p="http://schemas.openxmlformats.org/presentationml/2006/main">
   <p:cSld>
     <p:spTree>
@@ -12578,8 +13339,8 @@
           <a:chExt cx="0" cy="0"/>
         </a:xfrm>
       </p:grpSpPr>
-      <mc:AlternateContent xmlns:mc="http://schemas.openxmlformats.org/markup-compatibility/2006">
-        <mc:Choice xmlns:a14="http://schemas.microsoft.com/office/drawing/2010/main" Requires="a14">
+      <mc:AlternateContent xmlns:mc="http://schemas.openxmlformats.org/markup-compatibility/2006" xmlns:a14="http://schemas.microsoft.com/office/drawing/2010/main">
+        <mc:Choice Requires="a14">
           <p:sp>
             <p:nvSpPr>
               <p:cNvPr id="3" name="Inhaltsplatzhalter 2">
@@ -14063,7 +14824,7 @@
             </p:txBody>
           </p:sp>
         </mc:Choice>
-        <mc:Fallback>
+        <mc:Fallback xmlns="">
           <p:sp>
             <p:nvSpPr>
               <p:cNvPr id="3" name="Inhaltsplatzhalter 2">
@@ -15114,7 +15875,7 @@
 </p:sld>
 </file>
 
-<file path=ppt/slides/slide7.xml><?xml version="1.0" encoding="utf-8"?>
+<file path=ppt/slides/slide8.xml><?xml version="1.0" encoding="utf-8"?>
 <p:sld xmlns:a="http://schemas.openxmlformats.org/drawingml/2006/main" xmlns:r="http://schemas.openxmlformats.org/officeDocument/2006/relationships" xmlns:p="http://schemas.openxmlformats.org/presentationml/2006/main">
   <p:cSld>
     <p:spTree>
@@ -15131,8 +15892,8 @@
           <a:chExt cx="0" cy="0"/>
         </a:xfrm>
       </p:grpSpPr>
-      <mc:AlternateContent xmlns:mc="http://schemas.openxmlformats.org/markup-compatibility/2006">
-        <mc:Choice xmlns:a14="http://schemas.microsoft.com/office/drawing/2010/main" Requires="a14">
+      <mc:AlternateContent xmlns:mc="http://schemas.openxmlformats.org/markup-compatibility/2006" xmlns:a14="http://schemas.microsoft.com/office/drawing/2010/main">
+        <mc:Choice Requires="a14">
           <p:sp>
             <p:nvSpPr>
               <p:cNvPr id="3" name="Inhaltsplatzhalter 2">
@@ -15784,7 +16545,7 @@
             </p:txBody>
           </p:sp>
         </mc:Choice>
-        <mc:Fallback>
+        <mc:Fallback xmlns="">
           <p:sp>
             <p:nvSpPr>
               <p:cNvPr id="3" name="Inhaltsplatzhalter 2">

</xml_diff>

<commit_message>
update gitignore and ppt for two unequal mass calculations
</commit_message>
<xml_diff>
--- a/docu_and_plots/thoughts_and_revelations_during_this_project.pptx
+++ b/docu_and_plots/thoughts_and_revelations_during_this_project.pptx
@@ -279,7 +279,7 @@
           <a:p>
             <a:fld id="{911E94B8-BB3E-4AB9-8BD5-5E2112388417}" type="datetimeFigureOut">
               <a:rPr lang="de-DE" smtClean="0"/>
-              <a:t>23.12.2020</a:t>
+              <a:t>24.12.2020</a:t>
             </a:fld>
             <a:endParaRPr lang="de-DE"/>
           </a:p>
@@ -477,7 +477,7 @@
           <a:p>
             <a:fld id="{911E94B8-BB3E-4AB9-8BD5-5E2112388417}" type="datetimeFigureOut">
               <a:rPr lang="de-DE" smtClean="0"/>
-              <a:t>23.12.2020</a:t>
+              <a:t>24.12.2020</a:t>
             </a:fld>
             <a:endParaRPr lang="de-DE"/>
           </a:p>
@@ -685,7 +685,7 @@
           <a:p>
             <a:fld id="{911E94B8-BB3E-4AB9-8BD5-5E2112388417}" type="datetimeFigureOut">
               <a:rPr lang="de-DE" smtClean="0"/>
-              <a:t>23.12.2020</a:t>
+              <a:t>24.12.2020</a:t>
             </a:fld>
             <a:endParaRPr lang="de-DE"/>
           </a:p>
@@ -883,7 +883,7 @@
           <a:p>
             <a:fld id="{911E94B8-BB3E-4AB9-8BD5-5E2112388417}" type="datetimeFigureOut">
               <a:rPr lang="de-DE" smtClean="0"/>
-              <a:t>23.12.2020</a:t>
+              <a:t>24.12.2020</a:t>
             </a:fld>
             <a:endParaRPr lang="de-DE"/>
           </a:p>
@@ -1158,7 +1158,7 @@
           <a:p>
             <a:fld id="{911E94B8-BB3E-4AB9-8BD5-5E2112388417}" type="datetimeFigureOut">
               <a:rPr lang="de-DE" smtClean="0"/>
-              <a:t>23.12.2020</a:t>
+              <a:t>24.12.2020</a:t>
             </a:fld>
             <a:endParaRPr lang="de-DE"/>
           </a:p>
@@ -1423,7 +1423,7 @@
           <a:p>
             <a:fld id="{911E94B8-BB3E-4AB9-8BD5-5E2112388417}" type="datetimeFigureOut">
               <a:rPr lang="de-DE" smtClean="0"/>
-              <a:t>23.12.2020</a:t>
+              <a:t>24.12.2020</a:t>
             </a:fld>
             <a:endParaRPr lang="de-DE"/>
           </a:p>
@@ -1835,7 +1835,7 @@
           <a:p>
             <a:fld id="{911E94B8-BB3E-4AB9-8BD5-5E2112388417}" type="datetimeFigureOut">
               <a:rPr lang="de-DE" smtClean="0"/>
-              <a:t>23.12.2020</a:t>
+              <a:t>24.12.2020</a:t>
             </a:fld>
             <a:endParaRPr lang="de-DE"/>
           </a:p>
@@ -1976,7 +1976,7 @@
           <a:p>
             <a:fld id="{911E94B8-BB3E-4AB9-8BD5-5E2112388417}" type="datetimeFigureOut">
               <a:rPr lang="de-DE" smtClean="0"/>
-              <a:t>23.12.2020</a:t>
+              <a:t>24.12.2020</a:t>
             </a:fld>
             <a:endParaRPr lang="de-DE"/>
           </a:p>
@@ -2089,7 +2089,7 @@
           <a:p>
             <a:fld id="{911E94B8-BB3E-4AB9-8BD5-5E2112388417}" type="datetimeFigureOut">
               <a:rPr lang="de-DE" smtClean="0"/>
-              <a:t>23.12.2020</a:t>
+              <a:t>24.12.2020</a:t>
             </a:fld>
             <a:endParaRPr lang="de-DE"/>
           </a:p>
@@ -2400,7 +2400,7 @@
           <a:p>
             <a:fld id="{911E94B8-BB3E-4AB9-8BD5-5E2112388417}" type="datetimeFigureOut">
               <a:rPr lang="de-DE" smtClean="0"/>
-              <a:t>23.12.2020</a:t>
+              <a:t>24.12.2020</a:t>
             </a:fld>
             <a:endParaRPr lang="de-DE"/>
           </a:p>
@@ -2688,7 +2688,7 @@
           <a:p>
             <a:fld id="{911E94B8-BB3E-4AB9-8BD5-5E2112388417}" type="datetimeFigureOut">
               <a:rPr lang="de-DE" smtClean="0"/>
-              <a:t>23.12.2020</a:t>
+              <a:t>24.12.2020</a:t>
             </a:fld>
             <a:endParaRPr lang="de-DE"/>
           </a:p>
@@ -2929,7 +2929,7 @@
           <a:p>
             <a:fld id="{911E94B8-BB3E-4AB9-8BD5-5E2112388417}" type="datetimeFigureOut">
               <a:rPr lang="de-DE" smtClean="0"/>
-              <a:t>23.12.2020</a:t>
+              <a:t>24.12.2020</a:t>
             </a:fld>
             <a:endParaRPr lang="de-DE"/>
           </a:p>
@@ -13494,8 +13494,8 @@
           <a:chExt cx="0" cy="0"/>
         </a:xfrm>
       </p:grpSpPr>
-      <mc:AlternateContent xmlns:mc="http://schemas.openxmlformats.org/markup-compatibility/2006">
-        <mc:Choice xmlns:a14="http://schemas.microsoft.com/office/drawing/2010/main" Requires="a14">
+      <mc:AlternateContent xmlns:mc="http://schemas.openxmlformats.org/markup-compatibility/2006" xmlns:a14="http://schemas.microsoft.com/office/drawing/2010/main">
+        <mc:Choice Requires="a14">
           <p:sp>
             <p:nvSpPr>
               <p:cNvPr id="3" name="Inhaltsplatzhalter 2">
@@ -14164,7 +14164,7 @@
             </p:txBody>
           </p:sp>
         </mc:Choice>
-        <mc:Fallback>
+        <mc:Fallback xmlns="">
           <p:sp>
             <p:nvSpPr>
               <p:cNvPr id="3" name="Inhaltsplatzhalter 2">
@@ -14267,8 +14267,8 @@
           <a:chExt cx="0" cy="0"/>
         </a:xfrm>
       </p:grpSpPr>
-      <mc:AlternateContent xmlns:mc="http://schemas.openxmlformats.org/markup-compatibility/2006">
-        <mc:Choice xmlns:a14="http://schemas.microsoft.com/office/drawing/2010/main" Requires="a14">
+      <mc:AlternateContent xmlns:mc="http://schemas.openxmlformats.org/markup-compatibility/2006" xmlns:a14="http://schemas.microsoft.com/office/drawing/2010/main">
+        <mc:Choice Requires="a14">
           <p:sp>
             <p:nvSpPr>
               <p:cNvPr id="3" name="Inhaltsplatzhalter 2">
@@ -15780,7 +15780,7 @@
             </p:txBody>
           </p:sp>
         </mc:Choice>
-        <mc:Fallback>
+        <mc:Fallback xmlns="">
           <p:sp>
             <p:nvSpPr>
               <p:cNvPr id="3" name="Inhaltsplatzhalter 2">
@@ -16926,7 +16926,7 @@
             </p:spPr>
             <p:txBody>
               <a:bodyPr>
-                <a:normAutofit fontScale="55000" lnSpcReduction="20000"/>
+                <a:normAutofit fontScale="47500" lnSpcReduction="20000"/>
               </a:bodyPr>
               <a:lstStyle/>
               <a:p>
@@ -17362,13 +17362,7 @@
                       <a:rPr lang="de-DE" sz="2300" b="0" i="1" smtClean="0">
                         <a:latin typeface="Cambria Math" panose="02040503050406030204" pitchFamily="18" charset="0"/>
                       </a:rPr>
-                      <m:t> </m:t>
-                    </m:r>
-                    <m:r>
-                      <a:rPr lang="de-DE" sz="2300" b="0" i="1" smtClean="0">
-                        <a:latin typeface="Cambria Math" panose="02040503050406030204" pitchFamily="18" charset="0"/>
-                      </a:rPr>
-                      <m:t>  </m:t>
+                      <m:t>   </m:t>
                     </m:r>
                     <m:d>
                       <m:dPr>
@@ -18346,6 +18340,12 @@
                           </a:rPr>
                           <m:t>𝑍</m:t>
                         </m:r>
+                        <m:r>
+                          <a:rPr lang="de-DE" b="0" i="1" smtClean="0">
+                            <a:latin typeface="Cambria Math" panose="02040503050406030204" pitchFamily="18" charset="0"/>
+                          </a:rPr>
+                          <m:t>1</m:t>
+                        </m:r>
                       </m:sub>
                     </m:sSub>
                     <m:r>
@@ -18375,7 +18375,13 @@
                           <a:rPr lang="de-DE" b="0" i="1" smtClean="0">
                             <a:latin typeface="Cambria Math" panose="02040503050406030204" pitchFamily="18" charset="0"/>
                           </a:rPr>
-                          <m:t>𝐺</m:t>
+                          <m:t>𝑍</m:t>
+                        </m:r>
+                        <m:r>
+                          <a:rPr lang="de-DE" b="0" i="1" smtClean="0">
+                            <a:latin typeface="Cambria Math" panose="02040503050406030204" pitchFamily="18" charset="0"/>
+                          </a:rPr>
+                          <m:t>2</m:t>
                         </m:r>
                       </m:sub>
                     </m:sSub>
@@ -18385,14 +18391,12 @@
                       </a:rPr>
                       <m:t>  →</m:t>
                     </m:r>
-                  </m:oMath>
-                </a14:m>
-                <a:r>
-                  <a:rPr lang="de-DE" dirty="0"/>
-                  <a:t>	 </a:t>
-                </a:r>
-                <a14:m>
-                  <m:oMath xmlns:m="http://schemas.openxmlformats.org/officeDocument/2006/math">
+                    <m:r>
+                      <a:rPr lang="de-DE" b="0" i="0" smtClean="0">
+                        <a:latin typeface="Cambria Math" panose="02040503050406030204" pitchFamily="18" charset="0"/>
+                      </a:rPr>
+                      <m:t>  </m:t>
+                    </m:r>
                     <m:f>
                       <m:fPr>
                         <m:ctrlPr>
@@ -18591,13 +18595,12 @@
                         </m:sSub>
                       </m:den>
                     </m:f>
-                  </m:oMath>
-                </a14:m>
-                <a:br>
-                  <a:rPr lang="de-DE" sz="2800" b="0" dirty="0"/>
-                </a:br>
-                <a14:m>
-                  <m:oMath xmlns:m="http://schemas.openxmlformats.org/officeDocument/2006/math">
+                    <m:r>
+                      <a:rPr lang="de-DE" b="0" i="1" smtClean="0">
+                        <a:latin typeface="Cambria Math" panose="02040503050406030204" pitchFamily="18" charset="0"/>
+                      </a:rPr>
+                      <m:t>  →  </m:t>
+                    </m:r>
                     <m:sSub>
                       <m:sSubPr>
                         <m:ctrlPr>
@@ -18801,6 +18804,12 @@
                         </m:sSubSup>
                       </m:e>
                     </m:rad>
+                    <m:r>
+                      <a:rPr lang="de-DE" sz="2800" b="0" i="1" smtClean="0">
+                        <a:latin typeface="Cambria Math" panose="02040503050406030204" pitchFamily="18" charset="0"/>
+                      </a:rPr>
+                      <m:t>   (3)</m:t>
+                    </m:r>
                   </m:oMath>
                 </a14:m>
                 <a:br>
@@ -18808,6 +18817,74 @@
                 </a:br>
                 <a14:m>
                   <m:oMath xmlns:m="http://schemas.openxmlformats.org/officeDocument/2006/math">
+                    <m:sSub>
+                      <m:sSubPr>
+                        <m:ctrlPr>
+                          <a:rPr lang="de-DE" i="1">
+                            <a:latin typeface="Cambria Math" panose="02040503050406030204" pitchFamily="18" charset="0"/>
+                          </a:rPr>
+                        </m:ctrlPr>
+                      </m:sSubPr>
+                      <m:e>
+                        <m:r>
+                          <a:rPr lang="de-DE" i="1">
+                            <a:latin typeface="Cambria Math" panose="02040503050406030204" pitchFamily="18" charset="0"/>
+                          </a:rPr>
+                          <m:t>𝐹</m:t>
+                        </m:r>
+                      </m:e>
+                      <m:sub>
+                        <m:r>
+                          <a:rPr lang="de-DE" i="1">
+                            <a:latin typeface="Cambria Math" panose="02040503050406030204" pitchFamily="18" charset="0"/>
+                          </a:rPr>
+                          <m:t>𝑍</m:t>
+                        </m:r>
+                        <m:r>
+                          <a:rPr lang="de-DE" b="0" i="1" smtClean="0">
+                            <a:latin typeface="Cambria Math" panose="02040503050406030204" pitchFamily="18" charset="0"/>
+                          </a:rPr>
+                          <m:t>2</m:t>
+                        </m:r>
+                      </m:sub>
+                    </m:sSub>
+                    <m:r>
+                      <a:rPr lang="de-DE" i="1">
+                        <a:latin typeface="Cambria Math" panose="02040503050406030204" pitchFamily="18" charset="0"/>
+                      </a:rPr>
+                      <m:t>=</m:t>
+                    </m:r>
+                    <m:sSub>
+                      <m:sSubPr>
+                        <m:ctrlPr>
+                          <a:rPr lang="de-DE" i="1">
+                            <a:latin typeface="Cambria Math" panose="02040503050406030204" pitchFamily="18" charset="0"/>
+                          </a:rPr>
+                        </m:ctrlPr>
+                      </m:sSubPr>
+                      <m:e>
+                        <m:r>
+                          <a:rPr lang="de-DE" i="1">
+                            <a:latin typeface="Cambria Math" panose="02040503050406030204" pitchFamily="18" charset="0"/>
+                          </a:rPr>
+                          <m:t>𝐹</m:t>
+                        </m:r>
+                      </m:e>
+                      <m:sub>
+                        <m:r>
+                          <a:rPr lang="de-DE" b="0" i="1" smtClean="0">
+                            <a:latin typeface="Cambria Math" panose="02040503050406030204" pitchFamily="18" charset="0"/>
+                          </a:rPr>
+                          <m:t>𝐺</m:t>
+                        </m:r>
+                      </m:sub>
+                    </m:sSub>
+                    <m:r>
+                      <a:rPr lang="de-DE" b="0" i="1" smtClean="0">
+                        <a:latin typeface="Cambria Math" panose="02040503050406030204" pitchFamily="18" charset="0"/>
+                      </a:rPr>
+                      <m:t> →  </m:t>
+                    </m:r>
                     <m:f>
                       <m:fPr>
                         <m:ctrlPr>
@@ -19065,6 +19142,1142 @@
                         </m:sSup>
                       </m:den>
                     </m:f>
+                    <m:r>
+                      <a:rPr lang="de-DE" b="0" i="1" smtClean="0">
+                        <a:latin typeface="Cambria Math" panose="02040503050406030204" pitchFamily="18" charset="0"/>
+                      </a:rPr>
+                      <m:t> </m:t>
+                    </m:r>
+                  </m:oMath>
+                </a14:m>
+                <a:br>
+                  <a:rPr lang="de-DE" b="0" i="1" dirty="0">
+                    <a:latin typeface="Cambria Math" panose="02040503050406030204" pitchFamily="18" charset="0"/>
+                  </a:rPr>
+                </a:br>
+                <a14:m>
+                  <m:oMath xmlns:m="http://schemas.openxmlformats.org/officeDocument/2006/math">
+                    <m:r>
+                      <a:rPr lang="de-DE" b="0" i="1" smtClean="0">
+                        <a:latin typeface="Cambria Math" panose="02040503050406030204" pitchFamily="18" charset="0"/>
+                      </a:rPr>
+                      <m:t>→</m:t>
+                    </m:r>
+                    <m:limLow>
+                      <m:limLowPr>
+                        <m:ctrlPr>
+                          <a:rPr lang="de-DE" b="0" i="1" smtClean="0">
+                            <a:latin typeface="Cambria Math" panose="02040503050406030204" pitchFamily="18" charset="0"/>
+                          </a:rPr>
+                        </m:ctrlPr>
+                      </m:limLowPr>
+                      <m:e>
+                        <m:groupChr>
+                          <m:groupChrPr>
+                            <m:chr m:val="⏟"/>
+                            <m:ctrlPr>
+                              <a:rPr lang="de-DE" b="0" i="1" smtClean="0">
+                                <a:latin typeface="Cambria Math" panose="02040503050406030204" pitchFamily="18" charset="0"/>
+                              </a:rPr>
+                            </m:ctrlPr>
+                          </m:groupChrPr>
+                          <m:e>
+                            <m:sSub>
+                              <m:sSubPr>
+                                <m:ctrlPr>
+                                  <a:rPr lang="de-DE" b="0" i="1" smtClean="0">
+                                    <a:latin typeface="Cambria Math" panose="02040503050406030204" pitchFamily="18" charset="0"/>
+                                  </a:rPr>
+                                </m:ctrlPr>
+                              </m:sSubPr>
+                              <m:e>
+                                <m:r>
+                                  <a:rPr lang="de-DE" b="0" i="1" smtClean="0">
+                                    <a:latin typeface="Cambria Math" panose="02040503050406030204" pitchFamily="18" charset="0"/>
+                                  </a:rPr>
+                                  <m:t>𝑚</m:t>
+                                </m:r>
+                              </m:e>
+                              <m:sub>
+                                <m:r>
+                                  <a:rPr lang="de-DE" b="0" i="1" smtClean="0">
+                                    <a:latin typeface="Cambria Math" panose="02040503050406030204" pitchFamily="18" charset="0"/>
+                                  </a:rPr>
+                                  <m:t>2</m:t>
+                                </m:r>
+                              </m:sub>
+                            </m:sSub>
+                            <m:sSubSup>
+                              <m:sSubSupPr>
+                                <m:ctrlPr>
+                                  <a:rPr lang="de-DE" b="0" i="1" smtClean="0">
+                                    <a:latin typeface="Cambria Math" panose="02040503050406030204" pitchFamily="18" charset="0"/>
+                                  </a:rPr>
+                                </m:ctrlPr>
+                              </m:sSubSupPr>
+                              <m:e>
+                                <m:r>
+                                  <a:rPr lang="de-DE" b="0" i="1" smtClean="0">
+                                    <a:latin typeface="Cambria Math" panose="02040503050406030204" pitchFamily="18" charset="0"/>
+                                  </a:rPr>
+                                  <m:t>𝑣</m:t>
+                                </m:r>
+                              </m:e>
+                              <m:sub>
+                                <m:r>
+                                  <a:rPr lang="de-DE" b="0" i="1" smtClean="0">
+                                    <a:latin typeface="Cambria Math" panose="02040503050406030204" pitchFamily="18" charset="0"/>
+                                  </a:rPr>
+                                  <m:t>2</m:t>
+                                </m:r>
+                              </m:sub>
+                              <m:sup>
+                                <m:r>
+                                  <a:rPr lang="de-DE" b="0" i="1" smtClean="0">
+                                    <a:latin typeface="Cambria Math" panose="02040503050406030204" pitchFamily="18" charset="0"/>
+                                  </a:rPr>
+                                  <m:t>2</m:t>
+                                </m:r>
+                              </m:sup>
+                            </m:sSubSup>
+                          </m:e>
+                        </m:groupChr>
+                      </m:e>
+                      <m:lim>
+                        <m:r>
+                          <a:rPr lang="de-DE" b="0" i="1" smtClean="0">
+                            <a:latin typeface="Cambria Math" panose="02040503050406030204" pitchFamily="18" charset="0"/>
+                          </a:rPr>
+                          <m:t>𝑎</m:t>
+                        </m:r>
+                      </m:lim>
+                    </m:limLow>
+                    <m:r>
+                      <a:rPr lang="de-DE" b="0" i="1" smtClean="0">
+                        <a:latin typeface="Cambria Math" panose="02040503050406030204" pitchFamily="18" charset="0"/>
+                      </a:rPr>
+                      <m:t> </m:t>
+                    </m:r>
+                    <m:sSubSup>
+                      <m:sSubSupPr>
+                        <m:ctrlPr>
+                          <a:rPr lang="de-DE" b="0" i="1" smtClean="0">
+                            <a:latin typeface="Cambria Math" panose="02040503050406030204" pitchFamily="18" charset="0"/>
+                          </a:rPr>
+                        </m:ctrlPr>
+                      </m:sSubSupPr>
+                      <m:e>
+                        <m:r>
+                          <a:rPr lang="de-DE" b="0" i="1" smtClean="0">
+                            <a:latin typeface="Cambria Math" panose="02040503050406030204" pitchFamily="18" charset="0"/>
+                          </a:rPr>
+                          <m:t>𝑟</m:t>
+                        </m:r>
+                      </m:e>
+                      <m:sub>
+                        <m:r>
+                          <a:rPr lang="de-DE" b="0" i="1" smtClean="0">
+                            <a:latin typeface="Cambria Math" panose="02040503050406030204" pitchFamily="18" charset="0"/>
+                          </a:rPr>
+                          <m:t>1</m:t>
+                        </m:r>
+                      </m:sub>
+                      <m:sup>
+                        <m:r>
+                          <a:rPr lang="de-DE" b="0" i="1" smtClean="0">
+                            <a:latin typeface="Cambria Math" panose="02040503050406030204" pitchFamily="18" charset="0"/>
+                          </a:rPr>
+                          <m:t>2</m:t>
+                        </m:r>
+                      </m:sup>
+                    </m:sSubSup>
+                    <m:r>
+                      <a:rPr lang="de-DE" i="1">
+                        <a:latin typeface="Cambria Math" panose="02040503050406030204" pitchFamily="18" charset="0"/>
+                      </a:rPr>
+                      <m:t>+</m:t>
+                    </m:r>
+                    <m:limLow>
+                      <m:limLowPr>
+                        <m:ctrlPr>
+                          <a:rPr lang="de-DE" b="0" i="1" smtClean="0">
+                            <a:latin typeface="Cambria Math" panose="02040503050406030204" pitchFamily="18" charset="0"/>
+                          </a:rPr>
+                        </m:ctrlPr>
+                      </m:limLowPr>
+                      <m:e>
+                        <m:groupChr>
+                          <m:groupChrPr>
+                            <m:chr m:val="⏟"/>
+                            <m:ctrlPr>
+                              <a:rPr lang="de-DE" b="0" i="1" smtClean="0">
+                                <a:latin typeface="Cambria Math" panose="02040503050406030204" pitchFamily="18" charset="0"/>
+                              </a:rPr>
+                            </m:ctrlPr>
+                          </m:groupChrPr>
+                          <m:e>
+                            <m:r>
+                              <a:rPr lang="de-DE" i="1">
+                                <a:latin typeface="Cambria Math" panose="02040503050406030204" pitchFamily="18" charset="0"/>
+                              </a:rPr>
+                              <m:t>2</m:t>
+                            </m:r>
+                            <m:sSub>
+                              <m:sSubPr>
+                                <m:ctrlPr>
+                                  <a:rPr lang="de-DE" i="1">
+                                    <a:latin typeface="Cambria Math" panose="02040503050406030204" pitchFamily="18" charset="0"/>
+                                  </a:rPr>
+                                </m:ctrlPr>
+                              </m:sSubPr>
+                              <m:e>
+                                <m:r>
+                                  <a:rPr lang="de-DE" i="1">
+                                    <a:latin typeface="Cambria Math" panose="02040503050406030204" pitchFamily="18" charset="0"/>
+                                  </a:rPr>
+                                  <m:t>𝑚</m:t>
+                                </m:r>
+                              </m:e>
+                              <m:sub>
+                                <m:r>
+                                  <a:rPr lang="de-DE" i="1">
+                                    <a:latin typeface="Cambria Math" panose="02040503050406030204" pitchFamily="18" charset="0"/>
+                                  </a:rPr>
+                                  <m:t>2</m:t>
+                                </m:r>
+                              </m:sub>
+                            </m:sSub>
+                            <m:sSubSup>
+                              <m:sSubSupPr>
+                                <m:ctrlPr>
+                                  <a:rPr lang="de-DE" i="1">
+                                    <a:latin typeface="Cambria Math" panose="02040503050406030204" pitchFamily="18" charset="0"/>
+                                  </a:rPr>
+                                </m:ctrlPr>
+                              </m:sSubSupPr>
+                              <m:e>
+                                <m:r>
+                                  <a:rPr lang="de-DE" i="1">
+                                    <a:latin typeface="Cambria Math" panose="02040503050406030204" pitchFamily="18" charset="0"/>
+                                  </a:rPr>
+                                  <m:t>𝑣</m:t>
+                                </m:r>
+                              </m:e>
+                              <m:sub>
+                                <m:r>
+                                  <a:rPr lang="de-DE" i="1">
+                                    <a:latin typeface="Cambria Math" panose="02040503050406030204" pitchFamily="18" charset="0"/>
+                                  </a:rPr>
+                                  <m:t>2</m:t>
+                                </m:r>
+                              </m:sub>
+                              <m:sup>
+                                <m:r>
+                                  <a:rPr lang="de-DE" i="1">
+                                    <a:latin typeface="Cambria Math" panose="02040503050406030204" pitchFamily="18" charset="0"/>
+                                  </a:rPr>
+                                  <m:t>2</m:t>
+                                </m:r>
+                              </m:sup>
+                            </m:sSubSup>
+                            <m:sSub>
+                              <m:sSubPr>
+                                <m:ctrlPr>
+                                  <a:rPr lang="de-DE" i="1">
+                                    <a:latin typeface="Cambria Math" panose="02040503050406030204" pitchFamily="18" charset="0"/>
+                                  </a:rPr>
+                                </m:ctrlPr>
+                              </m:sSubPr>
+                              <m:e>
+                                <m:r>
+                                  <a:rPr lang="de-DE" i="1">
+                                    <a:latin typeface="Cambria Math" panose="02040503050406030204" pitchFamily="18" charset="0"/>
+                                  </a:rPr>
+                                  <m:t>𝑟</m:t>
+                                </m:r>
+                              </m:e>
+                              <m:sub>
+                                <m:r>
+                                  <a:rPr lang="de-DE" i="1">
+                                    <a:latin typeface="Cambria Math" panose="02040503050406030204" pitchFamily="18" charset="0"/>
+                                  </a:rPr>
+                                  <m:t>2</m:t>
+                                </m:r>
+                              </m:sub>
+                            </m:sSub>
+                          </m:e>
+                        </m:groupChr>
+                      </m:e>
+                      <m:lim>
+                        <m:r>
+                          <a:rPr lang="de-DE" b="0" i="1" smtClean="0">
+                            <a:latin typeface="Cambria Math" panose="02040503050406030204" pitchFamily="18" charset="0"/>
+                          </a:rPr>
+                          <m:t>𝑏</m:t>
+                        </m:r>
+                      </m:lim>
+                    </m:limLow>
+                    <m:r>
+                      <a:rPr lang="de-DE" b="0" i="1" smtClean="0">
+                        <a:latin typeface="Cambria Math" panose="02040503050406030204" pitchFamily="18" charset="0"/>
+                      </a:rPr>
+                      <m:t> </m:t>
+                    </m:r>
+                    <m:sSub>
+                      <m:sSubPr>
+                        <m:ctrlPr>
+                          <a:rPr lang="de-DE" b="0" i="1" smtClean="0">
+                            <a:latin typeface="Cambria Math" panose="02040503050406030204" pitchFamily="18" charset="0"/>
+                          </a:rPr>
+                        </m:ctrlPr>
+                      </m:sSubPr>
+                      <m:e>
+                        <m:r>
+                          <a:rPr lang="de-DE" b="0" i="1" smtClean="0">
+                            <a:latin typeface="Cambria Math" panose="02040503050406030204" pitchFamily="18" charset="0"/>
+                          </a:rPr>
+                          <m:t>𝑟</m:t>
+                        </m:r>
+                      </m:e>
+                      <m:sub>
+                        <m:r>
+                          <a:rPr lang="de-DE" b="0" i="1" smtClean="0">
+                            <a:latin typeface="Cambria Math" panose="02040503050406030204" pitchFamily="18" charset="0"/>
+                          </a:rPr>
+                          <m:t>1</m:t>
+                        </m:r>
+                      </m:sub>
+                    </m:sSub>
+                    <m:r>
+                      <a:rPr lang="de-DE" b="0" i="1" smtClean="0">
+                        <a:latin typeface="Cambria Math" panose="02040503050406030204" pitchFamily="18" charset="0"/>
+                      </a:rPr>
+                      <m:t>+</m:t>
+                    </m:r>
+                    <m:limLow>
+                      <m:limLowPr>
+                        <m:ctrlPr>
+                          <a:rPr lang="de-DE" b="0" i="1" smtClean="0">
+                            <a:latin typeface="Cambria Math" panose="02040503050406030204" pitchFamily="18" charset="0"/>
+                          </a:rPr>
+                        </m:ctrlPr>
+                      </m:limLowPr>
+                      <m:e>
+                        <m:groupChr>
+                          <m:groupChrPr>
+                            <m:chr m:val="⏟"/>
+                            <m:ctrlPr>
+                              <a:rPr lang="de-DE" b="0" i="1" smtClean="0">
+                                <a:latin typeface="Cambria Math" panose="02040503050406030204" pitchFamily="18" charset="0"/>
+                              </a:rPr>
+                            </m:ctrlPr>
+                          </m:groupChrPr>
+                          <m:e>
+                            <m:d>
+                              <m:dPr>
+                                <m:ctrlPr>
+                                  <a:rPr lang="de-DE" b="0" i="1" smtClean="0">
+                                    <a:latin typeface="Cambria Math" panose="02040503050406030204" pitchFamily="18" charset="0"/>
+                                  </a:rPr>
+                                </m:ctrlPr>
+                              </m:dPr>
+                              <m:e>
+                                <m:sSub>
+                                  <m:sSubPr>
+                                    <m:ctrlPr>
+                                      <a:rPr lang="de-DE" b="0" i="1" smtClean="0">
+                                        <a:latin typeface="Cambria Math" panose="02040503050406030204" pitchFamily="18" charset="0"/>
+                                      </a:rPr>
+                                    </m:ctrlPr>
+                                  </m:sSubPr>
+                                  <m:e>
+                                    <m:r>
+                                      <a:rPr lang="de-DE" b="0" i="1" smtClean="0">
+                                        <a:latin typeface="Cambria Math" panose="02040503050406030204" pitchFamily="18" charset="0"/>
+                                      </a:rPr>
+                                      <m:t>𝑚</m:t>
+                                    </m:r>
+                                  </m:e>
+                                  <m:sub>
+                                    <m:r>
+                                      <a:rPr lang="de-DE" b="0" i="1" smtClean="0">
+                                        <a:latin typeface="Cambria Math" panose="02040503050406030204" pitchFamily="18" charset="0"/>
+                                      </a:rPr>
+                                      <m:t>2</m:t>
+                                    </m:r>
+                                  </m:sub>
+                                </m:sSub>
+                                <m:sSubSup>
+                                  <m:sSubSupPr>
+                                    <m:ctrlPr>
+                                      <a:rPr lang="de-DE" b="0" i="1" smtClean="0">
+                                        <a:latin typeface="Cambria Math" panose="02040503050406030204" pitchFamily="18" charset="0"/>
+                                      </a:rPr>
+                                    </m:ctrlPr>
+                                  </m:sSubSupPr>
+                                  <m:e>
+                                    <m:r>
+                                      <a:rPr lang="de-DE" b="0" i="1" smtClean="0">
+                                        <a:latin typeface="Cambria Math" panose="02040503050406030204" pitchFamily="18" charset="0"/>
+                                      </a:rPr>
+                                      <m:t>𝑣</m:t>
+                                    </m:r>
+                                  </m:e>
+                                  <m:sub>
+                                    <m:r>
+                                      <a:rPr lang="de-DE" b="0" i="1" smtClean="0">
+                                        <a:latin typeface="Cambria Math" panose="02040503050406030204" pitchFamily="18" charset="0"/>
+                                      </a:rPr>
+                                      <m:t>2</m:t>
+                                    </m:r>
+                                  </m:sub>
+                                  <m:sup>
+                                    <m:r>
+                                      <a:rPr lang="de-DE" b="0" i="1" smtClean="0">
+                                        <a:latin typeface="Cambria Math" panose="02040503050406030204" pitchFamily="18" charset="0"/>
+                                      </a:rPr>
+                                      <m:t>2</m:t>
+                                    </m:r>
+                                  </m:sup>
+                                </m:sSubSup>
+                                <m:sSubSup>
+                                  <m:sSubSupPr>
+                                    <m:ctrlPr>
+                                      <a:rPr lang="de-DE" b="0" i="1" smtClean="0">
+                                        <a:latin typeface="Cambria Math" panose="02040503050406030204" pitchFamily="18" charset="0"/>
+                                      </a:rPr>
+                                    </m:ctrlPr>
+                                  </m:sSubSupPr>
+                                  <m:e>
+                                    <m:r>
+                                      <a:rPr lang="de-DE" b="0" i="1" smtClean="0">
+                                        <a:latin typeface="Cambria Math" panose="02040503050406030204" pitchFamily="18" charset="0"/>
+                                      </a:rPr>
+                                      <m:t>𝑟</m:t>
+                                    </m:r>
+                                  </m:e>
+                                  <m:sub>
+                                    <m:r>
+                                      <a:rPr lang="de-DE" b="0" i="1" smtClean="0">
+                                        <a:latin typeface="Cambria Math" panose="02040503050406030204" pitchFamily="18" charset="0"/>
+                                      </a:rPr>
+                                      <m:t>2</m:t>
+                                    </m:r>
+                                  </m:sub>
+                                  <m:sup>
+                                    <m:r>
+                                      <a:rPr lang="de-DE" b="0" i="1" smtClean="0">
+                                        <a:latin typeface="Cambria Math" panose="02040503050406030204" pitchFamily="18" charset="0"/>
+                                      </a:rPr>
+                                      <m:t>2</m:t>
+                                    </m:r>
+                                  </m:sup>
+                                </m:sSubSup>
+                                <m:r>
+                                  <a:rPr lang="de-DE" b="0" i="1" smtClean="0">
+                                    <a:latin typeface="Cambria Math" panose="02040503050406030204" pitchFamily="18" charset="0"/>
+                                  </a:rPr>
+                                  <m:t>−</m:t>
+                                </m:r>
+                                <m:r>
+                                  <a:rPr lang="de-DE" b="0" i="1" smtClean="0">
+                                    <a:latin typeface="Cambria Math" panose="02040503050406030204" pitchFamily="18" charset="0"/>
+                                  </a:rPr>
+                                  <m:t>𝐺</m:t>
+                                </m:r>
+                                <m:sSub>
+                                  <m:sSubPr>
+                                    <m:ctrlPr>
+                                      <a:rPr lang="de-DE" b="0" i="1" smtClean="0">
+                                        <a:latin typeface="Cambria Math" panose="02040503050406030204" pitchFamily="18" charset="0"/>
+                                      </a:rPr>
+                                    </m:ctrlPr>
+                                  </m:sSubPr>
+                                  <m:e>
+                                    <m:r>
+                                      <a:rPr lang="de-DE" b="0" i="1" smtClean="0">
+                                        <a:latin typeface="Cambria Math" panose="02040503050406030204" pitchFamily="18" charset="0"/>
+                                      </a:rPr>
+                                      <m:t>𝑚</m:t>
+                                    </m:r>
+                                  </m:e>
+                                  <m:sub>
+                                    <m:r>
+                                      <a:rPr lang="de-DE" b="0" i="1" smtClean="0">
+                                        <a:latin typeface="Cambria Math" panose="02040503050406030204" pitchFamily="18" charset="0"/>
+                                      </a:rPr>
+                                      <m:t>1</m:t>
+                                    </m:r>
+                                  </m:sub>
+                                </m:sSub>
+                                <m:sSub>
+                                  <m:sSubPr>
+                                    <m:ctrlPr>
+                                      <a:rPr lang="de-DE" b="0" i="1" smtClean="0">
+                                        <a:latin typeface="Cambria Math" panose="02040503050406030204" pitchFamily="18" charset="0"/>
+                                      </a:rPr>
+                                    </m:ctrlPr>
+                                  </m:sSubPr>
+                                  <m:e>
+                                    <m:r>
+                                      <a:rPr lang="de-DE" b="0" i="1" smtClean="0">
+                                        <a:latin typeface="Cambria Math" panose="02040503050406030204" pitchFamily="18" charset="0"/>
+                                      </a:rPr>
+                                      <m:t>𝑚</m:t>
+                                    </m:r>
+                                  </m:e>
+                                  <m:sub>
+                                    <m:r>
+                                      <a:rPr lang="de-DE" b="0" i="1" smtClean="0">
+                                        <a:latin typeface="Cambria Math" panose="02040503050406030204" pitchFamily="18" charset="0"/>
+                                      </a:rPr>
+                                      <m:t>2</m:t>
+                                    </m:r>
+                                  </m:sub>
+                                </m:sSub>
+                                <m:sSub>
+                                  <m:sSubPr>
+                                    <m:ctrlPr>
+                                      <a:rPr lang="de-DE" b="0" i="1" smtClean="0">
+                                        <a:latin typeface="Cambria Math" panose="02040503050406030204" pitchFamily="18" charset="0"/>
+                                      </a:rPr>
+                                    </m:ctrlPr>
+                                  </m:sSubPr>
+                                  <m:e>
+                                    <m:r>
+                                      <a:rPr lang="de-DE" b="0" i="1" smtClean="0">
+                                        <a:latin typeface="Cambria Math" panose="02040503050406030204" pitchFamily="18" charset="0"/>
+                                      </a:rPr>
+                                      <m:t>𝑟</m:t>
+                                    </m:r>
+                                  </m:e>
+                                  <m:sub>
+                                    <m:r>
+                                      <a:rPr lang="de-DE" b="0" i="1" smtClean="0">
+                                        <a:latin typeface="Cambria Math" panose="02040503050406030204" pitchFamily="18" charset="0"/>
+                                      </a:rPr>
+                                      <m:t>2</m:t>
+                                    </m:r>
+                                  </m:sub>
+                                </m:sSub>
+                              </m:e>
+                            </m:d>
+                          </m:e>
+                        </m:groupChr>
+                      </m:e>
+                      <m:lim>
+                        <m:r>
+                          <a:rPr lang="de-DE" b="0" i="1" smtClean="0">
+                            <a:latin typeface="Cambria Math" panose="02040503050406030204" pitchFamily="18" charset="0"/>
+                          </a:rPr>
+                          <m:t>𝑐</m:t>
+                        </m:r>
+                      </m:lim>
+                    </m:limLow>
+                    <m:r>
+                      <a:rPr lang="de-DE" b="0" i="1" smtClean="0">
+                        <a:latin typeface="Cambria Math" panose="02040503050406030204" pitchFamily="18" charset="0"/>
+                      </a:rPr>
+                      <m:t>=0</m:t>
+                    </m:r>
+                  </m:oMath>
+                </a14:m>
+                <a:br>
+                  <a:rPr lang="de-DE" b="0" i="1" dirty="0">
+                    <a:latin typeface="Cambria Math" panose="02040503050406030204" pitchFamily="18" charset="0"/>
+                  </a:rPr>
+                </a:br>
+                <a14:m>
+                  <m:oMath xmlns:m="http://schemas.openxmlformats.org/officeDocument/2006/math">
+                    <m:sSub>
+                      <m:sSubPr>
+                        <m:ctrlPr>
+                          <a:rPr lang="de-DE" b="0" i="1" smtClean="0">
+                            <a:latin typeface="Cambria Math" panose="02040503050406030204" pitchFamily="18" charset="0"/>
+                          </a:rPr>
+                        </m:ctrlPr>
+                      </m:sSubPr>
+                      <m:e>
+                        <m:r>
+                          <a:rPr lang="de-DE" b="0" i="1" smtClean="0">
+                            <a:latin typeface="Cambria Math" panose="02040503050406030204" pitchFamily="18" charset="0"/>
+                          </a:rPr>
+                          <m:t>𝑟</m:t>
+                        </m:r>
+                      </m:e>
+                      <m:sub>
+                        <m:r>
+                          <a:rPr lang="de-DE" b="0" i="1" smtClean="0">
+                            <a:latin typeface="Cambria Math" panose="02040503050406030204" pitchFamily="18" charset="0"/>
+                          </a:rPr>
+                          <m:t>1,   0/1</m:t>
+                        </m:r>
+                      </m:sub>
+                    </m:sSub>
+                    <m:r>
+                      <a:rPr lang="de-DE" b="0" i="1" smtClean="0">
+                        <a:latin typeface="Cambria Math" panose="02040503050406030204" pitchFamily="18" charset="0"/>
+                      </a:rPr>
+                      <m:t>=</m:t>
+                    </m:r>
+                    <m:f>
+                      <m:fPr>
+                        <m:ctrlPr>
+                          <a:rPr lang="de-DE" b="0" i="1" smtClean="0">
+                            <a:latin typeface="Cambria Math" panose="02040503050406030204" pitchFamily="18" charset="0"/>
+                          </a:rPr>
+                        </m:ctrlPr>
+                      </m:fPr>
+                      <m:num>
+                        <m:r>
+                          <a:rPr lang="de-DE" b="0" i="1" smtClean="0">
+                            <a:latin typeface="Cambria Math" panose="02040503050406030204" pitchFamily="18" charset="0"/>
+                          </a:rPr>
+                          <m:t>−</m:t>
+                        </m:r>
+                        <m:r>
+                          <a:rPr lang="de-DE" b="0" i="1" smtClean="0">
+                            <a:latin typeface="Cambria Math" panose="02040503050406030204" pitchFamily="18" charset="0"/>
+                          </a:rPr>
+                          <m:t>𝑏</m:t>
+                        </m:r>
+                        <m:r>
+                          <a:rPr lang="de-DE" b="0" i="1" smtClean="0">
+                            <a:latin typeface="Cambria Math" panose="02040503050406030204" pitchFamily="18" charset="0"/>
+                          </a:rPr>
+                          <m:t>±</m:t>
+                        </m:r>
+                        <m:rad>
+                          <m:radPr>
+                            <m:degHide m:val="on"/>
+                            <m:ctrlPr>
+                              <a:rPr lang="de-DE" b="0" i="1" smtClean="0">
+                                <a:latin typeface="Cambria Math" panose="02040503050406030204" pitchFamily="18" charset="0"/>
+                              </a:rPr>
+                            </m:ctrlPr>
+                          </m:radPr>
+                          <m:deg/>
+                          <m:e>
+                            <m:sSup>
+                              <m:sSupPr>
+                                <m:ctrlPr>
+                                  <a:rPr lang="de-DE" b="0" i="1" smtClean="0">
+                                    <a:latin typeface="Cambria Math" panose="02040503050406030204" pitchFamily="18" charset="0"/>
+                                  </a:rPr>
+                                </m:ctrlPr>
+                              </m:sSupPr>
+                              <m:e>
+                                <m:r>
+                                  <a:rPr lang="de-DE" b="0" i="1" smtClean="0">
+                                    <a:latin typeface="Cambria Math" panose="02040503050406030204" pitchFamily="18" charset="0"/>
+                                  </a:rPr>
+                                  <m:t>𝑏</m:t>
+                                </m:r>
+                              </m:e>
+                              <m:sup>
+                                <m:r>
+                                  <a:rPr lang="de-DE" b="0" i="1" smtClean="0">
+                                    <a:latin typeface="Cambria Math" panose="02040503050406030204" pitchFamily="18" charset="0"/>
+                                  </a:rPr>
+                                  <m:t>2</m:t>
+                                </m:r>
+                              </m:sup>
+                            </m:sSup>
+                            <m:r>
+                              <a:rPr lang="de-DE" b="0" i="1" smtClean="0">
+                                <a:latin typeface="Cambria Math" panose="02040503050406030204" pitchFamily="18" charset="0"/>
+                              </a:rPr>
+                              <m:t>−4</m:t>
+                            </m:r>
+                            <m:r>
+                              <a:rPr lang="de-DE" b="0" i="1" smtClean="0">
+                                <a:latin typeface="Cambria Math" panose="02040503050406030204" pitchFamily="18" charset="0"/>
+                              </a:rPr>
+                              <m:t>𝑎𝑐</m:t>
+                            </m:r>
+                          </m:e>
+                        </m:rad>
+                      </m:num>
+                      <m:den>
+                        <m:r>
+                          <a:rPr lang="de-DE" b="0" i="1" smtClean="0">
+                            <a:latin typeface="Cambria Math" panose="02040503050406030204" pitchFamily="18" charset="0"/>
+                          </a:rPr>
+                          <m:t>2</m:t>
+                        </m:r>
+                        <m:r>
+                          <a:rPr lang="de-DE" b="0" i="1" smtClean="0">
+                            <a:latin typeface="Cambria Math" panose="02040503050406030204" pitchFamily="18" charset="0"/>
+                          </a:rPr>
+                          <m:t>𝑎</m:t>
+                        </m:r>
+                      </m:den>
+                    </m:f>
+                  </m:oMath>
+                </a14:m>
+                <a:br>
+                  <a:rPr lang="de-DE" sz="2800" b="0" dirty="0"/>
+                </a:br>
+                <a:r>
+                  <a:rPr lang="de-DE" sz="2800" b="0" dirty="0" err="1"/>
+                  <a:t>with</a:t>
+                </a:r>
+                <a:r>
+                  <a:rPr lang="de-DE" sz="2800" b="0" dirty="0"/>
+                  <a:t> </a:t>
+                </a:r>
+                <a:r>
+                  <a:rPr lang="de-DE" sz="2800" b="0" dirty="0" err="1"/>
+                  <a:t>discriminant</a:t>
+                </a:r>
+                <a:r>
+                  <a:rPr lang="de-DE" sz="2800" b="0" dirty="0"/>
+                  <a:t>: </a:t>
+                </a:r>
+                <a14:m>
+                  <m:oMath xmlns:m="http://schemas.openxmlformats.org/officeDocument/2006/math">
+                    <m:sSup>
+                      <m:sSupPr>
+                        <m:ctrlPr>
+                          <a:rPr lang="de-DE" b="0" i="1" smtClean="0">
+                            <a:latin typeface="Cambria Math" panose="02040503050406030204" pitchFamily="18" charset="0"/>
+                          </a:rPr>
+                        </m:ctrlPr>
+                      </m:sSupPr>
+                      <m:e>
+                        <m:r>
+                          <a:rPr lang="de-DE" b="0" i="1" smtClean="0">
+                            <a:latin typeface="Cambria Math" panose="02040503050406030204" pitchFamily="18" charset="0"/>
+                          </a:rPr>
+                          <m:t>𝑏</m:t>
+                        </m:r>
+                      </m:e>
+                      <m:sup>
+                        <m:r>
+                          <a:rPr lang="de-DE" b="0" i="1" smtClean="0">
+                            <a:latin typeface="Cambria Math" panose="02040503050406030204" pitchFamily="18" charset="0"/>
+                          </a:rPr>
+                          <m:t>2</m:t>
+                        </m:r>
+                      </m:sup>
+                    </m:sSup>
+                    <m:r>
+                      <a:rPr lang="de-DE" sz="2800" b="0" i="1" smtClean="0">
+                        <a:latin typeface="Cambria Math" panose="02040503050406030204" pitchFamily="18" charset="0"/>
+                      </a:rPr>
+                      <m:t>−4</m:t>
+                    </m:r>
+                    <m:r>
+                      <a:rPr lang="de-DE" sz="2800" b="0" i="1" smtClean="0">
+                        <a:latin typeface="Cambria Math" panose="02040503050406030204" pitchFamily="18" charset="0"/>
+                      </a:rPr>
+                      <m:t>𝑎𝑐</m:t>
+                    </m:r>
+                    <m:r>
+                      <a:rPr lang="de-DE" sz="2800" b="0" i="1" smtClean="0">
+                        <a:latin typeface="Cambria Math" panose="02040503050406030204" pitchFamily="18" charset="0"/>
+                      </a:rPr>
+                      <m:t>=4</m:t>
+                    </m:r>
+                    <m:sSubSup>
+                      <m:sSubSupPr>
+                        <m:ctrlPr>
+                          <a:rPr lang="de-DE" sz="2800" b="0" i="1" smtClean="0">
+                            <a:latin typeface="Cambria Math" panose="02040503050406030204" pitchFamily="18" charset="0"/>
+                          </a:rPr>
+                        </m:ctrlPr>
+                      </m:sSubSupPr>
+                      <m:e>
+                        <m:r>
+                          <a:rPr lang="de-DE" sz="2800" b="0" i="1" smtClean="0">
+                            <a:latin typeface="Cambria Math" panose="02040503050406030204" pitchFamily="18" charset="0"/>
+                          </a:rPr>
+                          <m:t>𝑚</m:t>
+                        </m:r>
+                      </m:e>
+                      <m:sub>
+                        <m:r>
+                          <a:rPr lang="de-DE" sz="2800" b="0" i="1" smtClean="0">
+                            <a:latin typeface="Cambria Math" panose="02040503050406030204" pitchFamily="18" charset="0"/>
+                          </a:rPr>
+                          <m:t>2</m:t>
+                        </m:r>
+                      </m:sub>
+                      <m:sup>
+                        <m:r>
+                          <a:rPr lang="de-DE" sz="2800" b="0" i="1" smtClean="0">
+                            <a:latin typeface="Cambria Math" panose="02040503050406030204" pitchFamily="18" charset="0"/>
+                          </a:rPr>
+                          <m:t>2</m:t>
+                        </m:r>
+                      </m:sup>
+                    </m:sSubSup>
+                    <m:sSubSup>
+                      <m:sSubSupPr>
+                        <m:ctrlPr>
+                          <a:rPr lang="de-DE" sz="2800" b="0" i="1" smtClean="0">
+                            <a:latin typeface="Cambria Math" panose="02040503050406030204" pitchFamily="18" charset="0"/>
+                          </a:rPr>
+                        </m:ctrlPr>
+                      </m:sSubSupPr>
+                      <m:e>
+                        <m:r>
+                          <a:rPr lang="de-DE" sz="2800" b="0" i="1" smtClean="0">
+                            <a:latin typeface="Cambria Math" panose="02040503050406030204" pitchFamily="18" charset="0"/>
+                          </a:rPr>
+                          <m:t>𝑣</m:t>
+                        </m:r>
+                      </m:e>
+                      <m:sub>
+                        <m:r>
+                          <a:rPr lang="de-DE" sz="2800" b="0" i="1" smtClean="0">
+                            <a:latin typeface="Cambria Math" panose="02040503050406030204" pitchFamily="18" charset="0"/>
+                          </a:rPr>
+                          <m:t>2</m:t>
+                        </m:r>
+                      </m:sub>
+                      <m:sup>
+                        <m:r>
+                          <a:rPr lang="de-DE" sz="2800" b="0" i="1" smtClean="0">
+                            <a:latin typeface="Cambria Math" panose="02040503050406030204" pitchFamily="18" charset="0"/>
+                          </a:rPr>
+                          <m:t>4</m:t>
+                        </m:r>
+                      </m:sup>
+                    </m:sSubSup>
+                    <m:sSubSup>
+                      <m:sSubSupPr>
+                        <m:ctrlPr>
+                          <a:rPr lang="de-DE" sz="2800" b="0" i="1" smtClean="0">
+                            <a:latin typeface="Cambria Math" panose="02040503050406030204" pitchFamily="18" charset="0"/>
+                          </a:rPr>
+                        </m:ctrlPr>
+                      </m:sSubSupPr>
+                      <m:e>
+                        <m:r>
+                          <a:rPr lang="de-DE" sz="2800" b="0" i="1" smtClean="0">
+                            <a:latin typeface="Cambria Math" panose="02040503050406030204" pitchFamily="18" charset="0"/>
+                          </a:rPr>
+                          <m:t>𝑟</m:t>
+                        </m:r>
+                      </m:e>
+                      <m:sub>
+                        <m:r>
+                          <a:rPr lang="de-DE" sz="2800" b="0" i="1" smtClean="0">
+                            <a:latin typeface="Cambria Math" panose="02040503050406030204" pitchFamily="18" charset="0"/>
+                          </a:rPr>
+                          <m:t>2</m:t>
+                        </m:r>
+                      </m:sub>
+                      <m:sup>
+                        <m:r>
+                          <a:rPr lang="de-DE" sz="2800" b="0" i="1" smtClean="0">
+                            <a:latin typeface="Cambria Math" panose="02040503050406030204" pitchFamily="18" charset="0"/>
+                          </a:rPr>
+                          <m:t>2</m:t>
+                        </m:r>
+                      </m:sup>
+                    </m:sSubSup>
+                    <m:r>
+                      <a:rPr lang="de-DE" sz="2800" b="0" i="1" smtClean="0">
+                        <a:latin typeface="Cambria Math" panose="02040503050406030204" pitchFamily="18" charset="0"/>
+                      </a:rPr>
+                      <m:t>−4</m:t>
+                    </m:r>
+                    <m:sSub>
+                      <m:sSubPr>
+                        <m:ctrlPr>
+                          <a:rPr lang="de-DE" sz="2800" b="0" i="1" smtClean="0">
+                            <a:latin typeface="Cambria Math" panose="02040503050406030204" pitchFamily="18" charset="0"/>
+                          </a:rPr>
+                        </m:ctrlPr>
+                      </m:sSubPr>
+                      <m:e>
+                        <m:r>
+                          <a:rPr lang="de-DE" sz="2800" b="0" i="1" smtClean="0">
+                            <a:latin typeface="Cambria Math" panose="02040503050406030204" pitchFamily="18" charset="0"/>
+                          </a:rPr>
+                          <m:t>𝑚</m:t>
+                        </m:r>
+                      </m:e>
+                      <m:sub>
+                        <m:r>
+                          <a:rPr lang="de-DE" sz="2800" b="0" i="1" smtClean="0">
+                            <a:latin typeface="Cambria Math" panose="02040503050406030204" pitchFamily="18" charset="0"/>
+                          </a:rPr>
+                          <m:t>2</m:t>
+                        </m:r>
+                      </m:sub>
+                    </m:sSub>
+                    <m:sSubSup>
+                      <m:sSubSupPr>
+                        <m:ctrlPr>
+                          <a:rPr lang="de-DE" sz="2800" b="0" i="1" smtClean="0">
+                            <a:latin typeface="Cambria Math" panose="02040503050406030204" pitchFamily="18" charset="0"/>
+                          </a:rPr>
+                        </m:ctrlPr>
+                      </m:sSubSupPr>
+                      <m:e>
+                        <m:r>
+                          <a:rPr lang="de-DE" sz="2800" b="0" i="1" smtClean="0">
+                            <a:latin typeface="Cambria Math" panose="02040503050406030204" pitchFamily="18" charset="0"/>
+                          </a:rPr>
+                          <m:t>𝑣</m:t>
+                        </m:r>
+                      </m:e>
+                      <m:sub>
+                        <m:r>
+                          <a:rPr lang="de-DE" sz="2800" b="0" i="1" smtClean="0">
+                            <a:latin typeface="Cambria Math" panose="02040503050406030204" pitchFamily="18" charset="0"/>
+                          </a:rPr>
+                          <m:t>2</m:t>
+                        </m:r>
+                      </m:sub>
+                      <m:sup>
+                        <m:r>
+                          <a:rPr lang="de-DE" sz="2800" b="0" i="1" smtClean="0">
+                            <a:latin typeface="Cambria Math" panose="02040503050406030204" pitchFamily="18" charset="0"/>
+                          </a:rPr>
+                          <m:t>2</m:t>
+                        </m:r>
+                      </m:sup>
+                    </m:sSubSup>
+                    <m:sSub>
+                      <m:sSubPr>
+                        <m:ctrlPr>
+                          <a:rPr lang="de-DE" sz="2800" b="0" i="1" smtClean="0">
+                            <a:latin typeface="Cambria Math" panose="02040503050406030204" pitchFamily="18" charset="0"/>
+                          </a:rPr>
+                        </m:ctrlPr>
+                      </m:sSubPr>
+                      <m:e>
+                        <m:r>
+                          <a:rPr lang="de-DE" sz="2800" b="0" i="1" smtClean="0">
+                            <a:latin typeface="Cambria Math" panose="02040503050406030204" pitchFamily="18" charset="0"/>
+                          </a:rPr>
+                          <m:t>𝑚</m:t>
+                        </m:r>
+                      </m:e>
+                      <m:sub>
+                        <m:r>
+                          <a:rPr lang="de-DE" sz="2800" b="0" i="1" smtClean="0">
+                            <a:latin typeface="Cambria Math" panose="02040503050406030204" pitchFamily="18" charset="0"/>
+                          </a:rPr>
+                          <m:t>2</m:t>
+                        </m:r>
+                      </m:sub>
+                    </m:sSub>
+                    <m:sSubSup>
+                      <m:sSubSupPr>
+                        <m:ctrlPr>
+                          <a:rPr lang="de-DE" sz="2800" b="0" i="1" smtClean="0">
+                            <a:latin typeface="Cambria Math" panose="02040503050406030204" pitchFamily="18" charset="0"/>
+                          </a:rPr>
+                        </m:ctrlPr>
+                      </m:sSubSupPr>
+                      <m:e>
+                        <m:r>
+                          <a:rPr lang="de-DE" sz="2800" b="0" i="1" smtClean="0">
+                            <a:latin typeface="Cambria Math" panose="02040503050406030204" pitchFamily="18" charset="0"/>
+                          </a:rPr>
+                          <m:t>𝑣</m:t>
+                        </m:r>
+                      </m:e>
+                      <m:sub>
+                        <m:r>
+                          <a:rPr lang="de-DE" sz="2800" b="0" i="1" smtClean="0">
+                            <a:latin typeface="Cambria Math" panose="02040503050406030204" pitchFamily="18" charset="0"/>
+                          </a:rPr>
+                          <m:t>2</m:t>
+                        </m:r>
+                      </m:sub>
+                      <m:sup>
+                        <m:r>
+                          <a:rPr lang="de-DE" sz="2800" b="0" i="1" smtClean="0">
+                            <a:latin typeface="Cambria Math" panose="02040503050406030204" pitchFamily="18" charset="0"/>
+                          </a:rPr>
+                          <m:t>2</m:t>
+                        </m:r>
+                      </m:sup>
+                    </m:sSubSup>
+                    <m:sSubSup>
+                      <m:sSubSupPr>
+                        <m:ctrlPr>
+                          <a:rPr lang="de-DE" sz="2800" b="0" i="1" smtClean="0">
+                            <a:latin typeface="Cambria Math" panose="02040503050406030204" pitchFamily="18" charset="0"/>
+                          </a:rPr>
+                        </m:ctrlPr>
+                      </m:sSubSupPr>
+                      <m:e>
+                        <m:r>
+                          <a:rPr lang="de-DE" sz="2800" b="0" i="1" smtClean="0">
+                            <a:latin typeface="Cambria Math" panose="02040503050406030204" pitchFamily="18" charset="0"/>
+                          </a:rPr>
+                          <m:t>𝑟</m:t>
+                        </m:r>
+                      </m:e>
+                      <m:sub>
+                        <m:r>
+                          <a:rPr lang="de-DE" sz="2800" b="0" i="1" smtClean="0">
+                            <a:latin typeface="Cambria Math" panose="02040503050406030204" pitchFamily="18" charset="0"/>
+                          </a:rPr>
+                          <m:t>2</m:t>
+                        </m:r>
+                      </m:sub>
+                      <m:sup>
+                        <m:r>
+                          <a:rPr lang="de-DE" sz="2800" b="0" i="1" smtClean="0">
+                            <a:latin typeface="Cambria Math" panose="02040503050406030204" pitchFamily="18" charset="0"/>
+                          </a:rPr>
+                          <m:t>2</m:t>
+                        </m:r>
+                      </m:sup>
+                    </m:sSubSup>
+                    <m:r>
+                      <a:rPr lang="de-DE" sz="2800" b="0" i="1" smtClean="0">
+                        <a:latin typeface="Cambria Math" panose="02040503050406030204" pitchFamily="18" charset="0"/>
+                      </a:rPr>
+                      <m:t>+4</m:t>
+                    </m:r>
+                    <m:sSub>
+                      <m:sSubPr>
+                        <m:ctrlPr>
+                          <a:rPr lang="de-DE" sz="2800" b="0" i="1" smtClean="0">
+                            <a:latin typeface="Cambria Math" panose="02040503050406030204" pitchFamily="18" charset="0"/>
+                          </a:rPr>
+                        </m:ctrlPr>
+                      </m:sSubPr>
+                      <m:e>
+                        <m:r>
+                          <a:rPr lang="de-DE" sz="2800" b="0" i="1" smtClean="0">
+                            <a:latin typeface="Cambria Math" panose="02040503050406030204" pitchFamily="18" charset="0"/>
+                          </a:rPr>
+                          <m:t>𝑚</m:t>
+                        </m:r>
+                      </m:e>
+                      <m:sub>
+                        <m:r>
+                          <a:rPr lang="de-DE" sz="2800" b="0" i="1" smtClean="0">
+                            <a:latin typeface="Cambria Math" panose="02040503050406030204" pitchFamily="18" charset="0"/>
+                          </a:rPr>
+                          <m:t>2</m:t>
+                        </m:r>
+                      </m:sub>
+                    </m:sSub>
+                    <m:sSubSup>
+                      <m:sSubSupPr>
+                        <m:ctrlPr>
+                          <a:rPr lang="de-DE" sz="2800" b="0" i="1" smtClean="0">
+                            <a:latin typeface="Cambria Math" panose="02040503050406030204" pitchFamily="18" charset="0"/>
+                          </a:rPr>
+                        </m:ctrlPr>
+                      </m:sSubSupPr>
+                      <m:e>
+                        <m:r>
+                          <a:rPr lang="de-DE" sz="2800" b="0" i="1" smtClean="0">
+                            <a:latin typeface="Cambria Math" panose="02040503050406030204" pitchFamily="18" charset="0"/>
+                          </a:rPr>
+                          <m:t>𝑣</m:t>
+                        </m:r>
+                      </m:e>
+                      <m:sub>
+                        <m:r>
+                          <a:rPr lang="de-DE" sz="2800" b="0" i="1" smtClean="0">
+                            <a:latin typeface="Cambria Math" panose="02040503050406030204" pitchFamily="18" charset="0"/>
+                          </a:rPr>
+                          <m:t>2</m:t>
+                        </m:r>
+                      </m:sub>
+                      <m:sup>
+                        <m:r>
+                          <a:rPr lang="de-DE" sz="2800" b="0" i="1" smtClean="0">
+                            <a:latin typeface="Cambria Math" panose="02040503050406030204" pitchFamily="18" charset="0"/>
+                          </a:rPr>
+                          <m:t>2</m:t>
+                        </m:r>
+                      </m:sup>
+                    </m:sSubSup>
+                    <m:r>
+                      <a:rPr lang="de-DE" sz="2800" b="0" i="1" smtClean="0">
+                        <a:latin typeface="Cambria Math" panose="02040503050406030204" pitchFamily="18" charset="0"/>
+                      </a:rPr>
+                      <m:t>𝐺</m:t>
+                    </m:r>
+                    <m:sSub>
+                      <m:sSubPr>
+                        <m:ctrlPr>
+                          <a:rPr lang="de-DE" sz="2800" b="0" i="1" smtClean="0">
+                            <a:latin typeface="Cambria Math" panose="02040503050406030204" pitchFamily="18" charset="0"/>
+                          </a:rPr>
+                        </m:ctrlPr>
+                      </m:sSubPr>
+                      <m:e>
+                        <m:r>
+                          <a:rPr lang="de-DE" sz="2800" b="0" i="1" smtClean="0">
+                            <a:latin typeface="Cambria Math" panose="02040503050406030204" pitchFamily="18" charset="0"/>
+                          </a:rPr>
+                          <m:t>𝑚</m:t>
+                        </m:r>
+                      </m:e>
+                      <m:sub>
+                        <m:r>
+                          <a:rPr lang="de-DE" sz="2800" b="0" i="1" smtClean="0">
+                            <a:latin typeface="Cambria Math" panose="02040503050406030204" pitchFamily="18" charset="0"/>
+                          </a:rPr>
+                          <m:t>1</m:t>
+                        </m:r>
+                      </m:sub>
+                    </m:sSub>
+                    <m:sSub>
+                      <m:sSubPr>
+                        <m:ctrlPr>
+                          <a:rPr lang="de-DE" sz="2800" b="0" i="1" smtClean="0">
+                            <a:latin typeface="Cambria Math" panose="02040503050406030204" pitchFamily="18" charset="0"/>
+                          </a:rPr>
+                        </m:ctrlPr>
+                      </m:sSubPr>
+                      <m:e>
+                        <m:r>
+                          <a:rPr lang="de-DE" sz="2800" b="0" i="1" smtClean="0">
+                            <a:latin typeface="Cambria Math" panose="02040503050406030204" pitchFamily="18" charset="0"/>
+                          </a:rPr>
+                          <m:t>𝑚</m:t>
+                        </m:r>
+                      </m:e>
+                      <m:sub>
+                        <m:r>
+                          <a:rPr lang="de-DE" sz="2800" b="0" i="1" smtClean="0">
+                            <a:latin typeface="Cambria Math" panose="02040503050406030204" pitchFamily="18" charset="0"/>
+                          </a:rPr>
+                          <m:t>2</m:t>
+                        </m:r>
+                      </m:sub>
+                    </m:sSub>
+                    <m:sSub>
+                      <m:sSubPr>
+                        <m:ctrlPr>
+                          <a:rPr lang="de-DE" sz="2800" b="0" i="1" smtClean="0">
+                            <a:latin typeface="Cambria Math" panose="02040503050406030204" pitchFamily="18" charset="0"/>
+                          </a:rPr>
+                        </m:ctrlPr>
+                      </m:sSubPr>
+                      <m:e>
+                        <m:r>
+                          <a:rPr lang="de-DE" sz="2800" b="0" i="1" smtClean="0">
+                            <a:latin typeface="Cambria Math" panose="02040503050406030204" pitchFamily="18" charset="0"/>
+                          </a:rPr>
+                          <m:t>𝑟</m:t>
+                        </m:r>
+                      </m:e>
+                      <m:sub>
+                        <m:r>
+                          <a:rPr lang="de-DE" sz="2800" b="0" i="1" smtClean="0">
+                            <a:latin typeface="Cambria Math" panose="02040503050406030204" pitchFamily="18" charset="0"/>
+                          </a:rPr>
+                          <m:t>2</m:t>
+                        </m:r>
+                      </m:sub>
+                    </m:sSub>
                   </m:oMath>
                 </a14:m>
                 <a:br>
@@ -19140,7 +20353,7 @@
               <a:blipFill>
                 <a:blip r:embed="rId2"/>
                 <a:stretch>
-                  <a:fillRect l="-280" t="-1022"/>
+                  <a:fillRect l="-70" t="-836"/>
                 </a:stretch>
               </a:blipFill>
             </p:spPr>
@@ -19403,8 +20616,8 @@
             </a:fontRef>
           </p:style>
         </p:cxnSp>
-        <mc:AlternateContent xmlns:mc="http://schemas.openxmlformats.org/markup-compatibility/2006">
-          <mc:Choice xmlns:a14="http://schemas.microsoft.com/office/drawing/2010/main" Requires="a14">
+        <mc:AlternateContent xmlns:mc="http://schemas.openxmlformats.org/markup-compatibility/2006" xmlns:a14="http://schemas.microsoft.com/office/drawing/2010/main">
+          <mc:Choice Requires="a14">
             <p:sp>
               <p:nvSpPr>
                 <p:cNvPr id="12" name="Textfeld 30">
@@ -19509,7 +20722,7 @@
               </p:txBody>
             </p:sp>
           </mc:Choice>
-          <mc:Fallback>
+          <mc:Fallback xmlns="">
             <p:sp>
               <p:nvSpPr>
                 <p:cNvPr id="12" name="Textfeld 30">
@@ -19702,8 +20915,8 @@
             </p:sp>
           </mc:Fallback>
         </mc:AlternateContent>
-        <mc:AlternateContent xmlns:mc="http://schemas.openxmlformats.org/markup-compatibility/2006">
-          <mc:Choice xmlns:a14="http://schemas.microsoft.com/office/drawing/2010/main" Requires="a14">
+        <mc:AlternateContent xmlns:mc="http://schemas.openxmlformats.org/markup-compatibility/2006" xmlns:a14="http://schemas.microsoft.com/office/drawing/2010/main">
+          <mc:Choice Requires="a14">
             <p:sp>
               <p:nvSpPr>
                 <p:cNvPr id="14" name="Textfeld 31">
@@ -19799,7 +21012,7 @@
               </p:txBody>
             </p:sp>
           </mc:Choice>
-          <mc:Fallback>
+          <mc:Fallback xmlns="">
             <p:sp>
               <p:nvSpPr>
                 <p:cNvPr id="14" name="Textfeld 31">
@@ -19992,8 +21205,8 @@
             </p:sp>
           </mc:Fallback>
         </mc:AlternateContent>
-        <mc:AlternateContent xmlns:mc="http://schemas.openxmlformats.org/markup-compatibility/2006">
-          <mc:Choice xmlns:a14="http://schemas.microsoft.com/office/drawing/2010/main" Requires="a14">
+        <mc:AlternateContent xmlns:mc="http://schemas.openxmlformats.org/markup-compatibility/2006" xmlns:a14="http://schemas.microsoft.com/office/drawing/2010/main">
+          <mc:Choice Requires="a14">
             <p:sp>
               <p:nvSpPr>
                 <p:cNvPr id="16" name="Textfeld 31">
@@ -20089,7 +21302,7 @@
               </p:txBody>
             </p:sp>
           </mc:Choice>
-          <mc:Fallback>
+          <mc:Fallback xmlns="">
             <p:sp>
               <p:nvSpPr>
                 <p:cNvPr id="16" name="Textfeld 31">
@@ -20187,8 +21400,8 @@
             </a:p>
           </p:txBody>
         </p:sp>
-        <mc:AlternateContent xmlns:mc="http://schemas.openxmlformats.org/markup-compatibility/2006">
-          <mc:Choice xmlns:a14="http://schemas.microsoft.com/office/drawing/2010/main" Requires="a14">
+        <mc:AlternateContent xmlns:mc="http://schemas.openxmlformats.org/markup-compatibility/2006" xmlns:a14="http://schemas.microsoft.com/office/drawing/2010/main">
+          <mc:Choice Requires="a14">
             <p:sp>
               <p:nvSpPr>
                 <p:cNvPr id="22" name="Textfeld 30">
@@ -20296,7 +21509,7 @@
               </p:txBody>
             </p:sp>
           </mc:Choice>
-          <mc:Fallback>
+          <mc:Fallback xmlns="">
             <p:sp>
               <p:nvSpPr>
                 <p:cNvPr id="22" name="Textfeld 30">

</xml_diff>

<commit_message>
update plutoCharon script and adapt Matlab script to that
</commit_message>
<xml_diff>
--- a/docu_and_plots/thoughts_and_revelations_during_this_project.pptx
+++ b/docu_and_plots/thoughts_and_revelations_during_this_project.pptx
@@ -279,7 +279,7 @@
           <a:p>
             <a:fld id="{911E94B8-BB3E-4AB9-8BD5-5E2112388417}" type="datetimeFigureOut">
               <a:rPr lang="de-DE" smtClean="0"/>
-              <a:t>24.12.2020</a:t>
+              <a:t>25.12.2020</a:t>
             </a:fld>
             <a:endParaRPr lang="de-DE"/>
           </a:p>
@@ -477,7 +477,7 @@
           <a:p>
             <a:fld id="{911E94B8-BB3E-4AB9-8BD5-5E2112388417}" type="datetimeFigureOut">
               <a:rPr lang="de-DE" smtClean="0"/>
-              <a:t>24.12.2020</a:t>
+              <a:t>25.12.2020</a:t>
             </a:fld>
             <a:endParaRPr lang="de-DE"/>
           </a:p>
@@ -685,7 +685,7 @@
           <a:p>
             <a:fld id="{911E94B8-BB3E-4AB9-8BD5-5E2112388417}" type="datetimeFigureOut">
               <a:rPr lang="de-DE" smtClean="0"/>
-              <a:t>24.12.2020</a:t>
+              <a:t>25.12.2020</a:t>
             </a:fld>
             <a:endParaRPr lang="de-DE"/>
           </a:p>
@@ -883,7 +883,7 @@
           <a:p>
             <a:fld id="{911E94B8-BB3E-4AB9-8BD5-5E2112388417}" type="datetimeFigureOut">
               <a:rPr lang="de-DE" smtClean="0"/>
-              <a:t>24.12.2020</a:t>
+              <a:t>25.12.2020</a:t>
             </a:fld>
             <a:endParaRPr lang="de-DE"/>
           </a:p>
@@ -1158,7 +1158,7 @@
           <a:p>
             <a:fld id="{911E94B8-BB3E-4AB9-8BD5-5E2112388417}" type="datetimeFigureOut">
               <a:rPr lang="de-DE" smtClean="0"/>
-              <a:t>24.12.2020</a:t>
+              <a:t>25.12.2020</a:t>
             </a:fld>
             <a:endParaRPr lang="de-DE"/>
           </a:p>
@@ -1423,7 +1423,7 @@
           <a:p>
             <a:fld id="{911E94B8-BB3E-4AB9-8BD5-5E2112388417}" type="datetimeFigureOut">
               <a:rPr lang="de-DE" smtClean="0"/>
-              <a:t>24.12.2020</a:t>
+              <a:t>25.12.2020</a:t>
             </a:fld>
             <a:endParaRPr lang="de-DE"/>
           </a:p>
@@ -1835,7 +1835,7 @@
           <a:p>
             <a:fld id="{911E94B8-BB3E-4AB9-8BD5-5E2112388417}" type="datetimeFigureOut">
               <a:rPr lang="de-DE" smtClean="0"/>
-              <a:t>24.12.2020</a:t>
+              <a:t>25.12.2020</a:t>
             </a:fld>
             <a:endParaRPr lang="de-DE"/>
           </a:p>
@@ -1976,7 +1976,7 @@
           <a:p>
             <a:fld id="{911E94B8-BB3E-4AB9-8BD5-5E2112388417}" type="datetimeFigureOut">
               <a:rPr lang="de-DE" smtClean="0"/>
-              <a:t>24.12.2020</a:t>
+              <a:t>25.12.2020</a:t>
             </a:fld>
             <a:endParaRPr lang="de-DE"/>
           </a:p>
@@ -2089,7 +2089,7 @@
           <a:p>
             <a:fld id="{911E94B8-BB3E-4AB9-8BD5-5E2112388417}" type="datetimeFigureOut">
               <a:rPr lang="de-DE" smtClean="0"/>
-              <a:t>24.12.2020</a:t>
+              <a:t>25.12.2020</a:t>
             </a:fld>
             <a:endParaRPr lang="de-DE"/>
           </a:p>
@@ -2400,7 +2400,7 @@
           <a:p>
             <a:fld id="{911E94B8-BB3E-4AB9-8BD5-5E2112388417}" type="datetimeFigureOut">
               <a:rPr lang="de-DE" smtClean="0"/>
-              <a:t>24.12.2020</a:t>
+              <a:t>25.12.2020</a:t>
             </a:fld>
             <a:endParaRPr lang="de-DE"/>
           </a:p>
@@ -2688,7 +2688,7 @@
           <a:p>
             <a:fld id="{911E94B8-BB3E-4AB9-8BD5-5E2112388417}" type="datetimeFigureOut">
               <a:rPr lang="de-DE" smtClean="0"/>
-              <a:t>24.12.2020</a:t>
+              <a:t>25.12.2020</a:t>
             </a:fld>
             <a:endParaRPr lang="de-DE"/>
           </a:p>
@@ -2929,7 +2929,7 @@
           <a:p>
             <a:fld id="{911E94B8-BB3E-4AB9-8BD5-5E2112388417}" type="datetimeFigureOut">
               <a:rPr lang="de-DE" smtClean="0"/>
-              <a:t>24.12.2020</a:t>
+              <a:t>25.12.2020</a:t>
             </a:fld>
             <a:endParaRPr lang="de-DE"/>
           </a:p>
@@ -16926,7 +16926,7 @@
             </p:spPr>
             <p:txBody>
               <a:bodyPr>
-                <a:normAutofit fontScale="47500" lnSpcReduction="20000"/>
+                <a:normAutofit fontScale="62500" lnSpcReduction="20000"/>
               </a:bodyPr>
               <a:lstStyle/>
               <a:p>
@@ -18196,6 +18196,12 @@
                           <a:rPr lang="de-DE" sz="2800" b="0" i="1" smtClean="0">
                             <a:latin typeface="Cambria Math" panose="02040503050406030204" pitchFamily="18" charset="0"/>
                           </a:rPr>
+                          <m:t>+</m:t>
+                        </m:r>
+                        <m:r>
+                          <a:rPr lang="de-DE" sz="2800" b="0" i="1" smtClean="0">
+                            <a:latin typeface="Cambria Math" panose="02040503050406030204" pitchFamily="18" charset="0"/>
+                          </a:rPr>
                           <m:t>𝑣</m:t>
                         </m:r>
                       </m:e>
@@ -18227,6 +18233,43 @@
                           <a:rPr lang="de-DE" sz="2800" b="0" i="1" smtClean="0">
                             <a:latin typeface="Cambria Math" panose="02040503050406030204" pitchFamily="18" charset="0"/>
                           </a:rPr>
+                          <m:t> </m:t>
+                        </m:r>
+                        <m:sSub>
+                          <m:sSubPr>
+                            <m:ctrlPr>
+                              <a:rPr lang="de-DE" sz="2800" b="0" i="1" smtClean="0">
+                                <a:latin typeface="Cambria Math" panose="02040503050406030204" pitchFamily="18" charset="0"/>
+                              </a:rPr>
+                            </m:ctrlPr>
+                          </m:sSubPr>
+                          <m:e>
+                            <m:r>
+                              <a:rPr lang="de-DE" sz="2800" b="0" i="1" smtClean="0">
+                                <a:latin typeface="Cambria Math" panose="02040503050406030204" pitchFamily="18" charset="0"/>
+                              </a:rPr>
+                              <m:t>𝑟</m:t>
+                            </m:r>
+                          </m:e>
+                          <m:sub>
+                            <m:r>
+                              <a:rPr lang="de-DE" sz="2800" b="0" i="1" smtClean="0">
+                                <a:latin typeface="Cambria Math" panose="02040503050406030204" pitchFamily="18" charset="0"/>
+                              </a:rPr>
+                              <m:t>1</m:t>
+                            </m:r>
+                          </m:sub>
+                        </m:sSub>
+                        <m:r>
+                          <a:rPr lang="de-DE" sz="2800" b="0" i="1" smtClean="0">
+                            <a:latin typeface="Cambria Math" panose="02040503050406030204" pitchFamily="18" charset="0"/>
+                          </a:rPr>
+                          <m:t>+</m:t>
+                        </m:r>
+                        <m:r>
+                          <a:rPr lang="de-DE" sz="2800" b="0" i="1" smtClean="0">
+                            <a:latin typeface="Cambria Math" panose="02040503050406030204" pitchFamily="18" charset="0"/>
+                          </a:rPr>
                           <m:t>𝑟</m:t>
                         </m:r>
                       </m:e>
@@ -18239,6 +18282,18 @@
                         </m:r>
                       </m:sub>
                     </m:sSub>
+                    <m:r>
+                      <a:rPr lang="de-DE" sz="2800" b="0" i="1" smtClean="0">
+                        <a:latin typeface="Cambria Math" panose="02040503050406030204" pitchFamily="18" charset="0"/>
+                      </a:rPr>
+                      <m:t>=</m:t>
+                    </m:r>
+                    <m:r>
+                      <a:rPr lang="de-DE" sz="2800" b="0" i="1" smtClean="0">
+                        <a:latin typeface="Cambria Math" panose="02040503050406030204" pitchFamily="18" charset="0"/>
+                      </a:rPr>
+                      <m:t>𝑅</m:t>
+                    </m:r>
                     <m:r>
                       <a:rPr lang="de-DE" sz="2800" b="0" i="1" smtClean="0">
                         <a:latin typeface="Cambria Math" panose="02040503050406030204" pitchFamily="18" charset="0"/>
@@ -18304,17 +18359,35 @@
                   <a:rPr lang="de-DE" sz="2800" b="0" dirty="0"/>
                   <a:t>:</a:t>
                 </a:r>
+              </a:p>
+              <a:p>
+                <a:pPr lvl="1">
+                  <a:lnSpc>
+                    <a:spcPct val="120000"/>
+                  </a:lnSpc>
+                  <a:spcAft>
+                    <a:spcPts val="800"/>
+                  </a:spcAft>
+                </a:pPr>
+                <a:r>
+                  <a:rPr lang="de-DE" b="0" dirty="0" err="1"/>
+                  <a:t>first</a:t>
+                </a:r>
+                <a:r>
+                  <a:rPr lang="de-DE" b="0" dirty="0"/>
+                  <a:t> </a:t>
+                </a:r>
+                <a:r>
+                  <a:rPr lang="de-DE" b="0" dirty="0" err="1"/>
+                  <a:t>the</a:t>
+                </a:r>
+                <a:r>
+                  <a:rPr lang="de-DE" b="0" dirty="0"/>
+                  <a:t> individual initial radii:</a:t>
+                </a:r>
                 <a:br>
-                  <a:rPr lang="de-DE" sz="2800" b="0" dirty="0"/>
+                  <a:rPr lang="de-DE" b="0" dirty="0"/>
                 </a:br>
-                <a:r>
-                  <a:rPr lang="de-DE" dirty="0" err="1"/>
-                  <a:t>from</a:t>
-                </a:r>
-                <a:r>
-                  <a:rPr lang="de-DE" dirty="0"/>
-                  <a:t> (2):		</a:t>
-                </a:r>
                 <a14:m>
                   <m:oMath xmlns:m="http://schemas.openxmlformats.org/officeDocument/2006/math">
                     <m:sSub>
@@ -18330,7 +18403,7 @@
                           <a:rPr lang="de-DE" b="0" i="1" smtClean="0">
                             <a:latin typeface="Cambria Math" panose="02040503050406030204" pitchFamily="18" charset="0"/>
                           </a:rPr>
-                          <m:t>𝐹</m:t>
+                          <m:t>𝑟</m:t>
                         </m:r>
                       </m:e>
                       <m:sub>
@@ -18338,8 +18411,245 @@
                           <a:rPr lang="de-DE" b="0" i="1" smtClean="0">
                             <a:latin typeface="Cambria Math" panose="02040503050406030204" pitchFamily="18" charset="0"/>
                           </a:rPr>
-                          <m:t>𝑍</m:t>
+                          <m:t>2</m:t>
                         </m:r>
+                      </m:sub>
+                    </m:sSub>
+                    <m:r>
+                      <a:rPr lang="de-DE" b="0" i="1" smtClean="0">
+                        <a:latin typeface="Cambria Math" panose="02040503050406030204" pitchFamily="18" charset="0"/>
+                      </a:rPr>
+                      <m:t>=</m:t>
+                    </m:r>
+                    <m:r>
+                      <a:rPr lang="de-DE" b="0" i="1" smtClean="0">
+                        <a:latin typeface="Cambria Math" panose="02040503050406030204" pitchFamily="18" charset="0"/>
+                      </a:rPr>
+                      <m:t>𝑅</m:t>
+                    </m:r>
+                    <m:r>
+                      <a:rPr lang="de-DE" b="0" i="1" smtClean="0">
+                        <a:latin typeface="Cambria Math" panose="02040503050406030204" pitchFamily="18" charset="0"/>
+                      </a:rPr>
+                      <m:t>−</m:t>
+                    </m:r>
+                    <m:sSub>
+                      <m:sSubPr>
+                        <m:ctrlPr>
+                          <a:rPr lang="de-DE" b="0" i="1" smtClean="0">
+                            <a:latin typeface="Cambria Math" panose="02040503050406030204" pitchFamily="18" charset="0"/>
+                          </a:rPr>
+                        </m:ctrlPr>
+                      </m:sSubPr>
+                      <m:e>
+                        <m:r>
+                          <a:rPr lang="de-DE" b="0" i="1" smtClean="0">
+                            <a:latin typeface="Cambria Math" panose="02040503050406030204" pitchFamily="18" charset="0"/>
+                          </a:rPr>
+                          <m:t>𝑟</m:t>
+                        </m:r>
+                      </m:e>
+                      <m:sub>
+                        <m:r>
+                          <a:rPr lang="de-DE" b="0" i="1" smtClean="0">
+                            <a:latin typeface="Cambria Math" panose="02040503050406030204" pitchFamily="18" charset="0"/>
+                          </a:rPr>
+                          <m:t>1</m:t>
+                        </m:r>
+                      </m:sub>
+                    </m:sSub>
+                    <m:r>
+                      <a:rPr lang="de-DE" b="0" i="1" smtClean="0">
+                        <a:latin typeface="Cambria Math" panose="02040503050406030204" pitchFamily="18" charset="0"/>
+                      </a:rPr>
+                      <m:t> </m:t>
+                    </m:r>
+                  </m:oMath>
+                </a14:m>
+                <a:br>
+                  <a:rPr lang="de-DE" b="0" i="1" dirty="0">
+                    <a:latin typeface="Cambria Math" panose="02040503050406030204" pitchFamily="18" charset="0"/>
+                  </a:rPr>
+                </a:br>
+                <a14:m>
+                  <m:oMath xmlns:m="http://schemas.openxmlformats.org/officeDocument/2006/math">
+                    <m:r>
+                      <a:rPr lang="de-DE" b="0" i="1" smtClean="0">
+                        <a:latin typeface="Cambria Math" panose="02040503050406030204" pitchFamily="18" charset="0"/>
+                      </a:rPr>
+                      <m:t>→ </m:t>
+                    </m:r>
+                    <m:sSub>
+                      <m:sSubPr>
+                        <m:ctrlPr>
+                          <a:rPr lang="de-DE" b="0" i="1" smtClean="0">
+                            <a:latin typeface="Cambria Math" panose="02040503050406030204" pitchFamily="18" charset="0"/>
+                          </a:rPr>
+                        </m:ctrlPr>
+                      </m:sSubPr>
+                      <m:e>
+                        <m:r>
+                          <a:rPr lang="de-DE" b="0" i="1" smtClean="0">
+                            <a:latin typeface="Cambria Math" panose="02040503050406030204" pitchFamily="18" charset="0"/>
+                          </a:rPr>
+                          <m:t>𝑟</m:t>
+                        </m:r>
+                      </m:e>
+                      <m:sub>
+                        <m:r>
+                          <a:rPr lang="de-DE" b="0" i="1" smtClean="0">
+                            <a:latin typeface="Cambria Math" panose="02040503050406030204" pitchFamily="18" charset="0"/>
+                          </a:rPr>
+                          <m:t>1</m:t>
+                        </m:r>
+                      </m:sub>
+                    </m:sSub>
+                    <m:r>
+                      <a:rPr lang="de-DE" b="0" i="1" smtClean="0">
+                        <a:latin typeface="Cambria Math" panose="02040503050406030204" pitchFamily="18" charset="0"/>
+                      </a:rPr>
+                      <m:t>=−</m:t>
+                    </m:r>
+                    <m:f>
+                      <m:fPr>
+                        <m:ctrlPr>
+                          <a:rPr lang="de-DE" b="0" i="1" smtClean="0">
+                            <a:latin typeface="Cambria Math" panose="02040503050406030204" pitchFamily="18" charset="0"/>
+                          </a:rPr>
+                        </m:ctrlPr>
+                      </m:fPr>
+                      <m:num>
+                        <m:sSub>
+                          <m:sSubPr>
+                            <m:ctrlPr>
+                              <a:rPr lang="de-DE" b="0" i="1" smtClean="0">
+                                <a:latin typeface="Cambria Math" panose="02040503050406030204" pitchFamily="18" charset="0"/>
+                              </a:rPr>
+                            </m:ctrlPr>
+                          </m:sSubPr>
+                          <m:e>
+                            <m:r>
+                              <a:rPr lang="de-DE" b="0" i="1" smtClean="0">
+                                <a:latin typeface="Cambria Math" panose="02040503050406030204" pitchFamily="18" charset="0"/>
+                              </a:rPr>
+                              <m:t>𝑚</m:t>
+                            </m:r>
+                          </m:e>
+                          <m:sub>
+                            <m:r>
+                              <a:rPr lang="de-DE" b="0" i="1" smtClean="0">
+                                <a:latin typeface="Cambria Math" panose="02040503050406030204" pitchFamily="18" charset="0"/>
+                              </a:rPr>
+                              <m:t>2</m:t>
+                            </m:r>
+                          </m:sub>
+                        </m:sSub>
+                      </m:num>
+                      <m:den>
+                        <m:sSub>
+                          <m:sSubPr>
+                            <m:ctrlPr>
+                              <a:rPr lang="de-DE" b="0" i="1" smtClean="0">
+                                <a:latin typeface="Cambria Math" panose="02040503050406030204" pitchFamily="18" charset="0"/>
+                              </a:rPr>
+                            </m:ctrlPr>
+                          </m:sSubPr>
+                          <m:e>
+                            <m:r>
+                              <a:rPr lang="de-DE" b="0" i="1" smtClean="0">
+                                <a:latin typeface="Cambria Math" panose="02040503050406030204" pitchFamily="18" charset="0"/>
+                              </a:rPr>
+                              <m:t>𝑚</m:t>
+                            </m:r>
+                          </m:e>
+                          <m:sub>
+                            <m:r>
+                              <a:rPr lang="de-DE" b="0" i="1" smtClean="0">
+                                <a:latin typeface="Cambria Math" panose="02040503050406030204" pitchFamily="18" charset="0"/>
+                              </a:rPr>
+                              <m:t>1</m:t>
+                            </m:r>
+                          </m:sub>
+                        </m:sSub>
+                      </m:den>
+                    </m:f>
+                    <m:d>
+                      <m:dPr>
+                        <m:ctrlPr>
+                          <a:rPr lang="de-DE" b="0" i="1" smtClean="0">
+                            <a:latin typeface="Cambria Math" panose="02040503050406030204" pitchFamily="18" charset="0"/>
+                          </a:rPr>
+                        </m:ctrlPr>
+                      </m:dPr>
+                      <m:e>
+                        <m:r>
+                          <a:rPr lang="de-DE" b="0" i="1" smtClean="0">
+                            <a:latin typeface="Cambria Math" panose="02040503050406030204" pitchFamily="18" charset="0"/>
+                          </a:rPr>
+                          <m:t>𝑅</m:t>
+                        </m:r>
+                        <m:r>
+                          <a:rPr lang="de-DE" b="0" i="1" smtClean="0">
+                            <a:latin typeface="Cambria Math" panose="02040503050406030204" pitchFamily="18" charset="0"/>
+                          </a:rPr>
+                          <m:t>−</m:t>
+                        </m:r>
+                        <m:sSub>
+                          <m:sSubPr>
+                            <m:ctrlPr>
+                              <a:rPr lang="de-DE" b="0" i="1" smtClean="0">
+                                <a:latin typeface="Cambria Math" panose="02040503050406030204" pitchFamily="18" charset="0"/>
+                              </a:rPr>
+                            </m:ctrlPr>
+                          </m:sSubPr>
+                          <m:e>
+                            <m:r>
+                              <a:rPr lang="de-DE" b="0" i="1" smtClean="0">
+                                <a:latin typeface="Cambria Math" panose="02040503050406030204" pitchFamily="18" charset="0"/>
+                              </a:rPr>
+                              <m:t>𝑟</m:t>
+                            </m:r>
+                          </m:e>
+                          <m:sub>
+                            <m:r>
+                              <a:rPr lang="de-DE" b="0" i="1" smtClean="0">
+                                <a:latin typeface="Cambria Math" panose="02040503050406030204" pitchFamily="18" charset="0"/>
+                              </a:rPr>
+                              <m:t>1</m:t>
+                            </m:r>
+                          </m:sub>
+                        </m:sSub>
+                      </m:e>
+                    </m:d>
+                    <m:r>
+                      <a:rPr lang="de-DE" i="1">
+                        <a:latin typeface="Cambria Math" panose="02040503050406030204" pitchFamily="18" charset="0"/>
+                      </a:rPr>
+                      <m:t> →</m:t>
+                    </m:r>
+                    <m:r>
+                      <a:rPr lang="de-DE" b="0" i="1" smtClean="0">
+                        <a:latin typeface="Cambria Math" panose="02040503050406030204" pitchFamily="18" charset="0"/>
+                      </a:rPr>
+                      <m:t> </m:t>
+                    </m:r>
+                    <m:sSub>
+                      <m:sSubPr>
+                        <m:ctrlPr>
+                          <a:rPr lang="de-DE" b="0" i="1" smtClean="0">
+                            <a:latin typeface="Cambria Math" panose="02040503050406030204" pitchFamily="18" charset="0"/>
+                          </a:rPr>
+                        </m:ctrlPr>
+                      </m:sSubPr>
+                      <m:e>
+                        <m:r>
+                          <a:rPr lang="de-DE" i="1" smtClean="0">
+                            <a:latin typeface="Cambria Math" panose="02040503050406030204" pitchFamily="18" charset="0"/>
+                          </a:rPr>
+                          <m:t>𝑟</m:t>
+                        </m:r>
+                      </m:e>
+                      <m:sub>
                         <m:r>
                           <a:rPr lang="de-DE" b="0" i="1" smtClean="0">
                             <a:latin typeface="Cambria Math" panose="02040503050406030204" pitchFamily="18" charset="0"/>
@@ -18354,536 +18664,11 @@
                       </a:rPr>
                       <m:t>=</m:t>
                     </m:r>
-                    <m:sSub>
-                      <m:sSubPr>
-                        <m:ctrlPr>
-                          <a:rPr lang="de-DE" b="0" i="1" smtClean="0">
-                            <a:latin typeface="Cambria Math" panose="02040503050406030204" pitchFamily="18" charset="0"/>
-                          </a:rPr>
-                        </m:ctrlPr>
-                      </m:sSubPr>
-                      <m:e>
-                        <m:r>
-                          <a:rPr lang="de-DE" b="0" i="1" smtClean="0">
-                            <a:latin typeface="Cambria Math" panose="02040503050406030204" pitchFamily="18" charset="0"/>
-                          </a:rPr>
-                          <m:t>𝐹</m:t>
-                        </m:r>
-                      </m:e>
-                      <m:sub>
-                        <m:r>
-                          <a:rPr lang="de-DE" b="0" i="1" smtClean="0">
-                            <a:latin typeface="Cambria Math" panose="02040503050406030204" pitchFamily="18" charset="0"/>
-                          </a:rPr>
-                          <m:t>𝑍</m:t>
-                        </m:r>
-                        <m:r>
-                          <a:rPr lang="de-DE" b="0" i="1" smtClean="0">
-                            <a:latin typeface="Cambria Math" panose="02040503050406030204" pitchFamily="18" charset="0"/>
-                          </a:rPr>
-                          <m:t>2</m:t>
-                        </m:r>
-                      </m:sub>
-                    </m:sSub>
-                    <m:r>
-                      <a:rPr lang="de-DE" b="0" i="1" smtClean="0">
-                        <a:latin typeface="Cambria Math" panose="02040503050406030204" pitchFamily="18" charset="0"/>
-                      </a:rPr>
-                      <m:t>  →</m:t>
-                    </m:r>
-                    <m:r>
-                      <a:rPr lang="de-DE" b="0" i="0" smtClean="0">
-                        <a:latin typeface="Cambria Math" panose="02040503050406030204" pitchFamily="18" charset="0"/>
-                      </a:rPr>
-                      <m:t>  </m:t>
-                    </m:r>
-                    <m:f>
-                      <m:fPr>
-                        <m:ctrlPr>
-                          <a:rPr lang="de-DE" i="1">
-                            <a:latin typeface="Cambria Math" panose="02040503050406030204" pitchFamily="18" charset="0"/>
-                          </a:rPr>
-                        </m:ctrlPr>
-                      </m:fPr>
-                      <m:num>
-                        <m:sSub>
-                          <m:sSubPr>
-                            <m:ctrlPr>
-                              <a:rPr lang="de-DE" i="1">
-                                <a:latin typeface="Cambria Math" panose="02040503050406030204" pitchFamily="18" charset="0"/>
-                              </a:rPr>
-                            </m:ctrlPr>
-                          </m:sSubPr>
-                          <m:e>
-                            <m:r>
-                              <a:rPr lang="de-DE" i="1">
-                                <a:latin typeface="Cambria Math" panose="02040503050406030204" pitchFamily="18" charset="0"/>
-                              </a:rPr>
-                              <m:t>𝑚</m:t>
-                            </m:r>
-                          </m:e>
-                          <m:sub>
-                            <m:r>
-                              <a:rPr lang="de-DE" b="0" i="1" smtClean="0">
-                                <a:latin typeface="Cambria Math" panose="02040503050406030204" pitchFamily="18" charset="0"/>
-                              </a:rPr>
-                              <m:t>2</m:t>
-                            </m:r>
-                          </m:sub>
-                        </m:sSub>
-                        <m:sSubSup>
-                          <m:sSubSupPr>
-                            <m:ctrlPr>
-                              <a:rPr lang="de-DE" i="1">
-                                <a:latin typeface="Cambria Math" panose="02040503050406030204" pitchFamily="18" charset="0"/>
-                              </a:rPr>
-                            </m:ctrlPr>
-                          </m:sSubSupPr>
-                          <m:e>
-                            <m:r>
-                              <a:rPr lang="de-DE" i="1">
-                                <a:latin typeface="Cambria Math" panose="02040503050406030204" pitchFamily="18" charset="0"/>
-                              </a:rPr>
-                              <m:t>𝑣</m:t>
-                            </m:r>
-                          </m:e>
-                          <m:sub>
-                            <m:r>
-                              <a:rPr lang="de-DE" b="0" i="1" smtClean="0">
-                                <a:latin typeface="Cambria Math" panose="02040503050406030204" pitchFamily="18" charset="0"/>
-                              </a:rPr>
-                              <m:t>2</m:t>
-                            </m:r>
-                          </m:sub>
-                          <m:sup>
-                            <m:r>
-                              <a:rPr lang="de-DE" i="1">
-                                <a:latin typeface="Cambria Math" panose="02040503050406030204" pitchFamily="18" charset="0"/>
-                              </a:rPr>
-                              <m:t>2</m:t>
-                            </m:r>
-                          </m:sup>
-                        </m:sSubSup>
-                      </m:num>
-                      <m:den>
-                        <m:sSub>
-                          <m:sSubPr>
-                            <m:ctrlPr>
-                              <a:rPr lang="de-DE" i="1">
-                                <a:latin typeface="Cambria Math" panose="02040503050406030204" pitchFamily="18" charset="0"/>
-                              </a:rPr>
-                            </m:ctrlPr>
-                          </m:sSubPr>
-                          <m:e>
-                            <m:r>
-                              <a:rPr lang="de-DE" i="1">
-                                <a:latin typeface="Cambria Math" panose="02040503050406030204" pitchFamily="18" charset="0"/>
-                              </a:rPr>
-                              <m:t>𝑟</m:t>
-                            </m:r>
-                          </m:e>
-                          <m:sub>
-                            <m:r>
-                              <a:rPr lang="de-DE" b="0" i="1" smtClean="0">
-                                <a:latin typeface="Cambria Math" panose="02040503050406030204" pitchFamily="18" charset="0"/>
-                              </a:rPr>
-                              <m:t>2</m:t>
-                            </m:r>
-                          </m:sub>
-                        </m:sSub>
-                      </m:den>
-                    </m:f>
                     <m:r>
                       <a:rPr lang="de-DE" i="1">
                         <a:latin typeface="Cambria Math" panose="02040503050406030204" pitchFamily="18" charset="0"/>
                       </a:rPr>
-                      <m:t>=</m:t>
-                    </m:r>
-                    <m:f>
-                      <m:fPr>
-                        <m:ctrlPr>
-                          <a:rPr lang="de-DE" i="1">
-                            <a:latin typeface="Cambria Math" panose="02040503050406030204" pitchFamily="18" charset="0"/>
-                          </a:rPr>
-                        </m:ctrlPr>
-                      </m:fPr>
-                      <m:num>
-                        <m:sSub>
-                          <m:sSubPr>
-                            <m:ctrlPr>
-                              <a:rPr lang="de-DE" i="1">
-                                <a:latin typeface="Cambria Math" panose="02040503050406030204" pitchFamily="18" charset="0"/>
-                              </a:rPr>
-                            </m:ctrlPr>
-                          </m:sSubPr>
-                          <m:e>
-                            <m:r>
-                              <a:rPr lang="de-DE" i="1">
-                                <a:latin typeface="Cambria Math" panose="02040503050406030204" pitchFamily="18" charset="0"/>
-                              </a:rPr>
-                              <m:t>𝑚</m:t>
-                            </m:r>
-                          </m:e>
-                          <m:sub>
-                            <m:r>
-                              <a:rPr lang="de-DE" b="0" i="1" smtClean="0">
-                                <a:latin typeface="Cambria Math" panose="02040503050406030204" pitchFamily="18" charset="0"/>
-                              </a:rPr>
-                              <m:t>1</m:t>
-                            </m:r>
-                          </m:sub>
-                        </m:sSub>
-                        <m:sSubSup>
-                          <m:sSubSupPr>
-                            <m:ctrlPr>
-                              <a:rPr lang="de-DE" i="1">
-                                <a:latin typeface="Cambria Math" panose="02040503050406030204" pitchFamily="18" charset="0"/>
-                              </a:rPr>
-                            </m:ctrlPr>
-                          </m:sSubSupPr>
-                          <m:e>
-                            <m:r>
-                              <a:rPr lang="de-DE" i="1">
-                                <a:latin typeface="Cambria Math" panose="02040503050406030204" pitchFamily="18" charset="0"/>
-                              </a:rPr>
-                              <m:t>𝑣</m:t>
-                            </m:r>
-                          </m:e>
-                          <m:sub>
-                            <m:r>
-                              <a:rPr lang="de-DE" b="0" i="1" smtClean="0">
-                                <a:latin typeface="Cambria Math" panose="02040503050406030204" pitchFamily="18" charset="0"/>
-                              </a:rPr>
-                              <m:t>1</m:t>
-                            </m:r>
-                          </m:sub>
-                          <m:sup>
-                            <m:r>
-                              <a:rPr lang="de-DE" i="1">
-                                <a:latin typeface="Cambria Math" panose="02040503050406030204" pitchFamily="18" charset="0"/>
-                              </a:rPr>
-                              <m:t>2</m:t>
-                            </m:r>
-                          </m:sup>
-                        </m:sSubSup>
-                      </m:num>
-                      <m:den>
-                        <m:sSub>
-                          <m:sSubPr>
-                            <m:ctrlPr>
-                              <a:rPr lang="de-DE" i="1">
-                                <a:latin typeface="Cambria Math" panose="02040503050406030204" pitchFamily="18" charset="0"/>
-                              </a:rPr>
-                            </m:ctrlPr>
-                          </m:sSubPr>
-                          <m:e>
-                            <m:r>
-                              <a:rPr lang="de-DE" i="1">
-                                <a:latin typeface="Cambria Math" panose="02040503050406030204" pitchFamily="18" charset="0"/>
-                              </a:rPr>
-                              <m:t>𝑟</m:t>
-                            </m:r>
-                          </m:e>
-                          <m:sub>
-                            <m:r>
-                              <a:rPr lang="de-DE" b="0" i="1" smtClean="0">
-                                <a:latin typeface="Cambria Math" panose="02040503050406030204" pitchFamily="18" charset="0"/>
-                              </a:rPr>
-                              <m:t>1</m:t>
-                            </m:r>
-                          </m:sub>
-                        </m:sSub>
-                      </m:den>
-                    </m:f>
-                    <m:r>
-                      <a:rPr lang="de-DE" b="0" i="1" smtClean="0">
-                        <a:latin typeface="Cambria Math" panose="02040503050406030204" pitchFamily="18" charset="0"/>
-                      </a:rPr>
-                      <m:t>  →  </m:t>
-                    </m:r>
-                    <m:sSub>
-                      <m:sSubPr>
-                        <m:ctrlPr>
-                          <a:rPr lang="de-DE" sz="2800" b="0" i="1" smtClean="0">
-                            <a:latin typeface="Cambria Math" panose="02040503050406030204" pitchFamily="18" charset="0"/>
-                          </a:rPr>
-                        </m:ctrlPr>
-                      </m:sSubPr>
-                      <m:e>
-                        <m:r>
-                          <a:rPr lang="de-DE" sz="2800" b="0" i="1" smtClean="0">
-                            <a:latin typeface="Cambria Math" panose="02040503050406030204" pitchFamily="18" charset="0"/>
-                          </a:rPr>
-                          <m:t>𝑣</m:t>
-                        </m:r>
-                      </m:e>
-                      <m:sub>
-                        <m:r>
-                          <a:rPr lang="de-DE" sz="2800" b="0" i="1" smtClean="0">
-                            <a:latin typeface="Cambria Math" panose="02040503050406030204" pitchFamily="18" charset="0"/>
-                          </a:rPr>
-                          <m:t>1</m:t>
-                        </m:r>
-                      </m:sub>
-                    </m:sSub>
-                    <m:r>
-                      <a:rPr lang="de-DE" sz="2800" b="0" i="1" smtClean="0">
-                        <a:latin typeface="Cambria Math" panose="02040503050406030204" pitchFamily="18" charset="0"/>
-                      </a:rPr>
-                      <m:t>=</m:t>
-                    </m:r>
-                    <m:rad>
-                      <m:radPr>
-                        <m:degHide m:val="on"/>
-                        <m:ctrlPr>
-                          <a:rPr lang="de-DE" sz="2800" b="0" i="1" smtClean="0">
-                            <a:latin typeface="Cambria Math" panose="02040503050406030204" pitchFamily="18" charset="0"/>
-                          </a:rPr>
-                        </m:ctrlPr>
-                      </m:radPr>
-                      <m:deg/>
-                      <m:e>
-                        <m:f>
-                          <m:fPr>
-                            <m:ctrlPr>
-                              <a:rPr lang="de-DE" sz="2800" b="0" i="1" smtClean="0">
-                                <a:latin typeface="Cambria Math" panose="02040503050406030204" pitchFamily="18" charset="0"/>
-                              </a:rPr>
-                            </m:ctrlPr>
-                          </m:fPr>
-                          <m:num>
-                            <m:sSub>
-                              <m:sSubPr>
-                                <m:ctrlPr>
-                                  <a:rPr lang="de-DE" sz="2800" b="0" i="1" smtClean="0">
-                                    <a:latin typeface="Cambria Math" panose="02040503050406030204" pitchFamily="18" charset="0"/>
-                                  </a:rPr>
-                                </m:ctrlPr>
-                              </m:sSubPr>
-                              <m:e>
-                                <m:r>
-                                  <a:rPr lang="de-DE" sz="2800" b="0" i="1" smtClean="0">
-                                    <a:latin typeface="Cambria Math" panose="02040503050406030204" pitchFamily="18" charset="0"/>
-                                  </a:rPr>
-                                  <m:t>𝑚</m:t>
-                                </m:r>
-                              </m:e>
-                              <m:sub>
-                                <m:r>
-                                  <a:rPr lang="de-DE" sz="2800" b="0" i="1" smtClean="0">
-                                    <a:latin typeface="Cambria Math" panose="02040503050406030204" pitchFamily="18" charset="0"/>
-                                  </a:rPr>
-                                  <m:t>2</m:t>
-                                </m:r>
-                              </m:sub>
-                            </m:sSub>
-                          </m:num>
-                          <m:den>
-                            <m:sSub>
-                              <m:sSubPr>
-                                <m:ctrlPr>
-                                  <a:rPr lang="de-DE" sz="2800" b="0" i="1" smtClean="0">
-                                    <a:latin typeface="Cambria Math" panose="02040503050406030204" pitchFamily="18" charset="0"/>
-                                  </a:rPr>
-                                </m:ctrlPr>
-                              </m:sSubPr>
-                              <m:e>
-                                <m:r>
-                                  <a:rPr lang="de-DE" sz="2800" b="0" i="1" smtClean="0">
-                                    <a:latin typeface="Cambria Math" panose="02040503050406030204" pitchFamily="18" charset="0"/>
-                                  </a:rPr>
-                                  <m:t>𝑚</m:t>
-                                </m:r>
-                              </m:e>
-                              <m:sub>
-                                <m:r>
-                                  <a:rPr lang="de-DE" sz="2800" b="0" i="1" smtClean="0">
-                                    <a:latin typeface="Cambria Math" panose="02040503050406030204" pitchFamily="18" charset="0"/>
-                                  </a:rPr>
-                                  <m:t>1</m:t>
-                                </m:r>
-                              </m:sub>
-                            </m:sSub>
-                          </m:den>
-                        </m:f>
-                        <m:f>
-                          <m:fPr>
-                            <m:ctrlPr>
-                              <a:rPr lang="de-DE" sz="2800" b="0" i="1" smtClean="0">
-                                <a:latin typeface="Cambria Math" panose="02040503050406030204" pitchFamily="18" charset="0"/>
-                              </a:rPr>
-                            </m:ctrlPr>
-                          </m:fPr>
-                          <m:num>
-                            <m:sSub>
-                              <m:sSubPr>
-                                <m:ctrlPr>
-                                  <a:rPr lang="de-DE" sz="2800" b="0" i="1" smtClean="0">
-                                    <a:latin typeface="Cambria Math" panose="02040503050406030204" pitchFamily="18" charset="0"/>
-                                  </a:rPr>
-                                </m:ctrlPr>
-                              </m:sSubPr>
-                              <m:e>
-                                <m:r>
-                                  <a:rPr lang="de-DE" sz="2800" b="0" i="1" smtClean="0">
-                                    <a:latin typeface="Cambria Math" panose="02040503050406030204" pitchFamily="18" charset="0"/>
-                                  </a:rPr>
-                                  <m:t>𝑟</m:t>
-                                </m:r>
-                              </m:e>
-                              <m:sub>
-                                <m:r>
-                                  <a:rPr lang="de-DE" sz="2800" b="0" i="1" smtClean="0">
-                                    <a:latin typeface="Cambria Math" panose="02040503050406030204" pitchFamily="18" charset="0"/>
-                                  </a:rPr>
-                                  <m:t>1</m:t>
-                                </m:r>
-                              </m:sub>
-                            </m:sSub>
-                          </m:num>
-                          <m:den>
-                            <m:sSub>
-                              <m:sSubPr>
-                                <m:ctrlPr>
-                                  <a:rPr lang="de-DE" sz="2800" b="0" i="1" smtClean="0">
-                                    <a:latin typeface="Cambria Math" panose="02040503050406030204" pitchFamily="18" charset="0"/>
-                                  </a:rPr>
-                                </m:ctrlPr>
-                              </m:sSubPr>
-                              <m:e>
-                                <m:r>
-                                  <a:rPr lang="de-DE" sz="2800" b="0" i="1" smtClean="0">
-                                    <a:latin typeface="Cambria Math" panose="02040503050406030204" pitchFamily="18" charset="0"/>
-                                  </a:rPr>
-                                  <m:t>𝑟</m:t>
-                                </m:r>
-                              </m:e>
-                              <m:sub>
-                                <m:r>
-                                  <a:rPr lang="de-DE" sz="2800" b="0" i="1" smtClean="0">
-                                    <a:latin typeface="Cambria Math" panose="02040503050406030204" pitchFamily="18" charset="0"/>
-                                  </a:rPr>
-                                  <m:t>2</m:t>
-                                </m:r>
-                              </m:sub>
-                            </m:sSub>
-                          </m:den>
-                        </m:f>
-                        <m:sSubSup>
-                          <m:sSubSupPr>
-                            <m:ctrlPr>
-                              <a:rPr lang="de-DE" sz="2800" b="0" i="1" smtClean="0">
-                                <a:latin typeface="Cambria Math" panose="02040503050406030204" pitchFamily="18" charset="0"/>
-                              </a:rPr>
-                            </m:ctrlPr>
-                          </m:sSubSupPr>
-                          <m:e>
-                            <m:r>
-                              <a:rPr lang="de-DE" sz="2800" b="0" i="1" smtClean="0">
-                                <a:latin typeface="Cambria Math" panose="02040503050406030204" pitchFamily="18" charset="0"/>
-                              </a:rPr>
-                              <m:t>𝑣</m:t>
-                            </m:r>
-                          </m:e>
-                          <m:sub>
-                            <m:r>
-                              <a:rPr lang="de-DE" sz="2800" b="0" i="1" smtClean="0">
-                                <a:latin typeface="Cambria Math" panose="02040503050406030204" pitchFamily="18" charset="0"/>
-                              </a:rPr>
-                              <m:t>2</m:t>
-                            </m:r>
-                          </m:sub>
-                          <m:sup>
-                            <m:r>
-                              <a:rPr lang="de-DE" sz="2800" b="0" i="1" smtClean="0">
-                                <a:latin typeface="Cambria Math" panose="02040503050406030204" pitchFamily="18" charset="0"/>
-                              </a:rPr>
-                              <m:t>2</m:t>
-                            </m:r>
-                          </m:sup>
-                        </m:sSubSup>
-                      </m:e>
-                    </m:rad>
-                    <m:r>
-                      <a:rPr lang="de-DE" sz="2800" b="0" i="1" smtClean="0">
-                        <a:latin typeface="Cambria Math" panose="02040503050406030204" pitchFamily="18" charset="0"/>
-                      </a:rPr>
-                      <m:t>   (3)</m:t>
-                    </m:r>
-                  </m:oMath>
-                </a14:m>
-                <a:br>
-                  <a:rPr lang="de-DE" sz="2800" b="0" dirty="0"/>
-                </a:br>
-                <a14:m>
-                  <m:oMath xmlns:m="http://schemas.openxmlformats.org/officeDocument/2006/math">
-                    <m:sSub>
-                      <m:sSubPr>
-                        <m:ctrlPr>
-                          <a:rPr lang="de-DE" i="1">
-                            <a:latin typeface="Cambria Math" panose="02040503050406030204" pitchFamily="18" charset="0"/>
-                          </a:rPr>
-                        </m:ctrlPr>
-                      </m:sSubPr>
-                      <m:e>
-                        <m:r>
-                          <a:rPr lang="de-DE" i="1">
-                            <a:latin typeface="Cambria Math" panose="02040503050406030204" pitchFamily="18" charset="0"/>
-                          </a:rPr>
-                          <m:t>𝐹</m:t>
-                        </m:r>
-                      </m:e>
-                      <m:sub>
-                        <m:r>
-                          <a:rPr lang="de-DE" i="1">
-                            <a:latin typeface="Cambria Math" panose="02040503050406030204" pitchFamily="18" charset="0"/>
-                          </a:rPr>
-                          <m:t>𝑍</m:t>
-                        </m:r>
-                        <m:r>
-                          <a:rPr lang="de-DE" b="0" i="1" smtClean="0">
-                            <a:latin typeface="Cambria Math" panose="02040503050406030204" pitchFamily="18" charset="0"/>
-                          </a:rPr>
-                          <m:t>2</m:t>
-                        </m:r>
-                      </m:sub>
-                    </m:sSub>
-                    <m:r>
-                      <a:rPr lang="de-DE" i="1">
-                        <a:latin typeface="Cambria Math" panose="02040503050406030204" pitchFamily="18" charset="0"/>
-                      </a:rPr>
-                      <m:t>=</m:t>
-                    </m:r>
-                    <m:sSub>
-                      <m:sSubPr>
-                        <m:ctrlPr>
-                          <a:rPr lang="de-DE" i="1">
-                            <a:latin typeface="Cambria Math" panose="02040503050406030204" pitchFamily="18" charset="0"/>
-                          </a:rPr>
-                        </m:ctrlPr>
-                      </m:sSubPr>
-                      <m:e>
-                        <m:r>
-                          <a:rPr lang="de-DE" i="1">
-                            <a:latin typeface="Cambria Math" panose="02040503050406030204" pitchFamily="18" charset="0"/>
-                          </a:rPr>
-                          <m:t>𝐹</m:t>
-                        </m:r>
-                      </m:e>
-                      <m:sub>
-                        <m:r>
-                          <a:rPr lang="de-DE" b="0" i="1" smtClean="0">
-                            <a:latin typeface="Cambria Math" panose="02040503050406030204" pitchFamily="18" charset="0"/>
-                          </a:rPr>
-                          <m:t>𝐺</m:t>
-                        </m:r>
-                      </m:sub>
-                    </m:sSub>
-                    <m:r>
-                      <a:rPr lang="de-DE" b="0" i="1" smtClean="0">
-                        <a:latin typeface="Cambria Math" panose="02040503050406030204" pitchFamily="18" charset="0"/>
-                      </a:rPr>
-                      <m:t> →  </m:t>
+                      <m:t>−</m:t>
                     </m:r>
                     <m:f>
                       <m:fPr>
@@ -18919,89 +18704,8 @@
                             </m:r>
                           </m:sub>
                         </m:sSub>
-                        <m:sSubSup>
-                          <m:sSubSupPr>
-                            <m:ctrlPr>
-                              <a:rPr lang="de-DE" i="1">
-                                <a:latin typeface="Cambria Math" panose="02040503050406030204" pitchFamily="18" charset="0"/>
-                              </a:rPr>
-                            </m:ctrlPr>
-                          </m:sSubSupPr>
-                          <m:e>
-                            <m:r>
-                              <a:rPr lang="de-DE" i="1">
-                                <a:latin typeface="Cambria Math" panose="02040503050406030204" pitchFamily="18" charset="0"/>
-                              </a:rPr>
-                              <m:t>𝑣</m:t>
-                            </m:r>
-                          </m:e>
-                          <m:sub>
-                            <m:r>
-                              <a:rPr lang="de-DE" i="1">
-                                <a:latin typeface="Cambria Math" panose="02040503050406030204" pitchFamily="18" charset="0"/>
-                              </a:rPr>
-                              <m:t>2</m:t>
-                            </m:r>
-                          </m:sub>
-                          <m:sup>
-                            <m:r>
-                              <a:rPr lang="de-DE" i="1">
-                                <a:latin typeface="Cambria Math" panose="02040503050406030204" pitchFamily="18" charset="0"/>
-                              </a:rPr>
-                              <m:t>2</m:t>
-                            </m:r>
-                          </m:sup>
-                        </m:sSubSup>
                       </m:num>
                       <m:den>
-                        <m:sSub>
-                          <m:sSubPr>
-                            <m:ctrlPr>
-                              <a:rPr lang="de-DE" i="1">
-                                <a:latin typeface="Cambria Math" panose="02040503050406030204" pitchFamily="18" charset="0"/>
-                              </a:rPr>
-                            </m:ctrlPr>
-                          </m:sSubPr>
-                          <m:e>
-                            <m:r>
-                              <a:rPr lang="de-DE" i="1">
-                                <a:latin typeface="Cambria Math" panose="02040503050406030204" pitchFamily="18" charset="0"/>
-                              </a:rPr>
-                              <m:t>𝑟</m:t>
-                            </m:r>
-                          </m:e>
-                          <m:sub>
-                            <m:r>
-                              <a:rPr lang="de-DE" i="1">
-                                <a:latin typeface="Cambria Math" panose="02040503050406030204" pitchFamily="18" charset="0"/>
-                              </a:rPr>
-                              <m:t>2</m:t>
-                            </m:r>
-                          </m:sub>
-                        </m:sSub>
-                      </m:den>
-                    </m:f>
-                    <m:r>
-                      <a:rPr lang="de-DE" i="1">
-                        <a:latin typeface="Cambria Math" panose="02040503050406030204" pitchFamily="18" charset="0"/>
-                      </a:rPr>
-                      <m:t>=</m:t>
-                    </m:r>
-                    <m:f>
-                      <m:fPr>
-                        <m:ctrlPr>
-                          <a:rPr lang="de-DE" i="1">
-                            <a:latin typeface="Cambria Math" panose="02040503050406030204" pitchFamily="18" charset="0"/>
-                          </a:rPr>
-                        </m:ctrlPr>
-                      </m:fPr>
-                      <m:num>
-                        <m:r>
-                          <a:rPr lang="de-DE" i="1">
-                            <a:latin typeface="Cambria Math" panose="02040503050406030204" pitchFamily="18" charset="0"/>
-                          </a:rPr>
-                          <m:t>𝐺</m:t>
-                        </m:r>
                         <m:sSub>
                           <m:sSubPr>
                             <m:ctrlPr>
@@ -19027,17 +18731,40 @@
                             </m:r>
                           </m:sub>
                         </m:sSub>
+                      </m:den>
+                    </m:f>
+                    <m:r>
+                      <a:rPr lang="de-DE" b="0" i="1" smtClean="0">
+                        <a:latin typeface="Cambria Math" panose="02040503050406030204" pitchFamily="18" charset="0"/>
+                      </a:rPr>
+                      <m:t>𝑅</m:t>
+                    </m:r>
+                    <m:r>
+                      <a:rPr lang="de-DE" b="0" i="1" smtClean="0">
+                        <a:latin typeface="Cambria Math" panose="02040503050406030204" pitchFamily="18" charset="0"/>
+                      </a:rPr>
+                      <m:t>+</m:t>
+                    </m:r>
+                    <m:f>
+                      <m:fPr>
+                        <m:ctrlPr>
+                          <a:rPr lang="de-DE" b="0" i="1" smtClean="0">
+                            <a:latin typeface="Cambria Math" panose="02040503050406030204" pitchFamily="18" charset="0"/>
+                          </a:rPr>
+                        </m:ctrlPr>
+                      </m:fPr>
+                      <m:num>
                         <m:sSub>
                           <m:sSubPr>
                             <m:ctrlPr>
-                              <a:rPr lang="de-DE" i="1">
+                              <a:rPr lang="de-DE" b="0" i="1" smtClean="0">
                                 <a:latin typeface="Cambria Math" panose="02040503050406030204" pitchFamily="18" charset="0"/>
                               </a:rPr>
                             </m:ctrlPr>
                           </m:sSubPr>
                           <m:e>
                             <m:r>
-                              <a:rPr lang="de-DE" i="1">
+                              <a:rPr lang="de-DE" b="0" i="1" smtClean="0">
                                 <a:latin typeface="Cambria Math" panose="02040503050406030204" pitchFamily="18" charset="0"/>
                               </a:rPr>
                               <m:t>𝑚</m:t>
@@ -19045,7 +18772,7 @@
                           </m:e>
                           <m:sub>
                             <m:r>
-                              <a:rPr lang="de-DE" i="1">
+                              <a:rPr lang="de-DE" b="0" i="1" smtClean="0">
                                 <a:latin typeface="Cambria Math" panose="02040503050406030204" pitchFamily="18" charset="0"/>
                               </a:rPr>
                               <m:t>2</m:t>
@@ -19054,218 +18781,41 @@
                         </m:sSub>
                       </m:num>
                       <m:den>
-                        <m:sSup>
-                          <m:sSupPr>
+                        <m:sSub>
+                          <m:sSubPr>
                             <m:ctrlPr>
-                              <a:rPr lang="de-DE" i="1">
+                              <a:rPr lang="de-DE" b="0" i="1" smtClean="0">
                                 <a:latin typeface="Cambria Math" panose="02040503050406030204" pitchFamily="18" charset="0"/>
                               </a:rPr>
                             </m:ctrlPr>
-                          </m:sSupPr>
+                          </m:sSubPr>
                           <m:e>
-                            <m:d>
-                              <m:dPr>
-                                <m:ctrlPr>
-                                  <a:rPr lang="de-DE" i="1">
-                                    <a:latin typeface="Cambria Math" panose="02040503050406030204" pitchFamily="18" charset="0"/>
-                                  </a:rPr>
-                                </m:ctrlPr>
-                              </m:dPr>
-                              <m:e>
-                                <m:sSub>
-                                  <m:sSubPr>
-                                    <m:ctrlPr>
-                                      <a:rPr lang="de-DE" i="1">
-                                        <a:latin typeface="Cambria Math" panose="02040503050406030204" pitchFamily="18" charset="0"/>
-                                      </a:rPr>
-                                    </m:ctrlPr>
-                                  </m:sSubPr>
-                                  <m:e>
-                                    <m:r>
-                                      <a:rPr lang="de-DE" i="1">
-                                        <a:latin typeface="Cambria Math" panose="02040503050406030204" pitchFamily="18" charset="0"/>
-                                      </a:rPr>
-                                      <m:t>𝑟</m:t>
-                                    </m:r>
-                                  </m:e>
-                                  <m:sub>
-                                    <m:r>
-                                      <a:rPr lang="de-DE" i="1">
-                                        <a:latin typeface="Cambria Math" panose="02040503050406030204" pitchFamily="18" charset="0"/>
-                                      </a:rPr>
-                                      <m:t>1</m:t>
-                                    </m:r>
-                                  </m:sub>
-                                </m:sSub>
-                                <m:r>
-                                  <a:rPr lang="de-DE" i="1">
-                                    <a:latin typeface="Cambria Math" panose="02040503050406030204" pitchFamily="18" charset="0"/>
-                                  </a:rPr>
-                                  <m:t>+</m:t>
-                                </m:r>
-                                <m:sSub>
-                                  <m:sSubPr>
-                                    <m:ctrlPr>
-                                      <a:rPr lang="de-DE" i="1">
-                                        <a:latin typeface="Cambria Math" panose="02040503050406030204" pitchFamily="18" charset="0"/>
-                                      </a:rPr>
-                                    </m:ctrlPr>
-                                  </m:sSubPr>
-                                  <m:e>
-                                    <m:r>
-                                      <a:rPr lang="de-DE" i="1">
-                                        <a:latin typeface="Cambria Math" panose="02040503050406030204" pitchFamily="18" charset="0"/>
-                                      </a:rPr>
-                                      <m:t>𝑟</m:t>
-                                    </m:r>
-                                  </m:e>
-                                  <m:sub>
-                                    <m:r>
-                                      <a:rPr lang="de-DE" i="1">
-                                        <a:latin typeface="Cambria Math" panose="02040503050406030204" pitchFamily="18" charset="0"/>
-                                      </a:rPr>
-                                      <m:t>2</m:t>
-                                    </m:r>
-                                  </m:sub>
-                                </m:sSub>
-                              </m:e>
-                            </m:d>
-                          </m:e>
-                          <m:sup>
                             <m:r>
-                              <a:rPr lang="de-DE" i="1">
+                              <a:rPr lang="de-DE" b="0" i="1" smtClean="0">
                                 <a:latin typeface="Cambria Math" panose="02040503050406030204" pitchFamily="18" charset="0"/>
                               </a:rPr>
-                              <m:t>2</m:t>
+                              <m:t>𝑚</m:t>
                             </m:r>
-                          </m:sup>
-                        </m:sSup>
+                          </m:e>
+                          <m:sub>
+                            <m:r>
+                              <a:rPr lang="de-DE" b="0" i="1" smtClean="0">
+                                <a:latin typeface="Cambria Math" panose="02040503050406030204" pitchFamily="18" charset="0"/>
+                              </a:rPr>
+                              <m:t>1</m:t>
+                            </m:r>
+                          </m:sub>
+                        </m:sSub>
                       </m:den>
                     </m:f>
-                    <m:r>
-                      <a:rPr lang="de-DE" b="0" i="1" smtClean="0">
-                        <a:latin typeface="Cambria Math" panose="02040503050406030204" pitchFamily="18" charset="0"/>
-                      </a:rPr>
-                      <m:t> </m:t>
-                    </m:r>
-                  </m:oMath>
-                </a14:m>
-                <a:br>
-                  <a:rPr lang="de-DE" b="0" i="1" dirty="0">
-                    <a:latin typeface="Cambria Math" panose="02040503050406030204" pitchFamily="18" charset="0"/>
-                  </a:rPr>
-                </a:br>
-                <a14:m>
-                  <m:oMath xmlns:m="http://schemas.openxmlformats.org/officeDocument/2006/math">
-                    <m:r>
-                      <a:rPr lang="de-DE" b="0" i="1" smtClean="0">
-                        <a:latin typeface="Cambria Math" panose="02040503050406030204" pitchFamily="18" charset="0"/>
-                      </a:rPr>
-                      <m:t>→</m:t>
-                    </m:r>
-                    <m:limLow>
-                      <m:limLowPr>
+                    <m:sSub>
+                      <m:sSubPr>
                         <m:ctrlPr>
                           <a:rPr lang="de-DE" b="0" i="1" smtClean="0">
                             <a:latin typeface="Cambria Math" panose="02040503050406030204" pitchFamily="18" charset="0"/>
                           </a:rPr>
                         </m:ctrlPr>
-                      </m:limLowPr>
-                      <m:e>
-                        <m:groupChr>
-                          <m:groupChrPr>
-                            <m:chr m:val="⏟"/>
-                            <m:ctrlPr>
-                              <a:rPr lang="de-DE" b="0" i="1" smtClean="0">
-                                <a:latin typeface="Cambria Math" panose="02040503050406030204" pitchFamily="18" charset="0"/>
-                              </a:rPr>
-                            </m:ctrlPr>
-                          </m:groupChrPr>
-                          <m:e>
-                            <m:sSub>
-                              <m:sSubPr>
-                                <m:ctrlPr>
-                                  <a:rPr lang="de-DE" b="0" i="1" smtClean="0">
-                                    <a:latin typeface="Cambria Math" panose="02040503050406030204" pitchFamily="18" charset="0"/>
-                                  </a:rPr>
-                                </m:ctrlPr>
-                              </m:sSubPr>
-                              <m:e>
-                                <m:r>
-                                  <a:rPr lang="de-DE" b="0" i="1" smtClean="0">
-                                    <a:latin typeface="Cambria Math" panose="02040503050406030204" pitchFamily="18" charset="0"/>
-                                  </a:rPr>
-                                  <m:t>𝑚</m:t>
-                                </m:r>
-                              </m:e>
-                              <m:sub>
-                                <m:r>
-                                  <a:rPr lang="de-DE" b="0" i="1" smtClean="0">
-                                    <a:latin typeface="Cambria Math" panose="02040503050406030204" pitchFamily="18" charset="0"/>
-                                  </a:rPr>
-                                  <m:t>2</m:t>
-                                </m:r>
-                              </m:sub>
-                            </m:sSub>
-                            <m:sSubSup>
-                              <m:sSubSupPr>
-                                <m:ctrlPr>
-                                  <a:rPr lang="de-DE" b="0" i="1" smtClean="0">
-                                    <a:latin typeface="Cambria Math" panose="02040503050406030204" pitchFamily="18" charset="0"/>
-                                  </a:rPr>
-                                </m:ctrlPr>
-                              </m:sSubSupPr>
-                              <m:e>
-                                <m:r>
-                                  <a:rPr lang="de-DE" b="0" i="1" smtClean="0">
-                                    <a:latin typeface="Cambria Math" panose="02040503050406030204" pitchFamily="18" charset="0"/>
-                                  </a:rPr>
-                                  <m:t>𝑣</m:t>
-                                </m:r>
-                              </m:e>
-                              <m:sub>
-                                <m:r>
-                                  <a:rPr lang="de-DE" b="0" i="1" smtClean="0">
-                                    <a:latin typeface="Cambria Math" panose="02040503050406030204" pitchFamily="18" charset="0"/>
-                                  </a:rPr>
-                                  <m:t>2</m:t>
-                                </m:r>
-                              </m:sub>
-                              <m:sup>
-                                <m:r>
-                                  <a:rPr lang="de-DE" b="0" i="1" smtClean="0">
-                                    <a:latin typeface="Cambria Math" panose="02040503050406030204" pitchFamily="18" charset="0"/>
-                                  </a:rPr>
-                                  <m:t>2</m:t>
-                                </m:r>
-                              </m:sup>
-                            </m:sSubSup>
-                          </m:e>
-                        </m:groupChr>
-                      </m:e>
-                      <m:lim>
-                        <m:r>
-                          <a:rPr lang="de-DE" b="0" i="1" smtClean="0">
-                            <a:latin typeface="Cambria Math" panose="02040503050406030204" pitchFamily="18" charset="0"/>
-                          </a:rPr>
-                          <m:t>𝑎</m:t>
-                        </m:r>
-                      </m:lim>
-                    </m:limLow>
-                    <m:r>
-                      <a:rPr lang="de-DE" b="0" i="1" smtClean="0">
-                        <a:latin typeface="Cambria Math" panose="02040503050406030204" pitchFamily="18" charset="0"/>
-                      </a:rPr>
-                      <m:t> </m:t>
-                    </m:r>
-                    <m:sSubSup>
-                      <m:sSubSupPr>
-                        <m:ctrlPr>
-                          <a:rPr lang="de-DE" b="0" i="1" smtClean="0">
-                            <a:latin typeface="Cambria Math" panose="02040503050406030204" pitchFamily="18" charset="0"/>
-                          </a:rPr>
-                        </m:ctrlPr>
-                      </m:sSubSupPr>
+                      </m:sSubPr>
                       <m:e>
                         <m:r>
                           <a:rPr lang="de-DE" b="0" i="1" smtClean="0">
@@ -19282,146 +18832,18 @@
                           <m:t>1</m:t>
                         </m:r>
                       </m:sub>
-                      <m:sup>
-                        <m:r>
-                          <a:rPr lang="de-DE" b="0" i="1" smtClean="0">
-                            <a:latin typeface="Cambria Math" panose="02040503050406030204" pitchFamily="18" charset="0"/>
-                          </a:rPr>
-                          <m:t>2</m:t>
-                        </m:r>
-                      </m:sup>
-                    </m:sSubSup>
-                    <m:r>
-                      <a:rPr lang="de-DE" i="1">
-                        <a:latin typeface="Cambria Math" panose="02040503050406030204" pitchFamily="18" charset="0"/>
-                      </a:rPr>
-                      <m:t>+</m:t>
-                    </m:r>
-                    <m:limLow>
-                      <m:limLowPr>
-                        <m:ctrlPr>
-                          <a:rPr lang="de-DE" b="0" i="1" smtClean="0">
-                            <a:latin typeface="Cambria Math" panose="02040503050406030204" pitchFamily="18" charset="0"/>
-                          </a:rPr>
-                        </m:ctrlPr>
-                      </m:limLowPr>
-                      <m:e>
-                        <m:groupChr>
-                          <m:groupChrPr>
-                            <m:chr m:val="⏟"/>
-                            <m:ctrlPr>
-                              <a:rPr lang="de-DE" b="0" i="1" smtClean="0">
-                                <a:latin typeface="Cambria Math" panose="02040503050406030204" pitchFamily="18" charset="0"/>
-                              </a:rPr>
-                            </m:ctrlPr>
-                          </m:groupChrPr>
-                          <m:e>
-                            <m:r>
-                              <a:rPr lang="de-DE" i="1">
-                                <a:latin typeface="Cambria Math" panose="02040503050406030204" pitchFamily="18" charset="0"/>
-                              </a:rPr>
-                              <m:t>2</m:t>
-                            </m:r>
-                            <m:sSub>
-                              <m:sSubPr>
-                                <m:ctrlPr>
-                                  <a:rPr lang="de-DE" i="1">
-                                    <a:latin typeface="Cambria Math" panose="02040503050406030204" pitchFamily="18" charset="0"/>
-                                  </a:rPr>
-                                </m:ctrlPr>
-                              </m:sSubPr>
-                              <m:e>
-                                <m:r>
-                                  <a:rPr lang="de-DE" i="1">
-                                    <a:latin typeface="Cambria Math" panose="02040503050406030204" pitchFamily="18" charset="0"/>
-                                  </a:rPr>
-                                  <m:t>𝑚</m:t>
-                                </m:r>
-                              </m:e>
-                              <m:sub>
-                                <m:r>
-                                  <a:rPr lang="de-DE" i="1">
-                                    <a:latin typeface="Cambria Math" panose="02040503050406030204" pitchFamily="18" charset="0"/>
-                                  </a:rPr>
-                                  <m:t>2</m:t>
-                                </m:r>
-                              </m:sub>
-                            </m:sSub>
-                            <m:sSubSup>
-                              <m:sSubSupPr>
-                                <m:ctrlPr>
-                                  <a:rPr lang="de-DE" i="1">
-                                    <a:latin typeface="Cambria Math" panose="02040503050406030204" pitchFamily="18" charset="0"/>
-                                  </a:rPr>
-                                </m:ctrlPr>
-                              </m:sSubSupPr>
-                              <m:e>
-                                <m:r>
-                                  <a:rPr lang="de-DE" i="1">
-                                    <a:latin typeface="Cambria Math" panose="02040503050406030204" pitchFamily="18" charset="0"/>
-                                  </a:rPr>
-                                  <m:t>𝑣</m:t>
-                                </m:r>
-                              </m:e>
-                              <m:sub>
-                                <m:r>
-                                  <a:rPr lang="de-DE" i="1">
-                                    <a:latin typeface="Cambria Math" panose="02040503050406030204" pitchFamily="18" charset="0"/>
-                                  </a:rPr>
-                                  <m:t>2</m:t>
-                                </m:r>
-                              </m:sub>
-                              <m:sup>
-                                <m:r>
-                                  <a:rPr lang="de-DE" i="1">
-                                    <a:latin typeface="Cambria Math" panose="02040503050406030204" pitchFamily="18" charset="0"/>
-                                  </a:rPr>
-                                  <m:t>2</m:t>
-                                </m:r>
-                              </m:sup>
-                            </m:sSubSup>
-                            <m:sSub>
-                              <m:sSubPr>
-                                <m:ctrlPr>
-                                  <a:rPr lang="de-DE" i="1">
-                                    <a:latin typeface="Cambria Math" panose="02040503050406030204" pitchFamily="18" charset="0"/>
-                                  </a:rPr>
-                                </m:ctrlPr>
-                              </m:sSubPr>
-                              <m:e>
-                                <m:r>
-                                  <a:rPr lang="de-DE" i="1">
-                                    <a:latin typeface="Cambria Math" panose="02040503050406030204" pitchFamily="18" charset="0"/>
-                                  </a:rPr>
-                                  <m:t>𝑟</m:t>
-                                </m:r>
-                              </m:e>
-                              <m:sub>
-                                <m:r>
-                                  <a:rPr lang="de-DE" i="1">
-                                    <a:latin typeface="Cambria Math" panose="02040503050406030204" pitchFamily="18" charset="0"/>
-                                  </a:rPr>
-                                  <m:t>2</m:t>
-                                </m:r>
-                              </m:sub>
-                            </m:sSub>
-                          </m:e>
-                        </m:groupChr>
-                      </m:e>
-                      <m:lim>
-                        <m:r>
-                          <a:rPr lang="de-DE" b="0" i="1" smtClean="0">
-                            <a:latin typeface="Cambria Math" panose="02040503050406030204" pitchFamily="18" charset="0"/>
-                          </a:rPr>
-                          <m:t>𝑏</m:t>
-                        </m:r>
-                      </m:lim>
-                    </m:limLow>
+                    </m:sSub>
                     <m:r>
                       <a:rPr lang="de-DE" b="0" i="1" smtClean="0">
                         <a:latin typeface="Cambria Math" panose="02040503050406030204" pitchFamily="18" charset="0"/>
                       </a:rPr>
                       <m:t> </m:t>
+                    </m:r>
+                    <m:r>
+                      <a:rPr lang="de-DE" b="0" i="1" smtClean="0">
+                        <a:latin typeface="Cambria Math" panose="02040503050406030204" pitchFamily="18" charset="0"/>
+                      </a:rPr>
+                      <m:t>→  </m:t>
                     </m:r>
                     <m:sSub>
                       <m:sSubPr>
@@ -19452,47 +18874,104 @@
                       <a:rPr lang="de-DE" b="0" i="1" smtClean="0">
                         <a:latin typeface="Cambria Math" panose="02040503050406030204" pitchFamily="18" charset="0"/>
                       </a:rPr>
-                      <m:t>+</m:t>
+                      <m:t>=−</m:t>
                     </m:r>
-                    <m:limLow>
-                      <m:limLowPr>
+                    <m:f>
+                      <m:fPr>
                         <m:ctrlPr>
                           <a:rPr lang="de-DE" b="0" i="1" smtClean="0">
                             <a:latin typeface="Cambria Math" panose="02040503050406030204" pitchFamily="18" charset="0"/>
                           </a:rPr>
                         </m:ctrlPr>
-                      </m:limLowPr>
-                      <m:e>
-                        <m:groupChr>
-                          <m:groupChrPr>
-                            <m:chr m:val="⏟"/>
+                      </m:fPr>
+                      <m:num>
+                        <m:sSub>
+                          <m:sSubPr>
                             <m:ctrlPr>
                               <a:rPr lang="de-DE" b="0" i="1" smtClean="0">
                                 <a:latin typeface="Cambria Math" panose="02040503050406030204" pitchFamily="18" charset="0"/>
                               </a:rPr>
                             </m:ctrlPr>
-                          </m:groupChrPr>
+                          </m:sSubPr>
                           <m:e>
-                            <m:d>
-                              <m:dPr>
+                            <m:r>
+                              <a:rPr lang="de-DE" b="0" i="1" smtClean="0">
+                                <a:latin typeface="Cambria Math" panose="02040503050406030204" pitchFamily="18" charset="0"/>
+                              </a:rPr>
+                              <m:t>𝑚</m:t>
+                            </m:r>
+                          </m:e>
+                          <m:sub>
+                            <m:r>
+                              <a:rPr lang="de-DE" b="0" i="1" smtClean="0">
+                                <a:latin typeface="Cambria Math" panose="02040503050406030204" pitchFamily="18" charset="0"/>
+                              </a:rPr>
+                              <m:t>2</m:t>
+                            </m:r>
+                          </m:sub>
+                        </m:sSub>
+                      </m:num>
+                      <m:den>
+                        <m:sSub>
+                          <m:sSubPr>
+                            <m:ctrlPr>
+                              <a:rPr lang="de-DE" b="0" i="1" smtClean="0">
+                                <a:latin typeface="Cambria Math" panose="02040503050406030204" pitchFamily="18" charset="0"/>
+                              </a:rPr>
+                            </m:ctrlPr>
+                          </m:sSubPr>
+                          <m:e>
+                            <m:r>
+                              <a:rPr lang="de-DE" b="0" i="1" smtClean="0">
+                                <a:latin typeface="Cambria Math" panose="02040503050406030204" pitchFamily="18" charset="0"/>
+                              </a:rPr>
+                              <m:t>𝑚</m:t>
+                            </m:r>
+                          </m:e>
+                          <m:sub>
+                            <m:r>
+                              <a:rPr lang="de-DE" b="0" i="1" smtClean="0">
+                                <a:latin typeface="Cambria Math" panose="02040503050406030204" pitchFamily="18" charset="0"/>
+                              </a:rPr>
+                              <m:t>1</m:t>
+                            </m:r>
+                          </m:sub>
+                        </m:sSub>
+                        <m:d>
+                          <m:dPr>
+                            <m:ctrlPr>
+                              <a:rPr lang="de-DE" i="1">
+                                <a:latin typeface="Cambria Math" panose="02040503050406030204" pitchFamily="18" charset="0"/>
+                              </a:rPr>
+                            </m:ctrlPr>
+                          </m:dPr>
+                          <m:e>
+                            <m:r>
+                              <a:rPr lang="de-DE" i="1">
+                                <a:latin typeface="Cambria Math" panose="02040503050406030204" pitchFamily="18" charset="0"/>
+                              </a:rPr>
+                              <m:t>1−</m:t>
+                            </m:r>
+                            <m:f>
+                              <m:fPr>
                                 <m:ctrlPr>
-                                  <a:rPr lang="de-DE" b="0" i="1" smtClean="0">
+                                  <a:rPr lang="de-DE" i="1">
                                     <a:latin typeface="Cambria Math" panose="02040503050406030204" pitchFamily="18" charset="0"/>
                                   </a:rPr>
                                 </m:ctrlPr>
-                              </m:dPr>
-                              <m:e>
+                              </m:fPr>
+                              <m:num>
                                 <m:sSub>
                                   <m:sSubPr>
                                     <m:ctrlPr>
-                                      <a:rPr lang="de-DE" b="0" i="1" smtClean="0">
+                                      <a:rPr lang="de-DE" i="1">
                                         <a:latin typeface="Cambria Math" panose="02040503050406030204" pitchFamily="18" charset="0"/>
                                       </a:rPr>
                                     </m:ctrlPr>
                                   </m:sSubPr>
                                   <m:e>
                                     <m:r>
-                                      <a:rPr lang="de-DE" b="0" i="1" smtClean="0">
+                                      <a:rPr lang="de-DE" i="1">
                                         <a:latin typeface="Cambria Math" panose="02040503050406030204" pitchFamily="18" charset="0"/>
                                       </a:rPr>
                                       <m:t>𝑚</m:t>
@@ -19500,102 +18979,26 @@
                                   </m:e>
                                   <m:sub>
                                     <m:r>
-                                      <a:rPr lang="de-DE" b="0" i="1" smtClean="0">
+                                      <a:rPr lang="de-DE" i="1">
                                         <a:latin typeface="Cambria Math" panose="02040503050406030204" pitchFamily="18" charset="0"/>
                                       </a:rPr>
                                       <m:t>2</m:t>
                                     </m:r>
                                   </m:sub>
                                 </m:sSub>
-                                <m:sSubSup>
-                                  <m:sSubSupPr>
-                                    <m:ctrlPr>
-                                      <a:rPr lang="de-DE" b="0" i="1" smtClean="0">
-                                        <a:latin typeface="Cambria Math" panose="02040503050406030204" pitchFamily="18" charset="0"/>
-                                      </a:rPr>
-                                    </m:ctrlPr>
-                                  </m:sSubSupPr>
-                                  <m:e>
-                                    <m:r>
-                                      <a:rPr lang="de-DE" b="0" i="1" smtClean="0">
-                                        <a:latin typeface="Cambria Math" panose="02040503050406030204" pitchFamily="18" charset="0"/>
-                                      </a:rPr>
-                                      <m:t>𝑣</m:t>
-                                    </m:r>
-                                  </m:e>
-                                  <m:sub>
-                                    <m:r>
-                                      <a:rPr lang="de-DE" b="0" i="1" smtClean="0">
-                                        <a:latin typeface="Cambria Math" panose="02040503050406030204" pitchFamily="18" charset="0"/>
-                                      </a:rPr>
-                                      <m:t>2</m:t>
-                                    </m:r>
-                                  </m:sub>
-                                  <m:sup>
-                                    <m:r>
-                                      <a:rPr lang="de-DE" b="0" i="1" smtClean="0">
-                                        <a:latin typeface="Cambria Math" panose="02040503050406030204" pitchFamily="18" charset="0"/>
-                                      </a:rPr>
-                                      <m:t>2</m:t>
-                                    </m:r>
-                                  </m:sup>
-                                </m:sSubSup>
-                                <m:sSubSup>
-                                  <m:sSubSupPr>
-                                    <m:ctrlPr>
-                                      <a:rPr lang="de-DE" b="0" i="1" smtClean="0">
-                                        <a:latin typeface="Cambria Math" panose="02040503050406030204" pitchFamily="18" charset="0"/>
-                                      </a:rPr>
-                                    </m:ctrlPr>
-                                  </m:sSubSupPr>
-                                  <m:e>
-                                    <m:r>
-                                      <a:rPr lang="de-DE" b="0" i="1" smtClean="0">
-                                        <a:latin typeface="Cambria Math" panose="02040503050406030204" pitchFamily="18" charset="0"/>
-                                      </a:rPr>
-                                      <m:t>𝑟</m:t>
-                                    </m:r>
-                                  </m:e>
-                                  <m:sub>
-                                    <m:r>
-                                      <a:rPr lang="de-DE" b="0" i="1" smtClean="0">
-                                        <a:latin typeface="Cambria Math" panose="02040503050406030204" pitchFamily="18" charset="0"/>
-                                      </a:rPr>
-                                      <m:t>2</m:t>
-                                    </m:r>
-                                  </m:sub>
-                                  <m:sup>
-                                    <m:r>
-                                      <a:rPr lang="de-DE" b="0" i="1" smtClean="0">
-                                        <a:latin typeface="Cambria Math" panose="02040503050406030204" pitchFamily="18" charset="0"/>
-                                      </a:rPr>
-                                      <m:t>2</m:t>
-                                    </m:r>
-                                  </m:sup>
-                                </m:sSubSup>
-                                <m:r>
-                                  <a:rPr lang="de-DE" b="0" i="1" smtClean="0">
-                                    <a:latin typeface="Cambria Math" panose="02040503050406030204" pitchFamily="18" charset="0"/>
-                                  </a:rPr>
-                                  <m:t>−</m:t>
-                                </m:r>
-                                <m:r>
-                                  <a:rPr lang="de-DE" b="0" i="1" smtClean="0">
-                                    <a:latin typeface="Cambria Math" panose="02040503050406030204" pitchFamily="18" charset="0"/>
-                                  </a:rPr>
-                                  <m:t>𝐺</m:t>
-                                </m:r>
+                              </m:num>
+                              <m:den>
                                 <m:sSub>
                                   <m:sSubPr>
                                     <m:ctrlPr>
-                                      <a:rPr lang="de-DE" b="0" i="1" smtClean="0">
+                                      <a:rPr lang="de-DE" i="1">
                                         <a:latin typeface="Cambria Math" panose="02040503050406030204" pitchFamily="18" charset="0"/>
                                       </a:rPr>
                                     </m:ctrlPr>
                                   </m:sSubPr>
                                   <m:e>
                                     <m:r>
-                                      <a:rPr lang="de-DE" b="0" i="1" smtClean="0">
+                                      <a:rPr lang="de-DE" i="1">
                                         <a:latin typeface="Cambria Math" panose="02040503050406030204" pitchFamily="18" charset="0"/>
                                       </a:rPr>
                                       <m:t>𝑚</m:t>
@@ -19603,92 +19006,317 @@
                                   </m:e>
                                   <m:sub>
                                     <m:r>
-                                      <a:rPr lang="de-DE" b="0" i="1" smtClean="0">
+                                      <a:rPr lang="de-DE" i="1">
                                         <a:latin typeface="Cambria Math" panose="02040503050406030204" pitchFamily="18" charset="0"/>
                                       </a:rPr>
                                       <m:t>1</m:t>
                                     </m:r>
                                   </m:sub>
                                 </m:sSub>
-                                <m:sSub>
-                                  <m:sSubPr>
-                                    <m:ctrlPr>
-                                      <a:rPr lang="de-DE" b="0" i="1" smtClean="0">
-                                        <a:latin typeface="Cambria Math" panose="02040503050406030204" pitchFamily="18" charset="0"/>
-                                      </a:rPr>
-                                    </m:ctrlPr>
-                                  </m:sSubPr>
-                                  <m:e>
-                                    <m:r>
-                                      <a:rPr lang="de-DE" b="0" i="1" smtClean="0">
-                                        <a:latin typeface="Cambria Math" panose="02040503050406030204" pitchFamily="18" charset="0"/>
-                                      </a:rPr>
-                                      <m:t>𝑚</m:t>
-                                    </m:r>
-                                  </m:e>
-                                  <m:sub>
-                                    <m:r>
-                                      <a:rPr lang="de-DE" b="0" i="1" smtClean="0">
-                                        <a:latin typeface="Cambria Math" panose="02040503050406030204" pitchFamily="18" charset="0"/>
-                                      </a:rPr>
-                                      <m:t>2</m:t>
-                                    </m:r>
-                                  </m:sub>
-                                </m:sSub>
-                                <m:sSub>
-                                  <m:sSubPr>
-                                    <m:ctrlPr>
-                                      <a:rPr lang="de-DE" b="0" i="1" smtClean="0">
-                                        <a:latin typeface="Cambria Math" panose="02040503050406030204" pitchFamily="18" charset="0"/>
-                                      </a:rPr>
-                                    </m:ctrlPr>
-                                  </m:sSubPr>
-                                  <m:e>
-                                    <m:r>
-                                      <a:rPr lang="de-DE" b="0" i="1" smtClean="0">
-                                        <a:latin typeface="Cambria Math" panose="02040503050406030204" pitchFamily="18" charset="0"/>
-                                      </a:rPr>
-                                      <m:t>𝑟</m:t>
-                                    </m:r>
-                                  </m:e>
-                                  <m:sub>
-                                    <m:r>
-                                      <a:rPr lang="de-DE" b="0" i="1" smtClean="0">
-                                        <a:latin typeface="Cambria Math" panose="02040503050406030204" pitchFamily="18" charset="0"/>
-                                      </a:rPr>
-                                      <m:t>2</m:t>
-                                    </m:r>
-                                  </m:sub>
-                                </m:sSub>
-                              </m:e>
-                            </m:d>
+                              </m:den>
+                            </m:f>
                           </m:e>
-                        </m:groupChr>
-                      </m:e>
-                      <m:lim>
-                        <m:r>
-                          <a:rPr lang="de-DE" b="0" i="1" smtClean="0">
+                        </m:d>
+                      </m:den>
+                    </m:f>
+                    <m:r>
+                      <a:rPr lang="de-DE" i="1">
+                        <a:latin typeface="Cambria Math" panose="02040503050406030204" pitchFamily="18" charset="0"/>
+                      </a:rPr>
+                      <m:t>𝑅</m:t>
+                    </m:r>
+                    <m:r>
+                      <a:rPr lang="de-DE" i="1">
+                        <a:latin typeface="Cambria Math" panose="02040503050406030204" pitchFamily="18" charset="0"/>
+                      </a:rPr>
+                      <m:t>=−</m:t>
+                    </m:r>
+                    <m:f>
+                      <m:fPr>
+                        <m:ctrlPr>
+                          <a:rPr lang="de-DE" i="1">
                             <a:latin typeface="Cambria Math" panose="02040503050406030204" pitchFamily="18" charset="0"/>
                           </a:rPr>
-                          <m:t>𝑐</m:t>
-                        </m:r>
-                      </m:lim>
-                    </m:limLow>
+                        </m:ctrlPr>
+                      </m:fPr>
+                      <m:num>
+                        <m:sSub>
+                          <m:sSubPr>
+                            <m:ctrlPr>
+                              <a:rPr lang="de-DE" i="1">
+                                <a:latin typeface="Cambria Math" panose="02040503050406030204" pitchFamily="18" charset="0"/>
+                              </a:rPr>
+                            </m:ctrlPr>
+                          </m:sSubPr>
+                          <m:e>
+                            <m:r>
+                              <a:rPr lang="de-DE" i="1">
+                                <a:latin typeface="Cambria Math" panose="02040503050406030204" pitchFamily="18" charset="0"/>
+                              </a:rPr>
+                              <m:t>𝑚</m:t>
+                            </m:r>
+                          </m:e>
+                          <m:sub>
+                            <m:r>
+                              <a:rPr lang="de-DE" i="1">
+                                <a:latin typeface="Cambria Math" panose="02040503050406030204" pitchFamily="18" charset="0"/>
+                              </a:rPr>
+                              <m:t>2</m:t>
+                            </m:r>
+                          </m:sub>
+                        </m:sSub>
+                      </m:num>
+                      <m:den>
+                        <m:d>
+                          <m:dPr>
+                            <m:ctrlPr>
+                              <a:rPr lang="de-DE" i="1">
+                                <a:latin typeface="Cambria Math" panose="02040503050406030204" pitchFamily="18" charset="0"/>
+                              </a:rPr>
+                            </m:ctrlPr>
+                          </m:dPr>
+                          <m:e>
+                            <m:sSub>
+                              <m:sSubPr>
+                                <m:ctrlPr>
+                                  <a:rPr lang="de-DE" b="0" i="1" smtClean="0">
+                                    <a:latin typeface="Cambria Math" panose="02040503050406030204" pitchFamily="18" charset="0"/>
+                                  </a:rPr>
+                                </m:ctrlPr>
+                              </m:sSubPr>
+                              <m:e>
+                                <m:r>
+                                  <a:rPr lang="de-DE" b="0" i="1" smtClean="0">
+                                    <a:latin typeface="Cambria Math" panose="02040503050406030204" pitchFamily="18" charset="0"/>
+                                  </a:rPr>
+                                  <m:t>𝑚</m:t>
+                                </m:r>
+                              </m:e>
+                              <m:sub>
+                                <m:r>
+                                  <a:rPr lang="de-DE" b="0" i="1" smtClean="0">
+                                    <a:latin typeface="Cambria Math" panose="02040503050406030204" pitchFamily="18" charset="0"/>
+                                  </a:rPr>
+                                  <m:t>1</m:t>
+                                </m:r>
+                              </m:sub>
+                            </m:sSub>
+                            <m:r>
+                              <a:rPr lang="de-DE" i="1">
+                                <a:latin typeface="Cambria Math" panose="02040503050406030204" pitchFamily="18" charset="0"/>
+                              </a:rPr>
+                              <m:t>−</m:t>
+                            </m:r>
+                            <m:sSub>
+                              <m:sSubPr>
+                                <m:ctrlPr>
+                                  <a:rPr lang="de-DE" b="0" i="1" smtClean="0">
+                                    <a:latin typeface="Cambria Math" panose="02040503050406030204" pitchFamily="18" charset="0"/>
+                                  </a:rPr>
+                                </m:ctrlPr>
+                              </m:sSubPr>
+                              <m:e>
+                                <m:r>
+                                  <a:rPr lang="de-DE" b="0" i="1" smtClean="0">
+                                    <a:latin typeface="Cambria Math" panose="02040503050406030204" pitchFamily="18" charset="0"/>
+                                  </a:rPr>
+                                  <m:t>𝑚</m:t>
+                                </m:r>
+                              </m:e>
+                              <m:sub>
+                                <m:r>
+                                  <a:rPr lang="de-DE" b="0" i="1" smtClean="0">
+                                    <a:latin typeface="Cambria Math" panose="02040503050406030204" pitchFamily="18" charset="0"/>
+                                  </a:rPr>
+                                  <m:t>2</m:t>
+                                </m:r>
+                              </m:sub>
+                            </m:sSub>
+                          </m:e>
+                        </m:d>
+                      </m:den>
+                    </m:f>
                     <m:r>
-                      <a:rPr lang="de-DE" b="0" i="1" smtClean="0">
+                      <a:rPr lang="de-DE" i="1">
                         <a:latin typeface="Cambria Math" panose="02040503050406030204" pitchFamily="18" charset="0"/>
                       </a:rPr>
-                      <m:t>=0</m:t>
+                      <m:t>𝑅</m:t>
                     </m:r>
                   </m:oMath>
                 </a14:m>
                 <a:br>
-                  <a:rPr lang="de-DE" b="0" i="1" dirty="0">
+                  <a:rPr lang="de-DE" i="1" dirty="0">
                     <a:latin typeface="Cambria Math" panose="02040503050406030204" pitchFamily="18" charset="0"/>
                   </a:rPr>
                 </a:br>
                 <a14:m>
                   <m:oMath xmlns:m="http://schemas.openxmlformats.org/officeDocument/2006/math">
+                    <m:r>
+                      <a:rPr lang="de-DE" b="0" i="1" smtClean="0">
+                        <a:latin typeface="Cambria Math" panose="02040503050406030204" pitchFamily="18" charset="0"/>
+                      </a:rPr>
+                      <m:t>→</m:t>
+                    </m:r>
+                    <m:sSub>
+                      <m:sSubPr>
+                        <m:ctrlPr>
+                          <a:rPr lang="de-DE" b="1" i="1" smtClean="0">
+                            <a:latin typeface="Cambria Math" panose="02040503050406030204" pitchFamily="18" charset="0"/>
+                          </a:rPr>
+                        </m:ctrlPr>
+                      </m:sSubPr>
+                      <m:e>
+                        <m:r>
+                          <a:rPr lang="de-DE" b="1" i="1" smtClean="0">
+                            <a:latin typeface="Cambria Math" panose="02040503050406030204" pitchFamily="18" charset="0"/>
+                          </a:rPr>
+                          <m:t>𝒓</m:t>
+                        </m:r>
+                      </m:e>
+                      <m:sub>
+                        <m:r>
+                          <a:rPr lang="de-DE" b="1" i="1" smtClean="0">
+                            <a:latin typeface="Cambria Math" panose="02040503050406030204" pitchFamily="18" charset="0"/>
+                          </a:rPr>
+                          <m:t>𝟏</m:t>
+                        </m:r>
+                      </m:sub>
+                    </m:sSub>
+                    <m:r>
+                      <a:rPr lang="de-DE" b="1" i="1" smtClean="0">
+                        <a:latin typeface="Cambria Math" panose="02040503050406030204" pitchFamily="18" charset="0"/>
+                      </a:rPr>
+                      <m:t>= </m:t>
+                    </m:r>
+                    <m:r>
+                      <a:rPr lang="de-DE" b="1" i="1">
+                        <a:latin typeface="Cambria Math" panose="02040503050406030204" pitchFamily="18" charset="0"/>
+                      </a:rPr>
+                      <m:t>−</m:t>
+                    </m:r>
+                    <m:f>
+                      <m:fPr>
+                        <m:ctrlPr>
+                          <a:rPr lang="de-DE" b="1" i="1">
+                            <a:latin typeface="Cambria Math" panose="02040503050406030204" pitchFamily="18" charset="0"/>
+                          </a:rPr>
+                        </m:ctrlPr>
+                      </m:fPr>
+                      <m:num>
+                        <m:sSub>
+                          <m:sSubPr>
+                            <m:ctrlPr>
+                              <a:rPr lang="de-DE" b="1" i="1">
+                                <a:latin typeface="Cambria Math" panose="02040503050406030204" pitchFamily="18" charset="0"/>
+                              </a:rPr>
+                            </m:ctrlPr>
+                          </m:sSubPr>
+                          <m:e>
+                            <m:r>
+                              <a:rPr lang="de-DE" b="1" i="1">
+                                <a:latin typeface="Cambria Math" panose="02040503050406030204" pitchFamily="18" charset="0"/>
+                              </a:rPr>
+                              <m:t>𝒎</m:t>
+                            </m:r>
+                          </m:e>
+                          <m:sub>
+                            <m:r>
+                              <a:rPr lang="de-DE" b="1" i="1">
+                                <a:latin typeface="Cambria Math" panose="02040503050406030204" pitchFamily="18" charset="0"/>
+                              </a:rPr>
+                              <m:t>𝟐</m:t>
+                            </m:r>
+                          </m:sub>
+                        </m:sSub>
+                      </m:num>
+                      <m:den>
+                        <m:d>
+                          <m:dPr>
+                            <m:ctrlPr>
+                              <a:rPr lang="de-DE" b="1" i="1">
+                                <a:latin typeface="Cambria Math" panose="02040503050406030204" pitchFamily="18" charset="0"/>
+                              </a:rPr>
+                            </m:ctrlPr>
+                          </m:dPr>
+                          <m:e>
+                            <m:sSub>
+                              <m:sSubPr>
+                                <m:ctrlPr>
+                                  <a:rPr lang="de-DE" b="1" i="1">
+                                    <a:latin typeface="Cambria Math" panose="02040503050406030204" pitchFamily="18" charset="0"/>
+                                  </a:rPr>
+                                </m:ctrlPr>
+                              </m:sSubPr>
+                              <m:e>
+                                <m:r>
+                                  <a:rPr lang="de-DE" b="1" i="1">
+                                    <a:latin typeface="Cambria Math" panose="02040503050406030204" pitchFamily="18" charset="0"/>
+                                  </a:rPr>
+                                  <m:t>𝒎</m:t>
+                                </m:r>
+                              </m:e>
+                              <m:sub>
+                                <m:r>
+                                  <a:rPr lang="de-DE" b="1" i="1">
+                                    <a:latin typeface="Cambria Math" panose="02040503050406030204" pitchFamily="18" charset="0"/>
+                                  </a:rPr>
+                                  <m:t>𝟏</m:t>
+                                </m:r>
+                              </m:sub>
+                            </m:sSub>
+                            <m:r>
+                              <a:rPr lang="de-DE" b="1" i="1">
+                                <a:latin typeface="Cambria Math" panose="02040503050406030204" pitchFamily="18" charset="0"/>
+                              </a:rPr>
+                              <m:t>−</m:t>
+                            </m:r>
+                            <m:sSub>
+                              <m:sSubPr>
+                                <m:ctrlPr>
+                                  <a:rPr lang="de-DE" b="1" i="1">
+                                    <a:latin typeface="Cambria Math" panose="02040503050406030204" pitchFamily="18" charset="0"/>
+                                  </a:rPr>
+                                </m:ctrlPr>
+                              </m:sSubPr>
+                              <m:e>
+                                <m:r>
+                                  <a:rPr lang="de-DE" b="1" i="1">
+                                    <a:latin typeface="Cambria Math" panose="02040503050406030204" pitchFamily="18" charset="0"/>
+                                  </a:rPr>
+                                  <m:t>𝒎</m:t>
+                                </m:r>
+                              </m:e>
+                              <m:sub>
+                                <m:r>
+                                  <a:rPr lang="de-DE" b="1" i="1">
+                                    <a:latin typeface="Cambria Math" panose="02040503050406030204" pitchFamily="18" charset="0"/>
+                                  </a:rPr>
+                                  <m:t>𝟐</m:t>
+                                </m:r>
+                              </m:sub>
+                            </m:sSub>
+                          </m:e>
+                        </m:d>
+                      </m:den>
+                    </m:f>
+                    <m:r>
+                      <a:rPr lang="de-DE" b="1" i="1">
+                        <a:latin typeface="Cambria Math" panose="02040503050406030204" pitchFamily="18" charset="0"/>
+                      </a:rPr>
+                      <m:t>𝑹</m:t>
+                    </m:r>
+                    <m:r>
+                      <a:rPr lang="de-DE" b="1" i="1" smtClean="0">
+                        <a:latin typeface="Cambria Math" panose="02040503050406030204" pitchFamily="18" charset="0"/>
+                      </a:rPr>
+                      <m:t>  </m:t>
+                    </m:r>
+                    <m:r>
+                      <a:rPr lang="de-DE" b="0" i="1" smtClean="0">
+                        <a:latin typeface="Cambria Math" panose="02040503050406030204" pitchFamily="18" charset="0"/>
+                      </a:rPr>
+                      <m:t>→  </m:t>
+                    </m:r>
                     <m:sSub>
                       <m:sSubPr>
                         <m:ctrlPr>
@@ -19710,7 +19338,7 @@
                           <a:rPr lang="de-DE" b="0" i="1" smtClean="0">
                             <a:latin typeface="Cambria Math" panose="02040503050406030204" pitchFamily="18" charset="0"/>
                           </a:rPr>
-                          <m:t>1,   0/1</m:t>
+                          <m:t>2</m:t>
                         </m:r>
                       </m:sub>
                     </m:sSub>
@@ -19719,6 +19347,456 @@
                         <a:latin typeface="Cambria Math" panose="02040503050406030204" pitchFamily="18" charset="0"/>
                       </a:rPr>
                       <m:t>=</m:t>
+                    </m:r>
+                    <m:d>
+                      <m:dPr>
+                        <m:ctrlPr>
+                          <a:rPr lang="de-DE" b="0" i="1" smtClean="0">
+                            <a:latin typeface="Cambria Math" panose="02040503050406030204" pitchFamily="18" charset="0"/>
+                          </a:rPr>
+                        </m:ctrlPr>
+                      </m:dPr>
+                      <m:e>
+                        <m:f>
+                          <m:fPr>
+                            <m:ctrlPr>
+                              <a:rPr lang="de-DE" b="0" i="1" smtClean="0">
+                                <a:latin typeface="Cambria Math" panose="02040503050406030204" pitchFamily="18" charset="0"/>
+                              </a:rPr>
+                            </m:ctrlPr>
+                          </m:fPr>
+                          <m:num>
+                            <m:sSub>
+                              <m:sSubPr>
+                                <m:ctrlPr>
+                                  <a:rPr lang="de-DE" i="1">
+                                    <a:latin typeface="Cambria Math" panose="02040503050406030204" pitchFamily="18" charset="0"/>
+                                  </a:rPr>
+                                </m:ctrlPr>
+                              </m:sSubPr>
+                              <m:e>
+                                <m:r>
+                                  <a:rPr lang="de-DE" i="1">
+                                    <a:latin typeface="Cambria Math" panose="02040503050406030204" pitchFamily="18" charset="0"/>
+                                  </a:rPr>
+                                  <m:t>(</m:t>
+                                </m:r>
+                                <m:r>
+                                  <a:rPr lang="de-DE" i="1">
+                                    <a:latin typeface="Cambria Math" panose="02040503050406030204" pitchFamily="18" charset="0"/>
+                                  </a:rPr>
+                                  <m:t>𝑚</m:t>
+                                </m:r>
+                              </m:e>
+                              <m:sub>
+                                <m:r>
+                                  <a:rPr lang="de-DE" i="1">
+                                    <a:latin typeface="Cambria Math" panose="02040503050406030204" pitchFamily="18" charset="0"/>
+                                  </a:rPr>
+                                  <m:t>1</m:t>
+                                </m:r>
+                              </m:sub>
+                            </m:sSub>
+                            <m:r>
+                              <a:rPr lang="de-DE" i="1">
+                                <a:latin typeface="Cambria Math" panose="02040503050406030204" pitchFamily="18" charset="0"/>
+                              </a:rPr>
+                              <m:t>−</m:t>
+                            </m:r>
+                            <m:sSub>
+                              <m:sSubPr>
+                                <m:ctrlPr>
+                                  <a:rPr lang="de-DE" i="1">
+                                    <a:latin typeface="Cambria Math" panose="02040503050406030204" pitchFamily="18" charset="0"/>
+                                  </a:rPr>
+                                </m:ctrlPr>
+                              </m:sSubPr>
+                              <m:e>
+                                <m:r>
+                                  <a:rPr lang="de-DE" i="1">
+                                    <a:latin typeface="Cambria Math" panose="02040503050406030204" pitchFamily="18" charset="0"/>
+                                  </a:rPr>
+                                  <m:t>𝑚</m:t>
+                                </m:r>
+                              </m:e>
+                              <m:sub>
+                                <m:r>
+                                  <a:rPr lang="de-DE" i="1">
+                                    <a:latin typeface="Cambria Math" panose="02040503050406030204" pitchFamily="18" charset="0"/>
+                                  </a:rPr>
+                                  <m:t>2</m:t>
+                                </m:r>
+                              </m:sub>
+                            </m:sSub>
+                            <m:r>
+                              <a:rPr lang="de-DE" i="1">
+                                <a:latin typeface="Cambria Math" panose="02040503050406030204" pitchFamily="18" charset="0"/>
+                              </a:rPr>
+                              <m:t>)</m:t>
+                            </m:r>
+                          </m:num>
+                          <m:den>
+                            <m:sSub>
+                              <m:sSubPr>
+                                <m:ctrlPr>
+                                  <a:rPr lang="de-DE" i="1">
+                                    <a:latin typeface="Cambria Math" panose="02040503050406030204" pitchFamily="18" charset="0"/>
+                                  </a:rPr>
+                                </m:ctrlPr>
+                              </m:sSubPr>
+                              <m:e>
+                                <m:r>
+                                  <a:rPr lang="de-DE" i="1">
+                                    <a:latin typeface="Cambria Math" panose="02040503050406030204" pitchFamily="18" charset="0"/>
+                                  </a:rPr>
+                                  <m:t>(</m:t>
+                                </m:r>
+                                <m:r>
+                                  <a:rPr lang="de-DE" i="1">
+                                    <a:latin typeface="Cambria Math" panose="02040503050406030204" pitchFamily="18" charset="0"/>
+                                  </a:rPr>
+                                  <m:t>𝑚</m:t>
+                                </m:r>
+                              </m:e>
+                              <m:sub>
+                                <m:r>
+                                  <a:rPr lang="de-DE" i="1">
+                                    <a:latin typeface="Cambria Math" panose="02040503050406030204" pitchFamily="18" charset="0"/>
+                                  </a:rPr>
+                                  <m:t>1</m:t>
+                                </m:r>
+                              </m:sub>
+                            </m:sSub>
+                            <m:r>
+                              <a:rPr lang="de-DE" i="1">
+                                <a:latin typeface="Cambria Math" panose="02040503050406030204" pitchFamily="18" charset="0"/>
+                              </a:rPr>
+                              <m:t>−</m:t>
+                            </m:r>
+                            <m:sSub>
+                              <m:sSubPr>
+                                <m:ctrlPr>
+                                  <a:rPr lang="de-DE" i="1">
+                                    <a:latin typeface="Cambria Math" panose="02040503050406030204" pitchFamily="18" charset="0"/>
+                                  </a:rPr>
+                                </m:ctrlPr>
+                              </m:sSubPr>
+                              <m:e>
+                                <m:r>
+                                  <a:rPr lang="de-DE" i="1">
+                                    <a:latin typeface="Cambria Math" panose="02040503050406030204" pitchFamily="18" charset="0"/>
+                                  </a:rPr>
+                                  <m:t>𝑚</m:t>
+                                </m:r>
+                              </m:e>
+                              <m:sub>
+                                <m:r>
+                                  <a:rPr lang="de-DE" i="1">
+                                    <a:latin typeface="Cambria Math" panose="02040503050406030204" pitchFamily="18" charset="0"/>
+                                  </a:rPr>
+                                  <m:t>2</m:t>
+                                </m:r>
+                              </m:sub>
+                            </m:sSub>
+                            <m:r>
+                              <a:rPr lang="de-DE" i="1">
+                                <a:latin typeface="Cambria Math" panose="02040503050406030204" pitchFamily="18" charset="0"/>
+                              </a:rPr>
+                              <m:t>)</m:t>
+                            </m:r>
+                          </m:den>
+                        </m:f>
+                        <m:r>
+                          <a:rPr lang="de-DE" b="0" i="1" smtClean="0">
+                            <a:latin typeface="Cambria Math" panose="02040503050406030204" pitchFamily="18" charset="0"/>
+                          </a:rPr>
+                          <m:t>+</m:t>
+                        </m:r>
+                        <m:f>
+                          <m:fPr>
+                            <m:ctrlPr>
+                              <a:rPr lang="de-DE" i="1">
+                                <a:latin typeface="Cambria Math" panose="02040503050406030204" pitchFamily="18" charset="0"/>
+                              </a:rPr>
+                            </m:ctrlPr>
+                          </m:fPr>
+                          <m:num>
+                            <m:sSub>
+                              <m:sSubPr>
+                                <m:ctrlPr>
+                                  <a:rPr lang="de-DE" i="1">
+                                    <a:latin typeface="Cambria Math" panose="02040503050406030204" pitchFamily="18" charset="0"/>
+                                  </a:rPr>
+                                </m:ctrlPr>
+                              </m:sSubPr>
+                              <m:e>
+                                <m:r>
+                                  <a:rPr lang="de-DE" b="0" i="1">
+                                    <a:latin typeface="Cambria Math" panose="02040503050406030204" pitchFamily="18" charset="0"/>
+                                  </a:rPr>
+                                  <m:t>𝑚</m:t>
+                                </m:r>
+                              </m:e>
+                              <m:sub>
+                                <m:r>
+                                  <a:rPr lang="de-DE" b="0" i="1">
+                                    <a:latin typeface="Cambria Math" panose="02040503050406030204" pitchFamily="18" charset="0"/>
+                                  </a:rPr>
+                                  <m:t>2</m:t>
+                                </m:r>
+                              </m:sub>
+                            </m:sSub>
+                          </m:num>
+                          <m:den>
+                            <m:d>
+                              <m:dPr>
+                                <m:ctrlPr>
+                                  <a:rPr lang="de-DE" i="1">
+                                    <a:latin typeface="Cambria Math" panose="02040503050406030204" pitchFamily="18" charset="0"/>
+                                  </a:rPr>
+                                </m:ctrlPr>
+                              </m:dPr>
+                              <m:e>
+                                <m:sSub>
+                                  <m:sSubPr>
+                                    <m:ctrlPr>
+                                      <a:rPr lang="de-DE" i="1">
+                                        <a:latin typeface="Cambria Math" panose="02040503050406030204" pitchFamily="18" charset="0"/>
+                                      </a:rPr>
+                                    </m:ctrlPr>
+                                  </m:sSubPr>
+                                  <m:e>
+                                    <m:r>
+                                      <a:rPr lang="de-DE" b="0" i="1">
+                                        <a:latin typeface="Cambria Math" panose="02040503050406030204" pitchFamily="18" charset="0"/>
+                                      </a:rPr>
+                                      <m:t>𝑚</m:t>
+                                    </m:r>
+                                  </m:e>
+                                  <m:sub>
+                                    <m:r>
+                                      <a:rPr lang="de-DE" b="0" i="1">
+                                        <a:latin typeface="Cambria Math" panose="02040503050406030204" pitchFamily="18" charset="0"/>
+                                      </a:rPr>
+                                      <m:t>1</m:t>
+                                    </m:r>
+                                  </m:sub>
+                                </m:sSub>
+                                <m:r>
+                                  <a:rPr lang="de-DE" b="0" i="1">
+                                    <a:latin typeface="Cambria Math" panose="02040503050406030204" pitchFamily="18" charset="0"/>
+                                  </a:rPr>
+                                  <m:t>−</m:t>
+                                </m:r>
+                                <m:sSub>
+                                  <m:sSubPr>
+                                    <m:ctrlPr>
+                                      <a:rPr lang="de-DE" i="1">
+                                        <a:latin typeface="Cambria Math" panose="02040503050406030204" pitchFamily="18" charset="0"/>
+                                      </a:rPr>
+                                    </m:ctrlPr>
+                                  </m:sSubPr>
+                                  <m:e>
+                                    <m:r>
+                                      <a:rPr lang="de-DE" b="0" i="1">
+                                        <a:latin typeface="Cambria Math" panose="02040503050406030204" pitchFamily="18" charset="0"/>
+                                      </a:rPr>
+                                      <m:t>𝑚</m:t>
+                                    </m:r>
+                                  </m:e>
+                                  <m:sub>
+                                    <m:r>
+                                      <a:rPr lang="de-DE" b="0" i="1">
+                                        <a:latin typeface="Cambria Math" panose="02040503050406030204" pitchFamily="18" charset="0"/>
+                                      </a:rPr>
+                                      <m:t>2</m:t>
+                                    </m:r>
+                                  </m:sub>
+                                </m:sSub>
+                              </m:e>
+                            </m:d>
+                          </m:den>
+                        </m:f>
+                      </m:e>
+                    </m:d>
+                    <m:r>
+                      <a:rPr lang="de-DE" b="0" i="1">
+                        <a:latin typeface="Cambria Math" panose="02040503050406030204" pitchFamily="18" charset="0"/>
+                      </a:rPr>
+                      <m:t>𝑅</m:t>
+                    </m:r>
+                    <m:r>
+                      <a:rPr lang="de-DE" b="0" i="1" smtClean="0">
+                        <a:latin typeface="Cambria Math" panose="02040503050406030204" pitchFamily="18" charset="0"/>
+                      </a:rPr>
+                      <m:t>→</m:t>
+                    </m:r>
+                    <m:sSub>
+                      <m:sSubPr>
+                        <m:ctrlPr>
+                          <a:rPr lang="de-DE" b="1" i="1" smtClean="0">
+                            <a:latin typeface="Cambria Math" panose="02040503050406030204" pitchFamily="18" charset="0"/>
+                          </a:rPr>
+                        </m:ctrlPr>
+                      </m:sSubPr>
+                      <m:e>
+                        <m:r>
+                          <a:rPr lang="de-DE" b="1" i="1" smtClean="0">
+                            <a:latin typeface="Cambria Math" panose="02040503050406030204" pitchFamily="18" charset="0"/>
+                          </a:rPr>
+                          <m:t>𝒓</m:t>
+                        </m:r>
+                      </m:e>
+                      <m:sub>
+                        <m:r>
+                          <a:rPr lang="de-DE" b="1" i="1" smtClean="0">
+                            <a:latin typeface="Cambria Math" panose="02040503050406030204" pitchFamily="18" charset="0"/>
+                          </a:rPr>
+                          <m:t>𝟐</m:t>
+                        </m:r>
+                      </m:sub>
+                    </m:sSub>
+                    <m:r>
+                      <a:rPr lang="de-DE" b="1" i="1" smtClean="0">
+                        <a:latin typeface="Cambria Math" panose="02040503050406030204" pitchFamily="18" charset="0"/>
+                      </a:rPr>
+                      <m:t>=</m:t>
+                    </m:r>
+                    <m:f>
+                      <m:fPr>
+                        <m:ctrlPr>
+                          <a:rPr lang="de-DE" b="1" i="1">
+                            <a:latin typeface="Cambria Math" panose="02040503050406030204" pitchFamily="18" charset="0"/>
+                          </a:rPr>
+                        </m:ctrlPr>
+                      </m:fPr>
+                      <m:num>
+                        <m:sSub>
+                          <m:sSubPr>
+                            <m:ctrlPr>
+                              <a:rPr lang="de-DE" b="1" i="1" smtClean="0">
+                                <a:latin typeface="Cambria Math" panose="02040503050406030204" pitchFamily="18" charset="0"/>
+                              </a:rPr>
+                            </m:ctrlPr>
+                          </m:sSubPr>
+                          <m:e>
+                            <m:r>
+                              <a:rPr lang="de-DE" b="1" i="1" smtClean="0">
+                                <a:latin typeface="Cambria Math" panose="02040503050406030204" pitchFamily="18" charset="0"/>
+                              </a:rPr>
+                              <m:t>𝒎</m:t>
+                            </m:r>
+                          </m:e>
+                          <m:sub>
+                            <m:r>
+                              <a:rPr lang="de-DE" b="1" i="1" smtClean="0">
+                                <a:latin typeface="Cambria Math" panose="02040503050406030204" pitchFamily="18" charset="0"/>
+                              </a:rPr>
+                              <m:t>𝟏</m:t>
+                            </m:r>
+                          </m:sub>
+                        </m:sSub>
+                      </m:num>
+                      <m:den>
+                        <m:d>
+                          <m:dPr>
+                            <m:ctrlPr>
+                              <a:rPr lang="de-DE" b="1" i="1">
+                                <a:latin typeface="Cambria Math" panose="02040503050406030204" pitchFamily="18" charset="0"/>
+                              </a:rPr>
+                            </m:ctrlPr>
+                          </m:dPr>
+                          <m:e>
+                            <m:sSub>
+                              <m:sSubPr>
+                                <m:ctrlPr>
+                                  <a:rPr lang="de-DE" b="1" i="1">
+                                    <a:latin typeface="Cambria Math" panose="02040503050406030204" pitchFamily="18" charset="0"/>
+                                  </a:rPr>
+                                </m:ctrlPr>
+                              </m:sSubPr>
+                              <m:e>
+                                <m:r>
+                                  <a:rPr lang="de-DE" b="1" i="1">
+                                    <a:latin typeface="Cambria Math" panose="02040503050406030204" pitchFamily="18" charset="0"/>
+                                  </a:rPr>
+                                  <m:t>𝒎</m:t>
+                                </m:r>
+                              </m:e>
+                              <m:sub>
+                                <m:r>
+                                  <a:rPr lang="de-DE" b="1" i="1">
+                                    <a:latin typeface="Cambria Math" panose="02040503050406030204" pitchFamily="18" charset="0"/>
+                                  </a:rPr>
+                                  <m:t>𝟏</m:t>
+                                </m:r>
+                              </m:sub>
+                            </m:sSub>
+                            <m:r>
+                              <a:rPr lang="de-DE" b="1" i="1">
+                                <a:latin typeface="Cambria Math" panose="02040503050406030204" pitchFamily="18" charset="0"/>
+                              </a:rPr>
+                              <m:t>−</m:t>
+                            </m:r>
+                            <m:sSub>
+                              <m:sSubPr>
+                                <m:ctrlPr>
+                                  <a:rPr lang="de-DE" b="1" i="1">
+                                    <a:latin typeface="Cambria Math" panose="02040503050406030204" pitchFamily="18" charset="0"/>
+                                  </a:rPr>
+                                </m:ctrlPr>
+                              </m:sSubPr>
+                              <m:e>
+                                <m:r>
+                                  <a:rPr lang="de-DE" b="1" i="1">
+                                    <a:latin typeface="Cambria Math" panose="02040503050406030204" pitchFamily="18" charset="0"/>
+                                  </a:rPr>
+                                  <m:t>𝒎</m:t>
+                                </m:r>
+                              </m:e>
+                              <m:sub>
+                                <m:r>
+                                  <a:rPr lang="de-DE" b="1" i="1">
+                                    <a:latin typeface="Cambria Math" panose="02040503050406030204" pitchFamily="18" charset="0"/>
+                                  </a:rPr>
+                                  <m:t>𝟐</m:t>
+                                </m:r>
+                              </m:sub>
+                            </m:sSub>
+                          </m:e>
+                        </m:d>
+                      </m:den>
+                    </m:f>
+                    <m:r>
+                      <a:rPr lang="de-DE" b="1" i="1">
+                        <a:latin typeface="Cambria Math" panose="02040503050406030204" pitchFamily="18" charset="0"/>
+                      </a:rPr>
+                      <m:t>𝑹</m:t>
+                    </m:r>
+                  </m:oMath>
+                </a14:m>
+                <a:br>
+                  <a:rPr lang="de-DE" b="1" dirty="0"/>
+                </a:br>
+                <a14:m>
+                  <m:oMath xmlns:m="http://schemas.openxmlformats.org/officeDocument/2006/math">
+                    <m:r>
+                      <m:rPr>
+                        <m:sty m:val="p"/>
+                      </m:rPr>
+                      <a:rPr lang="de-DE" i="0">
+                        <a:latin typeface="Cambria Math" panose="02040503050406030204" pitchFamily="18" charset="0"/>
+                      </a:rPr>
+                      <m:t>f</m:t>
+                    </m:r>
+                    <m:r>
+                      <m:rPr>
+                        <m:sty m:val="p"/>
+                      </m:rPr>
+                      <a:rPr lang="de-DE" b="0" i="0" smtClean="0">
+                        <a:latin typeface="Cambria Math" panose="02040503050406030204" pitchFamily="18" charset="0"/>
+                      </a:rPr>
+                      <m:t>rom</m:t>
                     </m:r>
                     <m:f>
                       <m:fPr>
@@ -19733,196 +19811,52 @@
                           <a:rPr lang="de-DE" b="0" i="1" smtClean="0">
                             <a:latin typeface="Cambria Math" panose="02040503050406030204" pitchFamily="18" charset="0"/>
                           </a:rPr>
-                          <m:t>−</m:t>
+                          <m:t>𝑑</m:t>
                         </m:r>
-                        <m:r>
-                          <a:rPr lang="de-DE" b="0" i="1" smtClean="0">
-                            <a:latin typeface="Cambria Math" panose="02040503050406030204" pitchFamily="18" charset="0"/>
-                          </a:rPr>
-                          <m:t>𝑏</m:t>
-                        </m:r>
-                        <m:r>
-                          <a:rPr lang="de-DE" b="0" i="1" smtClean="0">
-                            <a:latin typeface="Cambria Math" panose="02040503050406030204" pitchFamily="18" charset="0"/>
-                          </a:rPr>
-                          <m:t>±</m:t>
-                        </m:r>
-                        <m:rad>
-                          <m:radPr>
-                            <m:degHide m:val="on"/>
-                            <m:ctrlPr>
-                              <a:rPr lang="de-DE" b="0" i="1" smtClean="0">
-                                <a:latin typeface="Cambria Math" panose="02040503050406030204" pitchFamily="18" charset="0"/>
-                              </a:rPr>
-                            </m:ctrlPr>
-                          </m:radPr>
-                          <m:deg/>
-                          <m:e>
-                            <m:sSup>
-                              <m:sSupPr>
-                                <m:ctrlPr>
-                                  <a:rPr lang="de-DE" b="0" i="1" smtClean="0">
-                                    <a:latin typeface="Cambria Math" panose="02040503050406030204" pitchFamily="18" charset="0"/>
-                                  </a:rPr>
-                                </m:ctrlPr>
-                              </m:sSupPr>
-                              <m:e>
-                                <m:r>
-                                  <a:rPr lang="de-DE" b="0" i="1" smtClean="0">
-                                    <a:latin typeface="Cambria Math" panose="02040503050406030204" pitchFamily="18" charset="0"/>
-                                  </a:rPr>
-                                  <m:t>𝑏</m:t>
-                                </m:r>
-                              </m:e>
-                              <m:sup>
-                                <m:r>
-                                  <a:rPr lang="de-DE" b="0" i="1" smtClean="0">
-                                    <a:latin typeface="Cambria Math" panose="02040503050406030204" pitchFamily="18" charset="0"/>
-                                  </a:rPr>
-                                  <m:t>2</m:t>
-                                </m:r>
-                              </m:sup>
-                            </m:sSup>
-                            <m:r>
-                              <a:rPr lang="de-DE" b="0" i="1" smtClean="0">
-                                <a:latin typeface="Cambria Math" panose="02040503050406030204" pitchFamily="18" charset="0"/>
-                              </a:rPr>
-                              <m:t>−4</m:t>
-                            </m:r>
-                            <m:r>
-                              <a:rPr lang="de-DE" b="0" i="1" smtClean="0">
-                                <a:latin typeface="Cambria Math" panose="02040503050406030204" pitchFamily="18" charset="0"/>
-                              </a:rPr>
-                              <m:t>𝑎𝑐</m:t>
-                            </m:r>
-                          </m:e>
-                        </m:rad>
                       </m:num>
                       <m:den>
                         <m:r>
                           <a:rPr lang="de-DE" b="0" i="1" smtClean="0">
                             <a:latin typeface="Cambria Math" panose="02040503050406030204" pitchFamily="18" charset="0"/>
                           </a:rPr>
-                          <m:t>2</m:t>
-                        </m:r>
-                        <m:r>
-                          <a:rPr lang="de-DE" b="0" i="1" smtClean="0">
-                            <a:latin typeface="Cambria Math" panose="02040503050406030204" pitchFamily="18" charset="0"/>
-                          </a:rPr>
-                          <m:t>𝑎</m:t>
+                          <m:t>𝑑𝑡</m:t>
                         </m:r>
                       </m:den>
                     </m:f>
-                  </m:oMath>
-                </a14:m>
-                <a:br>
-                  <a:rPr lang="de-DE" sz="2800" b="0" dirty="0"/>
-                </a:br>
-                <a:r>
-                  <a:rPr lang="de-DE" sz="2800" b="0" dirty="0" err="1"/>
-                  <a:t>with</a:t>
-                </a:r>
-                <a:r>
-                  <a:rPr lang="de-DE" sz="2800" b="0" dirty="0"/>
-                  <a:t> </a:t>
-                </a:r>
-                <a:r>
-                  <a:rPr lang="de-DE" sz="2800" b="0" dirty="0" err="1"/>
-                  <a:t>discriminant</a:t>
-                </a:r>
-                <a:r>
-                  <a:rPr lang="de-DE" sz="2800" b="0" dirty="0"/>
-                  <a:t>: </a:t>
-                </a:r>
-                <a14:m>
-                  <m:oMath xmlns:m="http://schemas.openxmlformats.org/officeDocument/2006/math">
-                    <m:sSup>
-                      <m:sSupPr>
+                    <m:d>
+                      <m:dPr>
                         <m:ctrlPr>
                           <a:rPr lang="de-DE" b="0" i="1" smtClean="0">
                             <a:latin typeface="Cambria Math" panose="02040503050406030204" pitchFamily="18" charset="0"/>
                           </a:rPr>
                         </m:ctrlPr>
-                      </m:sSupPr>
+                      </m:dPr>
                       <m:e>
                         <m:r>
                           <a:rPr lang="de-DE" b="0" i="1" smtClean="0">
                             <a:latin typeface="Cambria Math" panose="02040503050406030204" pitchFamily="18" charset="0"/>
                           </a:rPr>
-                          <m:t>𝑏</m:t>
+                          <m:t>4</m:t>
                         </m:r>
                       </m:e>
-                      <m:sup>
-                        <m:r>
-                          <a:rPr lang="de-DE" b="0" i="1" smtClean="0">
-                            <a:latin typeface="Cambria Math" panose="02040503050406030204" pitchFamily="18" charset="0"/>
-                          </a:rPr>
-                          <m:t>2</m:t>
-                        </m:r>
-                      </m:sup>
-                    </m:sSup>
+                    </m:d>
                     <m:r>
-                      <a:rPr lang="de-DE" sz="2800" b="0" i="1" smtClean="0">
+                      <a:rPr lang="de-DE" b="0" i="1" smtClean="0">
                         <a:latin typeface="Cambria Math" panose="02040503050406030204" pitchFamily="18" charset="0"/>
                       </a:rPr>
-                      <m:t>−4</m:t>
+                      <m:t>:  </m:t>
                     </m:r>
-                    <m:r>
-                      <a:rPr lang="de-DE" sz="2800" b="0" i="1" smtClean="0">
-                        <a:latin typeface="Cambria Math" panose="02040503050406030204" pitchFamily="18" charset="0"/>
-                      </a:rPr>
-                      <m:t>𝑎𝑐</m:t>
-                    </m:r>
-                    <m:r>
-                      <a:rPr lang="de-DE" sz="2800" b="0" i="1" smtClean="0">
-                        <a:latin typeface="Cambria Math" panose="02040503050406030204" pitchFamily="18" charset="0"/>
-                      </a:rPr>
-                      <m:t>=4</m:t>
-                    </m:r>
-                    <m:sSubSup>
-                      <m:sSubSupPr>
+                    <m:sSub>
+                      <m:sSubPr>
                         <m:ctrlPr>
-                          <a:rPr lang="de-DE" sz="2800" b="0" i="1" smtClean="0">
+                          <a:rPr lang="de-DE" i="1">
                             <a:latin typeface="Cambria Math" panose="02040503050406030204" pitchFamily="18" charset="0"/>
                           </a:rPr>
                         </m:ctrlPr>
-                      </m:sSubSupPr>
+                      </m:sSubPr>
                       <m:e>
                         <m:r>
-                          <a:rPr lang="de-DE" sz="2800" b="0" i="1" smtClean="0">
-                            <a:latin typeface="Cambria Math" panose="02040503050406030204" pitchFamily="18" charset="0"/>
-                          </a:rPr>
-                          <m:t>𝑚</m:t>
-                        </m:r>
-                      </m:e>
-                      <m:sub>
-                        <m:r>
-                          <a:rPr lang="de-DE" sz="2800" b="0" i="1" smtClean="0">
-                            <a:latin typeface="Cambria Math" panose="02040503050406030204" pitchFamily="18" charset="0"/>
-                          </a:rPr>
-                          <m:t>2</m:t>
-                        </m:r>
-                      </m:sub>
-                      <m:sup>
-                        <m:r>
-                          <a:rPr lang="de-DE" sz="2800" b="0" i="1" smtClean="0">
-                            <a:latin typeface="Cambria Math" panose="02040503050406030204" pitchFamily="18" charset="0"/>
-                          </a:rPr>
-                          <m:t>2</m:t>
-                        </m:r>
-                      </m:sup>
-                    </m:sSubSup>
-                    <m:sSubSup>
-                      <m:sSubSupPr>
-                        <m:ctrlPr>
-                          <a:rPr lang="de-DE" sz="2800" b="0" i="1" smtClean="0">
-                            <a:latin typeface="Cambria Math" panose="02040503050406030204" pitchFamily="18" charset="0"/>
-                          </a:rPr>
-                        </m:ctrlPr>
-                      </m:sSubSupPr>
-                      <m:e>
-                        <m:r>
-                          <a:rPr lang="de-DE" sz="2800" b="0" i="1" smtClean="0">
+                          <a:rPr lang="de-DE" i="1">
                             <a:latin typeface="Cambria Math" panose="02040503050406030204" pitchFamily="18" charset="0"/>
                           </a:rPr>
                           <m:t>𝑣</m:t>
@@ -19930,96 +19864,99 @@
                       </m:e>
                       <m:sub>
                         <m:r>
-                          <a:rPr lang="de-DE" sz="2800" b="0" i="1" smtClean="0">
+                          <a:rPr lang="de-DE" i="1">
                             <a:latin typeface="Cambria Math" panose="02040503050406030204" pitchFamily="18" charset="0"/>
                           </a:rPr>
-                          <m:t>2</m:t>
+                          <m:t>1</m:t>
                         </m:r>
                       </m:sub>
-                      <m:sup>
-                        <m:r>
-                          <a:rPr lang="de-DE" sz="2800" b="0" i="1" smtClean="0">
-                            <a:latin typeface="Cambria Math" panose="02040503050406030204" pitchFamily="18" charset="0"/>
-                          </a:rPr>
-                          <m:t>4</m:t>
-                        </m:r>
-                      </m:sup>
-                    </m:sSubSup>
-                    <m:sSubSup>
-                      <m:sSubSupPr>
+                    </m:sSub>
+                    <m:r>
+                      <a:rPr lang="de-DE" i="1">
+                        <a:latin typeface="Cambria Math" panose="02040503050406030204" pitchFamily="18" charset="0"/>
+                      </a:rPr>
+                      <m:t>=</m:t>
+                    </m:r>
+                    <m:r>
+                      <a:rPr lang="de-DE" b="0" i="1" smtClean="0">
+                        <a:latin typeface="Cambria Math" panose="02040503050406030204" pitchFamily="18" charset="0"/>
+                      </a:rPr>
+                      <m:t>−</m:t>
+                    </m:r>
+                    <m:f>
+                      <m:fPr>
                         <m:ctrlPr>
-                          <a:rPr lang="de-DE" sz="2800" b="0" i="1" smtClean="0">
+                          <a:rPr lang="de-DE" b="0" i="1" smtClean="0">
                             <a:latin typeface="Cambria Math" panose="02040503050406030204" pitchFamily="18" charset="0"/>
                           </a:rPr>
                         </m:ctrlPr>
-                      </m:sSubSupPr>
-                      <m:e>
-                        <m:r>
-                          <a:rPr lang="de-DE" sz="2800" b="0" i="1" smtClean="0">
-                            <a:latin typeface="Cambria Math" panose="02040503050406030204" pitchFamily="18" charset="0"/>
-                          </a:rPr>
-                          <m:t>𝑟</m:t>
-                        </m:r>
-                      </m:e>
-                      <m:sub>
-                        <m:r>
-                          <a:rPr lang="de-DE" sz="2800" b="0" i="1" smtClean="0">
-                            <a:latin typeface="Cambria Math" panose="02040503050406030204" pitchFamily="18" charset="0"/>
-                          </a:rPr>
-                          <m:t>2</m:t>
-                        </m:r>
-                      </m:sub>
-                      <m:sup>
-                        <m:r>
-                          <a:rPr lang="de-DE" sz="2800" b="0" i="1" smtClean="0">
-                            <a:latin typeface="Cambria Math" panose="02040503050406030204" pitchFamily="18" charset="0"/>
-                          </a:rPr>
-                          <m:t>2</m:t>
-                        </m:r>
-                      </m:sup>
-                    </m:sSubSup>
-                    <m:r>
-                      <a:rPr lang="de-DE" sz="2800" b="0" i="1" smtClean="0">
-                        <a:latin typeface="Cambria Math" panose="02040503050406030204" pitchFamily="18" charset="0"/>
-                      </a:rPr>
-                      <m:t>−4</m:t>
-                    </m:r>
+                      </m:fPr>
+                      <m:num>
+                        <m:sSub>
+                          <m:sSubPr>
+                            <m:ctrlPr>
+                              <a:rPr lang="de-DE" b="0" i="1" smtClean="0">
+                                <a:latin typeface="Cambria Math" panose="02040503050406030204" pitchFamily="18" charset="0"/>
+                              </a:rPr>
+                            </m:ctrlPr>
+                          </m:sSubPr>
+                          <m:e>
+                            <m:r>
+                              <a:rPr lang="de-DE" b="0" i="1" smtClean="0">
+                                <a:latin typeface="Cambria Math" panose="02040503050406030204" pitchFamily="18" charset="0"/>
+                              </a:rPr>
+                              <m:t>𝑚</m:t>
+                            </m:r>
+                          </m:e>
+                          <m:sub>
+                            <m:r>
+                              <a:rPr lang="de-DE" b="0" i="1" smtClean="0">
+                                <a:latin typeface="Cambria Math" panose="02040503050406030204" pitchFamily="18" charset="0"/>
+                              </a:rPr>
+                              <m:t>2</m:t>
+                            </m:r>
+                          </m:sub>
+                        </m:sSub>
+                      </m:num>
+                      <m:den>
+                        <m:sSub>
+                          <m:sSubPr>
+                            <m:ctrlPr>
+                              <a:rPr lang="de-DE" b="0" i="1" smtClean="0">
+                                <a:latin typeface="Cambria Math" panose="02040503050406030204" pitchFamily="18" charset="0"/>
+                              </a:rPr>
+                            </m:ctrlPr>
+                          </m:sSubPr>
+                          <m:e>
+                            <m:r>
+                              <a:rPr lang="de-DE" b="0" i="1" smtClean="0">
+                                <a:latin typeface="Cambria Math" panose="02040503050406030204" pitchFamily="18" charset="0"/>
+                              </a:rPr>
+                              <m:t>𝑚</m:t>
+                            </m:r>
+                          </m:e>
+                          <m:sub>
+                            <m:r>
+                              <a:rPr lang="de-DE" b="0" i="1" smtClean="0">
+                                <a:latin typeface="Cambria Math" panose="02040503050406030204" pitchFamily="18" charset="0"/>
+                              </a:rPr>
+                              <m:t>1</m:t>
+                            </m:r>
+                          </m:sub>
+                        </m:sSub>
+                      </m:den>
+                    </m:f>
                     <m:sSub>
                       <m:sSubPr>
                         <m:ctrlPr>
-                          <a:rPr lang="de-DE" sz="2800" b="0" i="1" smtClean="0">
+                          <a:rPr lang="de-DE" b="0" i="1" smtClean="0">
                             <a:latin typeface="Cambria Math" panose="02040503050406030204" pitchFamily="18" charset="0"/>
                           </a:rPr>
                         </m:ctrlPr>
                       </m:sSubPr>
                       <m:e>
                         <m:r>
-                          <a:rPr lang="de-DE" sz="2800" b="0" i="1" smtClean="0">
-                            <a:latin typeface="Cambria Math" panose="02040503050406030204" pitchFamily="18" charset="0"/>
-                          </a:rPr>
-                          <m:t>𝑚</m:t>
-                        </m:r>
-                      </m:e>
-                      <m:sub>
-                        <m:r>
-                          <a:rPr lang="de-DE" sz="2800" b="0" i="1" smtClean="0">
-                            <a:latin typeface="Cambria Math" panose="02040503050406030204" pitchFamily="18" charset="0"/>
-                          </a:rPr>
-                          <m:t>2</m:t>
-                        </m:r>
-                      </m:sub>
-                    </m:sSub>
-                    <m:sSubSup>
-                      <m:sSubSupPr>
-                        <m:ctrlPr>
-                          <a:rPr lang="de-DE" sz="2800" b="0" i="1" smtClean="0">
-                            <a:latin typeface="Cambria Math" panose="02040503050406030204" pitchFamily="18" charset="0"/>
-                          </a:rPr>
-                        </m:ctrlPr>
-                      </m:sSubSupPr>
-                      <m:e>
-                        <m:r>
-                          <a:rPr lang="de-DE" sz="2800" b="0" i="1" smtClean="0">
+                          <a:rPr lang="de-DE" b="0" i="1" smtClean="0">
                             <a:latin typeface="Cambria Math" panose="02040503050406030204" pitchFamily="18" charset="0"/>
                           </a:rPr>
                           <m:t>𝑣</m:t>
@@ -20027,251 +19964,7 @@
                       </m:e>
                       <m:sub>
                         <m:r>
-                          <a:rPr lang="de-DE" sz="2800" b="0" i="1" smtClean="0">
-                            <a:latin typeface="Cambria Math" panose="02040503050406030204" pitchFamily="18" charset="0"/>
-                          </a:rPr>
-                          <m:t>2</m:t>
-                        </m:r>
-                      </m:sub>
-                      <m:sup>
-                        <m:r>
-                          <a:rPr lang="de-DE" sz="2800" b="0" i="1" smtClean="0">
-                            <a:latin typeface="Cambria Math" panose="02040503050406030204" pitchFamily="18" charset="0"/>
-                          </a:rPr>
-                          <m:t>2</m:t>
-                        </m:r>
-                      </m:sup>
-                    </m:sSubSup>
-                    <m:sSub>
-                      <m:sSubPr>
-                        <m:ctrlPr>
-                          <a:rPr lang="de-DE" sz="2800" b="0" i="1" smtClean="0">
-                            <a:latin typeface="Cambria Math" panose="02040503050406030204" pitchFamily="18" charset="0"/>
-                          </a:rPr>
-                        </m:ctrlPr>
-                      </m:sSubPr>
-                      <m:e>
-                        <m:r>
-                          <a:rPr lang="de-DE" sz="2800" b="0" i="1" smtClean="0">
-                            <a:latin typeface="Cambria Math" panose="02040503050406030204" pitchFamily="18" charset="0"/>
-                          </a:rPr>
-                          <m:t>𝑚</m:t>
-                        </m:r>
-                      </m:e>
-                      <m:sub>
-                        <m:r>
-                          <a:rPr lang="de-DE" sz="2800" b="0" i="1" smtClean="0">
-                            <a:latin typeface="Cambria Math" panose="02040503050406030204" pitchFamily="18" charset="0"/>
-                          </a:rPr>
-                          <m:t>2</m:t>
-                        </m:r>
-                      </m:sub>
-                    </m:sSub>
-                    <m:sSubSup>
-                      <m:sSubSupPr>
-                        <m:ctrlPr>
-                          <a:rPr lang="de-DE" sz="2800" b="0" i="1" smtClean="0">
-                            <a:latin typeface="Cambria Math" panose="02040503050406030204" pitchFamily="18" charset="0"/>
-                          </a:rPr>
-                        </m:ctrlPr>
-                      </m:sSubSupPr>
-                      <m:e>
-                        <m:r>
-                          <a:rPr lang="de-DE" sz="2800" b="0" i="1" smtClean="0">
-                            <a:latin typeface="Cambria Math" panose="02040503050406030204" pitchFamily="18" charset="0"/>
-                          </a:rPr>
-                          <m:t>𝑣</m:t>
-                        </m:r>
-                      </m:e>
-                      <m:sub>
-                        <m:r>
-                          <a:rPr lang="de-DE" sz="2800" b="0" i="1" smtClean="0">
-                            <a:latin typeface="Cambria Math" panose="02040503050406030204" pitchFamily="18" charset="0"/>
-                          </a:rPr>
-                          <m:t>2</m:t>
-                        </m:r>
-                      </m:sub>
-                      <m:sup>
-                        <m:r>
-                          <a:rPr lang="de-DE" sz="2800" b="0" i="1" smtClean="0">
-                            <a:latin typeface="Cambria Math" panose="02040503050406030204" pitchFamily="18" charset="0"/>
-                          </a:rPr>
-                          <m:t>2</m:t>
-                        </m:r>
-                      </m:sup>
-                    </m:sSubSup>
-                    <m:sSubSup>
-                      <m:sSubSupPr>
-                        <m:ctrlPr>
-                          <a:rPr lang="de-DE" sz="2800" b="0" i="1" smtClean="0">
-                            <a:latin typeface="Cambria Math" panose="02040503050406030204" pitchFamily="18" charset="0"/>
-                          </a:rPr>
-                        </m:ctrlPr>
-                      </m:sSubSupPr>
-                      <m:e>
-                        <m:r>
-                          <a:rPr lang="de-DE" sz="2800" b="0" i="1" smtClean="0">
-                            <a:latin typeface="Cambria Math" panose="02040503050406030204" pitchFamily="18" charset="0"/>
-                          </a:rPr>
-                          <m:t>𝑟</m:t>
-                        </m:r>
-                      </m:e>
-                      <m:sub>
-                        <m:r>
-                          <a:rPr lang="de-DE" sz="2800" b="0" i="1" smtClean="0">
-                            <a:latin typeface="Cambria Math" panose="02040503050406030204" pitchFamily="18" charset="0"/>
-                          </a:rPr>
-                          <m:t>2</m:t>
-                        </m:r>
-                      </m:sub>
-                      <m:sup>
-                        <m:r>
-                          <a:rPr lang="de-DE" sz="2800" b="0" i="1" smtClean="0">
-                            <a:latin typeface="Cambria Math" panose="02040503050406030204" pitchFamily="18" charset="0"/>
-                          </a:rPr>
-                          <m:t>2</m:t>
-                        </m:r>
-                      </m:sup>
-                    </m:sSubSup>
-                    <m:r>
-                      <a:rPr lang="de-DE" sz="2800" b="0" i="1" smtClean="0">
-                        <a:latin typeface="Cambria Math" panose="02040503050406030204" pitchFamily="18" charset="0"/>
-                      </a:rPr>
-                      <m:t>+4</m:t>
-                    </m:r>
-                    <m:sSub>
-                      <m:sSubPr>
-                        <m:ctrlPr>
-                          <a:rPr lang="de-DE" sz="2800" b="0" i="1" smtClean="0">
-                            <a:latin typeface="Cambria Math" panose="02040503050406030204" pitchFamily="18" charset="0"/>
-                          </a:rPr>
-                        </m:ctrlPr>
-                      </m:sSubPr>
-                      <m:e>
-                        <m:r>
-                          <a:rPr lang="de-DE" sz="2800" b="0" i="1" smtClean="0">
-                            <a:latin typeface="Cambria Math" panose="02040503050406030204" pitchFamily="18" charset="0"/>
-                          </a:rPr>
-                          <m:t>𝑚</m:t>
-                        </m:r>
-                      </m:e>
-                      <m:sub>
-                        <m:r>
-                          <a:rPr lang="de-DE" sz="2800" b="0" i="1" smtClean="0">
-                            <a:latin typeface="Cambria Math" panose="02040503050406030204" pitchFamily="18" charset="0"/>
-                          </a:rPr>
-                          <m:t>2</m:t>
-                        </m:r>
-                      </m:sub>
-                    </m:sSub>
-                    <m:sSubSup>
-                      <m:sSubSupPr>
-                        <m:ctrlPr>
-                          <a:rPr lang="de-DE" sz="2800" b="0" i="1" smtClean="0">
-                            <a:latin typeface="Cambria Math" panose="02040503050406030204" pitchFamily="18" charset="0"/>
-                          </a:rPr>
-                        </m:ctrlPr>
-                      </m:sSubSupPr>
-                      <m:e>
-                        <m:r>
-                          <a:rPr lang="de-DE" sz="2800" b="0" i="1" smtClean="0">
-                            <a:latin typeface="Cambria Math" panose="02040503050406030204" pitchFamily="18" charset="0"/>
-                          </a:rPr>
-                          <m:t>𝑣</m:t>
-                        </m:r>
-                      </m:e>
-                      <m:sub>
-                        <m:r>
-                          <a:rPr lang="de-DE" sz="2800" b="0" i="1" smtClean="0">
-                            <a:latin typeface="Cambria Math" panose="02040503050406030204" pitchFamily="18" charset="0"/>
-                          </a:rPr>
-                          <m:t>2</m:t>
-                        </m:r>
-                      </m:sub>
-                      <m:sup>
-                        <m:r>
-                          <a:rPr lang="de-DE" sz="2800" b="0" i="1" smtClean="0">
-                            <a:latin typeface="Cambria Math" panose="02040503050406030204" pitchFamily="18" charset="0"/>
-                          </a:rPr>
-                          <m:t>2</m:t>
-                        </m:r>
-                      </m:sup>
-                    </m:sSubSup>
-                    <m:r>
-                      <a:rPr lang="de-DE" sz="2800" b="0" i="1" smtClean="0">
-                        <a:latin typeface="Cambria Math" panose="02040503050406030204" pitchFamily="18" charset="0"/>
-                      </a:rPr>
-                      <m:t>𝐺</m:t>
-                    </m:r>
-                    <m:sSub>
-                      <m:sSubPr>
-                        <m:ctrlPr>
-                          <a:rPr lang="de-DE" sz="2800" b="0" i="1" smtClean="0">
-                            <a:latin typeface="Cambria Math" panose="02040503050406030204" pitchFamily="18" charset="0"/>
-                          </a:rPr>
-                        </m:ctrlPr>
-                      </m:sSubPr>
-                      <m:e>
-                        <m:r>
-                          <a:rPr lang="de-DE" sz="2800" b="0" i="1" smtClean="0">
-                            <a:latin typeface="Cambria Math" panose="02040503050406030204" pitchFamily="18" charset="0"/>
-                          </a:rPr>
-                          <m:t>𝑚</m:t>
-                        </m:r>
-                      </m:e>
-                      <m:sub>
-                        <m:r>
-                          <a:rPr lang="de-DE" sz="2800" b="0" i="1" smtClean="0">
-                            <a:latin typeface="Cambria Math" panose="02040503050406030204" pitchFamily="18" charset="0"/>
-                          </a:rPr>
-                          <m:t>1</m:t>
-                        </m:r>
-                      </m:sub>
-                    </m:sSub>
-                    <m:sSub>
-                      <m:sSubPr>
-                        <m:ctrlPr>
-                          <a:rPr lang="de-DE" sz="2800" b="0" i="1" smtClean="0">
-                            <a:latin typeface="Cambria Math" panose="02040503050406030204" pitchFamily="18" charset="0"/>
-                          </a:rPr>
-                        </m:ctrlPr>
-                      </m:sSubPr>
-                      <m:e>
-                        <m:r>
-                          <a:rPr lang="de-DE" sz="2800" b="0" i="1" smtClean="0">
-                            <a:latin typeface="Cambria Math" panose="02040503050406030204" pitchFamily="18" charset="0"/>
-                          </a:rPr>
-                          <m:t>𝑚</m:t>
-                        </m:r>
-                      </m:e>
-                      <m:sub>
-                        <m:r>
-                          <a:rPr lang="de-DE" sz="2800" b="0" i="1" smtClean="0">
-                            <a:latin typeface="Cambria Math" panose="02040503050406030204" pitchFamily="18" charset="0"/>
-                          </a:rPr>
-                          <m:t>2</m:t>
-                        </m:r>
-                      </m:sub>
-                    </m:sSub>
-                    <m:sSub>
-                      <m:sSubPr>
-                        <m:ctrlPr>
-                          <a:rPr lang="de-DE" sz="2800" b="0" i="1" smtClean="0">
-                            <a:latin typeface="Cambria Math" panose="02040503050406030204" pitchFamily="18" charset="0"/>
-                          </a:rPr>
-                        </m:ctrlPr>
-                      </m:sSubPr>
-                      <m:e>
-                        <m:r>
-                          <a:rPr lang="de-DE" sz="2800" b="0" i="1" smtClean="0">
-                            <a:latin typeface="Cambria Math" panose="02040503050406030204" pitchFamily="18" charset="0"/>
-                          </a:rPr>
-                          <m:t>𝑟</m:t>
-                        </m:r>
-                      </m:e>
-                      <m:sub>
-                        <m:r>
-                          <a:rPr lang="de-DE" sz="2800" b="0" i="1" smtClean="0">
+                          <a:rPr lang="de-DE" b="0" i="1" smtClean="0">
                             <a:latin typeface="Cambria Math" panose="02040503050406030204" pitchFamily="18" charset="0"/>
                           </a:rPr>
                           <m:t>2</m:t>
@@ -20280,49 +19973,6 @@
                     </m:sSub>
                   </m:oMath>
                 </a14:m>
-                <a:br>
-                  <a:rPr lang="de-DE" sz="2800" b="0" dirty="0"/>
-                </a:br>
-                <a:endParaRPr lang="de-DE" sz="2800" b="0" dirty="0"/>
-              </a:p>
-              <a:p>
-                <a:pPr marL="0" indent="0">
-                  <a:lnSpc>
-                    <a:spcPct val="120000"/>
-                  </a:lnSpc>
-                  <a:spcAft>
-                    <a:spcPts val="800"/>
-                  </a:spcAft>
-                  <a:buNone/>
-                </a:pPr>
-                <a:endParaRPr lang="de-DE" dirty="0"/>
-              </a:p>
-              <a:p>
-                <a:pPr marL="0" indent="0">
-                  <a:lnSpc>
-                    <a:spcPct val="120000"/>
-                  </a:lnSpc>
-                  <a:spcAft>
-                    <a:spcPts val="800"/>
-                  </a:spcAft>
-                  <a:buNone/>
-                </a:pPr>
-                <a:endParaRPr lang="de-DE" sz="2800" b="0" dirty="0"/>
-              </a:p>
-              <a:p>
-                <a:pPr marL="0" indent="0">
-                  <a:lnSpc>
-                    <a:spcPct val="120000"/>
-                  </a:lnSpc>
-                  <a:spcAft>
-                    <a:spcPts val="800"/>
-                  </a:spcAft>
-                  <a:buNone/>
-                </a:pPr>
-                <a:r>
-                  <a:rPr lang="de-DE" dirty="0"/>
-                  <a:t> </a:t>
-                </a:r>
                 <a:endParaRPr lang="de-DE" sz="2800" b="0" dirty="0"/>
               </a:p>
             </p:txBody>
@@ -20353,7 +20003,7 @@
               <a:blipFill>
                 <a:blip r:embed="rId2"/>
                 <a:stretch>
-                  <a:fillRect l="-70" t="-836"/>
+                  <a:fillRect l="-559" t="-1487"/>
                 </a:stretch>
               </a:blipFill>
             </p:spPr>
@@ -21602,6 +21252,531 @@
           </a:fontRef>
         </p:style>
       </p:cxnSp>
+      <mc:AlternateContent xmlns:mc="http://schemas.openxmlformats.org/markup-compatibility/2006">
+        <mc:Choice xmlns:a14="http://schemas.microsoft.com/office/drawing/2010/main" Requires="a14">
+          <p:sp>
+            <p:nvSpPr>
+              <p:cNvPr id="2" name="Textfeld 1">
+                <a:extLst>
+                  <a:ext uri="{FF2B5EF4-FFF2-40B4-BE49-F238E27FC236}">
+                    <a16:creationId xmlns:a16="http://schemas.microsoft.com/office/drawing/2014/main" id="{D9D1FF40-E687-4BE8-AA29-78E1D0C47331}"/>
+                  </a:ext>
+                </a:extLst>
+              </p:cNvPr>
+              <p:cNvSpPr txBox="1"/>
+              <p:nvPr/>
+            </p:nvSpPr>
+            <p:spPr>
+              <a:xfrm>
+                <a:off x="8498048" y="3417572"/>
+                <a:ext cx="3693951" cy="1408719"/>
+              </a:xfrm>
+              <a:prstGeom prst="rect">
+                <a:avLst/>
+              </a:prstGeom>
+              <a:noFill/>
+            </p:spPr>
+            <p:txBody>
+              <a:bodyPr wrap="square" rtlCol="0">
+                <a:spAutoFit/>
+              </a:bodyPr>
+              <a:lstStyle/>
+              <a:p>
+                <a:r>
+                  <a:rPr lang="de-DE" dirty="0"/>
+                  <a:t>Barycenter </a:t>
+                </a:r>
+                <a:r>
+                  <a:rPr lang="de-DE" dirty="0" err="1"/>
+                  <a:t>of</a:t>
+                </a:r>
+                <a:r>
+                  <a:rPr lang="de-DE" dirty="0"/>
+                  <a:t> </a:t>
+                </a:r>
+                <a:r>
+                  <a:rPr lang="de-DE" dirty="0" err="1"/>
+                  <a:t>the</a:t>
+                </a:r>
+                <a:r>
+                  <a:rPr lang="de-DE" dirty="0"/>
+                  <a:t> </a:t>
+                </a:r>
+                <a:r>
+                  <a:rPr lang="de-DE" dirty="0" err="1"/>
+                  <a:t>two</a:t>
+                </a:r>
+                <a:r>
+                  <a:rPr lang="de-DE" dirty="0"/>
+                  <a:t> </a:t>
+                </a:r>
+                <a:r>
+                  <a:rPr lang="de-DE" dirty="0" err="1"/>
+                  <a:t>masses</a:t>
+                </a:r>
+                <a:endParaRPr lang="de-DE" dirty="0"/>
+              </a:p>
+              <a:p>
+                <a14:m>
+                  <m:oMathPara xmlns:m="http://schemas.openxmlformats.org/officeDocument/2006/math">
+                    <m:oMathParaPr>
+                      <m:jc m:val="centerGroup"/>
+                    </m:oMathParaPr>
+                    <m:oMath xmlns:m="http://schemas.openxmlformats.org/officeDocument/2006/math">
+                      <m:r>
+                        <a:rPr lang="de-DE" b="0" i="1" smtClean="0">
+                          <a:latin typeface="Cambria Math" panose="02040503050406030204" pitchFamily="18" charset="0"/>
+                        </a:rPr>
+                        <m:t>𝑅</m:t>
+                      </m:r>
+                      <m:r>
+                        <a:rPr lang="de-DE" b="0" i="1" smtClean="0">
+                          <a:latin typeface="Cambria Math" panose="02040503050406030204" pitchFamily="18" charset="0"/>
+                        </a:rPr>
+                        <m:t>=</m:t>
+                      </m:r>
+                      <m:f>
+                        <m:fPr>
+                          <m:ctrlPr>
+                            <a:rPr lang="de-DE" b="0" i="1" smtClean="0">
+                              <a:latin typeface="Cambria Math" panose="02040503050406030204" pitchFamily="18" charset="0"/>
+                            </a:rPr>
+                          </m:ctrlPr>
+                        </m:fPr>
+                        <m:num>
+                          <m:sSub>
+                            <m:sSubPr>
+                              <m:ctrlPr>
+                                <a:rPr lang="de-DE" b="0" i="1" smtClean="0">
+                                  <a:latin typeface="Cambria Math" panose="02040503050406030204" pitchFamily="18" charset="0"/>
+                                </a:rPr>
+                              </m:ctrlPr>
+                            </m:sSubPr>
+                            <m:e>
+                              <m:r>
+                                <a:rPr lang="de-DE" b="0" i="1" smtClean="0">
+                                  <a:latin typeface="Cambria Math" panose="02040503050406030204" pitchFamily="18" charset="0"/>
+                                </a:rPr>
+                                <m:t>𝑚</m:t>
+                              </m:r>
+                            </m:e>
+                            <m:sub>
+                              <m:r>
+                                <a:rPr lang="de-DE" b="0" i="1" smtClean="0">
+                                  <a:latin typeface="Cambria Math" panose="02040503050406030204" pitchFamily="18" charset="0"/>
+                                </a:rPr>
+                                <m:t>1</m:t>
+                              </m:r>
+                            </m:sub>
+                          </m:sSub>
+                        </m:num>
+                        <m:den>
+                          <m:sSub>
+                            <m:sSubPr>
+                              <m:ctrlPr>
+                                <a:rPr lang="de-DE" b="0" i="1" smtClean="0">
+                                  <a:latin typeface="Cambria Math" panose="02040503050406030204" pitchFamily="18" charset="0"/>
+                                </a:rPr>
+                              </m:ctrlPr>
+                            </m:sSubPr>
+                            <m:e>
+                              <m:r>
+                                <a:rPr lang="de-DE" b="0" i="1" smtClean="0">
+                                  <a:latin typeface="Cambria Math" panose="02040503050406030204" pitchFamily="18" charset="0"/>
+                                </a:rPr>
+                                <m:t>𝑚</m:t>
+                              </m:r>
+                            </m:e>
+                            <m:sub>
+                              <m:r>
+                                <a:rPr lang="de-DE" b="0" i="1" smtClean="0">
+                                  <a:latin typeface="Cambria Math" panose="02040503050406030204" pitchFamily="18" charset="0"/>
+                                </a:rPr>
+                                <m:t>1</m:t>
+                              </m:r>
+                            </m:sub>
+                          </m:sSub>
+                          <m:r>
+                            <a:rPr lang="de-DE" b="0" i="1" smtClean="0">
+                              <a:latin typeface="Cambria Math" panose="02040503050406030204" pitchFamily="18" charset="0"/>
+                            </a:rPr>
+                            <m:t>+</m:t>
+                          </m:r>
+                          <m:sSub>
+                            <m:sSubPr>
+                              <m:ctrlPr>
+                                <a:rPr lang="de-DE" b="0" i="1" smtClean="0">
+                                  <a:latin typeface="Cambria Math" panose="02040503050406030204" pitchFamily="18" charset="0"/>
+                                </a:rPr>
+                              </m:ctrlPr>
+                            </m:sSubPr>
+                            <m:e>
+                              <m:r>
+                                <a:rPr lang="de-DE" b="0" i="1" smtClean="0">
+                                  <a:latin typeface="Cambria Math" panose="02040503050406030204" pitchFamily="18" charset="0"/>
+                                </a:rPr>
+                                <m:t>𝑚</m:t>
+                              </m:r>
+                            </m:e>
+                            <m:sub>
+                              <m:r>
+                                <a:rPr lang="de-DE" b="0" i="1" smtClean="0">
+                                  <a:latin typeface="Cambria Math" panose="02040503050406030204" pitchFamily="18" charset="0"/>
+                                </a:rPr>
+                                <m:t>2</m:t>
+                              </m:r>
+                            </m:sub>
+                          </m:sSub>
+                        </m:den>
+                      </m:f>
+                      <m:sSub>
+                        <m:sSubPr>
+                          <m:ctrlPr>
+                            <a:rPr lang="de-DE" b="0" i="1" smtClean="0">
+                              <a:latin typeface="Cambria Math" panose="02040503050406030204" pitchFamily="18" charset="0"/>
+                            </a:rPr>
+                          </m:ctrlPr>
+                        </m:sSubPr>
+                        <m:e>
+                          <m:r>
+                            <a:rPr lang="de-DE" b="0" i="1" smtClean="0">
+                              <a:latin typeface="Cambria Math" panose="02040503050406030204" pitchFamily="18" charset="0"/>
+                            </a:rPr>
+                            <m:t>𝑟</m:t>
+                          </m:r>
+                        </m:e>
+                        <m:sub>
+                          <m:r>
+                            <a:rPr lang="de-DE" b="0" i="1" smtClean="0">
+                              <a:latin typeface="Cambria Math" panose="02040503050406030204" pitchFamily="18" charset="0"/>
+                            </a:rPr>
+                            <m:t>1</m:t>
+                          </m:r>
+                        </m:sub>
+                      </m:sSub>
+                      <m:r>
+                        <a:rPr lang="de-DE" b="0" i="1" smtClean="0">
+                          <a:latin typeface="Cambria Math" panose="02040503050406030204" pitchFamily="18" charset="0"/>
+                        </a:rPr>
+                        <m:t>+</m:t>
+                      </m:r>
+                      <m:f>
+                        <m:fPr>
+                          <m:ctrlPr>
+                            <a:rPr lang="de-DE" b="0" i="1" smtClean="0">
+                              <a:latin typeface="Cambria Math" panose="02040503050406030204" pitchFamily="18" charset="0"/>
+                            </a:rPr>
+                          </m:ctrlPr>
+                        </m:fPr>
+                        <m:num>
+                          <m:sSub>
+                            <m:sSubPr>
+                              <m:ctrlPr>
+                                <a:rPr lang="de-DE" b="0" i="1" smtClean="0">
+                                  <a:latin typeface="Cambria Math" panose="02040503050406030204" pitchFamily="18" charset="0"/>
+                                </a:rPr>
+                              </m:ctrlPr>
+                            </m:sSubPr>
+                            <m:e>
+                              <m:r>
+                                <a:rPr lang="de-DE" b="0" i="1" smtClean="0">
+                                  <a:latin typeface="Cambria Math" panose="02040503050406030204" pitchFamily="18" charset="0"/>
+                                </a:rPr>
+                                <m:t>𝑚</m:t>
+                              </m:r>
+                            </m:e>
+                            <m:sub>
+                              <m:r>
+                                <a:rPr lang="de-DE" b="0" i="1" smtClean="0">
+                                  <a:latin typeface="Cambria Math" panose="02040503050406030204" pitchFamily="18" charset="0"/>
+                                </a:rPr>
+                                <m:t>2</m:t>
+                              </m:r>
+                            </m:sub>
+                          </m:sSub>
+                        </m:num>
+                        <m:den>
+                          <m:sSub>
+                            <m:sSubPr>
+                              <m:ctrlPr>
+                                <a:rPr lang="de-DE" b="0" i="1" smtClean="0">
+                                  <a:latin typeface="Cambria Math" panose="02040503050406030204" pitchFamily="18" charset="0"/>
+                                </a:rPr>
+                              </m:ctrlPr>
+                            </m:sSubPr>
+                            <m:e>
+                              <m:r>
+                                <a:rPr lang="de-DE" b="0" i="1" smtClean="0">
+                                  <a:latin typeface="Cambria Math" panose="02040503050406030204" pitchFamily="18" charset="0"/>
+                                </a:rPr>
+                                <m:t>𝑚</m:t>
+                              </m:r>
+                            </m:e>
+                            <m:sub>
+                              <m:r>
+                                <a:rPr lang="de-DE" b="0" i="1" smtClean="0">
+                                  <a:latin typeface="Cambria Math" panose="02040503050406030204" pitchFamily="18" charset="0"/>
+                                </a:rPr>
+                                <m:t>1</m:t>
+                              </m:r>
+                            </m:sub>
+                          </m:sSub>
+                          <m:r>
+                            <a:rPr lang="de-DE" b="0" i="1" smtClean="0">
+                              <a:latin typeface="Cambria Math" panose="02040503050406030204" pitchFamily="18" charset="0"/>
+                            </a:rPr>
+                            <m:t>+</m:t>
+                          </m:r>
+                          <m:sSub>
+                            <m:sSubPr>
+                              <m:ctrlPr>
+                                <a:rPr lang="de-DE" b="0" i="1" smtClean="0">
+                                  <a:latin typeface="Cambria Math" panose="02040503050406030204" pitchFamily="18" charset="0"/>
+                                </a:rPr>
+                              </m:ctrlPr>
+                            </m:sSubPr>
+                            <m:e>
+                              <m:r>
+                                <a:rPr lang="de-DE" b="0" i="1" smtClean="0">
+                                  <a:latin typeface="Cambria Math" panose="02040503050406030204" pitchFamily="18" charset="0"/>
+                                </a:rPr>
+                                <m:t>𝑚</m:t>
+                              </m:r>
+                            </m:e>
+                            <m:sub>
+                              <m:r>
+                                <a:rPr lang="de-DE" b="0" i="1" smtClean="0">
+                                  <a:latin typeface="Cambria Math" panose="02040503050406030204" pitchFamily="18" charset="0"/>
+                                </a:rPr>
+                                <m:t>2</m:t>
+                              </m:r>
+                            </m:sub>
+                          </m:sSub>
+                        </m:den>
+                      </m:f>
+                      <m:sSub>
+                        <m:sSubPr>
+                          <m:ctrlPr>
+                            <a:rPr lang="de-DE" b="0" i="1" smtClean="0">
+                              <a:latin typeface="Cambria Math" panose="02040503050406030204" pitchFamily="18" charset="0"/>
+                            </a:rPr>
+                          </m:ctrlPr>
+                        </m:sSubPr>
+                        <m:e>
+                          <m:r>
+                            <a:rPr lang="de-DE" b="0" i="1" smtClean="0">
+                              <a:latin typeface="Cambria Math" panose="02040503050406030204" pitchFamily="18" charset="0"/>
+                            </a:rPr>
+                            <m:t>𝑟</m:t>
+                          </m:r>
+                        </m:e>
+                        <m:sub>
+                          <m:r>
+                            <a:rPr lang="de-DE" b="0" i="1" smtClean="0">
+                              <a:latin typeface="Cambria Math" panose="02040503050406030204" pitchFamily="18" charset="0"/>
+                            </a:rPr>
+                            <m:t>2</m:t>
+                          </m:r>
+                        </m:sub>
+                      </m:sSub>
+                      <m:r>
+                        <a:rPr lang="de-DE" b="0" i="1" smtClean="0">
+                          <a:latin typeface="Cambria Math" panose="02040503050406030204" pitchFamily="18" charset="0"/>
+                        </a:rPr>
+                        <m:t>≝0</m:t>
+                      </m:r>
+                    </m:oMath>
+                    <m:oMath xmlns:m="http://schemas.openxmlformats.org/officeDocument/2006/math">
+                      <m:r>
+                        <a:rPr lang="de-DE" b="0" i="0" smtClean="0">
+                          <a:latin typeface="Cambria Math" panose="02040503050406030204" pitchFamily="18" charset="0"/>
+                        </a:rPr>
+                        <m:t>→  </m:t>
+                      </m:r>
+                      <m:sSub>
+                        <m:sSubPr>
+                          <m:ctrlPr>
+                            <a:rPr lang="de-DE" b="1" i="1">
+                              <a:latin typeface="Cambria Math" panose="02040503050406030204" pitchFamily="18" charset="0"/>
+                            </a:rPr>
+                          </m:ctrlPr>
+                        </m:sSubPr>
+                        <m:e>
+                          <m:r>
+                            <a:rPr lang="de-DE" b="1" i="1">
+                              <a:latin typeface="Cambria Math" panose="02040503050406030204" pitchFamily="18" charset="0"/>
+                            </a:rPr>
+                            <m:t>𝒓</m:t>
+                          </m:r>
+                        </m:e>
+                        <m:sub>
+                          <m:r>
+                            <a:rPr lang="de-DE" b="1" i="1">
+                              <a:latin typeface="Cambria Math" panose="02040503050406030204" pitchFamily="18" charset="0"/>
+                            </a:rPr>
+                            <m:t>𝟏</m:t>
+                          </m:r>
+                        </m:sub>
+                      </m:sSub>
+                      <m:r>
+                        <a:rPr lang="de-DE" b="1" i="1" smtClean="0">
+                          <a:latin typeface="Cambria Math" panose="02040503050406030204" pitchFamily="18" charset="0"/>
+                        </a:rPr>
+                        <m:t>=−</m:t>
+                      </m:r>
+                      <m:f>
+                        <m:fPr>
+                          <m:ctrlPr>
+                            <a:rPr lang="de-DE" b="1" i="1">
+                              <a:latin typeface="Cambria Math" panose="02040503050406030204" pitchFamily="18" charset="0"/>
+                            </a:rPr>
+                          </m:ctrlPr>
+                        </m:fPr>
+                        <m:num>
+                          <m:sSub>
+                            <m:sSubPr>
+                              <m:ctrlPr>
+                                <a:rPr lang="de-DE" b="1" i="1">
+                                  <a:latin typeface="Cambria Math" panose="02040503050406030204" pitchFamily="18" charset="0"/>
+                                </a:rPr>
+                              </m:ctrlPr>
+                            </m:sSubPr>
+                            <m:e>
+                              <m:r>
+                                <a:rPr lang="de-DE" b="1" i="1">
+                                  <a:latin typeface="Cambria Math" panose="02040503050406030204" pitchFamily="18" charset="0"/>
+                                </a:rPr>
+                                <m:t>𝒎</m:t>
+                              </m:r>
+                            </m:e>
+                            <m:sub>
+                              <m:r>
+                                <a:rPr lang="de-DE" b="1" i="1">
+                                  <a:latin typeface="Cambria Math" panose="02040503050406030204" pitchFamily="18" charset="0"/>
+                                </a:rPr>
+                                <m:t>𝟐</m:t>
+                              </m:r>
+                            </m:sub>
+                          </m:sSub>
+                        </m:num>
+                        <m:den>
+                          <m:sSub>
+                            <m:sSubPr>
+                              <m:ctrlPr>
+                                <a:rPr lang="de-DE" b="1" i="1">
+                                  <a:latin typeface="Cambria Math" panose="02040503050406030204" pitchFamily="18" charset="0"/>
+                                </a:rPr>
+                              </m:ctrlPr>
+                            </m:sSubPr>
+                            <m:e>
+                              <m:r>
+                                <a:rPr lang="de-DE" b="1" i="1">
+                                  <a:latin typeface="Cambria Math" panose="02040503050406030204" pitchFamily="18" charset="0"/>
+                                </a:rPr>
+                                <m:t>𝒎</m:t>
+                              </m:r>
+                            </m:e>
+                            <m:sub>
+                              <m:r>
+                                <a:rPr lang="de-DE" b="1" i="1">
+                                  <a:latin typeface="Cambria Math" panose="02040503050406030204" pitchFamily="18" charset="0"/>
+                                </a:rPr>
+                                <m:t>𝟏</m:t>
+                              </m:r>
+                            </m:sub>
+                          </m:sSub>
+                        </m:den>
+                      </m:f>
+                      <m:sSub>
+                        <m:sSubPr>
+                          <m:ctrlPr>
+                            <a:rPr lang="de-DE" b="1" i="1">
+                              <a:latin typeface="Cambria Math" panose="02040503050406030204" pitchFamily="18" charset="0"/>
+                            </a:rPr>
+                          </m:ctrlPr>
+                        </m:sSubPr>
+                        <m:e>
+                          <m:r>
+                            <a:rPr lang="de-DE" b="1" i="1">
+                              <a:latin typeface="Cambria Math" panose="02040503050406030204" pitchFamily="18" charset="0"/>
+                            </a:rPr>
+                            <m:t>𝒓</m:t>
+                          </m:r>
+                        </m:e>
+                        <m:sub>
+                          <m:r>
+                            <a:rPr lang="de-DE" b="1" i="1">
+                              <a:latin typeface="Cambria Math" panose="02040503050406030204" pitchFamily="18" charset="0"/>
+                            </a:rPr>
+                            <m:t>𝟐</m:t>
+                          </m:r>
+                        </m:sub>
+                      </m:sSub>
+                      <m:r>
+                        <a:rPr lang="de-DE" b="1" i="0" smtClean="0">
+                          <a:latin typeface="Cambria Math" panose="02040503050406030204" pitchFamily="18" charset="0"/>
+                        </a:rPr>
+                        <m:t>      </m:t>
+                      </m:r>
+                      <m:r>
+                        <a:rPr lang="de-DE" b="0" i="0" smtClean="0">
+                          <a:latin typeface="Cambria Math" panose="02040503050406030204" pitchFamily="18" charset="0"/>
+                        </a:rPr>
+                        <m:t>(4)</m:t>
+                      </m:r>
+                    </m:oMath>
+                  </m:oMathPara>
+                </a14:m>
+                <a:endParaRPr lang="de-DE" dirty="0"/>
+              </a:p>
+            </p:txBody>
+          </p:sp>
+        </mc:Choice>
+        <mc:Fallback>
+          <p:sp>
+            <p:nvSpPr>
+              <p:cNvPr id="2" name="Textfeld 1">
+                <a:extLst>
+                  <a:ext uri="{FF2B5EF4-FFF2-40B4-BE49-F238E27FC236}">
+                    <a16:creationId xmlns:a16="http://schemas.microsoft.com/office/drawing/2014/main" id="{D9D1FF40-E687-4BE8-AA29-78E1D0C47331}"/>
+                  </a:ext>
+                </a:extLst>
+              </p:cNvPr>
+              <p:cNvSpPr txBox="1">
+                <a:spLocks noRot="1" noChangeAspect="1" noMove="1" noResize="1" noEditPoints="1" noAdjustHandles="1" noChangeArrowheads="1" noChangeShapeType="1" noTextEdit="1"/>
+              </p:cNvSpPr>
+              <p:nvPr/>
+            </p:nvSpPr>
+            <p:spPr>
+              <a:xfrm>
+                <a:off x="8498048" y="3417572"/>
+                <a:ext cx="3693951" cy="1408719"/>
+              </a:xfrm>
+              <a:prstGeom prst="rect">
+                <a:avLst/>
+              </a:prstGeom>
+              <a:blipFill>
+                <a:blip r:embed="rId9"/>
+                <a:stretch>
+                  <a:fillRect l="-1320" t="-2597"/>
+                </a:stretch>
+              </a:blipFill>
+            </p:spPr>
+            <p:txBody>
+              <a:bodyPr/>
+              <a:lstStyle/>
+              <a:p>
+                <a:r>
+                  <a:rPr lang="de-DE">
+                    <a:noFill/>
+                  </a:rPr>
+                  <a:t> </a:t>
+                </a:r>
+              </a:p>
+            </p:txBody>
+          </p:sp>
+        </mc:Fallback>
+      </mc:AlternateContent>
     </p:spTree>
     <p:extLst>
       <p:ext uri="{BB962C8B-B14F-4D97-AF65-F5344CB8AC3E}">

</xml_diff>

<commit_message>
trying to bugfix the calculations for script5
</commit_message>
<xml_diff>
--- a/docu_and_plots/thoughts_and_revelations_during_this_project.pptx
+++ b/docu_and_plots/thoughts_and_revelations_during_this_project.pptx
@@ -16926,7 +16926,7 @@
             </p:spPr>
             <p:txBody>
               <a:bodyPr>
-                <a:normAutofit fontScale="62500" lnSpcReduction="20000"/>
+                <a:normAutofit fontScale="55000" lnSpcReduction="20000"/>
               </a:bodyPr>
               <a:lstStyle/>
               <a:p>
@@ -18152,6 +18152,12 @@
                       </a:rPr>
                       <m:t>,</m:t>
                     </m:r>
+                    <m:r>
+                      <a:rPr lang="de-DE" sz="2800" b="0" i="0" smtClean="0">
+                        <a:latin typeface="Cambria Math" panose="02040503050406030204" pitchFamily="18" charset="0"/>
+                      </a:rPr>
+                      <m:t>  </m:t>
+                    </m:r>
                     <m:sSub>
                       <m:sSubPr>
                         <m:ctrlPr>
@@ -18183,6 +18189,12 @@
                       </a:rPr>
                       <m:t>,</m:t>
                     </m:r>
+                    <m:r>
+                      <a:rPr lang="de-DE" sz="2800" b="0" i="1" smtClean="0">
+                        <a:latin typeface="Cambria Math" panose="02040503050406030204" pitchFamily="18" charset="0"/>
+                      </a:rPr>
+                      <m:t>  </m:t>
+                    </m:r>
                     <m:sSub>
                       <m:sSubPr>
                         <m:ctrlPr>
@@ -18192,12 +18204,6 @@
                         </m:ctrlPr>
                       </m:sSubPr>
                       <m:e>
-                        <m:r>
-                          <a:rPr lang="de-DE" sz="2800" b="0" i="1" smtClean="0">
-                            <a:latin typeface="Cambria Math" panose="02040503050406030204" pitchFamily="18" charset="0"/>
-                          </a:rPr>
-                          <m:t>+</m:t>
-                        </m:r>
                         <m:r>
                           <a:rPr lang="de-DE" sz="2800" b="0" i="1" smtClean="0">
                             <a:latin typeface="Cambria Math" panose="02040503050406030204" pitchFamily="18" charset="0"/>
@@ -18220,6 +18226,12 @@
                       </a:rPr>
                       <m:t>, </m:t>
                     </m:r>
+                    <m:r>
+                      <a:rPr lang="de-DE" sz="2800" b="0" i="1" smtClean="0">
+                        <a:latin typeface="Cambria Math" panose="02040503050406030204" pitchFamily="18" charset="0"/>
+                      </a:rPr>
+                      <m:t> </m:t>
+                    </m:r>
                     <m:sSub>
                       <m:sSubPr>
                         <m:ctrlPr>
@@ -18233,7 +18245,7 @@
                           <a:rPr lang="de-DE" sz="2800" b="0" i="1" smtClean="0">
                             <a:latin typeface="Cambria Math" panose="02040503050406030204" pitchFamily="18" charset="0"/>
                           </a:rPr>
-                          <m:t> </m:t>
+                          <m:t>−</m:t>
                         </m:r>
                         <m:sSub>
                           <m:sSubPr>
@@ -18304,6 +18316,12 @@
                       <a:rPr lang="de-DE" sz="2800" b="0" i="1" smtClean="0">
                         <a:latin typeface="Cambria Math" panose="02040503050406030204" pitchFamily="18" charset="0"/>
                       </a:rPr>
+                      <m:t> </m:t>
+                    </m:r>
+                    <m:r>
+                      <a:rPr lang="de-DE" sz="2800" b="0" i="1" smtClean="0">
+                        <a:latin typeface="Cambria Math" panose="02040503050406030204" pitchFamily="18" charset="0"/>
+                      </a:rPr>
                       <m:t>𝐺</m:t>
                     </m:r>
                   </m:oMath>
@@ -18431,7 +18449,7 @@
                       <a:rPr lang="de-DE" b="0" i="1" smtClean="0">
                         <a:latin typeface="Cambria Math" panose="02040503050406030204" pitchFamily="18" charset="0"/>
                       </a:rPr>
-                      <m:t>−</m:t>
+                      <m:t>+</m:t>
                     </m:r>
                     <m:sSub>
                       <m:sSubPr>
@@ -18592,7 +18610,7 @@
                           <a:rPr lang="de-DE" b="0" i="1" smtClean="0">
                             <a:latin typeface="Cambria Math" panose="02040503050406030204" pitchFamily="18" charset="0"/>
                           </a:rPr>
-                          <m:t>−</m:t>
+                          <m:t>+</m:t>
                         </m:r>
                         <m:sSub>
                           <m:sSubPr>
@@ -18623,218 +18641,6 @@
                     </m:d>
                     <m:r>
                       <a:rPr lang="de-DE" i="1">
-                        <a:latin typeface="Cambria Math" panose="02040503050406030204" pitchFamily="18" charset="0"/>
-                      </a:rPr>
-                      <m:t> →</m:t>
-                    </m:r>
-                    <m:r>
-                      <a:rPr lang="de-DE" b="0" i="1" smtClean="0">
-                        <a:latin typeface="Cambria Math" panose="02040503050406030204" pitchFamily="18" charset="0"/>
-                      </a:rPr>
-                      <m:t> </m:t>
-                    </m:r>
-                    <m:sSub>
-                      <m:sSubPr>
-                        <m:ctrlPr>
-                          <a:rPr lang="de-DE" b="0" i="1" smtClean="0">
-                            <a:latin typeface="Cambria Math" panose="02040503050406030204" pitchFamily="18" charset="0"/>
-                          </a:rPr>
-                        </m:ctrlPr>
-                      </m:sSubPr>
-                      <m:e>
-                        <m:r>
-                          <a:rPr lang="de-DE" i="1" smtClean="0">
-                            <a:latin typeface="Cambria Math" panose="02040503050406030204" pitchFamily="18" charset="0"/>
-                          </a:rPr>
-                          <m:t>𝑟</m:t>
-                        </m:r>
-                      </m:e>
-                      <m:sub>
-                        <m:r>
-                          <a:rPr lang="de-DE" b="0" i="1" smtClean="0">
-                            <a:latin typeface="Cambria Math" panose="02040503050406030204" pitchFamily="18" charset="0"/>
-                          </a:rPr>
-                          <m:t>1</m:t>
-                        </m:r>
-                      </m:sub>
-                    </m:sSub>
-                    <m:r>
-                      <a:rPr lang="de-DE" b="0" i="1" smtClean="0">
-                        <a:latin typeface="Cambria Math" panose="02040503050406030204" pitchFamily="18" charset="0"/>
-                      </a:rPr>
-                      <m:t>=</m:t>
-                    </m:r>
-                    <m:r>
-                      <a:rPr lang="de-DE" i="1">
-                        <a:latin typeface="Cambria Math" panose="02040503050406030204" pitchFamily="18" charset="0"/>
-                      </a:rPr>
-                      <m:t>−</m:t>
-                    </m:r>
-                    <m:f>
-                      <m:fPr>
-                        <m:ctrlPr>
-                          <a:rPr lang="de-DE" i="1">
-                            <a:latin typeface="Cambria Math" panose="02040503050406030204" pitchFamily="18" charset="0"/>
-                          </a:rPr>
-                        </m:ctrlPr>
-                      </m:fPr>
-                      <m:num>
-                        <m:sSub>
-                          <m:sSubPr>
-                            <m:ctrlPr>
-                              <a:rPr lang="de-DE" i="1">
-                                <a:latin typeface="Cambria Math" panose="02040503050406030204" pitchFamily="18" charset="0"/>
-                              </a:rPr>
-                            </m:ctrlPr>
-                          </m:sSubPr>
-                          <m:e>
-                            <m:r>
-                              <a:rPr lang="de-DE" i="1">
-                                <a:latin typeface="Cambria Math" panose="02040503050406030204" pitchFamily="18" charset="0"/>
-                              </a:rPr>
-                              <m:t>𝑚</m:t>
-                            </m:r>
-                          </m:e>
-                          <m:sub>
-                            <m:r>
-                              <a:rPr lang="de-DE" i="1">
-                                <a:latin typeface="Cambria Math" panose="02040503050406030204" pitchFamily="18" charset="0"/>
-                              </a:rPr>
-                              <m:t>2</m:t>
-                            </m:r>
-                          </m:sub>
-                        </m:sSub>
-                      </m:num>
-                      <m:den>
-                        <m:sSub>
-                          <m:sSubPr>
-                            <m:ctrlPr>
-                              <a:rPr lang="de-DE" i="1">
-                                <a:latin typeface="Cambria Math" panose="02040503050406030204" pitchFamily="18" charset="0"/>
-                              </a:rPr>
-                            </m:ctrlPr>
-                          </m:sSubPr>
-                          <m:e>
-                            <m:r>
-                              <a:rPr lang="de-DE" i="1">
-                                <a:latin typeface="Cambria Math" panose="02040503050406030204" pitchFamily="18" charset="0"/>
-                              </a:rPr>
-                              <m:t>𝑚</m:t>
-                            </m:r>
-                          </m:e>
-                          <m:sub>
-                            <m:r>
-                              <a:rPr lang="de-DE" i="1">
-                                <a:latin typeface="Cambria Math" panose="02040503050406030204" pitchFamily="18" charset="0"/>
-                              </a:rPr>
-                              <m:t>1</m:t>
-                            </m:r>
-                          </m:sub>
-                        </m:sSub>
-                      </m:den>
-                    </m:f>
-                    <m:r>
-                      <a:rPr lang="de-DE" b="0" i="1" smtClean="0">
-                        <a:latin typeface="Cambria Math" panose="02040503050406030204" pitchFamily="18" charset="0"/>
-                      </a:rPr>
-                      <m:t>𝑅</m:t>
-                    </m:r>
-                    <m:r>
-                      <a:rPr lang="de-DE" b="0" i="1" smtClean="0">
-                        <a:latin typeface="Cambria Math" panose="02040503050406030204" pitchFamily="18" charset="0"/>
-                      </a:rPr>
-                      <m:t>+</m:t>
-                    </m:r>
-                    <m:f>
-                      <m:fPr>
-                        <m:ctrlPr>
-                          <a:rPr lang="de-DE" b="0" i="1" smtClean="0">
-                            <a:latin typeface="Cambria Math" panose="02040503050406030204" pitchFamily="18" charset="0"/>
-                          </a:rPr>
-                        </m:ctrlPr>
-                      </m:fPr>
-                      <m:num>
-                        <m:sSub>
-                          <m:sSubPr>
-                            <m:ctrlPr>
-                              <a:rPr lang="de-DE" b="0" i="1" smtClean="0">
-                                <a:latin typeface="Cambria Math" panose="02040503050406030204" pitchFamily="18" charset="0"/>
-                              </a:rPr>
-                            </m:ctrlPr>
-                          </m:sSubPr>
-                          <m:e>
-                            <m:r>
-                              <a:rPr lang="de-DE" b="0" i="1" smtClean="0">
-                                <a:latin typeface="Cambria Math" panose="02040503050406030204" pitchFamily="18" charset="0"/>
-                              </a:rPr>
-                              <m:t>𝑚</m:t>
-                            </m:r>
-                          </m:e>
-                          <m:sub>
-                            <m:r>
-                              <a:rPr lang="de-DE" b="0" i="1" smtClean="0">
-                                <a:latin typeface="Cambria Math" panose="02040503050406030204" pitchFamily="18" charset="0"/>
-                              </a:rPr>
-                              <m:t>2</m:t>
-                            </m:r>
-                          </m:sub>
-                        </m:sSub>
-                      </m:num>
-                      <m:den>
-                        <m:sSub>
-                          <m:sSubPr>
-                            <m:ctrlPr>
-                              <a:rPr lang="de-DE" b="0" i="1" smtClean="0">
-                                <a:latin typeface="Cambria Math" panose="02040503050406030204" pitchFamily="18" charset="0"/>
-                              </a:rPr>
-                            </m:ctrlPr>
-                          </m:sSubPr>
-                          <m:e>
-                            <m:r>
-                              <a:rPr lang="de-DE" b="0" i="1" smtClean="0">
-                                <a:latin typeface="Cambria Math" panose="02040503050406030204" pitchFamily="18" charset="0"/>
-                              </a:rPr>
-                              <m:t>𝑚</m:t>
-                            </m:r>
-                          </m:e>
-                          <m:sub>
-                            <m:r>
-                              <a:rPr lang="de-DE" b="0" i="1" smtClean="0">
-                                <a:latin typeface="Cambria Math" panose="02040503050406030204" pitchFamily="18" charset="0"/>
-                              </a:rPr>
-                              <m:t>1</m:t>
-                            </m:r>
-                          </m:sub>
-                        </m:sSub>
-                      </m:den>
-                    </m:f>
-                    <m:sSub>
-                      <m:sSubPr>
-                        <m:ctrlPr>
-                          <a:rPr lang="de-DE" b="0" i="1" smtClean="0">
-                            <a:latin typeface="Cambria Math" panose="02040503050406030204" pitchFamily="18" charset="0"/>
-                          </a:rPr>
-                        </m:ctrlPr>
-                      </m:sSubPr>
-                      <m:e>
-                        <m:r>
-                          <a:rPr lang="de-DE" b="0" i="1" smtClean="0">
-                            <a:latin typeface="Cambria Math" panose="02040503050406030204" pitchFamily="18" charset="0"/>
-                          </a:rPr>
-                          <m:t>𝑟</m:t>
-                        </m:r>
-                      </m:e>
-                      <m:sub>
-                        <m:r>
-                          <a:rPr lang="de-DE" b="0" i="1" smtClean="0">
-                            <a:latin typeface="Cambria Math" panose="02040503050406030204" pitchFamily="18" charset="0"/>
-                          </a:rPr>
-                          <m:t>1</m:t>
-                        </m:r>
-                      </m:sub>
-                    </m:sSub>
-                    <m:r>
-                      <a:rPr lang="de-DE" b="0" i="1" smtClean="0">
                         <a:latin typeface="Cambria Math" panose="02040503050406030204" pitchFamily="18" charset="0"/>
                       </a:rPr>
                       <m:t> </m:t>
@@ -18950,7 +18756,13 @@
                               <a:rPr lang="de-DE" i="1">
                                 <a:latin typeface="Cambria Math" panose="02040503050406030204" pitchFamily="18" charset="0"/>
                               </a:rPr>
-                              <m:t>1−</m:t>
+                              <m:t>1</m:t>
+                            </m:r>
+                            <m:r>
+                              <a:rPr lang="de-DE" b="0" i="1" smtClean="0">
+                                <a:latin typeface="Cambria Math" panose="02040503050406030204" pitchFamily="18" charset="0"/>
+                              </a:rPr>
+                              <m:t>+</m:t>
                             </m:r>
                             <m:f>
                               <m:fPr>
@@ -19102,10 +18914,10 @@
                               </m:sub>
                             </m:sSub>
                             <m:r>
-                              <a:rPr lang="de-DE" i="1">
+                              <a:rPr lang="de-DE" b="0" i="1" smtClean="0">
                                 <a:latin typeface="Cambria Math" panose="02040503050406030204" pitchFamily="18" charset="0"/>
                               </a:rPr>
-                              <m:t>−</m:t>
+                              <m:t>+</m:t>
                             </m:r>
                             <m:sSub>
                               <m:sSubPr>
@@ -19265,10 +19077,10 @@
                               </m:sub>
                             </m:sSub>
                             <m:r>
-                              <a:rPr lang="de-DE" b="1" i="1">
+                              <a:rPr lang="de-DE" b="1" i="1" smtClean="0">
                                 <a:latin typeface="Cambria Math" panose="02040503050406030204" pitchFamily="18" charset="0"/>
                               </a:rPr>
-                              <m:t>−</m:t>
+                              <m:t>+</m:t>
                             </m:r>
                             <m:sSub>
                               <m:sSubPr>
@@ -19398,10 +19210,10 @@
                               </m:sub>
                             </m:sSub>
                             <m:r>
-                              <a:rPr lang="de-DE" i="1">
+                              <a:rPr lang="de-DE" b="0" i="1" smtClean="0">
                                 <a:latin typeface="Cambria Math" panose="02040503050406030204" pitchFamily="18" charset="0"/>
                               </a:rPr>
-                              <m:t>−</m:t>
+                              <m:t>+</m:t>
                             </m:r>
                             <m:sSub>
                               <m:sSubPr>
@@ -19468,10 +19280,10 @@
                               </m:sub>
                             </m:sSub>
                             <m:r>
-                              <a:rPr lang="de-DE" i="1">
+                              <a:rPr lang="de-DE" b="0" i="1" smtClean="0">
                                 <a:latin typeface="Cambria Math" panose="02040503050406030204" pitchFamily="18" charset="0"/>
                               </a:rPr>
-                              <m:t>−</m:t>
+                              <m:t>+</m:t>
                             </m:r>
                             <m:sSub>
                               <m:sSubPr>
@@ -19583,10 +19395,10 @@
                                   </m:sub>
                                 </m:sSub>
                                 <m:r>
-                                  <a:rPr lang="de-DE" b="0" i="1">
+                                  <a:rPr lang="de-DE" b="0" i="1" smtClean="0">
                                     <a:latin typeface="Cambria Math" panose="02040503050406030204" pitchFamily="18" charset="0"/>
                                   </a:rPr>
-                                  <m:t>−</m:t>
+                                  <m:t>+</m:t>
                                 </m:r>
                                 <m:sSub>
                                   <m:sSubPr>
@@ -19733,10 +19545,10 @@
                               </m:sub>
                             </m:sSub>
                             <m:r>
-                              <a:rPr lang="de-DE" b="1" i="1">
+                              <a:rPr lang="de-DE" b="1" i="1" smtClean="0">
                                 <a:latin typeface="Cambria Math" panose="02040503050406030204" pitchFamily="18" charset="0"/>
                               </a:rPr>
-                              <m:t>−</m:t>
+                              <m:t>+</m:t>
                             </m:r>
                             <m:sSub>
                               <m:sSubPr>
@@ -19973,7 +19785,229 @@
                     </m:sSub>
                   </m:oMath>
                 </a14:m>
-                <a:endParaRPr lang="de-DE" sz="2800" b="0" dirty="0"/>
+                <a:endParaRPr lang="de-DE" b="0" dirty="0"/>
+              </a:p>
+              <a:p>
+                <a:pPr>
+                  <a:lnSpc>
+                    <a:spcPct val="120000"/>
+                  </a:lnSpc>
+                  <a:spcAft>
+                    <a:spcPts val="800"/>
+                  </a:spcAft>
+                </a:pPr>
+                <a:r>
+                  <a:rPr lang="de-DE" sz="3200" b="0" dirty="0" err="1"/>
+                  <a:t>Using</a:t>
+                </a:r>
+                <a:r>
+                  <a:rPr lang="de-DE" sz="3200" b="0" dirty="0"/>
+                  <a:t> (2):</a:t>
+                </a:r>
+                <a14:m>
+                  <m:oMath xmlns:m="http://schemas.openxmlformats.org/officeDocument/2006/math">
+                    <m:sSub>
+                      <m:sSubPr>
+                        <m:ctrlPr>
+                          <a:rPr lang="de-DE" sz="3200" b="0" i="1" smtClean="0">
+                            <a:latin typeface="Cambria Math" panose="02040503050406030204" pitchFamily="18" charset="0"/>
+                          </a:rPr>
+                        </m:ctrlPr>
+                      </m:sSubPr>
+                      <m:e>
+                        <m:r>
+                          <a:rPr lang="de-DE" sz="3200" b="0" i="1" smtClean="0">
+                            <a:latin typeface="Cambria Math" panose="02040503050406030204" pitchFamily="18" charset="0"/>
+                          </a:rPr>
+                          <m:t>𝑣</m:t>
+                        </m:r>
+                      </m:e>
+                      <m:sub>
+                        <m:r>
+                          <a:rPr lang="de-DE" sz="3200" b="0" i="1" smtClean="0">
+                            <a:latin typeface="Cambria Math" panose="02040503050406030204" pitchFamily="18" charset="0"/>
+                          </a:rPr>
+                          <m:t>2</m:t>
+                        </m:r>
+                      </m:sub>
+                    </m:sSub>
+                    <m:r>
+                      <a:rPr lang="de-DE" sz="3200" b="0" i="1" smtClean="0">
+                        <a:latin typeface="Cambria Math" panose="02040503050406030204" pitchFamily="18" charset="0"/>
+                      </a:rPr>
+                      <m:t>=</m:t>
+                    </m:r>
+                    <m:rad>
+                      <m:radPr>
+                        <m:degHide m:val="on"/>
+                        <m:ctrlPr>
+                          <a:rPr lang="de-DE" sz="3200" b="0" i="1" smtClean="0">
+                            <a:latin typeface="Cambria Math" panose="02040503050406030204" pitchFamily="18" charset="0"/>
+                          </a:rPr>
+                        </m:ctrlPr>
+                      </m:radPr>
+                      <m:deg/>
+                      <m:e>
+                        <m:f>
+                          <m:fPr>
+                            <m:ctrlPr>
+                              <a:rPr lang="de-DE" sz="3200" i="1">
+                                <a:latin typeface="Cambria Math" panose="02040503050406030204" pitchFamily="18" charset="0"/>
+                              </a:rPr>
+                            </m:ctrlPr>
+                          </m:fPr>
+                          <m:num>
+                            <m:sSub>
+                              <m:sSubPr>
+                                <m:ctrlPr>
+                                  <a:rPr lang="de-DE" sz="3200" i="1">
+                                    <a:latin typeface="Cambria Math" panose="02040503050406030204" pitchFamily="18" charset="0"/>
+                                  </a:rPr>
+                                </m:ctrlPr>
+                              </m:sSubPr>
+                              <m:e>
+                                <m:r>
+                                  <a:rPr lang="de-DE" sz="3200" i="1">
+                                    <a:latin typeface="Cambria Math" panose="02040503050406030204" pitchFamily="18" charset="0"/>
+                                  </a:rPr>
+                                  <m:t>𝑟</m:t>
+                                </m:r>
+                              </m:e>
+                              <m:sub>
+                                <m:r>
+                                  <a:rPr lang="de-DE" sz="3200" i="1">
+                                    <a:latin typeface="Cambria Math" panose="02040503050406030204" pitchFamily="18" charset="0"/>
+                                  </a:rPr>
+                                  <m:t>2</m:t>
+                                </m:r>
+                              </m:sub>
+                            </m:sSub>
+                            <m:r>
+                              <a:rPr lang="de-DE" sz="3200" i="1">
+                                <a:latin typeface="Cambria Math" panose="02040503050406030204" pitchFamily="18" charset="0"/>
+                              </a:rPr>
+                              <m:t>𝐺</m:t>
+                            </m:r>
+                            <m:sSub>
+                              <m:sSubPr>
+                                <m:ctrlPr>
+                                  <a:rPr lang="de-DE" sz="3200" i="1">
+                                    <a:latin typeface="Cambria Math" panose="02040503050406030204" pitchFamily="18" charset="0"/>
+                                  </a:rPr>
+                                </m:ctrlPr>
+                              </m:sSubPr>
+                              <m:e>
+                                <m:r>
+                                  <a:rPr lang="de-DE" sz="3200" i="1">
+                                    <a:latin typeface="Cambria Math" panose="02040503050406030204" pitchFamily="18" charset="0"/>
+                                  </a:rPr>
+                                  <m:t>𝑚</m:t>
+                                </m:r>
+                              </m:e>
+                              <m:sub>
+                                <m:r>
+                                  <a:rPr lang="de-DE" sz="3200" i="1">
+                                    <a:latin typeface="Cambria Math" panose="02040503050406030204" pitchFamily="18" charset="0"/>
+                                  </a:rPr>
+                                  <m:t>1</m:t>
+                                </m:r>
+                              </m:sub>
+                            </m:sSub>
+                          </m:num>
+                          <m:den>
+                            <m:sSup>
+                              <m:sSupPr>
+                                <m:ctrlPr>
+                                  <a:rPr lang="de-DE" sz="3200" i="1">
+                                    <a:latin typeface="Cambria Math" panose="02040503050406030204" pitchFamily="18" charset="0"/>
+                                  </a:rPr>
+                                </m:ctrlPr>
+                              </m:sSupPr>
+                              <m:e>
+                                <m:d>
+                                  <m:dPr>
+                                    <m:ctrlPr>
+                                      <a:rPr lang="de-DE" sz="3200" i="1">
+                                        <a:latin typeface="Cambria Math" panose="02040503050406030204" pitchFamily="18" charset="0"/>
+                                      </a:rPr>
+                                    </m:ctrlPr>
+                                  </m:dPr>
+                                  <m:e>
+                                    <m:sSub>
+                                      <m:sSubPr>
+                                        <m:ctrlPr>
+                                          <a:rPr lang="de-DE" sz="3200" b="0" i="1" smtClean="0">
+                                            <a:latin typeface="Cambria Math" panose="02040503050406030204" pitchFamily="18" charset="0"/>
+                                          </a:rPr>
+                                        </m:ctrlPr>
+                                      </m:sSubPr>
+                                      <m:e>
+                                        <m:r>
+                                          <a:rPr lang="de-DE" sz="3200" b="0" i="1" smtClean="0">
+                                            <a:latin typeface="Cambria Math" panose="02040503050406030204" pitchFamily="18" charset="0"/>
+                                          </a:rPr>
+                                          <m:t>𝑟</m:t>
+                                        </m:r>
+                                      </m:e>
+                                      <m:sub>
+                                        <m:r>
+                                          <a:rPr lang="de-DE" sz="3200" b="0" i="1" smtClean="0">
+                                            <a:latin typeface="Cambria Math" panose="02040503050406030204" pitchFamily="18" charset="0"/>
+                                          </a:rPr>
+                                          <m:t>1</m:t>
+                                        </m:r>
+                                      </m:sub>
+                                    </m:sSub>
+                                    <m:r>
+                                      <a:rPr lang="de-DE" sz="3200" b="0" i="1" smtClean="0">
+                                        <a:latin typeface="Cambria Math" panose="02040503050406030204" pitchFamily="18" charset="0"/>
+                                      </a:rPr>
+                                      <m:t>+</m:t>
+                                    </m:r>
+                                    <m:sSub>
+                                      <m:sSubPr>
+                                        <m:ctrlPr>
+                                          <a:rPr lang="de-DE" sz="3200" b="0" i="1" smtClean="0">
+                                            <a:latin typeface="Cambria Math" panose="02040503050406030204" pitchFamily="18" charset="0"/>
+                                          </a:rPr>
+                                        </m:ctrlPr>
+                                      </m:sSubPr>
+                                      <m:e>
+                                        <m:r>
+                                          <a:rPr lang="de-DE" sz="3200" i="1">
+                                            <a:latin typeface="Cambria Math" panose="02040503050406030204" pitchFamily="18" charset="0"/>
+                                          </a:rPr>
+                                          <m:t>𝑟</m:t>
+                                        </m:r>
+                                      </m:e>
+                                      <m:sub>
+                                        <m:r>
+                                          <a:rPr lang="de-DE" sz="3200" b="0" i="1" smtClean="0">
+                                            <a:latin typeface="Cambria Math" panose="02040503050406030204" pitchFamily="18" charset="0"/>
+                                          </a:rPr>
+                                          <m:t>2</m:t>
+                                        </m:r>
+                                      </m:sub>
+                                    </m:sSub>
+                                  </m:e>
+                                </m:d>
+                              </m:e>
+                              <m:sup>
+                                <m:r>
+                                  <a:rPr lang="de-DE" sz="3200" i="1">
+                                    <a:latin typeface="Cambria Math" panose="02040503050406030204" pitchFamily="18" charset="0"/>
+                                  </a:rPr>
+                                  <m:t>2</m:t>
+                                </m:r>
+                              </m:sup>
+                            </m:sSup>
+                          </m:den>
+                        </m:f>
+                      </m:e>
+                    </m:rad>
+                  </m:oMath>
+                </a14:m>
+                <a:endParaRPr lang="de-DE" sz="3200" b="0" dirty="0"/>
               </a:p>
             </p:txBody>
           </p:sp>
@@ -20003,7 +20037,7 @@
               <a:blipFill>
                 <a:blip r:embed="rId2"/>
                 <a:stretch>
-                  <a:fillRect l="-559" t="-1487"/>
+                  <a:fillRect l="-420" t="-1022"/>
                 </a:stretch>
               </a:blipFill>
             </p:spPr>
@@ -21268,8 +21302,8 @@
             </p:nvSpPr>
             <p:spPr>
               <a:xfrm>
-                <a:off x="8498048" y="3417572"/>
-                <a:ext cx="3693951" cy="1408719"/>
+                <a:off x="8355436" y="3417572"/>
+                <a:ext cx="3836564" cy="1119153"/>
               </a:xfrm>
               <a:prstGeom prst="rect">
                 <a:avLst/>
@@ -21283,38 +21317,38 @@
               <a:lstStyle/>
               <a:p>
                 <a:r>
-                  <a:rPr lang="de-DE" dirty="0"/>
+                  <a:rPr lang="de-DE" sz="1400" dirty="0"/>
                   <a:t>Barycenter </a:t>
                 </a:r>
                 <a:r>
-                  <a:rPr lang="de-DE" dirty="0" err="1"/>
+                  <a:rPr lang="de-DE" sz="1400" dirty="0" err="1"/>
                   <a:t>of</a:t>
                 </a:r>
                 <a:r>
-                  <a:rPr lang="de-DE" dirty="0"/>
+                  <a:rPr lang="de-DE" sz="1400" dirty="0"/>
                   <a:t> </a:t>
                 </a:r>
                 <a:r>
-                  <a:rPr lang="de-DE" dirty="0" err="1"/>
+                  <a:rPr lang="de-DE" sz="1400" dirty="0" err="1"/>
                   <a:t>the</a:t>
                 </a:r>
                 <a:r>
-                  <a:rPr lang="de-DE" dirty="0"/>
+                  <a:rPr lang="de-DE" sz="1400" dirty="0"/>
                   <a:t> </a:t>
                 </a:r>
                 <a:r>
-                  <a:rPr lang="de-DE" dirty="0" err="1"/>
+                  <a:rPr lang="de-DE" sz="1400" dirty="0" err="1"/>
                   <a:t>two</a:t>
                 </a:r>
                 <a:r>
-                  <a:rPr lang="de-DE" dirty="0"/>
+                  <a:rPr lang="de-DE" sz="1400" dirty="0"/>
                   <a:t> </a:t>
                 </a:r>
                 <a:r>
-                  <a:rPr lang="de-DE" dirty="0" err="1"/>
+                  <a:rPr lang="de-DE" sz="1400" dirty="0" err="1"/>
                   <a:t>masses</a:t>
                 </a:r>
-                <a:endParaRPr lang="de-DE" dirty="0"/>
+                <a:endParaRPr lang="de-DE" sz="1400" dirty="0"/>
               </a:p>
               <a:p>
                 <a14:m>
@@ -21323,14 +21357,45 @@
                       <m:jc m:val="centerGroup"/>
                     </m:oMathParaPr>
                     <m:oMath xmlns:m="http://schemas.openxmlformats.org/officeDocument/2006/math">
+                      <m:sSub>
+                        <m:sSubPr>
+                          <m:ctrlPr>
+                            <a:rPr lang="de-DE" sz="1400" b="0" i="1" smtClean="0">
+                              <a:latin typeface="Cambria Math" panose="02040503050406030204" pitchFamily="18" charset="0"/>
+                            </a:rPr>
+                          </m:ctrlPr>
+                        </m:sSubPr>
+                        <m:e>
+                          <m:acc>
+                            <m:accPr>
+                              <m:chr m:val="⃑"/>
+                              <m:ctrlPr>
+                                <a:rPr lang="de-DE" sz="1400" b="0" i="1" smtClean="0">
+                                  <a:latin typeface="Cambria Math" panose="02040503050406030204" pitchFamily="18" charset="0"/>
+                                </a:rPr>
+                              </m:ctrlPr>
+                            </m:accPr>
+                            <m:e>
+                              <m:r>
+                                <a:rPr lang="de-DE" sz="1400" b="0" i="1" smtClean="0">
+                                  <a:latin typeface="Cambria Math" panose="02040503050406030204" pitchFamily="18" charset="0"/>
+                                </a:rPr>
+                                <m:t>𝑟</m:t>
+                              </m:r>
+                            </m:e>
+                          </m:acc>
+                        </m:e>
+                        <m:sub>
+                          <m:r>
+                            <a:rPr lang="de-DE" sz="1400" b="0" i="1" smtClean="0">
+                              <a:latin typeface="Cambria Math" panose="02040503050406030204" pitchFamily="18" charset="0"/>
+                            </a:rPr>
+                            <m:t>𝑏𝑎𝑟𝑦</m:t>
+                          </m:r>
+                        </m:sub>
+                      </m:sSub>
                       <m:r>
-                        <a:rPr lang="de-DE" b="0" i="1" smtClean="0">
-                          <a:latin typeface="Cambria Math" panose="02040503050406030204" pitchFamily="18" charset="0"/>
-                        </a:rPr>
-                        <m:t>𝑅</m:t>
-                      </m:r>
-                      <m:r>
-                        <a:rPr lang="de-DE" b="0" i="1" smtClean="0">
+                        <a:rPr lang="de-DE" sz="1400" b="0" i="1" smtClean="0">
                           <a:latin typeface="Cambria Math" panose="02040503050406030204" pitchFamily="18" charset="0"/>
                         </a:rPr>
                         <m:t>=</m:t>
@@ -21338,7 +21403,7 @@
                       <m:f>
                         <m:fPr>
                           <m:ctrlPr>
-                            <a:rPr lang="de-DE" b="0" i="1" smtClean="0">
+                            <a:rPr lang="de-DE" sz="1400" b="0" i="1" smtClean="0">
                               <a:latin typeface="Cambria Math" panose="02040503050406030204" pitchFamily="18" charset="0"/>
                             </a:rPr>
                           </m:ctrlPr>
@@ -21347,14 +21412,14 @@
                           <m:sSub>
                             <m:sSubPr>
                               <m:ctrlPr>
-                                <a:rPr lang="de-DE" b="0" i="1" smtClean="0">
+                                <a:rPr lang="de-DE" sz="1400" b="0" i="1" smtClean="0">
                                   <a:latin typeface="Cambria Math" panose="02040503050406030204" pitchFamily="18" charset="0"/>
                                 </a:rPr>
                               </m:ctrlPr>
                             </m:sSubPr>
                             <m:e>
                               <m:r>
-                                <a:rPr lang="de-DE" b="0" i="1" smtClean="0">
+                                <a:rPr lang="de-DE" sz="1400" b="0" i="1" smtClean="0">
                                   <a:latin typeface="Cambria Math" panose="02040503050406030204" pitchFamily="18" charset="0"/>
                                 </a:rPr>
                                 <m:t>𝑚</m:t>
@@ -21362,7 +21427,7 @@
                             </m:e>
                             <m:sub>
                               <m:r>
-                                <a:rPr lang="de-DE" b="0" i="1" smtClean="0">
+                                <a:rPr lang="de-DE" sz="1400" b="0" i="1" smtClean="0">
                                   <a:latin typeface="Cambria Math" panose="02040503050406030204" pitchFamily="18" charset="0"/>
                                 </a:rPr>
                                 <m:t>1</m:t>
@@ -21374,14 +21439,14 @@
                           <m:sSub>
                             <m:sSubPr>
                               <m:ctrlPr>
-                                <a:rPr lang="de-DE" b="0" i="1" smtClean="0">
+                                <a:rPr lang="de-DE" sz="1400" b="0" i="1" smtClean="0">
                                   <a:latin typeface="Cambria Math" panose="02040503050406030204" pitchFamily="18" charset="0"/>
                                 </a:rPr>
                               </m:ctrlPr>
                             </m:sSubPr>
                             <m:e>
                               <m:r>
-                                <a:rPr lang="de-DE" b="0" i="1" smtClean="0">
+                                <a:rPr lang="de-DE" sz="1400" b="0" i="1" smtClean="0">
                                   <a:latin typeface="Cambria Math" panose="02040503050406030204" pitchFamily="18" charset="0"/>
                                 </a:rPr>
                                 <m:t>𝑚</m:t>
@@ -21389,7 +21454,7 @@
                             </m:e>
                             <m:sub>
                               <m:r>
-                                <a:rPr lang="de-DE" b="0" i="1" smtClean="0">
+                                <a:rPr lang="de-DE" sz="1400" b="0" i="1" smtClean="0">
                                   <a:latin typeface="Cambria Math" panose="02040503050406030204" pitchFamily="18" charset="0"/>
                                 </a:rPr>
                                 <m:t>1</m:t>
@@ -21397,7 +21462,7 @@
                             </m:sub>
                           </m:sSub>
                           <m:r>
-                            <a:rPr lang="de-DE" b="0" i="1" smtClean="0">
+                            <a:rPr lang="de-DE" sz="1400" b="0" i="1" smtClean="0">
                               <a:latin typeface="Cambria Math" panose="02040503050406030204" pitchFamily="18" charset="0"/>
                             </a:rPr>
                             <m:t>+</m:t>
@@ -21405,14 +21470,14 @@
                           <m:sSub>
                             <m:sSubPr>
                               <m:ctrlPr>
-                                <a:rPr lang="de-DE" b="0" i="1" smtClean="0">
+                                <a:rPr lang="de-DE" sz="1400" b="0" i="1" smtClean="0">
                                   <a:latin typeface="Cambria Math" panose="02040503050406030204" pitchFamily="18" charset="0"/>
                                 </a:rPr>
                               </m:ctrlPr>
                             </m:sSubPr>
                             <m:e>
                               <m:r>
-                                <a:rPr lang="de-DE" b="0" i="1" smtClean="0">
+                                <a:rPr lang="de-DE" sz="1400" b="0" i="1" smtClean="0">
                                   <a:latin typeface="Cambria Math" panose="02040503050406030204" pitchFamily="18" charset="0"/>
                                 </a:rPr>
                                 <m:t>𝑚</m:t>
@@ -21420,7 +21485,7 @@
                             </m:e>
                             <m:sub>
                               <m:r>
-                                <a:rPr lang="de-DE" b="0" i="1" smtClean="0">
+                                <a:rPr lang="de-DE" sz="1400" b="0" i="1" smtClean="0">
                                   <a:latin typeface="Cambria Math" panose="02040503050406030204" pitchFamily="18" charset="0"/>
                                 </a:rPr>
                                 <m:t>2</m:t>
@@ -21432,14 +21497,14 @@
                       <m:sSub>
                         <m:sSubPr>
                           <m:ctrlPr>
-                            <a:rPr lang="de-DE" b="0" i="1" smtClean="0">
+                            <a:rPr lang="de-DE" sz="1400" b="0" i="1" smtClean="0">
                               <a:latin typeface="Cambria Math" panose="02040503050406030204" pitchFamily="18" charset="0"/>
                             </a:rPr>
                           </m:ctrlPr>
                         </m:sSubPr>
                         <m:e>
                           <m:r>
-                            <a:rPr lang="de-DE" b="0" i="1" smtClean="0">
+                            <a:rPr lang="de-DE" sz="1400" b="0" i="1" smtClean="0">
                               <a:latin typeface="Cambria Math" panose="02040503050406030204" pitchFamily="18" charset="0"/>
                             </a:rPr>
                             <m:t>𝑟</m:t>
@@ -21447,7 +21512,7 @@
                         </m:e>
                         <m:sub>
                           <m:r>
-                            <a:rPr lang="de-DE" b="0" i="1" smtClean="0">
+                            <a:rPr lang="de-DE" sz="1400" b="0" i="1" smtClean="0">
                               <a:latin typeface="Cambria Math" panose="02040503050406030204" pitchFamily="18" charset="0"/>
                             </a:rPr>
                             <m:t>1</m:t>
@@ -21455,7 +21520,7 @@
                         </m:sub>
                       </m:sSub>
                       <m:r>
-                        <a:rPr lang="de-DE" b="0" i="1" smtClean="0">
+                        <a:rPr lang="de-DE" sz="1400" b="0" i="1" smtClean="0">
                           <a:latin typeface="Cambria Math" panose="02040503050406030204" pitchFamily="18" charset="0"/>
                         </a:rPr>
                         <m:t>+</m:t>
@@ -21463,7 +21528,7 @@
                       <m:f>
                         <m:fPr>
                           <m:ctrlPr>
-                            <a:rPr lang="de-DE" b="0" i="1" smtClean="0">
+                            <a:rPr lang="de-DE" sz="1400" b="0" i="1" smtClean="0">
                               <a:latin typeface="Cambria Math" panose="02040503050406030204" pitchFamily="18" charset="0"/>
                             </a:rPr>
                           </m:ctrlPr>
@@ -21472,14 +21537,14 @@
                           <m:sSub>
                             <m:sSubPr>
                               <m:ctrlPr>
-                                <a:rPr lang="de-DE" b="0" i="1" smtClean="0">
+                                <a:rPr lang="de-DE" sz="1400" b="0" i="1" smtClean="0">
                                   <a:latin typeface="Cambria Math" panose="02040503050406030204" pitchFamily="18" charset="0"/>
                                 </a:rPr>
                               </m:ctrlPr>
                             </m:sSubPr>
                             <m:e>
                               <m:r>
-                                <a:rPr lang="de-DE" b="0" i="1" smtClean="0">
+                                <a:rPr lang="de-DE" sz="1400" b="0" i="1" smtClean="0">
                                   <a:latin typeface="Cambria Math" panose="02040503050406030204" pitchFamily="18" charset="0"/>
                                 </a:rPr>
                                 <m:t>𝑚</m:t>
@@ -21487,7 +21552,7 @@
                             </m:e>
                             <m:sub>
                               <m:r>
-                                <a:rPr lang="de-DE" b="0" i="1" smtClean="0">
+                                <a:rPr lang="de-DE" sz="1400" b="0" i="1" smtClean="0">
                                   <a:latin typeface="Cambria Math" panose="02040503050406030204" pitchFamily="18" charset="0"/>
                                 </a:rPr>
                                 <m:t>2</m:t>
@@ -21499,14 +21564,14 @@
                           <m:sSub>
                             <m:sSubPr>
                               <m:ctrlPr>
-                                <a:rPr lang="de-DE" b="0" i="1" smtClean="0">
+                                <a:rPr lang="de-DE" sz="1400" b="0" i="1" smtClean="0">
                                   <a:latin typeface="Cambria Math" panose="02040503050406030204" pitchFamily="18" charset="0"/>
                                 </a:rPr>
                               </m:ctrlPr>
                             </m:sSubPr>
                             <m:e>
                               <m:r>
-                                <a:rPr lang="de-DE" b="0" i="1" smtClean="0">
+                                <a:rPr lang="de-DE" sz="1400" b="0" i="1" smtClean="0">
                                   <a:latin typeface="Cambria Math" panose="02040503050406030204" pitchFamily="18" charset="0"/>
                                 </a:rPr>
                                 <m:t>𝑚</m:t>
@@ -21514,7 +21579,7 @@
                             </m:e>
                             <m:sub>
                               <m:r>
-                                <a:rPr lang="de-DE" b="0" i="1" smtClean="0">
+                                <a:rPr lang="de-DE" sz="1400" b="0" i="1" smtClean="0">
                                   <a:latin typeface="Cambria Math" panose="02040503050406030204" pitchFamily="18" charset="0"/>
                                 </a:rPr>
                                 <m:t>1</m:t>
@@ -21522,7 +21587,7 @@
                             </m:sub>
                           </m:sSub>
                           <m:r>
-                            <a:rPr lang="de-DE" b="0" i="1" smtClean="0">
+                            <a:rPr lang="de-DE" sz="1400" b="0" i="1" smtClean="0">
                               <a:latin typeface="Cambria Math" panose="02040503050406030204" pitchFamily="18" charset="0"/>
                             </a:rPr>
                             <m:t>+</m:t>
@@ -21530,14 +21595,14 @@
                           <m:sSub>
                             <m:sSubPr>
                               <m:ctrlPr>
-                                <a:rPr lang="de-DE" b="0" i="1" smtClean="0">
+                                <a:rPr lang="de-DE" sz="1400" b="0" i="1" smtClean="0">
                                   <a:latin typeface="Cambria Math" panose="02040503050406030204" pitchFamily="18" charset="0"/>
                                 </a:rPr>
                               </m:ctrlPr>
                             </m:sSubPr>
                             <m:e>
                               <m:r>
-                                <a:rPr lang="de-DE" b="0" i="1" smtClean="0">
+                                <a:rPr lang="de-DE" sz="1400" b="0" i="1" smtClean="0">
                                   <a:latin typeface="Cambria Math" panose="02040503050406030204" pitchFamily="18" charset="0"/>
                                 </a:rPr>
                                 <m:t>𝑚</m:t>
@@ -21545,7 +21610,7 @@
                             </m:e>
                             <m:sub>
                               <m:r>
-                                <a:rPr lang="de-DE" b="0" i="1" smtClean="0">
+                                <a:rPr lang="de-DE" sz="1400" b="0" i="1" smtClean="0">
                                   <a:latin typeface="Cambria Math" panose="02040503050406030204" pitchFamily="18" charset="0"/>
                                 </a:rPr>
                                 <m:t>2</m:t>
@@ -21557,14 +21622,14 @@
                       <m:sSub>
                         <m:sSubPr>
                           <m:ctrlPr>
-                            <a:rPr lang="de-DE" b="0" i="1" smtClean="0">
+                            <a:rPr lang="de-DE" sz="1400" b="0" i="1" smtClean="0">
                               <a:latin typeface="Cambria Math" panose="02040503050406030204" pitchFamily="18" charset="0"/>
                             </a:rPr>
                           </m:ctrlPr>
                         </m:sSubPr>
                         <m:e>
                           <m:r>
-                            <a:rPr lang="de-DE" b="0" i="1" smtClean="0">
+                            <a:rPr lang="de-DE" sz="1400" b="0" i="1" smtClean="0">
                               <a:latin typeface="Cambria Math" panose="02040503050406030204" pitchFamily="18" charset="0"/>
                             </a:rPr>
                             <m:t>𝑟</m:t>
@@ -21572,7 +21637,7 @@
                         </m:e>
                         <m:sub>
                           <m:r>
-                            <a:rPr lang="de-DE" b="0" i="1" smtClean="0">
+                            <a:rPr lang="de-DE" sz="1400" b="0" i="1" smtClean="0">
                               <a:latin typeface="Cambria Math" panose="02040503050406030204" pitchFamily="18" charset="0"/>
                             </a:rPr>
                             <m:t>2</m:t>
@@ -21580,7 +21645,7 @@
                         </m:sub>
                       </m:sSub>
                       <m:r>
-                        <a:rPr lang="de-DE" b="0" i="1" smtClean="0">
+                        <a:rPr lang="de-DE" sz="1400" b="0" i="1" smtClean="0">
                           <a:latin typeface="Cambria Math" panose="02040503050406030204" pitchFamily="18" charset="0"/>
                         </a:rPr>
                         <m:t>≝0</m:t>
@@ -21588,7 +21653,7 @@
                     </m:oMath>
                     <m:oMath xmlns:m="http://schemas.openxmlformats.org/officeDocument/2006/math">
                       <m:r>
-                        <a:rPr lang="de-DE" b="0" i="0" smtClean="0">
+                        <a:rPr lang="de-DE" sz="1400" b="0" i="0" smtClean="0">
                           <a:latin typeface="Cambria Math" panose="02040503050406030204" pitchFamily="18" charset="0"/>
                         </a:rPr>
                         <m:t>→  </m:t>
@@ -21596,14 +21661,14 @@
                       <m:sSub>
                         <m:sSubPr>
                           <m:ctrlPr>
-                            <a:rPr lang="de-DE" b="1" i="1">
+                            <a:rPr lang="de-DE" sz="1400" b="1" i="1">
                               <a:latin typeface="Cambria Math" panose="02040503050406030204" pitchFamily="18" charset="0"/>
                             </a:rPr>
                           </m:ctrlPr>
                         </m:sSubPr>
                         <m:e>
                           <m:r>
-                            <a:rPr lang="de-DE" b="1" i="1">
+                            <a:rPr lang="de-DE" sz="1400" b="1" i="1">
                               <a:latin typeface="Cambria Math" panose="02040503050406030204" pitchFamily="18" charset="0"/>
                             </a:rPr>
                             <m:t>𝒓</m:t>
@@ -21611,7 +21676,7 @@
                         </m:e>
                         <m:sub>
                           <m:r>
-                            <a:rPr lang="de-DE" b="1" i="1">
+                            <a:rPr lang="de-DE" sz="1400" b="1" i="1">
                               <a:latin typeface="Cambria Math" panose="02040503050406030204" pitchFamily="18" charset="0"/>
                             </a:rPr>
                             <m:t>𝟏</m:t>
@@ -21619,7 +21684,7 @@
                         </m:sub>
                       </m:sSub>
                       <m:r>
-                        <a:rPr lang="de-DE" b="1" i="1" smtClean="0">
+                        <a:rPr lang="de-DE" sz="1400" b="1" i="1" smtClean="0">
                           <a:latin typeface="Cambria Math" panose="02040503050406030204" pitchFamily="18" charset="0"/>
                         </a:rPr>
                         <m:t>=−</m:t>
@@ -21627,7 +21692,7 @@
                       <m:f>
                         <m:fPr>
                           <m:ctrlPr>
-                            <a:rPr lang="de-DE" b="1" i="1">
+                            <a:rPr lang="de-DE" sz="1400" b="1" i="1">
                               <a:latin typeface="Cambria Math" panose="02040503050406030204" pitchFamily="18" charset="0"/>
                             </a:rPr>
                           </m:ctrlPr>
@@ -21636,14 +21701,14 @@
                           <m:sSub>
                             <m:sSubPr>
                               <m:ctrlPr>
-                                <a:rPr lang="de-DE" b="1" i="1">
+                                <a:rPr lang="de-DE" sz="1400" b="1" i="1">
                                   <a:latin typeface="Cambria Math" panose="02040503050406030204" pitchFamily="18" charset="0"/>
                                 </a:rPr>
                               </m:ctrlPr>
                             </m:sSubPr>
                             <m:e>
                               <m:r>
-                                <a:rPr lang="de-DE" b="1" i="1">
+                                <a:rPr lang="de-DE" sz="1400" b="1" i="1">
                                   <a:latin typeface="Cambria Math" panose="02040503050406030204" pitchFamily="18" charset="0"/>
                                 </a:rPr>
                                 <m:t>𝒎</m:t>
@@ -21651,7 +21716,7 @@
                             </m:e>
                             <m:sub>
                               <m:r>
-                                <a:rPr lang="de-DE" b="1" i="1">
+                                <a:rPr lang="de-DE" sz="1400" b="1" i="1">
                                   <a:latin typeface="Cambria Math" panose="02040503050406030204" pitchFamily="18" charset="0"/>
                                 </a:rPr>
                                 <m:t>𝟐</m:t>
@@ -21663,14 +21728,14 @@
                           <m:sSub>
                             <m:sSubPr>
                               <m:ctrlPr>
-                                <a:rPr lang="de-DE" b="1" i="1">
+                                <a:rPr lang="de-DE" sz="1400" b="1" i="1">
                                   <a:latin typeface="Cambria Math" panose="02040503050406030204" pitchFamily="18" charset="0"/>
                                 </a:rPr>
                               </m:ctrlPr>
                             </m:sSubPr>
                             <m:e>
                               <m:r>
-                                <a:rPr lang="de-DE" b="1" i="1">
+                                <a:rPr lang="de-DE" sz="1400" b="1" i="1">
                                   <a:latin typeface="Cambria Math" panose="02040503050406030204" pitchFamily="18" charset="0"/>
                                 </a:rPr>
                                 <m:t>𝒎</m:t>
@@ -21678,7 +21743,7 @@
                             </m:e>
                             <m:sub>
                               <m:r>
-                                <a:rPr lang="de-DE" b="1" i="1">
+                                <a:rPr lang="de-DE" sz="1400" b="1" i="1">
                                   <a:latin typeface="Cambria Math" panose="02040503050406030204" pitchFamily="18" charset="0"/>
                                 </a:rPr>
                                 <m:t>𝟏</m:t>
@@ -21690,14 +21755,14 @@
                       <m:sSub>
                         <m:sSubPr>
                           <m:ctrlPr>
-                            <a:rPr lang="de-DE" b="1" i="1">
+                            <a:rPr lang="de-DE" sz="1400" b="1" i="1">
                               <a:latin typeface="Cambria Math" panose="02040503050406030204" pitchFamily="18" charset="0"/>
                             </a:rPr>
                           </m:ctrlPr>
                         </m:sSubPr>
                         <m:e>
                           <m:r>
-                            <a:rPr lang="de-DE" b="1" i="1">
+                            <a:rPr lang="de-DE" sz="1400" b="1" i="1">
                               <a:latin typeface="Cambria Math" panose="02040503050406030204" pitchFamily="18" charset="0"/>
                             </a:rPr>
                             <m:t>𝒓</m:t>
@@ -21705,7 +21770,7 @@
                         </m:e>
                         <m:sub>
                           <m:r>
-                            <a:rPr lang="de-DE" b="1" i="1">
+                            <a:rPr lang="de-DE" sz="1400" b="1" i="1">
                               <a:latin typeface="Cambria Math" panose="02040503050406030204" pitchFamily="18" charset="0"/>
                             </a:rPr>
                             <m:t>𝟐</m:t>
@@ -21713,13 +21778,13 @@
                         </m:sub>
                       </m:sSub>
                       <m:r>
-                        <a:rPr lang="de-DE" b="1" i="0" smtClean="0">
+                        <a:rPr lang="de-DE" sz="1400" b="1" i="0" smtClean="0">
                           <a:latin typeface="Cambria Math" panose="02040503050406030204" pitchFamily="18" charset="0"/>
                         </a:rPr>
                         <m:t>      </m:t>
                       </m:r>
                       <m:r>
-                        <a:rPr lang="de-DE" b="0" i="0" smtClean="0">
+                        <a:rPr lang="de-DE" sz="1400" b="0" i="0" smtClean="0">
                           <a:latin typeface="Cambria Math" panose="02040503050406030204" pitchFamily="18" charset="0"/>
                         </a:rPr>
                         <m:t>(4)</m:t>
@@ -21727,7 +21792,7 @@
                     </m:oMath>
                   </m:oMathPara>
                 </a14:m>
-                <a:endParaRPr lang="de-DE" dirty="0"/>
+                <a:endParaRPr lang="de-DE" sz="1400" dirty="0"/>
               </a:p>
             </p:txBody>
           </p:sp>
@@ -21749,8 +21814,8 @@
             </p:nvSpPr>
             <p:spPr>
               <a:xfrm>
-                <a:off x="8498048" y="3417572"/>
-                <a:ext cx="3693951" cy="1408719"/>
+                <a:off x="8355436" y="3417572"/>
+                <a:ext cx="3836564" cy="1119153"/>
               </a:xfrm>
               <a:prstGeom prst="rect">
                 <a:avLst/>
@@ -21758,7 +21823,7 @@
               <a:blipFill>
                 <a:blip r:embed="rId9"/>
                 <a:stretch>
-                  <a:fillRect l="-1320" t="-2597"/>
+                  <a:fillRect l="-477" t="-1093"/>
                 </a:stretch>
               </a:blipFill>
             </p:spPr>

</xml_diff>